<commit_message>
added rough title page
</commit_message>
<xml_diff>
--- a/Android Presentation - Java Workshop.pptx
+++ b/Android Presentation - Java Workshop.pptx
@@ -104,6 +104,11 @@
       </a:defRPr>
     </a:lvl9pPr>
   </p:defaultTextStyle>
+  <p:extLst>
+    <p:ext uri="{EFAFB233-063F-42B5-8137-9DF3F51BA10A}">
+      <p15:sldGuideLst xmlns:p15="http://schemas.microsoft.com/office/powerpoint/2012/main"/>
+    </p:ext>
+  </p:extLst>
 </p:presentation>
 </file>
 
@@ -2979,7 +2984,11 @@
           <a:bodyPr/>
           <a:lstStyle/>
           <a:p>
-            <a:endParaRPr lang="en-US"/>
+            <a:r>
+              <a:rPr lang="en-US" dirty="0" smtClean="0"/>
+              <a:t>Android Presentation</a:t>
+            </a:r>
+            <a:endParaRPr lang="en-US" dirty="0"/>
           </a:p>
         </p:txBody>
       </p:sp>
@@ -2998,7 +3007,15 @@
           <a:bodyPr/>
           <a:lstStyle/>
           <a:p>
-            <a:endParaRPr lang="en-US"/>
+            <a:r>
+              <a:rPr lang="en-US" dirty="0" smtClean="0"/>
+              <a:t>Yonatan </a:t>
+            </a:r>
+            <a:r>
+              <a:rPr lang="en-US" dirty="0" err="1" smtClean="0"/>
+              <a:t>Giventer</a:t>
+            </a:r>
+            <a:endParaRPr lang="en-US" dirty="0"/>
           </a:p>
         </p:txBody>
       </p:sp>

</xml_diff>

<commit_message>
added new empty slide
</commit_message>
<xml_diff>
--- a/Android Presentation - Java Workshop.pptx
+++ b/Android Presentation - Java Workshop.pptx
@@ -6,6 +6,7 @@
   </p:sldMasterIdLst>
   <p:sldIdLst>
     <p:sldId id="256" r:id="rId2"/>
+    <p:sldId id="257" r:id="rId3"/>
   </p:sldIdLst>
   <p:sldSz cx="12192000" cy="6858000"/>
   <p:notesSz cx="6858000" cy="9144000"/>
@@ -3032,6 +3033,74 @@
 </p:sld>
 </file>
 
+<file path=ppt/slides/slide2.xml><?xml version="1.0" encoding="utf-8"?>
+<p:sld xmlns:a="http://schemas.openxmlformats.org/drawingml/2006/main" xmlns:r="http://schemas.openxmlformats.org/officeDocument/2006/relationships" xmlns:p="http://schemas.openxmlformats.org/presentationml/2006/main">
+  <p:cSld>
+    <p:spTree>
+      <p:nvGrpSpPr>
+        <p:cNvPr id="1" name=""/>
+        <p:cNvGrpSpPr/>
+        <p:nvPr/>
+      </p:nvGrpSpPr>
+      <p:grpSpPr>
+        <a:xfrm>
+          <a:off x="0" y="0"/>
+          <a:ext cx="0" cy="0"/>
+          <a:chOff x="0" y="0"/>
+          <a:chExt cx="0" cy="0"/>
+        </a:xfrm>
+      </p:grpSpPr>
+      <p:sp>
+        <p:nvSpPr>
+          <p:cNvPr id="2" name="Title 1"/>
+          <p:cNvSpPr>
+            <a:spLocks noGrp="1"/>
+          </p:cNvSpPr>
+          <p:nvPr>
+            <p:ph type="title"/>
+          </p:nvPr>
+        </p:nvSpPr>
+        <p:spPr/>
+        <p:txBody>
+          <a:bodyPr/>
+          <a:lstStyle/>
+          <a:p>
+            <a:endParaRPr lang="en-US"/>
+          </a:p>
+        </p:txBody>
+      </p:sp>
+      <p:sp>
+        <p:nvSpPr>
+          <p:cNvPr id="3" name="Content Placeholder 2"/>
+          <p:cNvSpPr>
+            <a:spLocks noGrp="1"/>
+          </p:cNvSpPr>
+          <p:nvPr>
+            <p:ph idx="1"/>
+          </p:nvPr>
+        </p:nvSpPr>
+        <p:spPr/>
+        <p:txBody>
+          <a:bodyPr/>
+          <a:lstStyle/>
+          <a:p>
+            <a:endParaRPr lang="en-US"/>
+          </a:p>
+        </p:txBody>
+      </p:sp>
+    </p:spTree>
+    <p:extLst>
+      <p:ext uri="{BB962C8B-B14F-4D97-AF65-F5344CB8AC3E}">
+        <p14:creationId xmlns:p14="http://schemas.microsoft.com/office/powerpoint/2010/main" val="794581574"/>
+      </p:ext>
+    </p:extLst>
+  </p:cSld>
+  <p:clrMapOvr>
+    <a:masterClrMapping/>
+  </p:clrMapOvr>
+</p:sld>
+</file>
+
 <file path=ppt/theme/theme1.xml><?xml version="1.0" encoding="utf-8"?>
 <a:theme xmlns:a="http://schemas.openxmlformats.org/drawingml/2006/main" name="Office Theme">
   <a:themeElements>

</xml_diff>

<commit_message>
added table of contents (rough draft)
</commit_message>
<xml_diff>
--- a/Android Presentation - Java Workshop.pptx
+++ b/Android Presentation - Java Workshop.pptx
@@ -3801,15 +3801,118 @@
         </p:nvSpPr>
         <p:spPr/>
         <p:txBody>
-          <a:bodyPr/>
+          <a:bodyPr>
+            <a:normAutofit/>
+          </a:bodyPr>
           <a:lstStyle/>
           <a:p>
             <a:pPr algn="r" rtl="1"/>
             <a:r>
-              <a:rPr lang="he-IL" dirty="0" smtClean="0"/>
+              <a:rPr lang="he-IL" sz="2800" dirty="0" smtClean="0"/>
               <a:t>הקדמה</a:t>
             </a:r>
-            <a:endParaRPr lang="en-US" dirty="0"/>
+            <a:endParaRPr lang="en-US" sz="2800" dirty="0" smtClean="0"/>
+          </a:p>
+          <a:p>
+            <a:pPr algn="r" rtl="1"/>
+            <a:r>
+              <a:rPr lang="he-IL" sz="2800" dirty="0" smtClean="0"/>
+              <a:t>התקנת סביבת העבודה</a:t>
+            </a:r>
+          </a:p>
+          <a:p>
+            <a:pPr algn="r" rtl="1"/>
+            <a:r>
+              <a:rPr lang="he-IL" sz="2800" dirty="0" smtClean="0"/>
+              <a:t>הרכב הפרוייק</a:t>
+            </a:r>
+            <a:r>
+              <a:rPr lang="he-IL" sz="2800" dirty="0">
+                <a:solidFill>
+                  <a:prstClr val="white"/>
+                </a:solidFill>
+              </a:rPr>
+              <a:t>ט </a:t>
+            </a:r>
+            <a:r>
+              <a:rPr lang="en-US" sz="1400" dirty="0">
+                <a:solidFill>
+                  <a:prstClr val="white"/>
+                </a:solidFill>
+              </a:rPr>
+              <a:t>[manifest, </a:t>
+            </a:r>
+            <a:r>
+              <a:rPr lang="en-US" sz="1400" dirty="0" err="1">
+                <a:solidFill>
+                  <a:prstClr val="white"/>
+                </a:solidFill>
+              </a:rPr>
+              <a:t>gradle</a:t>
+            </a:r>
+            <a:r>
+              <a:rPr lang="en-US" sz="1400" dirty="0">
+                <a:solidFill>
+                  <a:prstClr val="white"/>
+                </a:solidFill>
+              </a:rPr>
+              <a:t>, res, java]</a:t>
+            </a:r>
+            <a:endParaRPr lang="en-US" sz="2800" dirty="0" smtClean="0"/>
+          </a:p>
+          <a:p>
+            <a:pPr algn="r" rtl="1"/>
+            <a:r>
+              <a:rPr lang="he-IL" sz="2800" dirty="0" smtClean="0"/>
+              <a:t>עיצוב </a:t>
+            </a:r>
+            <a:r>
+              <a:rPr lang="en-US" sz="2800" dirty="0" smtClean="0"/>
+              <a:t>UI</a:t>
+            </a:r>
+            <a:r>
+              <a:rPr lang="he-IL" sz="2800" dirty="0" smtClean="0"/>
+              <a:t> באנדרואיד</a:t>
+            </a:r>
+          </a:p>
+          <a:p>
+            <a:pPr algn="r" rtl="1"/>
+            <a:r>
+              <a:rPr lang="he-IL" sz="2800" dirty="0" smtClean="0"/>
+              <a:t>מרכיבים עיקריים בארכיטקטורת אנדרואיד </a:t>
+            </a:r>
+            <a:r>
+              <a:rPr lang="en-US" sz="1400" dirty="0" smtClean="0">
+                <a:solidFill>
+                  <a:prstClr val="white"/>
+                </a:solidFill>
+              </a:rPr>
+              <a:t>[activity, </a:t>
+            </a:r>
+            <a:r>
+              <a:rPr lang="en-US" sz="1400" dirty="0" err="1" smtClean="0">
+                <a:solidFill>
+                  <a:prstClr val="white"/>
+                </a:solidFill>
+              </a:rPr>
+              <a:t>fagment</a:t>
+            </a:r>
+            <a:r>
+              <a:rPr lang="en-US" sz="1400" dirty="0" smtClean="0">
+                <a:solidFill>
+                  <a:prstClr val="white"/>
+                </a:solidFill>
+              </a:rPr>
+              <a:t>, intent, broadcasting, services, content resolving/providing]</a:t>
+            </a:r>
+          </a:p>
+          <a:p>
+            <a:pPr algn="r" rtl="1"/>
+            <a:r>
+              <a:rPr lang="he-IL" sz="2800" smtClean="0"/>
+              <a:t>פרוייקט קטן לדוגמה</a:t>
+            </a:r>
+            <a:endParaRPr lang="en-US" sz="2800" dirty="0"/>
           </a:p>
         </p:txBody>
       </p:sp>

</xml_diff>

<commit_message>
added opening screen picture
</commit_message>
<xml_diff>
--- a/Android Presentation - Java Workshop.pptx
+++ b/Android Presentation - Java Workshop.pptx
@@ -4611,8 +4611,8 @@
         </p:blipFill>
         <p:spPr>
           <a:xfrm>
-            <a:off x="894182" y="2247200"/>
-            <a:ext cx="2520000" cy="1728000"/>
+            <a:off x="598621" y="3014597"/>
+            <a:ext cx="1950618" cy="1337567"/>
           </a:xfrm>
         </p:spPr>
       </p:pic>
@@ -4683,6 +4683,229 @@
                 <a:srgbClr val="FFE701"/>
               </a:solidFill>
             </a:endParaRPr>
+          </a:p>
+        </p:txBody>
+      </p:sp>
+      <p:pic>
+        <p:nvPicPr>
+          <p:cNvPr id="7" name="Picture 6"/>
+          <p:cNvPicPr>
+            <a:picLocks noChangeAspect="1"/>
+          </p:cNvPicPr>
+          <p:nvPr/>
+        </p:nvPicPr>
+        <p:blipFill>
+          <a:blip r:embed="rId3">
+            <a:extLst>
+              <a:ext uri="{28A0092B-C50C-407E-A947-70E740481C1C}">
+                <a14:useLocalDpi xmlns:a14="http://schemas.microsoft.com/office/drawing/2010/main" val="0"/>
+              </a:ext>
+            </a:extLst>
+          </a:blip>
+          <a:stretch>
+            <a:fillRect/>
+          </a:stretch>
+        </p:blipFill>
+        <p:spPr>
+          <a:xfrm>
+            <a:off x="3121665" y="1852654"/>
+            <a:ext cx="5506147" cy="3402837"/>
+          </a:xfrm>
+          <a:prstGeom prst="rect">
+            <a:avLst/>
+          </a:prstGeom>
+        </p:spPr>
+      </p:pic>
+      <p:sp>
+        <p:nvSpPr>
+          <p:cNvPr id="8" name="Content Placeholder 2"/>
+          <p:cNvSpPr txBox="1">
+            <a:spLocks/>
+          </p:cNvSpPr>
+          <p:nvPr/>
+        </p:nvSpPr>
+        <p:spPr>
+          <a:xfrm>
+            <a:off x="968076" y="5338852"/>
+            <a:ext cx="7940660" cy="854521"/>
+          </a:xfrm>
+          <a:prstGeom prst="rect">
+            <a:avLst/>
+          </a:prstGeom>
+        </p:spPr>
+        <p:txBody>
+          <a:bodyPr vert="horz" lIns="91440" tIns="45720" rIns="91440" bIns="45720" rtlCol="0">
+            <a:normAutofit fontScale="70000" lnSpcReduction="20000"/>
+          </a:bodyPr>
+          <a:lstStyle>
+            <a:lvl1pPr marL="457189" indent="-457189" algn="l" defTabSz="1219170" rtl="0" eaLnBrk="1" latinLnBrk="0" hangingPunct="1">
+              <a:spcBef>
+                <a:spcPct val="20000"/>
+              </a:spcBef>
+              <a:buFont typeface="Arial" pitchFamily="34" charset="0"/>
+              <a:buChar char="•"/>
+              <a:defRPr sz="3733" kern="1200">
+                <a:solidFill>
+                  <a:schemeClr val="bg1"/>
+                </a:solidFill>
+                <a:latin typeface="+mn-lt"/>
+                <a:ea typeface="+mn-ea"/>
+                <a:cs typeface="+mn-cs"/>
+              </a:defRPr>
+            </a:lvl1pPr>
+            <a:lvl2pPr marL="990575" indent="-380990" algn="l" defTabSz="1219170" rtl="0" eaLnBrk="1" latinLnBrk="0" hangingPunct="1">
+              <a:spcBef>
+                <a:spcPct val="20000"/>
+              </a:spcBef>
+              <a:buFont typeface="Arial" pitchFamily="34" charset="0"/>
+              <a:buChar char="–"/>
+              <a:defRPr sz="3733" kern="1200">
+                <a:solidFill>
+                  <a:schemeClr val="bg1"/>
+                </a:solidFill>
+                <a:latin typeface="+mn-lt"/>
+                <a:ea typeface="+mn-ea"/>
+                <a:cs typeface="+mn-cs"/>
+              </a:defRPr>
+            </a:lvl2pPr>
+            <a:lvl3pPr marL="1523962" indent="-304792" algn="l" defTabSz="1219170" rtl="0" eaLnBrk="1" latinLnBrk="0" hangingPunct="1">
+              <a:spcBef>
+                <a:spcPct val="20000"/>
+              </a:spcBef>
+              <a:buFont typeface="Arial" pitchFamily="34" charset="0"/>
+              <a:buChar char="•"/>
+              <a:defRPr sz="3200" kern="1200">
+                <a:solidFill>
+                  <a:schemeClr val="bg1"/>
+                </a:solidFill>
+                <a:latin typeface="+mn-lt"/>
+                <a:ea typeface="+mn-ea"/>
+                <a:cs typeface="+mn-cs"/>
+              </a:defRPr>
+            </a:lvl3pPr>
+            <a:lvl4pPr marL="2133547" indent="-304792" algn="l" defTabSz="1219170" rtl="0" eaLnBrk="1" latinLnBrk="0" hangingPunct="1">
+              <a:spcBef>
+                <a:spcPct val="20000"/>
+              </a:spcBef>
+              <a:buFont typeface="Arial" pitchFamily="34" charset="0"/>
+              <a:buChar char="–"/>
+              <a:defRPr sz="2667" kern="1200">
+                <a:solidFill>
+                  <a:schemeClr val="bg1"/>
+                </a:solidFill>
+                <a:latin typeface="+mn-lt"/>
+                <a:ea typeface="+mn-ea"/>
+                <a:cs typeface="+mn-cs"/>
+              </a:defRPr>
+            </a:lvl4pPr>
+            <a:lvl5pPr marL="2743131" indent="-304792" algn="l" defTabSz="1219170" rtl="0" eaLnBrk="1" latinLnBrk="0" hangingPunct="1">
+              <a:spcBef>
+                <a:spcPct val="20000"/>
+              </a:spcBef>
+              <a:buFont typeface="Arial" pitchFamily="34" charset="0"/>
+              <a:buChar char="»"/>
+              <a:defRPr sz="2667" kern="1200">
+                <a:solidFill>
+                  <a:schemeClr val="bg1"/>
+                </a:solidFill>
+                <a:latin typeface="+mn-lt"/>
+                <a:ea typeface="+mn-ea"/>
+                <a:cs typeface="+mn-cs"/>
+              </a:defRPr>
+            </a:lvl5pPr>
+            <a:lvl6pPr marL="3352716" indent="-304792" algn="l" defTabSz="1219170" rtl="0" eaLnBrk="1" latinLnBrk="0" hangingPunct="1">
+              <a:spcBef>
+                <a:spcPct val="20000"/>
+              </a:spcBef>
+              <a:buFont typeface="Arial" pitchFamily="34" charset="0"/>
+              <a:buChar char="•"/>
+              <a:defRPr sz="2667" kern="1200">
+                <a:solidFill>
+                  <a:schemeClr val="tx1"/>
+                </a:solidFill>
+                <a:latin typeface="+mn-lt"/>
+                <a:ea typeface="+mn-ea"/>
+                <a:cs typeface="+mn-cs"/>
+              </a:defRPr>
+            </a:lvl6pPr>
+            <a:lvl7pPr marL="3962301" indent="-304792" algn="l" defTabSz="1219170" rtl="0" eaLnBrk="1" latinLnBrk="0" hangingPunct="1">
+              <a:spcBef>
+                <a:spcPct val="20000"/>
+              </a:spcBef>
+              <a:buFont typeface="Arial" pitchFamily="34" charset="0"/>
+              <a:buChar char="•"/>
+              <a:defRPr sz="2667" kern="1200">
+                <a:solidFill>
+                  <a:schemeClr val="tx1"/>
+                </a:solidFill>
+                <a:latin typeface="+mn-lt"/>
+                <a:ea typeface="+mn-ea"/>
+                <a:cs typeface="+mn-cs"/>
+              </a:defRPr>
+            </a:lvl7pPr>
+            <a:lvl8pPr marL="4571886" indent="-304792" algn="l" defTabSz="1219170" rtl="0" eaLnBrk="1" latinLnBrk="0" hangingPunct="1">
+              <a:spcBef>
+                <a:spcPct val="20000"/>
+              </a:spcBef>
+              <a:buFont typeface="Arial" pitchFamily="34" charset="0"/>
+              <a:buChar char="•"/>
+              <a:defRPr sz="2667" kern="1200">
+                <a:solidFill>
+                  <a:schemeClr val="tx1"/>
+                </a:solidFill>
+                <a:latin typeface="+mn-lt"/>
+                <a:ea typeface="+mn-ea"/>
+                <a:cs typeface="+mn-cs"/>
+              </a:defRPr>
+            </a:lvl8pPr>
+            <a:lvl9pPr marL="5181470" indent="-304792" algn="l" defTabSz="1219170" rtl="0" eaLnBrk="1" latinLnBrk="0" hangingPunct="1">
+              <a:spcBef>
+                <a:spcPct val="20000"/>
+              </a:spcBef>
+              <a:buFont typeface="Arial" pitchFamily="34" charset="0"/>
+              <a:buChar char="•"/>
+              <a:defRPr sz="2667" kern="1200">
+                <a:solidFill>
+                  <a:schemeClr val="tx1"/>
+                </a:solidFill>
+                <a:latin typeface="+mn-lt"/>
+                <a:ea typeface="+mn-ea"/>
+                <a:cs typeface="+mn-cs"/>
+              </a:defRPr>
+            </a:lvl9pPr>
+          </a:lstStyle>
+          <a:p>
+            <a:pPr marL="0" indent="0" algn="r" rtl="1">
+              <a:buFont typeface="Arial" pitchFamily="34" charset="0"/>
+              <a:buNone/>
+            </a:pPr>
+            <a:r>
+              <a:rPr lang="he-IL" sz="3730" dirty="0" smtClean="0"/>
+              <a:t>מגיעים למסך הפתיח של </a:t>
+            </a:r>
+            <a:r>
+              <a:rPr lang="en-US" sz="3730" dirty="0" smtClean="0"/>
+              <a:t> Android Studio</a:t>
+            </a:r>
+          </a:p>
+          <a:p>
+            <a:pPr marL="0" indent="0" algn="r" rtl="1">
+              <a:buFont typeface="Arial" pitchFamily="34" charset="0"/>
+              <a:buNone/>
+            </a:pPr>
+            <a:r>
+              <a:rPr lang="he-IL" sz="3730" dirty="0" smtClean="0"/>
+              <a:t>ניתן ללחוץ על האופציה הראשונה ליצירת </a:t>
+            </a:r>
+            <a:r>
+              <a:rPr lang="he-IL" sz="3730" dirty="0" err="1" smtClean="0"/>
+              <a:t>פרוייקט</a:t>
+            </a:r>
+            <a:r>
+              <a:rPr lang="he-IL" sz="3730" dirty="0" smtClean="0"/>
+              <a:t> חדש</a:t>
+            </a:r>
+            <a:endParaRPr lang="en-US" sz="3730" dirty="0"/>
           </a:p>
         </p:txBody>
       </p:sp>

</xml_diff>

<commit_message>
added next page of open screen
</commit_message>
<xml_diff>
--- a/Android Presentation - Java Workshop.pptx
+++ b/Android Presentation - Java Workshop.pptx
@@ -10,8 +10,11 @@
     <p:sldId id="264" r:id="rId4"/>
     <p:sldId id="265" r:id="rId5"/>
     <p:sldId id="266" r:id="rId6"/>
-    <p:sldId id="267" r:id="rId7"/>
-    <p:sldId id="268" r:id="rId8"/>
+    <p:sldId id="269" r:id="rId7"/>
+    <p:sldId id="267" r:id="rId8"/>
+    <p:sldId id="268" r:id="rId9"/>
+    <p:sldId id="270" r:id="rId10"/>
+    <p:sldId id="271" r:id="rId11"/>
   </p:sldIdLst>
   <p:sldSz cx="12192000" cy="6858000"/>
   <p:notesSz cx="6858000" cy="9144000"/>
@@ -3731,6 +3734,299 @@
 </p:sld>
 </file>
 
+<file path=ppt/slides/slide10.xml><?xml version="1.0" encoding="utf-8"?>
+<p:sld xmlns:a="http://schemas.openxmlformats.org/drawingml/2006/main" xmlns:r="http://schemas.openxmlformats.org/officeDocument/2006/relationships" xmlns:p="http://schemas.openxmlformats.org/presentationml/2006/main">
+  <p:cSld>
+    <p:spTree>
+      <p:nvGrpSpPr>
+        <p:cNvPr id="1" name=""/>
+        <p:cNvGrpSpPr/>
+        <p:nvPr/>
+      </p:nvGrpSpPr>
+      <p:grpSpPr>
+        <a:xfrm>
+          <a:off x="0" y="0"/>
+          <a:ext cx="0" cy="0"/>
+          <a:chOff x="0" y="0"/>
+          <a:chExt cx="0" cy="0"/>
+        </a:xfrm>
+      </p:grpSpPr>
+      <p:sp>
+        <p:nvSpPr>
+          <p:cNvPr id="2" name="Title 1"/>
+          <p:cNvSpPr>
+            <a:spLocks noGrp="1"/>
+          </p:cNvSpPr>
+          <p:nvPr>
+            <p:ph type="title"/>
+          </p:nvPr>
+        </p:nvSpPr>
+        <p:spPr/>
+        <p:txBody>
+          <a:bodyPr>
+            <a:normAutofit fontScale="90000"/>
+          </a:bodyPr>
+          <a:lstStyle/>
+          <a:p>
+            <a:pPr algn="r" rtl="1"/>
+            <a:r>
+              <a:rPr lang="he-IL" dirty="0"/>
+              <a:t>התקנת סביבת </a:t>
+            </a:r>
+            <a:r>
+              <a:rPr lang="he-IL" dirty="0" smtClean="0"/>
+              <a:t>העבודה</a:t>
+            </a:r>
+            <a:endParaRPr lang="en-US" dirty="0"/>
+          </a:p>
+        </p:txBody>
+      </p:sp>
+      <p:sp>
+        <p:nvSpPr>
+          <p:cNvPr id="3" name="Content Placeholder 2"/>
+          <p:cNvSpPr>
+            <a:spLocks noGrp="1"/>
+          </p:cNvSpPr>
+          <p:nvPr>
+            <p:ph idx="1"/>
+          </p:nvPr>
+        </p:nvSpPr>
+        <p:spPr>
+          <a:xfrm>
+            <a:off x="5652655" y="2063315"/>
+            <a:ext cx="3823855" cy="3827710"/>
+          </a:xfrm>
+        </p:spPr>
+        <p:txBody>
+          <a:bodyPr>
+            <a:normAutofit fontScale="40000" lnSpcReduction="20000"/>
+          </a:bodyPr>
+          <a:lstStyle/>
+          <a:p>
+            <a:pPr marL="0" indent="0" algn="r" rtl="1">
+              <a:buNone/>
+            </a:pPr>
+            <a:r>
+              <a:rPr lang="he-IL" dirty="0" smtClean="0"/>
+              <a:t>ניבחר שם ליישום ואת ה</a:t>
+            </a:r>
+            <a:r>
+              <a:rPr lang="en-US" dirty="0" smtClean="0"/>
+              <a:t>package</a:t>
+            </a:r>
+            <a:r>
+              <a:rPr lang="he-IL" dirty="0" smtClean="0"/>
+              <a:t> שלו (המוכר לנו מפיתוח בשפת </a:t>
+            </a:r>
+            <a:r>
+              <a:rPr lang="en-US" dirty="0" smtClean="0"/>
+              <a:t>Java</a:t>
+            </a:r>
+            <a:r>
+              <a:rPr lang="he-IL" dirty="0" smtClean="0"/>
+              <a:t>). בנוסף נחבר מיקום לשמירת </a:t>
+            </a:r>
+            <a:r>
+              <a:rPr lang="he-IL" dirty="0" err="1" smtClean="0"/>
+              <a:t>הפרוייקט</a:t>
+            </a:r>
+            <a:r>
+              <a:rPr lang="he-IL" dirty="0" smtClean="0"/>
+              <a:t> (ניתן להשאיר את המיקום עם ברירת המחדל).</a:t>
+            </a:r>
+            <a:endParaRPr lang="en-US" dirty="0"/>
+          </a:p>
+          <a:p>
+            <a:pPr marL="0" indent="0" algn="r" rtl="1">
+              <a:buNone/>
+            </a:pPr>
+            <a:endParaRPr lang="he-IL" dirty="0" smtClean="0"/>
+          </a:p>
+          <a:p>
+            <a:pPr marL="0" indent="0" algn="r" rtl="1">
+              <a:buNone/>
+            </a:pPr>
+            <a:r>
+              <a:rPr lang="he-IL" dirty="0" smtClean="0"/>
+              <a:t>יש צורך לבחור את שפת הפיתוח </a:t>
+            </a:r>
+            <a:r>
+              <a:rPr lang="he-IL" dirty="0" err="1" smtClean="0"/>
+              <a:t>לפרוייקט</a:t>
+            </a:r>
+            <a:r>
+              <a:rPr lang="he-IL" dirty="0" smtClean="0"/>
+              <a:t> מבין </a:t>
+            </a:r>
+            <a:r>
+              <a:rPr lang="en-US" dirty="0" smtClean="0"/>
+              <a:t>Java</a:t>
+            </a:r>
+            <a:r>
+              <a:rPr lang="he-IL" dirty="0" smtClean="0"/>
+              <a:t> ו</a:t>
+            </a:r>
+            <a:r>
+              <a:rPr lang="en-US" dirty="0" err="1" smtClean="0"/>
+              <a:t>Kotlin</a:t>
+            </a:r>
+            <a:r>
+              <a:rPr lang="en-US" dirty="0" smtClean="0"/>
+              <a:t> </a:t>
+            </a:r>
+            <a:r>
+              <a:rPr lang="he-IL" dirty="0" smtClean="0"/>
+              <a:t>. בדוגמה זו נבחר את </a:t>
+            </a:r>
+            <a:r>
+              <a:rPr lang="en-US" dirty="0" smtClean="0"/>
+              <a:t>Java</a:t>
+            </a:r>
+            <a:r>
+              <a:rPr lang="he-IL" dirty="0" smtClean="0"/>
+              <a:t>.</a:t>
+            </a:r>
+            <a:endParaRPr lang="en-US" dirty="0" smtClean="0"/>
+          </a:p>
+          <a:p>
+            <a:pPr marL="0" indent="0" algn="r" rtl="1">
+              <a:buNone/>
+            </a:pPr>
+            <a:endParaRPr lang="he-IL" dirty="0"/>
+          </a:p>
+          <a:p>
+            <a:pPr marL="0" indent="0" algn="r" rtl="1">
+              <a:buNone/>
+            </a:pPr>
+            <a:r>
+              <a:rPr lang="he-IL" dirty="0" smtClean="0"/>
+              <a:t>לבסוף נבחר את ה</a:t>
+            </a:r>
+            <a:r>
+              <a:rPr lang="en-US" dirty="0" smtClean="0"/>
+              <a:t>SDK</a:t>
+            </a:r>
+            <a:r>
+              <a:rPr lang="he-IL" dirty="0" smtClean="0"/>
+              <a:t> המינימלי שנתמוך בו. יש להשתמש בשיקול דעת בבחירת גרסה מינימלית. ככל הגרסה נמוכה יותר ניתן להגיע לקהל רחב יותר (עד גבול מסוים) אבל תמיכה בהרבה גרסאות מסרבל את פיתוח </a:t>
+            </a:r>
+            <a:r>
+              <a:rPr lang="he-IL" dirty="0" err="1" smtClean="0"/>
+              <a:t>הפרוייקט</a:t>
+            </a:r>
+            <a:r>
+              <a:rPr lang="he-IL" dirty="0" smtClean="0"/>
+              <a:t> כי במספר מקומות יש התנהגויות שונות לגרסאות שונות ופיצ'רים חדשים שאולי נרצה להשתמש בהם שאינם קיימים בגרסאות ישנות יותר.</a:t>
+            </a:r>
+            <a:endParaRPr lang="en-US" dirty="0"/>
+          </a:p>
+        </p:txBody>
+      </p:sp>
+      <p:sp>
+        <p:nvSpPr>
+          <p:cNvPr id="4" name="Title 1"/>
+          <p:cNvSpPr txBox="1">
+            <a:spLocks/>
+          </p:cNvSpPr>
+          <p:nvPr/>
+        </p:nvSpPr>
+        <p:spPr>
+          <a:xfrm>
+            <a:off x="598621" y="1089129"/>
+            <a:ext cx="7376537" cy="763525"/>
+          </a:xfrm>
+          <a:prstGeom prst="rect">
+            <a:avLst/>
+          </a:prstGeom>
+        </p:spPr>
+        <p:txBody>
+          <a:bodyPr vert="horz" lIns="91440" tIns="45720" rIns="91440" bIns="45720" rtlCol="0" anchor="ctr">
+            <a:normAutofit fontScale="97500"/>
+          </a:bodyPr>
+          <a:lstStyle>
+            <a:lvl1pPr algn="l" defTabSz="1219170" rtl="0" eaLnBrk="1" latinLnBrk="0" hangingPunct="1">
+              <a:spcBef>
+                <a:spcPct val="0"/>
+              </a:spcBef>
+              <a:buNone/>
+              <a:defRPr sz="4800" kern="1200">
+                <a:solidFill>
+                  <a:srgbClr val="FFC000"/>
+                </a:solidFill>
+                <a:effectLst>
+                  <a:outerShdw blurRad="50800" dist="38100" dir="2700000" algn="tl" rotWithShape="0">
+                    <a:prstClr val="black">
+                      <a:alpha val="40000"/>
+                    </a:prstClr>
+                  </a:outerShdw>
+                </a:effectLst>
+                <a:latin typeface="+mj-lt"/>
+                <a:ea typeface="+mj-ea"/>
+                <a:cs typeface="+mj-cs"/>
+              </a:defRPr>
+            </a:lvl1pPr>
+          </a:lstStyle>
+          <a:p>
+            <a:pPr algn="r" rtl="1"/>
+            <a:r>
+              <a:rPr lang="he-IL" sz="4000" dirty="0">
+                <a:solidFill>
+                  <a:srgbClr val="FFE701"/>
+                </a:solidFill>
+              </a:rPr>
+              <a:t>פתיחת הסביבה</a:t>
+            </a:r>
+            <a:endParaRPr lang="en-US" sz="4000" dirty="0">
+              <a:solidFill>
+                <a:srgbClr val="FFE701"/>
+              </a:solidFill>
+            </a:endParaRPr>
+          </a:p>
+        </p:txBody>
+      </p:sp>
+      <p:pic>
+        <p:nvPicPr>
+          <p:cNvPr id="5" name="Picture 4"/>
+          <p:cNvPicPr>
+            <a:picLocks noChangeAspect="1"/>
+          </p:cNvPicPr>
+          <p:nvPr/>
+        </p:nvPicPr>
+        <p:blipFill>
+          <a:blip r:embed="rId2">
+            <a:extLst>
+              <a:ext uri="{28A0092B-C50C-407E-A947-70E740481C1C}">
+                <a14:useLocalDpi xmlns:a14="http://schemas.microsoft.com/office/drawing/2010/main" val="0"/>
+              </a:ext>
+            </a:extLst>
+          </a:blip>
+          <a:stretch>
+            <a:fillRect/>
+          </a:stretch>
+        </p:blipFill>
+        <p:spPr>
+          <a:xfrm>
+            <a:off x="180110" y="2064834"/>
+            <a:ext cx="5356366" cy="3974228"/>
+          </a:xfrm>
+          <a:prstGeom prst="rect">
+            <a:avLst/>
+          </a:prstGeom>
+        </p:spPr>
+      </p:pic>
+    </p:spTree>
+    <p:extLst>
+      <p:ext uri="{BB962C8B-B14F-4D97-AF65-F5344CB8AC3E}">
+        <p14:creationId xmlns:p14="http://schemas.microsoft.com/office/powerpoint/2010/main" val="2045570969"/>
+      </p:ext>
+    </p:extLst>
+  </p:cSld>
+  <p:clrMapOvr>
+    <a:masterClrMapping/>
+  </p:clrMapOvr>
+</p:sld>
+</file>
+
 <file path=ppt/slides/slide2.xml><?xml version="1.0" encoding="utf-8"?>
 <p:sld xmlns:a="http://schemas.openxmlformats.org/drawingml/2006/main" xmlns:r="http://schemas.openxmlformats.org/officeDocument/2006/relationships" xmlns:p="http://schemas.openxmlformats.org/presentationml/2006/main">
   <p:cSld>
@@ -4377,7 +4673,7 @@
         </p:spPr>
         <p:txBody>
           <a:bodyPr>
-            <a:normAutofit lnSpcReduction="10000"/>
+            <a:normAutofit fontScale="85000" lnSpcReduction="10000"/>
           </a:bodyPr>
           <a:lstStyle/>
           <a:p>
@@ -4386,19 +4682,23 @@
             </a:pPr>
             <a:r>
               <a:rPr lang="he-IL" dirty="0" smtClean="0"/>
-              <a:t>ניתן להוריד את סביבת העבודה </a:t>
+              <a:t>סביבת העבודה העיקרית בה משתמשים לפיתוח אנדרואיד הינה </a:t>
             </a:r>
             <a:r>
               <a:rPr lang="en-US" dirty="0" smtClean="0"/>
               <a:t>Android Studio</a:t>
             </a:r>
             <a:r>
-              <a:rPr lang="he-IL" dirty="0"/>
-              <a:t> </a:t>
-            </a:r>
-            <a:r>
               <a:rPr lang="he-IL" dirty="0" smtClean="0"/>
-              <a:t>בחינם מהאתר</a:t>
+              <a:t> מחברת </a:t>
+            </a:r>
+            <a:r>
+              <a:rPr lang="en-US" dirty="0" err="1" smtClean="0"/>
+              <a:t>JetBrains</a:t>
+            </a:r>
+            <a:r>
+              <a:rPr lang="he-IL" dirty="0" smtClean="0"/>
+              <a:t>.</a:t>
             </a:r>
           </a:p>
           <a:p>
@@ -4406,55 +4706,51 @@
               <a:buNone/>
             </a:pPr>
             <a:r>
-              <a:rPr lang="en-US" sz="2400" dirty="0">
-                <a:hlinkClick r:id="rId2"/>
-              </a:rPr>
-              <a:t>https://</a:t>
-            </a:r>
-            <a:r>
-              <a:rPr lang="en-US" sz="2400" dirty="0" smtClean="0">
-                <a:hlinkClick r:id="rId2"/>
-              </a:rPr>
-              <a:t>developer.android.com/studio/index.html</a:t>
-            </a:r>
-            <a:endParaRPr lang="he-IL" sz="2400" dirty="0" smtClean="0"/>
+              <a:rPr lang="he-IL" dirty="0" smtClean="0"/>
+              <a:t>זאת לא סביבת הפיתוח היחידה שהייתה בשימוש מאז תולדות פיתוח אנדרואיד לסמרטפונים. לדוגמה לפני </a:t>
+            </a:r>
+            <a:r>
+              <a:rPr lang="en-US" dirty="0" smtClean="0"/>
+              <a:t>Android Studio</a:t>
+            </a:r>
+            <a:r>
+              <a:rPr lang="he-IL" dirty="0" smtClean="0"/>
+              <a:t> היה נפוץ להשתמש ב</a:t>
+            </a:r>
+            <a:r>
+              <a:rPr lang="en-US" dirty="0" smtClean="0"/>
+              <a:t>Eclipse</a:t>
+            </a:r>
+            <a:r>
+              <a:rPr lang="he-IL" dirty="0" smtClean="0"/>
+              <a:t> עם </a:t>
+            </a:r>
+            <a:r>
+              <a:rPr lang="en-US" dirty="0" smtClean="0"/>
+              <a:t>plugins</a:t>
+            </a:r>
+            <a:r>
+              <a:rPr lang="he-IL" dirty="0" smtClean="0"/>
+              <a:t> יעודיות לפיתוח באנדרואיד.</a:t>
+            </a:r>
           </a:p>
           <a:p>
             <a:pPr marL="0" indent="0" algn="r" rtl="1">
               <a:buNone/>
             </a:pPr>
-            <a:endParaRPr lang="he-IL" sz="2400" dirty="0"/>
-          </a:p>
-          <a:p>
-            <a:pPr marL="0" indent="0" algn="r" rtl="1">
-              <a:buNone/>
-            </a:pPr>
-            <a:r>
-              <a:rPr lang="he-IL" sz="3730" dirty="0" smtClean="0"/>
-              <a:t>את </a:t>
-            </a:r>
-            <a:r>
-              <a:rPr lang="en-US" sz="3730" dirty="0" smtClean="0"/>
+            <a:r>
+              <a:rPr lang="he-IL" dirty="0" smtClean="0"/>
+              <a:t>אך כבר שנים רבות </a:t>
+            </a:r>
+            <a:r>
+              <a:rPr lang="en-US" dirty="0" smtClean="0"/>
               <a:t>Android Studio</a:t>
             </a:r>
             <a:r>
-              <a:rPr lang="he-IL" sz="3730" dirty="0" smtClean="0"/>
-              <a:t> ניתן להתקין למערכות הפעלה רבות הכוללות </a:t>
-            </a:r>
-            <a:r>
-              <a:rPr lang="en-US" sz="3730" dirty="0" smtClean="0"/>
-              <a:t>Windows, Mac, Linux</a:t>
-            </a:r>
-          </a:p>
-          <a:p>
-            <a:pPr marL="0" indent="0" algn="r" rtl="1">
-              <a:buNone/>
-            </a:pPr>
-            <a:r>
-              <a:rPr lang="he-IL" sz="3730" dirty="0" smtClean="0"/>
-              <a:t>לאחר ההורדה ההתקנה היא סדנטרתית.</a:t>
-            </a:r>
-            <a:endParaRPr lang="en-US" sz="3730" dirty="0"/>
+              <a:rPr lang="he-IL" dirty="0" smtClean="0"/>
+              <a:t> היא הסביבה העיקרית ורישמית לפיתוח אנדרואיד.</a:t>
+            </a:r>
+            <a:endParaRPr lang="en-US" dirty="0"/>
           </a:p>
         </p:txBody>
       </p:sp>
@@ -4510,15 +4806,7 @@
                   <a:srgbClr val="FFE701"/>
                 </a:solidFill>
               </a:rPr>
-              <a:t>הורדה והתקנה של </a:t>
-            </a:r>
-            <a:r>
-              <a:rPr lang="en-US" sz="4000" dirty="0" smtClean="0">
-                <a:solidFill>
-                  <a:srgbClr val="FFE701"/>
-                </a:solidFill>
-              </a:rPr>
-              <a:t>Android Studio</a:t>
+              <a:t>הקדמה</a:t>
             </a:r>
             <a:endParaRPr lang="en-US" sz="4000" dirty="0">
               <a:solidFill>
@@ -4531,7 +4819,7 @@
     </p:spTree>
     <p:extLst>
       <p:ext uri="{BB962C8B-B14F-4D97-AF65-F5344CB8AC3E}">
-        <p14:creationId xmlns:p14="http://schemas.microsoft.com/office/powerpoint/2010/main" val="2943503347"/>
+        <p14:creationId xmlns:p14="http://schemas.microsoft.com/office/powerpoint/2010/main" val="381732308"/>
       </p:ext>
     </p:extLst>
   </p:cSld>
@@ -4588,6 +4876,235 @@
           </a:p>
         </p:txBody>
       </p:sp>
+      <p:sp>
+        <p:nvSpPr>
+          <p:cNvPr id="3" name="Content Placeholder 2"/>
+          <p:cNvSpPr>
+            <a:spLocks noGrp="1"/>
+          </p:cNvSpPr>
+          <p:nvPr>
+            <p:ph idx="1"/>
+          </p:nvPr>
+        </p:nvSpPr>
+        <p:spPr>
+          <a:xfrm>
+            <a:off x="598621" y="1852654"/>
+            <a:ext cx="7940660" cy="4426840"/>
+          </a:xfrm>
+        </p:spPr>
+        <p:txBody>
+          <a:bodyPr>
+            <a:normAutofit lnSpcReduction="10000"/>
+          </a:bodyPr>
+          <a:lstStyle/>
+          <a:p>
+            <a:pPr marL="0" indent="0" algn="r" rtl="1">
+              <a:buNone/>
+            </a:pPr>
+            <a:r>
+              <a:rPr lang="he-IL" dirty="0" smtClean="0"/>
+              <a:t>ניתן להוריד את סביבת העבודה </a:t>
+            </a:r>
+            <a:r>
+              <a:rPr lang="en-US" dirty="0" smtClean="0"/>
+              <a:t>Android Studio</a:t>
+            </a:r>
+            <a:r>
+              <a:rPr lang="he-IL" dirty="0"/>
+              <a:t> </a:t>
+            </a:r>
+            <a:r>
+              <a:rPr lang="he-IL" dirty="0" smtClean="0"/>
+              <a:t>בחינם מהאתר</a:t>
+            </a:r>
+          </a:p>
+          <a:p>
+            <a:pPr marL="0" indent="0" algn="r" rtl="1">
+              <a:buNone/>
+            </a:pPr>
+            <a:r>
+              <a:rPr lang="en-US" sz="2400" dirty="0">
+                <a:hlinkClick r:id="rId2"/>
+              </a:rPr>
+              <a:t>https://</a:t>
+            </a:r>
+            <a:r>
+              <a:rPr lang="en-US" sz="2400" dirty="0" smtClean="0">
+                <a:hlinkClick r:id="rId2"/>
+              </a:rPr>
+              <a:t>developer.android.com/studio/index.html</a:t>
+            </a:r>
+            <a:endParaRPr lang="he-IL" sz="2400" dirty="0" smtClean="0"/>
+          </a:p>
+          <a:p>
+            <a:pPr marL="0" indent="0" algn="r" rtl="1">
+              <a:buNone/>
+            </a:pPr>
+            <a:endParaRPr lang="he-IL" sz="2400" dirty="0"/>
+          </a:p>
+          <a:p>
+            <a:pPr marL="0" indent="0" algn="r" rtl="1">
+              <a:buNone/>
+            </a:pPr>
+            <a:r>
+              <a:rPr lang="he-IL" sz="3730" dirty="0" smtClean="0"/>
+              <a:t>את </a:t>
+            </a:r>
+            <a:r>
+              <a:rPr lang="en-US" sz="3730" dirty="0" smtClean="0"/>
+              <a:t>Android Studio</a:t>
+            </a:r>
+            <a:r>
+              <a:rPr lang="he-IL" sz="3730" dirty="0" smtClean="0"/>
+              <a:t> ניתן להתקין למערכות הפעלה רבות הכוללות </a:t>
+            </a:r>
+            <a:r>
+              <a:rPr lang="en-US" sz="3730" dirty="0" smtClean="0"/>
+              <a:t>Windows, Mac, Linux</a:t>
+            </a:r>
+          </a:p>
+          <a:p>
+            <a:pPr marL="0" indent="0" algn="r" rtl="1">
+              <a:buNone/>
+            </a:pPr>
+            <a:r>
+              <a:rPr lang="he-IL" sz="3730" dirty="0" smtClean="0"/>
+              <a:t>לאחר ההורדה ההתקנה היא סדנטרתית.</a:t>
+            </a:r>
+            <a:endParaRPr lang="en-US" sz="3730" dirty="0"/>
+          </a:p>
+        </p:txBody>
+      </p:sp>
+      <p:sp>
+        <p:nvSpPr>
+          <p:cNvPr id="4" name="Title 1"/>
+          <p:cNvSpPr txBox="1">
+            <a:spLocks/>
+          </p:cNvSpPr>
+          <p:nvPr/>
+        </p:nvSpPr>
+        <p:spPr>
+          <a:xfrm>
+            <a:off x="598621" y="1089129"/>
+            <a:ext cx="7376537" cy="763525"/>
+          </a:xfrm>
+          <a:prstGeom prst="rect">
+            <a:avLst/>
+          </a:prstGeom>
+        </p:spPr>
+        <p:txBody>
+          <a:bodyPr vert="horz" lIns="91440" tIns="45720" rIns="91440" bIns="45720" rtlCol="0" anchor="ctr">
+            <a:normAutofit fontScale="97500"/>
+          </a:bodyPr>
+          <a:lstStyle>
+            <a:lvl1pPr algn="l" defTabSz="1219170" rtl="0" eaLnBrk="1" latinLnBrk="0" hangingPunct="1">
+              <a:spcBef>
+                <a:spcPct val="0"/>
+              </a:spcBef>
+              <a:buNone/>
+              <a:defRPr sz="4800" kern="1200">
+                <a:solidFill>
+                  <a:srgbClr val="FFC000"/>
+                </a:solidFill>
+                <a:effectLst>
+                  <a:outerShdw blurRad="50800" dist="38100" dir="2700000" algn="tl" rotWithShape="0">
+                    <a:prstClr val="black">
+                      <a:alpha val="40000"/>
+                    </a:prstClr>
+                  </a:outerShdw>
+                </a:effectLst>
+                <a:latin typeface="+mj-lt"/>
+                <a:ea typeface="+mj-ea"/>
+                <a:cs typeface="+mj-cs"/>
+              </a:defRPr>
+            </a:lvl1pPr>
+          </a:lstStyle>
+          <a:p>
+            <a:pPr algn="r" rtl="1"/>
+            <a:r>
+              <a:rPr lang="he-IL" sz="4000" dirty="0" smtClean="0">
+                <a:solidFill>
+                  <a:srgbClr val="FFE701"/>
+                </a:solidFill>
+              </a:rPr>
+              <a:t>הורדה והתקנה של </a:t>
+            </a:r>
+            <a:r>
+              <a:rPr lang="en-US" sz="4000" dirty="0" smtClean="0">
+                <a:solidFill>
+                  <a:srgbClr val="FFE701"/>
+                </a:solidFill>
+              </a:rPr>
+              <a:t>Android Studio</a:t>
+            </a:r>
+            <a:endParaRPr lang="en-US" sz="4000" dirty="0">
+              <a:solidFill>
+                <a:srgbClr val="FFE701"/>
+              </a:solidFill>
+            </a:endParaRPr>
+          </a:p>
+        </p:txBody>
+      </p:sp>
+    </p:spTree>
+    <p:extLst>
+      <p:ext uri="{BB962C8B-B14F-4D97-AF65-F5344CB8AC3E}">
+        <p14:creationId xmlns:p14="http://schemas.microsoft.com/office/powerpoint/2010/main" val="2943503347"/>
+      </p:ext>
+    </p:extLst>
+  </p:cSld>
+  <p:clrMapOvr>
+    <a:masterClrMapping/>
+  </p:clrMapOvr>
+</p:sld>
+</file>
+
+<file path=ppt/slides/slide8.xml><?xml version="1.0" encoding="utf-8"?>
+<p:sld xmlns:a="http://schemas.openxmlformats.org/drawingml/2006/main" xmlns:r="http://schemas.openxmlformats.org/officeDocument/2006/relationships" xmlns:p="http://schemas.openxmlformats.org/presentationml/2006/main">
+  <p:cSld>
+    <p:spTree>
+      <p:nvGrpSpPr>
+        <p:cNvPr id="1" name=""/>
+        <p:cNvGrpSpPr/>
+        <p:nvPr/>
+      </p:nvGrpSpPr>
+      <p:grpSpPr>
+        <a:xfrm>
+          <a:off x="0" y="0"/>
+          <a:ext cx="0" cy="0"/>
+          <a:chOff x="0" y="0"/>
+          <a:chExt cx="0" cy="0"/>
+        </a:xfrm>
+      </p:grpSpPr>
+      <p:sp>
+        <p:nvSpPr>
+          <p:cNvPr id="2" name="Title 1"/>
+          <p:cNvSpPr>
+            <a:spLocks noGrp="1"/>
+          </p:cNvSpPr>
+          <p:nvPr>
+            <p:ph type="title"/>
+          </p:nvPr>
+        </p:nvSpPr>
+        <p:spPr/>
+        <p:txBody>
+          <a:bodyPr>
+            <a:normAutofit fontScale="90000"/>
+          </a:bodyPr>
+          <a:lstStyle/>
+          <a:p>
+            <a:pPr algn="r" rtl="1"/>
+            <a:r>
+              <a:rPr lang="he-IL" dirty="0"/>
+              <a:t>התקנת סביבת </a:t>
+            </a:r>
+            <a:r>
+              <a:rPr lang="he-IL" dirty="0" smtClean="0"/>
+              <a:t>העבודה</a:t>
+            </a:r>
+            <a:endParaRPr lang="en-US" dirty="0"/>
+          </a:p>
+        </p:txBody>
+      </p:sp>
       <p:pic>
         <p:nvPicPr>
           <p:cNvPr id="5" name="Content Placeholder 4"/>
@@ -4668,15 +5185,7 @@
                   <a:srgbClr val="FFE701"/>
                 </a:solidFill>
               </a:rPr>
-              <a:t>הורדה והתקנה של </a:t>
-            </a:r>
-            <a:r>
-              <a:rPr lang="en-US" sz="4000" dirty="0" smtClean="0">
-                <a:solidFill>
-                  <a:srgbClr val="FFE701"/>
-                </a:solidFill>
-              </a:rPr>
-              <a:t>Android Studio</a:t>
+              <a:t>פתיחת הסביבה</a:t>
             </a:r>
             <a:endParaRPr lang="en-US" sz="4000" dirty="0">
               <a:solidFill>
@@ -5307,6 +5816,242 @@
     <p:extLst>
       <p:ext uri="{BB962C8B-B14F-4D97-AF65-F5344CB8AC3E}">
         <p14:creationId xmlns:p14="http://schemas.microsoft.com/office/powerpoint/2010/main" val="3811463040"/>
+      </p:ext>
+    </p:extLst>
+  </p:cSld>
+  <p:clrMapOvr>
+    <a:masterClrMapping/>
+  </p:clrMapOvr>
+</p:sld>
+</file>
+
+<file path=ppt/slides/slide9.xml><?xml version="1.0" encoding="utf-8"?>
+<p:sld xmlns:a="http://schemas.openxmlformats.org/drawingml/2006/main" xmlns:r="http://schemas.openxmlformats.org/officeDocument/2006/relationships" xmlns:p="http://schemas.openxmlformats.org/presentationml/2006/main">
+  <p:cSld>
+    <p:spTree>
+      <p:nvGrpSpPr>
+        <p:cNvPr id="1" name=""/>
+        <p:cNvGrpSpPr/>
+        <p:nvPr/>
+      </p:nvGrpSpPr>
+      <p:grpSpPr>
+        <a:xfrm>
+          <a:off x="0" y="0"/>
+          <a:ext cx="0" cy="0"/>
+          <a:chOff x="0" y="0"/>
+          <a:chExt cx="0" cy="0"/>
+        </a:xfrm>
+      </p:grpSpPr>
+      <p:sp>
+        <p:nvSpPr>
+          <p:cNvPr id="2" name="Title 1"/>
+          <p:cNvSpPr>
+            <a:spLocks noGrp="1"/>
+          </p:cNvSpPr>
+          <p:nvPr>
+            <p:ph type="title"/>
+          </p:nvPr>
+        </p:nvSpPr>
+        <p:spPr/>
+        <p:txBody>
+          <a:bodyPr>
+            <a:normAutofit fontScale="90000"/>
+          </a:bodyPr>
+          <a:lstStyle/>
+          <a:p>
+            <a:pPr algn="r" rtl="1"/>
+            <a:r>
+              <a:rPr lang="he-IL" dirty="0"/>
+              <a:t>התקנת סביבת </a:t>
+            </a:r>
+            <a:r>
+              <a:rPr lang="he-IL" dirty="0" smtClean="0"/>
+              <a:t>העבודה</a:t>
+            </a:r>
+            <a:endParaRPr lang="en-US" dirty="0"/>
+          </a:p>
+        </p:txBody>
+      </p:sp>
+      <p:sp>
+        <p:nvSpPr>
+          <p:cNvPr id="3" name="Content Placeholder 2"/>
+          <p:cNvSpPr>
+            <a:spLocks noGrp="1"/>
+          </p:cNvSpPr>
+          <p:nvPr>
+            <p:ph idx="1"/>
+          </p:nvPr>
+        </p:nvSpPr>
+        <p:spPr>
+          <a:xfrm>
+            <a:off x="5652655" y="2063315"/>
+            <a:ext cx="3823855" cy="3827710"/>
+          </a:xfrm>
+        </p:spPr>
+        <p:txBody>
+          <a:bodyPr>
+            <a:normAutofit fontScale="62500" lnSpcReduction="20000"/>
+          </a:bodyPr>
+          <a:lstStyle/>
+          <a:p>
+            <a:pPr marL="0" indent="0" algn="r" rtl="1">
+              <a:buNone/>
+            </a:pPr>
+            <a:r>
+              <a:rPr lang="he-IL" dirty="0"/>
+              <a:t>ניתן לבחור בין סביבת היישום. אנחנו נבחר את האופציה הראשונה </a:t>
+            </a:r>
+            <a:r>
+              <a:rPr lang="en-US" dirty="0"/>
+              <a:t>Phone and Tablet</a:t>
+            </a:r>
+          </a:p>
+          <a:p>
+            <a:pPr marL="0" indent="0" algn="r" rtl="1">
+              <a:buNone/>
+            </a:pPr>
+            <a:endParaRPr lang="he-IL" dirty="0" smtClean="0"/>
+          </a:p>
+          <a:p>
+            <a:pPr marL="0" indent="0" algn="r" rtl="1">
+              <a:buNone/>
+            </a:pPr>
+            <a:r>
+              <a:rPr lang="he-IL" dirty="0" smtClean="0"/>
+              <a:t>אז יש </a:t>
+            </a:r>
+            <a:r>
+              <a:rPr lang="he-IL" dirty="0" smtClean="0"/>
+              <a:t>לבחור בין מספר סוגי </a:t>
+            </a:r>
+            <a:r>
+              <a:rPr lang="he-IL" dirty="0" err="1" smtClean="0"/>
+              <a:t>טמפלייטים</a:t>
+            </a:r>
+            <a:r>
+              <a:rPr lang="he-IL" dirty="0" smtClean="0"/>
+              <a:t>.</a:t>
+            </a:r>
+            <a:endParaRPr lang="en-US" dirty="0" smtClean="0"/>
+          </a:p>
+          <a:p>
+            <a:pPr marL="0" indent="0" algn="r" rtl="1">
+              <a:buNone/>
+            </a:pPr>
+            <a:endParaRPr lang="he-IL" dirty="0"/>
+          </a:p>
+          <a:p>
+            <a:pPr marL="0" indent="0" algn="r" rtl="1">
+              <a:buNone/>
+            </a:pPr>
+            <a:r>
+              <a:rPr lang="he-IL" dirty="0" smtClean="0"/>
+              <a:t>בדוגמה זו, נבחר את הבסיסי ביותר הבנוי שהינו </a:t>
+            </a:r>
+            <a:r>
+              <a:rPr lang="en-US" dirty="0" smtClean="0"/>
+              <a:t>Empty Activity</a:t>
+            </a:r>
+            <a:endParaRPr lang="en-US" dirty="0"/>
+          </a:p>
+        </p:txBody>
+      </p:sp>
+      <p:sp>
+        <p:nvSpPr>
+          <p:cNvPr id="4" name="Title 1"/>
+          <p:cNvSpPr txBox="1">
+            <a:spLocks/>
+          </p:cNvSpPr>
+          <p:nvPr/>
+        </p:nvSpPr>
+        <p:spPr>
+          <a:xfrm>
+            <a:off x="598621" y="1089129"/>
+            <a:ext cx="7376537" cy="763525"/>
+          </a:xfrm>
+          <a:prstGeom prst="rect">
+            <a:avLst/>
+          </a:prstGeom>
+        </p:spPr>
+        <p:txBody>
+          <a:bodyPr vert="horz" lIns="91440" tIns="45720" rIns="91440" bIns="45720" rtlCol="0" anchor="ctr">
+            <a:normAutofit fontScale="97500"/>
+          </a:bodyPr>
+          <a:lstStyle>
+            <a:lvl1pPr algn="l" defTabSz="1219170" rtl="0" eaLnBrk="1" latinLnBrk="0" hangingPunct="1">
+              <a:spcBef>
+                <a:spcPct val="0"/>
+              </a:spcBef>
+              <a:buNone/>
+              <a:defRPr sz="4800" kern="1200">
+                <a:solidFill>
+                  <a:srgbClr val="FFC000"/>
+                </a:solidFill>
+                <a:effectLst>
+                  <a:outerShdw blurRad="50800" dist="38100" dir="2700000" algn="tl" rotWithShape="0">
+                    <a:prstClr val="black">
+                      <a:alpha val="40000"/>
+                    </a:prstClr>
+                  </a:outerShdw>
+                </a:effectLst>
+                <a:latin typeface="+mj-lt"/>
+                <a:ea typeface="+mj-ea"/>
+                <a:cs typeface="+mj-cs"/>
+              </a:defRPr>
+            </a:lvl1pPr>
+          </a:lstStyle>
+          <a:p>
+            <a:pPr algn="r" rtl="1"/>
+            <a:r>
+              <a:rPr lang="he-IL" sz="4000" dirty="0">
+                <a:solidFill>
+                  <a:srgbClr val="FFE701"/>
+                </a:solidFill>
+              </a:rPr>
+              <a:t>פתיחת הסביבה</a:t>
+            </a:r>
+            <a:endParaRPr lang="en-US" sz="4000" dirty="0">
+              <a:solidFill>
+                <a:srgbClr val="FFE701"/>
+              </a:solidFill>
+            </a:endParaRPr>
+          </a:p>
+        </p:txBody>
+      </p:sp>
+      <p:pic>
+        <p:nvPicPr>
+          <p:cNvPr id="5" name="Picture 4"/>
+          <p:cNvPicPr>
+            <a:picLocks noChangeAspect="1"/>
+          </p:cNvPicPr>
+          <p:nvPr/>
+        </p:nvPicPr>
+        <p:blipFill>
+          <a:blip r:embed="rId2">
+            <a:extLst>
+              <a:ext uri="{28A0092B-C50C-407E-A947-70E740481C1C}">
+                <a14:useLocalDpi xmlns:a14="http://schemas.microsoft.com/office/drawing/2010/main" val="0"/>
+              </a:ext>
+            </a:extLst>
+          </a:blip>
+          <a:stretch>
+            <a:fillRect/>
+          </a:stretch>
+        </p:blipFill>
+        <p:spPr>
+          <a:xfrm>
+            <a:off x="180110" y="2063315"/>
+            <a:ext cx="5356366" cy="3977267"/>
+          </a:xfrm>
+          <a:prstGeom prst="rect">
+            <a:avLst/>
+          </a:prstGeom>
+        </p:spPr>
+      </p:pic>
+    </p:spTree>
+    <p:extLst>
+      <p:ext uri="{BB962C8B-B14F-4D97-AF65-F5344CB8AC3E}">
+        <p14:creationId xmlns:p14="http://schemas.microsoft.com/office/powerpoint/2010/main" val="352469291"/>
       </p:ext>
     </p:extLst>
   </p:cSld>

</xml_diff>

<commit_message>
added first page of simulator
</commit_message>
<xml_diff>
--- a/Android Presentation - Java Workshop.pptx
+++ b/Android Presentation - Java Workshop.pptx
@@ -15,6 +15,8 @@
     <p:sldId id="268" r:id="rId9"/>
     <p:sldId id="270" r:id="rId10"/>
     <p:sldId id="271" r:id="rId11"/>
+    <p:sldId id="272" r:id="rId12"/>
+    <p:sldId id="273" r:id="rId13"/>
   </p:sldIdLst>
   <p:sldSz cx="12192000" cy="6858000"/>
   <p:notesSz cx="6858000" cy="9144000"/>
@@ -4018,6 +4020,586 @@
     <p:extLst>
       <p:ext uri="{BB962C8B-B14F-4D97-AF65-F5344CB8AC3E}">
         <p14:creationId xmlns:p14="http://schemas.microsoft.com/office/powerpoint/2010/main" val="2045570969"/>
+      </p:ext>
+    </p:extLst>
+  </p:cSld>
+  <p:clrMapOvr>
+    <a:masterClrMapping/>
+  </p:clrMapOvr>
+</p:sld>
+</file>
+
+<file path=ppt/slides/slide11.xml><?xml version="1.0" encoding="utf-8"?>
+<p:sld xmlns:a="http://schemas.openxmlformats.org/drawingml/2006/main" xmlns:r="http://schemas.openxmlformats.org/officeDocument/2006/relationships" xmlns:p="http://schemas.openxmlformats.org/presentationml/2006/main">
+  <p:cSld>
+    <p:spTree>
+      <p:nvGrpSpPr>
+        <p:cNvPr id="1" name=""/>
+        <p:cNvGrpSpPr/>
+        <p:nvPr/>
+      </p:nvGrpSpPr>
+      <p:grpSpPr>
+        <a:xfrm>
+          <a:off x="0" y="0"/>
+          <a:ext cx="0" cy="0"/>
+          <a:chOff x="0" y="0"/>
+          <a:chExt cx="0" cy="0"/>
+        </a:xfrm>
+      </p:grpSpPr>
+      <p:sp>
+        <p:nvSpPr>
+          <p:cNvPr id="2" name="Title 1"/>
+          <p:cNvSpPr>
+            <a:spLocks noGrp="1"/>
+          </p:cNvSpPr>
+          <p:nvPr>
+            <p:ph type="title"/>
+          </p:nvPr>
+        </p:nvSpPr>
+        <p:spPr/>
+        <p:txBody>
+          <a:bodyPr>
+            <a:normAutofit fontScale="90000"/>
+          </a:bodyPr>
+          <a:lstStyle/>
+          <a:p>
+            <a:pPr algn="r" rtl="1"/>
+            <a:r>
+              <a:rPr lang="he-IL" dirty="0"/>
+              <a:t>התקנת סביבת </a:t>
+            </a:r>
+            <a:r>
+              <a:rPr lang="he-IL" dirty="0" smtClean="0"/>
+              <a:t>העבודה</a:t>
+            </a:r>
+            <a:endParaRPr lang="en-US" dirty="0"/>
+          </a:p>
+        </p:txBody>
+      </p:sp>
+      <p:sp>
+        <p:nvSpPr>
+          <p:cNvPr id="3" name="Content Placeholder 2"/>
+          <p:cNvSpPr>
+            <a:spLocks noGrp="1"/>
+          </p:cNvSpPr>
+          <p:nvPr>
+            <p:ph idx="1"/>
+          </p:nvPr>
+        </p:nvSpPr>
+        <p:spPr>
+          <a:xfrm>
+            <a:off x="471056" y="5798225"/>
+            <a:ext cx="9144000" cy="916615"/>
+          </a:xfrm>
+        </p:spPr>
+        <p:txBody>
+          <a:bodyPr>
+            <a:normAutofit fontScale="85000" lnSpcReduction="10000"/>
+          </a:bodyPr>
+          <a:lstStyle/>
+          <a:p>
+            <a:pPr marL="0" indent="0" algn="r" rtl="1">
+              <a:buNone/>
+            </a:pPr>
+            <a:r>
+              <a:rPr lang="en-US" dirty="0"/>
+              <a:t> </a:t>
+            </a:r>
+            <a:r>
+              <a:rPr lang="he-IL" dirty="0" smtClean="0"/>
+              <a:t>הגענו למסך הפתיחה של </a:t>
+            </a:r>
+            <a:r>
+              <a:rPr lang="he-IL" dirty="0" err="1" smtClean="0"/>
+              <a:t>הפרוייקט</a:t>
+            </a:r>
+            <a:r>
+              <a:rPr lang="he-IL" dirty="0" smtClean="0"/>
+              <a:t> שעליו נדבר בהמשך.</a:t>
+            </a:r>
+            <a:endParaRPr lang="en-US" dirty="0"/>
+          </a:p>
+        </p:txBody>
+      </p:sp>
+      <p:sp>
+        <p:nvSpPr>
+          <p:cNvPr id="4" name="Title 1"/>
+          <p:cNvSpPr txBox="1">
+            <a:spLocks/>
+          </p:cNvSpPr>
+          <p:nvPr/>
+        </p:nvSpPr>
+        <p:spPr>
+          <a:xfrm>
+            <a:off x="598621" y="1089129"/>
+            <a:ext cx="7376537" cy="763525"/>
+          </a:xfrm>
+          <a:prstGeom prst="rect">
+            <a:avLst/>
+          </a:prstGeom>
+        </p:spPr>
+        <p:txBody>
+          <a:bodyPr vert="horz" lIns="91440" tIns="45720" rIns="91440" bIns="45720" rtlCol="0" anchor="ctr">
+            <a:normAutofit fontScale="97500"/>
+          </a:bodyPr>
+          <a:lstStyle>
+            <a:lvl1pPr algn="l" defTabSz="1219170" rtl="0" eaLnBrk="1" latinLnBrk="0" hangingPunct="1">
+              <a:spcBef>
+                <a:spcPct val="0"/>
+              </a:spcBef>
+              <a:buNone/>
+              <a:defRPr sz="4800" kern="1200">
+                <a:solidFill>
+                  <a:srgbClr val="FFC000"/>
+                </a:solidFill>
+                <a:effectLst>
+                  <a:outerShdw blurRad="50800" dist="38100" dir="2700000" algn="tl" rotWithShape="0">
+                    <a:prstClr val="black">
+                      <a:alpha val="40000"/>
+                    </a:prstClr>
+                  </a:outerShdw>
+                </a:effectLst>
+                <a:latin typeface="+mj-lt"/>
+                <a:ea typeface="+mj-ea"/>
+                <a:cs typeface="+mj-cs"/>
+              </a:defRPr>
+            </a:lvl1pPr>
+          </a:lstStyle>
+          <a:p>
+            <a:pPr algn="r" rtl="1"/>
+            <a:r>
+              <a:rPr lang="he-IL" sz="4000" dirty="0">
+                <a:solidFill>
+                  <a:srgbClr val="FFE701"/>
+                </a:solidFill>
+              </a:rPr>
+              <a:t>פתיחת הסביבה</a:t>
+            </a:r>
+            <a:endParaRPr lang="en-US" sz="4000" dirty="0">
+              <a:solidFill>
+                <a:srgbClr val="FFE701"/>
+              </a:solidFill>
+            </a:endParaRPr>
+          </a:p>
+        </p:txBody>
+      </p:sp>
+      <p:pic>
+        <p:nvPicPr>
+          <p:cNvPr id="5" name="Picture 4"/>
+          <p:cNvPicPr>
+            <a:picLocks noChangeAspect="1"/>
+          </p:cNvPicPr>
+          <p:nvPr/>
+        </p:nvPicPr>
+        <p:blipFill>
+          <a:blip r:embed="rId2">
+            <a:extLst>
+              <a:ext uri="{28A0092B-C50C-407E-A947-70E740481C1C}">
+                <a14:useLocalDpi xmlns:a14="http://schemas.microsoft.com/office/drawing/2010/main" val="0"/>
+              </a:ext>
+            </a:extLst>
+          </a:blip>
+          <a:stretch>
+            <a:fillRect/>
+          </a:stretch>
+        </p:blipFill>
+        <p:spPr>
+          <a:xfrm>
+            <a:off x="1639455" y="1852654"/>
+            <a:ext cx="7578435" cy="3882022"/>
+          </a:xfrm>
+          <a:prstGeom prst="rect">
+            <a:avLst/>
+          </a:prstGeom>
+        </p:spPr>
+      </p:pic>
+    </p:spTree>
+    <p:extLst>
+      <p:ext uri="{BB962C8B-B14F-4D97-AF65-F5344CB8AC3E}">
+        <p14:creationId xmlns:p14="http://schemas.microsoft.com/office/powerpoint/2010/main" val="1009471613"/>
+      </p:ext>
+    </p:extLst>
+  </p:cSld>
+  <p:clrMapOvr>
+    <a:masterClrMapping/>
+  </p:clrMapOvr>
+</p:sld>
+</file>
+
+<file path=ppt/slides/slide12.xml><?xml version="1.0" encoding="utf-8"?>
+<p:sld xmlns:a="http://schemas.openxmlformats.org/drawingml/2006/main" xmlns:r="http://schemas.openxmlformats.org/officeDocument/2006/relationships" xmlns:p="http://schemas.openxmlformats.org/presentationml/2006/main">
+  <p:cSld>
+    <p:spTree>
+      <p:nvGrpSpPr>
+        <p:cNvPr id="1" name=""/>
+        <p:cNvGrpSpPr/>
+        <p:nvPr/>
+      </p:nvGrpSpPr>
+      <p:grpSpPr>
+        <a:xfrm>
+          <a:off x="0" y="0"/>
+          <a:ext cx="0" cy="0"/>
+          <a:chOff x="0" y="0"/>
+          <a:chExt cx="0" cy="0"/>
+        </a:xfrm>
+      </p:grpSpPr>
+      <p:sp>
+        <p:nvSpPr>
+          <p:cNvPr id="2" name="Title 1"/>
+          <p:cNvSpPr>
+            <a:spLocks noGrp="1"/>
+          </p:cNvSpPr>
+          <p:nvPr>
+            <p:ph type="title"/>
+          </p:nvPr>
+        </p:nvSpPr>
+        <p:spPr/>
+        <p:txBody>
+          <a:bodyPr>
+            <a:normAutofit fontScale="90000"/>
+          </a:bodyPr>
+          <a:lstStyle/>
+          <a:p>
+            <a:pPr algn="r" rtl="1"/>
+            <a:r>
+              <a:rPr lang="he-IL" dirty="0"/>
+              <a:t>התקנת סביבת </a:t>
+            </a:r>
+            <a:r>
+              <a:rPr lang="he-IL" dirty="0" smtClean="0"/>
+              <a:t>העבודה</a:t>
+            </a:r>
+            <a:endParaRPr lang="en-US" dirty="0"/>
+          </a:p>
+        </p:txBody>
+      </p:sp>
+      <p:sp>
+        <p:nvSpPr>
+          <p:cNvPr id="3" name="Content Placeholder 2"/>
+          <p:cNvSpPr>
+            <a:spLocks noGrp="1"/>
+          </p:cNvSpPr>
+          <p:nvPr>
+            <p:ph idx="1"/>
+          </p:nvPr>
+        </p:nvSpPr>
+        <p:spPr>
+          <a:xfrm>
+            <a:off x="471056" y="1852655"/>
+            <a:ext cx="9144000" cy="3873890"/>
+          </a:xfrm>
+        </p:spPr>
+        <p:txBody>
+          <a:bodyPr>
+            <a:normAutofit fontScale="85000" lnSpcReduction="10000"/>
+          </a:bodyPr>
+          <a:lstStyle/>
+          <a:p>
+            <a:pPr marL="0" indent="0" algn="r" rtl="1">
+              <a:buNone/>
+            </a:pPr>
+            <a:r>
+              <a:rPr lang="he-IL" dirty="0" smtClean="0"/>
+              <a:t>נרצה להריץ את האפליקציה שאני בונים וקיימות לזה 2 אופציות נפוצות.</a:t>
+            </a:r>
+          </a:p>
+          <a:p>
+            <a:pPr marL="742950" indent="-742950" algn="r" rtl="1">
+              <a:buFont typeface="+mj-lt"/>
+              <a:buAutoNum type="arabicPeriod"/>
+            </a:pPr>
+            <a:r>
+              <a:rPr lang="he-IL" dirty="0" smtClean="0"/>
+              <a:t>פתיחת אפשרויות מפתחים במכשיר אנדרואיד ממשי ואישור ניתור באגים באמצעות </a:t>
+            </a:r>
+            <a:r>
+              <a:rPr lang="en-US" dirty="0" smtClean="0"/>
+              <a:t>USB</a:t>
+            </a:r>
+            <a:r>
+              <a:rPr lang="he-IL" dirty="0" smtClean="0"/>
+              <a:t>.</a:t>
+            </a:r>
+            <a:r>
+              <a:rPr lang="he-IL" dirty="0"/>
+              <a:t> </a:t>
+            </a:r>
+            <a:r>
+              <a:rPr lang="he-IL" dirty="0" smtClean="0"/>
+              <a:t>תהליך זה שונה ממכשיר למכשיר. למידע נוסף למכשירים שונים ניתן לעיין במסמך </a:t>
+            </a:r>
+            <a:r>
+              <a:rPr lang="en-US" sz="2800" dirty="0">
+                <a:hlinkClick r:id="rId2"/>
+              </a:rPr>
+              <a:t>https://</a:t>
+            </a:r>
+            <a:r>
+              <a:rPr lang="en-US" sz="2800" dirty="0" smtClean="0">
+                <a:hlinkClick r:id="rId2"/>
+              </a:rPr>
+              <a:t>developer.android.com/studio/debug/dev-options</a:t>
+            </a:r>
+            <a:endParaRPr lang="he-IL" sz="2800" dirty="0" smtClean="0"/>
+          </a:p>
+          <a:p>
+            <a:pPr marL="742950" indent="-742950" algn="r" rtl="1">
+              <a:buFont typeface="+mj-lt"/>
+              <a:buAutoNum type="arabicPeriod"/>
+            </a:pPr>
+            <a:r>
+              <a:rPr lang="he-IL" dirty="0" smtClean="0"/>
+              <a:t>הרצת היישום בסימולטור ש</a:t>
+            </a:r>
+            <a:r>
+              <a:rPr lang="en-US" dirty="0" smtClean="0"/>
+              <a:t>Android Studio</a:t>
+            </a:r>
+            <a:r>
+              <a:rPr lang="he-IL" dirty="0" smtClean="0"/>
+              <a:t> מספקים.</a:t>
+            </a:r>
+            <a:endParaRPr lang="he-IL" dirty="0"/>
+          </a:p>
+        </p:txBody>
+      </p:sp>
+      <p:sp>
+        <p:nvSpPr>
+          <p:cNvPr id="4" name="Title 1"/>
+          <p:cNvSpPr txBox="1">
+            <a:spLocks/>
+          </p:cNvSpPr>
+          <p:nvPr/>
+        </p:nvSpPr>
+        <p:spPr>
+          <a:xfrm>
+            <a:off x="598621" y="1089129"/>
+            <a:ext cx="7376537" cy="763525"/>
+          </a:xfrm>
+          <a:prstGeom prst="rect">
+            <a:avLst/>
+          </a:prstGeom>
+        </p:spPr>
+        <p:txBody>
+          <a:bodyPr vert="horz" lIns="91440" tIns="45720" rIns="91440" bIns="45720" rtlCol="0" anchor="ctr">
+            <a:normAutofit fontScale="97500"/>
+          </a:bodyPr>
+          <a:lstStyle>
+            <a:lvl1pPr algn="l" defTabSz="1219170" rtl="0" eaLnBrk="1" latinLnBrk="0" hangingPunct="1">
+              <a:spcBef>
+                <a:spcPct val="0"/>
+              </a:spcBef>
+              <a:buNone/>
+              <a:defRPr sz="4800" kern="1200">
+                <a:solidFill>
+                  <a:srgbClr val="FFC000"/>
+                </a:solidFill>
+                <a:effectLst>
+                  <a:outerShdw blurRad="50800" dist="38100" dir="2700000" algn="tl" rotWithShape="0">
+                    <a:prstClr val="black">
+                      <a:alpha val="40000"/>
+                    </a:prstClr>
+                  </a:outerShdw>
+                </a:effectLst>
+                <a:latin typeface="+mj-lt"/>
+                <a:ea typeface="+mj-ea"/>
+                <a:cs typeface="+mj-cs"/>
+              </a:defRPr>
+            </a:lvl1pPr>
+          </a:lstStyle>
+          <a:p>
+            <a:pPr algn="r" rtl="1"/>
+            <a:r>
+              <a:rPr lang="he-IL" sz="4000" dirty="0" smtClean="0">
+                <a:solidFill>
+                  <a:srgbClr val="FFE701"/>
+                </a:solidFill>
+              </a:rPr>
+              <a:t>התקנת סימולטור</a:t>
+            </a:r>
+            <a:endParaRPr lang="en-US" sz="4000" dirty="0">
+              <a:solidFill>
+                <a:srgbClr val="FFE701"/>
+              </a:solidFill>
+            </a:endParaRPr>
+          </a:p>
+        </p:txBody>
+      </p:sp>
+      <p:sp>
+        <p:nvSpPr>
+          <p:cNvPr id="6" name="Content Placeholder 2"/>
+          <p:cNvSpPr txBox="1">
+            <a:spLocks/>
+          </p:cNvSpPr>
+          <p:nvPr/>
+        </p:nvSpPr>
+        <p:spPr>
+          <a:xfrm>
+            <a:off x="471056" y="5808059"/>
+            <a:ext cx="9144000" cy="858218"/>
+          </a:xfrm>
+          <a:prstGeom prst="rect">
+            <a:avLst/>
+          </a:prstGeom>
+        </p:spPr>
+        <p:txBody>
+          <a:bodyPr vert="horz" lIns="91440" tIns="45720" rIns="91440" bIns="45720" rtlCol="0">
+            <a:normAutofit/>
+          </a:bodyPr>
+          <a:lstStyle>
+            <a:lvl1pPr marL="457189" indent="-457189" algn="l" defTabSz="1219170" rtl="0" eaLnBrk="1" latinLnBrk="0" hangingPunct="1">
+              <a:spcBef>
+                <a:spcPct val="20000"/>
+              </a:spcBef>
+              <a:buFont typeface="Arial" pitchFamily="34" charset="0"/>
+              <a:buChar char="•"/>
+              <a:defRPr sz="3733" kern="1200">
+                <a:solidFill>
+                  <a:schemeClr val="bg1"/>
+                </a:solidFill>
+                <a:latin typeface="+mn-lt"/>
+                <a:ea typeface="+mn-ea"/>
+                <a:cs typeface="+mn-cs"/>
+              </a:defRPr>
+            </a:lvl1pPr>
+            <a:lvl2pPr marL="990575" indent="-380990" algn="l" defTabSz="1219170" rtl="0" eaLnBrk="1" latinLnBrk="0" hangingPunct="1">
+              <a:spcBef>
+                <a:spcPct val="20000"/>
+              </a:spcBef>
+              <a:buFont typeface="Arial" pitchFamily="34" charset="0"/>
+              <a:buChar char="–"/>
+              <a:defRPr sz="3733" kern="1200">
+                <a:solidFill>
+                  <a:schemeClr val="bg1"/>
+                </a:solidFill>
+                <a:latin typeface="+mn-lt"/>
+                <a:ea typeface="+mn-ea"/>
+                <a:cs typeface="+mn-cs"/>
+              </a:defRPr>
+            </a:lvl2pPr>
+            <a:lvl3pPr marL="1523962" indent="-304792" algn="l" defTabSz="1219170" rtl="0" eaLnBrk="1" latinLnBrk="0" hangingPunct="1">
+              <a:spcBef>
+                <a:spcPct val="20000"/>
+              </a:spcBef>
+              <a:buFont typeface="Arial" pitchFamily="34" charset="0"/>
+              <a:buChar char="•"/>
+              <a:defRPr sz="3200" kern="1200">
+                <a:solidFill>
+                  <a:schemeClr val="bg1"/>
+                </a:solidFill>
+                <a:latin typeface="+mn-lt"/>
+                <a:ea typeface="+mn-ea"/>
+                <a:cs typeface="+mn-cs"/>
+              </a:defRPr>
+            </a:lvl3pPr>
+            <a:lvl4pPr marL="2133547" indent="-304792" algn="l" defTabSz="1219170" rtl="0" eaLnBrk="1" latinLnBrk="0" hangingPunct="1">
+              <a:spcBef>
+                <a:spcPct val="20000"/>
+              </a:spcBef>
+              <a:buFont typeface="Arial" pitchFamily="34" charset="0"/>
+              <a:buChar char="–"/>
+              <a:defRPr sz="2667" kern="1200">
+                <a:solidFill>
+                  <a:schemeClr val="bg1"/>
+                </a:solidFill>
+                <a:latin typeface="+mn-lt"/>
+                <a:ea typeface="+mn-ea"/>
+                <a:cs typeface="+mn-cs"/>
+              </a:defRPr>
+            </a:lvl4pPr>
+            <a:lvl5pPr marL="2743131" indent="-304792" algn="l" defTabSz="1219170" rtl="0" eaLnBrk="1" latinLnBrk="0" hangingPunct="1">
+              <a:spcBef>
+                <a:spcPct val="20000"/>
+              </a:spcBef>
+              <a:buFont typeface="Arial" pitchFamily="34" charset="0"/>
+              <a:buChar char="»"/>
+              <a:defRPr sz="2667" kern="1200">
+                <a:solidFill>
+                  <a:schemeClr val="bg1"/>
+                </a:solidFill>
+                <a:latin typeface="+mn-lt"/>
+                <a:ea typeface="+mn-ea"/>
+                <a:cs typeface="+mn-cs"/>
+              </a:defRPr>
+            </a:lvl5pPr>
+            <a:lvl6pPr marL="3352716" indent="-304792" algn="l" defTabSz="1219170" rtl="0" eaLnBrk="1" latinLnBrk="0" hangingPunct="1">
+              <a:spcBef>
+                <a:spcPct val="20000"/>
+              </a:spcBef>
+              <a:buFont typeface="Arial" pitchFamily="34" charset="0"/>
+              <a:buChar char="•"/>
+              <a:defRPr sz="2667" kern="1200">
+                <a:solidFill>
+                  <a:schemeClr val="tx1"/>
+                </a:solidFill>
+                <a:latin typeface="+mn-lt"/>
+                <a:ea typeface="+mn-ea"/>
+                <a:cs typeface="+mn-cs"/>
+              </a:defRPr>
+            </a:lvl6pPr>
+            <a:lvl7pPr marL="3962301" indent="-304792" algn="l" defTabSz="1219170" rtl="0" eaLnBrk="1" latinLnBrk="0" hangingPunct="1">
+              <a:spcBef>
+                <a:spcPct val="20000"/>
+              </a:spcBef>
+              <a:buFont typeface="Arial" pitchFamily="34" charset="0"/>
+              <a:buChar char="•"/>
+              <a:defRPr sz="2667" kern="1200">
+                <a:solidFill>
+                  <a:schemeClr val="tx1"/>
+                </a:solidFill>
+                <a:latin typeface="+mn-lt"/>
+                <a:ea typeface="+mn-ea"/>
+                <a:cs typeface="+mn-cs"/>
+              </a:defRPr>
+            </a:lvl7pPr>
+            <a:lvl8pPr marL="4571886" indent="-304792" algn="l" defTabSz="1219170" rtl="0" eaLnBrk="1" latinLnBrk="0" hangingPunct="1">
+              <a:spcBef>
+                <a:spcPct val="20000"/>
+              </a:spcBef>
+              <a:buFont typeface="Arial" pitchFamily="34" charset="0"/>
+              <a:buChar char="•"/>
+              <a:defRPr sz="2667" kern="1200">
+                <a:solidFill>
+                  <a:schemeClr val="tx1"/>
+                </a:solidFill>
+                <a:latin typeface="+mn-lt"/>
+                <a:ea typeface="+mn-ea"/>
+                <a:cs typeface="+mn-cs"/>
+              </a:defRPr>
+            </a:lvl8pPr>
+            <a:lvl9pPr marL="5181470" indent="-304792" algn="l" defTabSz="1219170" rtl="0" eaLnBrk="1" latinLnBrk="0" hangingPunct="1">
+              <a:spcBef>
+                <a:spcPct val="20000"/>
+              </a:spcBef>
+              <a:buFont typeface="Arial" pitchFamily="34" charset="0"/>
+              <a:buChar char="•"/>
+              <a:defRPr sz="2667" kern="1200">
+                <a:solidFill>
+                  <a:schemeClr val="tx1"/>
+                </a:solidFill>
+                <a:latin typeface="+mn-lt"/>
+                <a:ea typeface="+mn-ea"/>
+                <a:cs typeface="+mn-cs"/>
+              </a:defRPr>
+            </a:lvl9pPr>
+          </a:lstStyle>
+          <a:p>
+            <a:pPr marL="0" indent="0" algn="r" rtl="1">
+              <a:buFont typeface="Arial" pitchFamily="34" charset="0"/>
+              <a:buNone/>
+            </a:pPr>
+            <a:r>
+              <a:rPr lang="he-IL" dirty="0" smtClean="0"/>
+              <a:t>אני נתמקד כעת באופציה מספר 2</a:t>
+            </a:r>
+            <a:endParaRPr lang="he-IL" dirty="0"/>
+          </a:p>
+        </p:txBody>
+      </p:sp>
+    </p:spTree>
+    <p:extLst>
+      <p:ext uri="{BB962C8B-B14F-4D97-AF65-F5344CB8AC3E}">
+        <p14:creationId xmlns:p14="http://schemas.microsoft.com/office/powerpoint/2010/main" val="1526086175"/>
       </p:ext>
     </p:extLst>
   </p:cSld>

</xml_diff>

<commit_message>
added second  page of simulator
</commit_message>
<xml_diff>
--- a/Android Presentation - Java Workshop.pptx
+++ b/Android Presentation - Java Workshop.pptx
@@ -17,6 +17,7 @@
     <p:sldId id="271" r:id="rId11"/>
     <p:sldId id="272" r:id="rId12"/>
     <p:sldId id="273" r:id="rId13"/>
+    <p:sldId id="274" r:id="rId14"/>
   </p:sldIdLst>
   <p:sldSz cx="12192000" cy="6858000"/>
   <p:notesSz cx="6858000" cy="9144000"/>
@@ -4600,6 +4601,684 @@
     <p:extLst>
       <p:ext uri="{BB962C8B-B14F-4D97-AF65-F5344CB8AC3E}">
         <p14:creationId xmlns:p14="http://schemas.microsoft.com/office/powerpoint/2010/main" val="1526086175"/>
+      </p:ext>
+    </p:extLst>
+  </p:cSld>
+  <p:clrMapOvr>
+    <a:masterClrMapping/>
+  </p:clrMapOvr>
+</p:sld>
+</file>
+
+<file path=ppt/slides/slide13.xml><?xml version="1.0" encoding="utf-8"?>
+<p:sld xmlns:a="http://schemas.openxmlformats.org/drawingml/2006/main" xmlns:r="http://schemas.openxmlformats.org/officeDocument/2006/relationships" xmlns:p="http://schemas.openxmlformats.org/presentationml/2006/main">
+  <p:cSld>
+    <p:spTree>
+      <p:nvGrpSpPr>
+        <p:cNvPr id="1" name=""/>
+        <p:cNvGrpSpPr/>
+        <p:nvPr/>
+      </p:nvGrpSpPr>
+      <p:grpSpPr>
+        <a:xfrm>
+          <a:off x="0" y="0"/>
+          <a:ext cx="0" cy="0"/>
+          <a:chOff x="0" y="0"/>
+          <a:chExt cx="0" cy="0"/>
+        </a:xfrm>
+      </p:grpSpPr>
+      <p:sp>
+        <p:nvSpPr>
+          <p:cNvPr id="2" name="Title 1"/>
+          <p:cNvSpPr>
+            <a:spLocks noGrp="1"/>
+          </p:cNvSpPr>
+          <p:nvPr>
+            <p:ph type="title"/>
+          </p:nvPr>
+        </p:nvSpPr>
+        <p:spPr/>
+        <p:txBody>
+          <a:bodyPr>
+            <a:normAutofit fontScale="90000"/>
+          </a:bodyPr>
+          <a:lstStyle/>
+          <a:p>
+            <a:pPr algn="r" rtl="1"/>
+            <a:r>
+              <a:rPr lang="he-IL" dirty="0"/>
+              <a:t>התקנת סביבת </a:t>
+            </a:r>
+            <a:r>
+              <a:rPr lang="he-IL" dirty="0" smtClean="0"/>
+              <a:t>העבודה</a:t>
+            </a:r>
+            <a:endParaRPr lang="en-US" dirty="0"/>
+          </a:p>
+        </p:txBody>
+      </p:sp>
+      <p:sp>
+        <p:nvSpPr>
+          <p:cNvPr id="4" name="Title 1"/>
+          <p:cNvSpPr txBox="1">
+            <a:spLocks/>
+          </p:cNvSpPr>
+          <p:nvPr/>
+        </p:nvSpPr>
+        <p:spPr>
+          <a:xfrm>
+            <a:off x="598621" y="1089129"/>
+            <a:ext cx="7376537" cy="763525"/>
+          </a:xfrm>
+          <a:prstGeom prst="rect">
+            <a:avLst/>
+          </a:prstGeom>
+        </p:spPr>
+        <p:txBody>
+          <a:bodyPr vert="horz" lIns="91440" tIns="45720" rIns="91440" bIns="45720" rtlCol="0" anchor="ctr">
+            <a:normAutofit fontScale="97500"/>
+          </a:bodyPr>
+          <a:lstStyle>
+            <a:lvl1pPr algn="l" defTabSz="1219170" rtl="0" eaLnBrk="1" latinLnBrk="0" hangingPunct="1">
+              <a:spcBef>
+                <a:spcPct val="0"/>
+              </a:spcBef>
+              <a:buNone/>
+              <a:defRPr sz="4800" kern="1200">
+                <a:solidFill>
+                  <a:srgbClr val="FFC000"/>
+                </a:solidFill>
+                <a:effectLst>
+                  <a:outerShdw blurRad="50800" dist="38100" dir="2700000" algn="tl" rotWithShape="0">
+                    <a:prstClr val="black">
+                      <a:alpha val="40000"/>
+                    </a:prstClr>
+                  </a:outerShdw>
+                </a:effectLst>
+                <a:latin typeface="+mj-lt"/>
+                <a:ea typeface="+mj-ea"/>
+                <a:cs typeface="+mj-cs"/>
+              </a:defRPr>
+            </a:lvl1pPr>
+          </a:lstStyle>
+          <a:p>
+            <a:pPr algn="r" rtl="1"/>
+            <a:r>
+              <a:rPr lang="he-IL" sz="4000" dirty="0" smtClean="0">
+                <a:solidFill>
+                  <a:srgbClr val="FFE701"/>
+                </a:solidFill>
+              </a:rPr>
+              <a:t>התקנת סימולטור</a:t>
+            </a:r>
+            <a:endParaRPr lang="en-US" sz="4000" dirty="0">
+              <a:solidFill>
+                <a:srgbClr val="FFE701"/>
+              </a:solidFill>
+            </a:endParaRPr>
+          </a:p>
+        </p:txBody>
+      </p:sp>
+      <p:sp>
+        <p:nvSpPr>
+          <p:cNvPr id="6" name="Content Placeholder 2"/>
+          <p:cNvSpPr txBox="1">
+            <a:spLocks/>
+          </p:cNvSpPr>
+          <p:nvPr/>
+        </p:nvSpPr>
+        <p:spPr>
+          <a:xfrm>
+            <a:off x="2733964" y="1996081"/>
+            <a:ext cx="5874327" cy="673228"/>
+          </a:xfrm>
+          <a:prstGeom prst="rect">
+            <a:avLst/>
+          </a:prstGeom>
+        </p:spPr>
+        <p:txBody>
+          <a:bodyPr vert="horz" lIns="91440" tIns="45720" rIns="91440" bIns="45720" rtlCol="0">
+            <a:normAutofit fontScale="47500" lnSpcReduction="20000"/>
+          </a:bodyPr>
+          <a:lstStyle>
+            <a:lvl1pPr marL="457189" indent="-457189" algn="l" defTabSz="1219170" rtl="0" eaLnBrk="1" latinLnBrk="0" hangingPunct="1">
+              <a:spcBef>
+                <a:spcPct val="20000"/>
+              </a:spcBef>
+              <a:buFont typeface="Arial" pitchFamily="34" charset="0"/>
+              <a:buChar char="•"/>
+              <a:defRPr sz="3733" kern="1200">
+                <a:solidFill>
+                  <a:schemeClr val="bg1"/>
+                </a:solidFill>
+                <a:latin typeface="+mn-lt"/>
+                <a:ea typeface="+mn-ea"/>
+                <a:cs typeface="+mn-cs"/>
+              </a:defRPr>
+            </a:lvl1pPr>
+            <a:lvl2pPr marL="990575" indent="-380990" algn="l" defTabSz="1219170" rtl="0" eaLnBrk="1" latinLnBrk="0" hangingPunct="1">
+              <a:spcBef>
+                <a:spcPct val="20000"/>
+              </a:spcBef>
+              <a:buFont typeface="Arial" pitchFamily="34" charset="0"/>
+              <a:buChar char="–"/>
+              <a:defRPr sz="3733" kern="1200">
+                <a:solidFill>
+                  <a:schemeClr val="bg1"/>
+                </a:solidFill>
+                <a:latin typeface="+mn-lt"/>
+                <a:ea typeface="+mn-ea"/>
+                <a:cs typeface="+mn-cs"/>
+              </a:defRPr>
+            </a:lvl2pPr>
+            <a:lvl3pPr marL="1523962" indent="-304792" algn="l" defTabSz="1219170" rtl="0" eaLnBrk="1" latinLnBrk="0" hangingPunct="1">
+              <a:spcBef>
+                <a:spcPct val="20000"/>
+              </a:spcBef>
+              <a:buFont typeface="Arial" pitchFamily="34" charset="0"/>
+              <a:buChar char="•"/>
+              <a:defRPr sz="3200" kern="1200">
+                <a:solidFill>
+                  <a:schemeClr val="bg1"/>
+                </a:solidFill>
+                <a:latin typeface="+mn-lt"/>
+                <a:ea typeface="+mn-ea"/>
+                <a:cs typeface="+mn-cs"/>
+              </a:defRPr>
+            </a:lvl3pPr>
+            <a:lvl4pPr marL="2133547" indent="-304792" algn="l" defTabSz="1219170" rtl="0" eaLnBrk="1" latinLnBrk="0" hangingPunct="1">
+              <a:spcBef>
+                <a:spcPct val="20000"/>
+              </a:spcBef>
+              <a:buFont typeface="Arial" pitchFamily="34" charset="0"/>
+              <a:buChar char="–"/>
+              <a:defRPr sz="2667" kern="1200">
+                <a:solidFill>
+                  <a:schemeClr val="bg1"/>
+                </a:solidFill>
+                <a:latin typeface="+mn-lt"/>
+                <a:ea typeface="+mn-ea"/>
+                <a:cs typeface="+mn-cs"/>
+              </a:defRPr>
+            </a:lvl4pPr>
+            <a:lvl5pPr marL="2743131" indent="-304792" algn="l" defTabSz="1219170" rtl="0" eaLnBrk="1" latinLnBrk="0" hangingPunct="1">
+              <a:spcBef>
+                <a:spcPct val="20000"/>
+              </a:spcBef>
+              <a:buFont typeface="Arial" pitchFamily="34" charset="0"/>
+              <a:buChar char="»"/>
+              <a:defRPr sz="2667" kern="1200">
+                <a:solidFill>
+                  <a:schemeClr val="bg1"/>
+                </a:solidFill>
+                <a:latin typeface="+mn-lt"/>
+                <a:ea typeface="+mn-ea"/>
+                <a:cs typeface="+mn-cs"/>
+              </a:defRPr>
+            </a:lvl5pPr>
+            <a:lvl6pPr marL="3352716" indent="-304792" algn="l" defTabSz="1219170" rtl="0" eaLnBrk="1" latinLnBrk="0" hangingPunct="1">
+              <a:spcBef>
+                <a:spcPct val="20000"/>
+              </a:spcBef>
+              <a:buFont typeface="Arial" pitchFamily="34" charset="0"/>
+              <a:buChar char="•"/>
+              <a:defRPr sz="2667" kern="1200">
+                <a:solidFill>
+                  <a:schemeClr val="tx1"/>
+                </a:solidFill>
+                <a:latin typeface="+mn-lt"/>
+                <a:ea typeface="+mn-ea"/>
+                <a:cs typeface="+mn-cs"/>
+              </a:defRPr>
+            </a:lvl6pPr>
+            <a:lvl7pPr marL="3962301" indent="-304792" algn="l" defTabSz="1219170" rtl="0" eaLnBrk="1" latinLnBrk="0" hangingPunct="1">
+              <a:spcBef>
+                <a:spcPct val="20000"/>
+              </a:spcBef>
+              <a:buFont typeface="Arial" pitchFamily="34" charset="0"/>
+              <a:buChar char="•"/>
+              <a:defRPr sz="2667" kern="1200">
+                <a:solidFill>
+                  <a:schemeClr val="tx1"/>
+                </a:solidFill>
+                <a:latin typeface="+mn-lt"/>
+                <a:ea typeface="+mn-ea"/>
+                <a:cs typeface="+mn-cs"/>
+              </a:defRPr>
+            </a:lvl7pPr>
+            <a:lvl8pPr marL="4571886" indent="-304792" algn="l" defTabSz="1219170" rtl="0" eaLnBrk="1" latinLnBrk="0" hangingPunct="1">
+              <a:spcBef>
+                <a:spcPct val="20000"/>
+              </a:spcBef>
+              <a:buFont typeface="Arial" pitchFamily="34" charset="0"/>
+              <a:buChar char="•"/>
+              <a:defRPr sz="2667" kern="1200">
+                <a:solidFill>
+                  <a:schemeClr val="tx1"/>
+                </a:solidFill>
+                <a:latin typeface="+mn-lt"/>
+                <a:ea typeface="+mn-ea"/>
+                <a:cs typeface="+mn-cs"/>
+              </a:defRPr>
+            </a:lvl8pPr>
+            <a:lvl9pPr marL="5181470" indent="-304792" algn="l" defTabSz="1219170" rtl="0" eaLnBrk="1" latinLnBrk="0" hangingPunct="1">
+              <a:spcBef>
+                <a:spcPct val="20000"/>
+              </a:spcBef>
+              <a:buFont typeface="Arial" pitchFamily="34" charset="0"/>
+              <a:buChar char="•"/>
+              <a:defRPr sz="2667" kern="1200">
+                <a:solidFill>
+                  <a:schemeClr val="tx1"/>
+                </a:solidFill>
+                <a:latin typeface="+mn-lt"/>
+                <a:ea typeface="+mn-ea"/>
+                <a:cs typeface="+mn-cs"/>
+              </a:defRPr>
+            </a:lvl9pPr>
+          </a:lstStyle>
+          <a:p>
+            <a:pPr marL="0" indent="0" algn="r" rtl="1">
+              <a:buFont typeface="Arial" pitchFamily="34" charset="0"/>
+              <a:buNone/>
+            </a:pPr>
+            <a:r>
+              <a:rPr lang="he-IL" dirty="0" smtClean="0"/>
+              <a:t>בסרגל הכלים שניתן לראות בצד ימין למעלה בחון ב</a:t>
+            </a:r>
+            <a:r>
+              <a:rPr lang="en-US" dirty="0" smtClean="0"/>
+              <a:t>Android Studio </a:t>
+            </a:r>
+            <a:r>
+              <a:rPr lang="he-IL" dirty="0"/>
+              <a:t> </a:t>
+            </a:r>
+            <a:r>
+              <a:rPr lang="he-IL" dirty="0" smtClean="0"/>
+              <a:t>נלחץ על כפתור ה</a:t>
+            </a:r>
+            <a:r>
+              <a:rPr lang="en-US" dirty="0" smtClean="0"/>
+              <a:t>AVD</a:t>
+            </a:r>
+            <a:r>
+              <a:rPr lang="he-IL" dirty="0" smtClean="0"/>
+              <a:t> (</a:t>
+            </a:r>
+            <a:r>
+              <a:rPr lang="en-US" dirty="0" smtClean="0"/>
+              <a:t>Android Virtual Devices</a:t>
+            </a:r>
+            <a:r>
+              <a:rPr lang="he-IL" dirty="0" smtClean="0"/>
+              <a:t>)</a:t>
+            </a:r>
+            <a:endParaRPr lang="he-IL" dirty="0"/>
+          </a:p>
+        </p:txBody>
+      </p:sp>
+      <p:pic>
+        <p:nvPicPr>
+          <p:cNvPr id="7" name="Content Placeholder 6"/>
+          <p:cNvPicPr>
+            <a:picLocks noGrp="1" noChangeAspect="1"/>
+          </p:cNvPicPr>
+          <p:nvPr>
+            <p:ph idx="1"/>
+          </p:nvPr>
+        </p:nvPicPr>
+        <p:blipFill>
+          <a:blip r:embed="rId2">
+            <a:extLst>
+              <a:ext uri="{28A0092B-C50C-407E-A947-70E740481C1C}">
+                <a14:useLocalDpi xmlns:a14="http://schemas.microsoft.com/office/drawing/2010/main" val="0"/>
+              </a:ext>
+            </a:extLst>
+          </a:blip>
+          <a:stretch>
+            <a:fillRect/>
+          </a:stretch>
+        </p:blipFill>
+        <p:spPr>
+          <a:xfrm>
+            <a:off x="737034" y="2997727"/>
+            <a:ext cx="7940675" cy="384879"/>
+          </a:xfrm>
+        </p:spPr>
+      </p:pic>
+      <p:sp>
+        <p:nvSpPr>
+          <p:cNvPr id="8" name="Rectangle 7"/>
+          <p:cNvSpPr/>
+          <p:nvPr/>
+        </p:nvSpPr>
+        <p:spPr>
+          <a:xfrm>
+            <a:off x="7887855" y="2997726"/>
+            <a:ext cx="286328" cy="325631"/>
+          </a:xfrm>
+          <a:prstGeom prst="rect">
+            <a:avLst/>
+          </a:prstGeom>
+          <a:noFill/>
+          <a:ln>
+            <a:solidFill>
+              <a:schemeClr val="accent2"/>
+            </a:solidFill>
+          </a:ln>
+        </p:spPr>
+        <p:style>
+          <a:lnRef idx="2">
+            <a:schemeClr val="accent2">
+              <a:shade val="50000"/>
+            </a:schemeClr>
+          </a:lnRef>
+          <a:fillRef idx="1">
+            <a:schemeClr val="accent2"/>
+          </a:fillRef>
+          <a:effectRef idx="0">
+            <a:schemeClr val="accent2"/>
+          </a:effectRef>
+          <a:fontRef idx="minor">
+            <a:schemeClr val="lt1"/>
+          </a:fontRef>
+        </p:style>
+        <p:txBody>
+          <a:bodyPr rtlCol="0" anchor="ctr"/>
+          <a:lstStyle/>
+          <a:p>
+            <a:pPr algn="ctr"/>
+            <a:endParaRPr lang="en-US"/>
+          </a:p>
+        </p:txBody>
+      </p:sp>
+      <p:cxnSp>
+        <p:nvCxnSpPr>
+          <p:cNvPr id="26" name="Straight Connector 25"/>
+          <p:cNvCxnSpPr/>
+          <p:nvPr/>
+        </p:nvCxnSpPr>
+        <p:spPr>
+          <a:xfrm>
+            <a:off x="6428509" y="2487105"/>
+            <a:ext cx="1546649" cy="510621"/>
+          </a:xfrm>
+          <a:prstGeom prst="line">
+            <a:avLst/>
+          </a:prstGeom>
+          <a:ln w="19050">
+            <a:solidFill>
+              <a:schemeClr val="accent2"/>
+            </a:solidFill>
+          </a:ln>
+        </p:spPr>
+        <p:style>
+          <a:lnRef idx="1">
+            <a:schemeClr val="accent1"/>
+          </a:lnRef>
+          <a:fillRef idx="0">
+            <a:schemeClr val="accent1"/>
+          </a:fillRef>
+          <a:effectRef idx="0">
+            <a:schemeClr val="accent1"/>
+          </a:effectRef>
+          <a:fontRef idx="minor">
+            <a:schemeClr val="tx1"/>
+          </a:fontRef>
+        </p:style>
+      </p:cxnSp>
+      <p:sp>
+        <p:nvSpPr>
+          <p:cNvPr id="28" name="Rectangle 27"/>
+          <p:cNvSpPr/>
+          <p:nvPr/>
+        </p:nvSpPr>
+        <p:spPr>
+          <a:xfrm>
+            <a:off x="5823084" y="2234074"/>
+            <a:ext cx="1224000" cy="253031"/>
+          </a:xfrm>
+          <a:prstGeom prst="rect">
+            <a:avLst/>
+          </a:prstGeom>
+          <a:noFill/>
+          <a:ln>
+            <a:solidFill>
+              <a:schemeClr val="accent2"/>
+            </a:solidFill>
+          </a:ln>
+        </p:spPr>
+        <p:style>
+          <a:lnRef idx="2">
+            <a:schemeClr val="accent2">
+              <a:shade val="50000"/>
+            </a:schemeClr>
+          </a:lnRef>
+          <a:fillRef idx="1">
+            <a:schemeClr val="accent2"/>
+          </a:fillRef>
+          <a:effectRef idx="0">
+            <a:schemeClr val="accent2"/>
+          </a:effectRef>
+          <a:fontRef idx="minor">
+            <a:schemeClr val="lt1"/>
+          </a:fontRef>
+        </p:style>
+        <p:txBody>
+          <a:bodyPr rtlCol="0" anchor="ctr"/>
+          <a:lstStyle/>
+          <a:p>
+            <a:pPr algn="ctr"/>
+            <a:endParaRPr lang="en-US"/>
+          </a:p>
+        </p:txBody>
+      </p:sp>
+      <p:sp>
+        <p:nvSpPr>
+          <p:cNvPr id="29" name="Content Placeholder 2"/>
+          <p:cNvSpPr txBox="1">
+            <a:spLocks/>
+          </p:cNvSpPr>
+          <p:nvPr/>
+        </p:nvSpPr>
+        <p:spPr>
+          <a:xfrm>
+            <a:off x="2803382" y="3718679"/>
+            <a:ext cx="5874327" cy="673228"/>
+          </a:xfrm>
+          <a:prstGeom prst="rect">
+            <a:avLst/>
+          </a:prstGeom>
+        </p:spPr>
+        <p:txBody>
+          <a:bodyPr vert="horz" lIns="91440" tIns="45720" rIns="91440" bIns="45720" rtlCol="0">
+            <a:normAutofit fontScale="62500" lnSpcReduction="20000"/>
+          </a:bodyPr>
+          <a:lstStyle>
+            <a:lvl1pPr marL="457189" indent="-457189" algn="l" defTabSz="1219170" rtl="0" eaLnBrk="1" latinLnBrk="0" hangingPunct="1">
+              <a:spcBef>
+                <a:spcPct val="20000"/>
+              </a:spcBef>
+              <a:buFont typeface="Arial" pitchFamily="34" charset="0"/>
+              <a:buChar char="•"/>
+              <a:defRPr sz="3733" kern="1200">
+                <a:solidFill>
+                  <a:schemeClr val="bg1"/>
+                </a:solidFill>
+                <a:latin typeface="+mn-lt"/>
+                <a:ea typeface="+mn-ea"/>
+                <a:cs typeface="+mn-cs"/>
+              </a:defRPr>
+            </a:lvl1pPr>
+            <a:lvl2pPr marL="990575" indent="-380990" algn="l" defTabSz="1219170" rtl="0" eaLnBrk="1" latinLnBrk="0" hangingPunct="1">
+              <a:spcBef>
+                <a:spcPct val="20000"/>
+              </a:spcBef>
+              <a:buFont typeface="Arial" pitchFamily="34" charset="0"/>
+              <a:buChar char="–"/>
+              <a:defRPr sz="3733" kern="1200">
+                <a:solidFill>
+                  <a:schemeClr val="bg1"/>
+                </a:solidFill>
+                <a:latin typeface="+mn-lt"/>
+                <a:ea typeface="+mn-ea"/>
+                <a:cs typeface="+mn-cs"/>
+              </a:defRPr>
+            </a:lvl2pPr>
+            <a:lvl3pPr marL="1523962" indent="-304792" algn="l" defTabSz="1219170" rtl="0" eaLnBrk="1" latinLnBrk="0" hangingPunct="1">
+              <a:spcBef>
+                <a:spcPct val="20000"/>
+              </a:spcBef>
+              <a:buFont typeface="Arial" pitchFamily="34" charset="0"/>
+              <a:buChar char="•"/>
+              <a:defRPr sz="3200" kern="1200">
+                <a:solidFill>
+                  <a:schemeClr val="bg1"/>
+                </a:solidFill>
+                <a:latin typeface="+mn-lt"/>
+                <a:ea typeface="+mn-ea"/>
+                <a:cs typeface="+mn-cs"/>
+              </a:defRPr>
+            </a:lvl3pPr>
+            <a:lvl4pPr marL="2133547" indent="-304792" algn="l" defTabSz="1219170" rtl="0" eaLnBrk="1" latinLnBrk="0" hangingPunct="1">
+              <a:spcBef>
+                <a:spcPct val="20000"/>
+              </a:spcBef>
+              <a:buFont typeface="Arial" pitchFamily="34" charset="0"/>
+              <a:buChar char="–"/>
+              <a:defRPr sz="2667" kern="1200">
+                <a:solidFill>
+                  <a:schemeClr val="bg1"/>
+                </a:solidFill>
+                <a:latin typeface="+mn-lt"/>
+                <a:ea typeface="+mn-ea"/>
+                <a:cs typeface="+mn-cs"/>
+              </a:defRPr>
+            </a:lvl4pPr>
+            <a:lvl5pPr marL="2743131" indent="-304792" algn="l" defTabSz="1219170" rtl="0" eaLnBrk="1" latinLnBrk="0" hangingPunct="1">
+              <a:spcBef>
+                <a:spcPct val="20000"/>
+              </a:spcBef>
+              <a:buFont typeface="Arial" pitchFamily="34" charset="0"/>
+              <a:buChar char="»"/>
+              <a:defRPr sz="2667" kern="1200">
+                <a:solidFill>
+                  <a:schemeClr val="bg1"/>
+                </a:solidFill>
+                <a:latin typeface="+mn-lt"/>
+                <a:ea typeface="+mn-ea"/>
+                <a:cs typeface="+mn-cs"/>
+              </a:defRPr>
+            </a:lvl5pPr>
+            <a:lvl6pPr marL="3352716" indent="-304792" algn="l" defTabSz="1219170" rtl="0" eaLnBrk="1" latinLnBrk="0" hangingPunct="1">
+              <a:spcBef>
+                <a:spcPct val="20000"/>
+              </a:spcBef>
+              <a:buFont typeface="Arial" pitchFamily="34" charset="0"/>
+              <a:buChar char="•"/>
+              <a:defRPr sz="2667" kern="1200">
+                <a:solidFill>
+                  <a:schemeClr val="tx1"/>
+                </a:solidFill>
+                <a:latin typeface="+mn-lt"/>
+                <a:ea typeface="+mn-ea"/>
+                <a:cs typeface="+mn-cs"/>
+              </a:defRPr>
+            </a:lvl6pPr>
+            <a:lvl7pPr marL="3962301" indent="-304792" algn="l" defTabSz="1219170" rtl="0" eaLnBrk="1" latinLnBrk="0" hangingPunct="1">
+              <a:spcBef>
+                <a:spcPct val="20000"/>
+              </a:spcBef>
+              <a:buFont typeface="Arial" pitchFamily="34" charset="0"/>
+              <a:buChar char="•"/>
+              <a:defRPr sz="2667" kern="1200">
+                <a:solidFill>
+                  <a:schemeClr val="tx1"/>
+                </a:solidFill>
+                <a:latin typeface="+mn-lt"/>
+                <a:ea typeface="+mn-ea"/>
+                <a:cs typeface="+mn-cs"/>
+              </a:defRPr>
+            </a:lvl7pPr>
+            <a:lvl8pPr marL="4571886" indent="-304792" algn="l" defTabSz="1219170" rtl="0" eaLnBrk="1" latinLnBrk="0" hangingPunct="1">
+              <a:spcBef>
+                <a:spcPct val="20000"/>
+              </a:spcBef>
+              <a:buFont typeface="Arial" pitchFamily="34" charset="0"/>
+              <a:buChar char="•"/>
+              <a:defRPr sz="2667" kern="1200">
+                <a:solidFill>
+                  <a:schemeClr val="tx1"/>
+                </a:solidFill>
+                <a:latin typeface="+mn-lt"/>
+                <a:ea typeface="+mn-ea"/>
+                <a:cs typeface="+mn-cs"/>
+              </a:defRPr>
+            </a:lvl8pPr>
+            <a:lvl9pPr marL="5181470" indent="-304792" algn="l" defTabSz="1219170" rtl="0" eaLnBrk="1" latinLnBrk="0" hangingPunct="1">
+              <a:spcBef>
+                <a:spcPct val="20000"/>
+              </a:spcBef>
+              <a:buFont typeface="Arial" pitchFamily="34" charset="0"/>
+              <a:buChar char="•"/>
+              <a:defRPr sz="2667" kern="1200">
+                <a:solidFill>
+                  <a:schemeClr val="tx1"/>
+                </a:solidFill>
+                <a:latin typeface="+mn-lt"/>
+                <a:ea typeface="+mn-ea"/>
+                <a:cs typeface="+mn-cs"/>
+              </a:defRPr>
+            </a:lvl9pPr>
+          </a:lstStyle>
+          <a:p>
+            <a:pPr marL="0" indent="0" algn="r" rtl="1">
+              <a:buFont typeface="Arial" pitchFamily="34" charset="0"/>
+              <a:buNone/>
+            </a:pPr>
+            <a:r>
+              <a:rPr lang="he-IL" dirty="0" smtClean="0"/>
+              <a:t>אז נלחץ על כפתור ליצירת מכשיר וירטואלי חדש (סימולטור)</a:t>
+            </a:r>
+            <a:endParaRPr lang="he-IL" dirty="0"/>
+          </a:p>
+        </p:txBody>
+      </p:sp>
+      <p:pic>
+        <p:nvPicPr>
+          <p:cNvPr id="30" name="Picture 29"/>
+          <p:cNvPicPr>
+            <a:picLocks noChangeAspect="1"/>
+          </p:cNvPicPr>
+          <p:nvPr/>
+        </p:nvPicPr>
+        <p:blipFill>
+          <a:blip r:embed="rId3">
+            <a:extLst>
+              <a:ext uri="{28A0092B-C50C-407E-A947-70E740481C1C}">
+                <a14:useLocalDpi xmlns:a14="http://schemas.microsoft.com/office/drawing/2010/main" val="0"/>
+              </a:ext>
+            </a:extLst>
+          </a:blip>
+          <a:stretch>
+            <a:fillRect/>
+          </a:stretch>
+        </p:blipFill>
+        <p:spPr>
+          <a:xfrm>
+            <a:off x="3783184" y="4435880"/>
+            <a:ext cx="3263900" cy="584200"/>
+          </a:xfrm>
+          <a:prstGeom prst="rect">
+            <a:avLst/>
+          </a:prstGeom>
+        </p:spPr>
+      </p:pic>
+    </p:spTree>
+    <p:extLst>
+      <p:ext uri="{BB962C8B-B14F-4D97-AF65-F5344CB8AC3E}">
+        <p14:creationId xmlns:p14="http://schemas.microsoft.com/office/powerpoint/2010/main" val="253604450"/>
       </p:ext>
     </p:extLst>
   </p:cSld>

</xml_diff>

<commit_message>
added  thid  page of simulator
</commit_message>
<xml_diff>
--- a/Android Presentation - Java Workshop.pptx
+++ b/Android Presentation - Java Workshop.pptx
@@ -18,6 +18,8 @@
     <p:sldId id="272" r:id="rId12"/>
     <p:sldId id="273" r:id="rId13"/>
     <p:sldId id="274" r:id="rId14"/>
+    <p:sldId id="275" r:id="rId15"/>
+    <p:sldId id="276" r:id="rId16"/>
   </p:sldIdLst>
   <p:sldSz cx="12192000" cy="6858000"/>
   <p:notesSz cx="6858000" cy="9144000"/>
@@ -4729,8 +4731,8 @@
         </p:nvSpPr>
         <p:spPr>
           <a:xfrm>
-            <a:off x="2733964" y="1996081"/>
-            <a:ext cx="5874327" cy="673228"/>
+            <a:off x="2318328" y="1996081"/>
+            <a:ext cx="6289964" cy="673228"/>
           </a:xfrm>
           <a:prstGeom prst="rect">
             <a:avLst/>
@@ -4903,12 +4905,20 @@
               <a:t>AVD</a:t>
             </a:r>
             <a:r>
+              <a:rPr lang="en-US" dirty="0"/>
+              <a:t> </a:t>
+            </a:r>
+            <a:r>
+              <a:rPr lang="en-US" dirty="0" smtClean="0"/>
+              <a:t>Manager</a:t>
+            </a:r>
+            <a:r>
               <a:rPr lang="he-IL" dirty="0" smtClean="0"/>
               <a:t> (</a:t>
             </a:r>
             <a:r>
               <a:rPr lang="en-US" dirty="0" smtClean="0"/>
-              <a:t>Android Virtual Devices</a:t>
+              <a:t>Android Virtual Device</a:t>
             </a:r>
             <a:r>
               <a:rPr lang="he-IL" dirty="0" smtClean="0"/>
@@ -5036,8 +5046,8 @@
         </p:nvSpPr>
         <p:spPr>
           <a:xfrm>
-            <a:off x="5823084" y="2234074"/>
-            <a:ext cx="1224000" cy="253031"/>
+            <a:off x="5652655" y="2234074"/>
+            <a:ext cx="2096654" cy="253031"/>
           </a:xfrm>
           <a:prstGeom prst="rect">
             <a:avLst/>
@@ -5279,6 +5289,1167 @@
     <p:extLst>
       <p:ext uri="{BB962C8B-B14F-4D97-AF65-F5344CB8AC3E}">
         <p14:creationId xmlns:p14="http://schemas.microsoft.com/office/powerpoint/2010/main" val="253604450"/>
+      </p:ext>
+    </p:extLst>
+  </p:cSld>
+  <p:clrMapOvr>
+    <a:masterClrMapping/>
+  </p:clrMapOvr>
+</p:sld>
+</file>
+
+<file path=ppt/slides/slide14.xml><?xml version="1.0" encoding="utf-8"?>
+<p:sld xmlns:a="http://schemas.openxmlformats.org/drawingml/2006/main" xmlns:r="http://schemas.openxmlformats.org/officeDocument/2006/relationships" xmlns:p="http://schemas.openxmlformats.org/presentationml/2006/main">
+  <p:cSld>
+    <p:spTree>
+      <p:nvGrpSpPr>
+        <p:cNvPr id="1" name=""/>
+        <p:cNvGrpSpPr/>
+        <p:nvPr/>
+      </p:nvGrpSpPr>
+      <p:grpSpPr>
+        <a:xfrm>
+          <a:off x="0" y="0"/>
+          <a:ext cx="0" cy="0"/>
+          <a:chOff x="0" y="0"/>
+          <a:chExt cx="0" cy="0"/>
+        </a:xfrm>
+      </p:grpSpPr>
+      <p:sp>
+        <p:nvSpPr>
+          <p:cNvPr id="2" name="Title 1"/>
+          <p:cNvSpPr>
+            <a:spLocks noGrp="1"/>
+          </p:cNvSpPr>
+          <p:nvPr>
+            <p:ph type="title"/>
+          </p:nvPr>
+        </p:nvSpPr>
+        <p:spPr/>
+        <p:txBody>
+          <a:bodyPr>
+            <a:normAutofit fontScale="90000"/>
+          </a:bodyPr>
+          <a:lstStyle/>
+          <a:p>
+            <a:pPr algn="r" rtl="1"/>
+            <a:r>
+              <a:rPr lang="he-IL" dirty="0"/>
+              <a:t>התקנת סביבת </a:t>
+            </a:r>
+            <a:r>
+              <a:rPr lang="he-IL" dirty="0" smtClean="0"/>
+              <a:t>העבודה</a:t>
+            </a:r>
+            <a:endParaRPr lang="en-US" dirty="0"/>
+          </a:p>
+        </p:txBody>
+      </p:sp>
+      <p:sp>
+        <p:nvSpPr>
+          <p:cNvPr id="3" name="Content Placeholder 2"/>
+          <p:cNvSpPr>
+            <a:spLocks noGrp="1"/>
+          </p:cNvSpPr>
+          <p:nvPr>
+            <p:ph idx="1"/>
+          </p:nvPr>
+        </p:nvSpPr>
+        <p:spPr>
+          <a:xfrm>
+            <a:off x="4830619" y="1852654"/>
+            <a:ext cx="4645892" cy="2176176"/>
+          </a:xfrm>
+        </p:spPr>
+        <p:txBody>
+          <a:bodyPr>
+            <a:normAutofit fontScale="92500" lnSpcReduction="10000"/>
+          </a:bodyPr>
+          <a:lstStyle/>
+          <a:p>
+            <a:pPr marL="0" indent="0" algn="r" rtl="1">
+              <a:buNone/>
+            </a:pPr>
+            <a:r>
+              <a:rPr lang="he-IL" dirty="0" smtClean="0"/>
+              <a:t>לסימולטור </a:t>
+            </a:r>
+            <a:r>
+              <a:rPr lang="he-IL" dirty="0" err="1" smtClean="0"/>
+              <a:t>לסמטרפון</a:t>
+            </a:r>
+            <a:r>
+              <a:rPr lang="he-IL" dirty="0" smtClean="0"/>
+              <a:t> נבחר את </a:t>
+            </a:r>
+            <a:r>
+              <a:rPr lang="en-US" dirty="0" smtClean="0"/>
+              <a:t>Phone</a:t>
+            </a:r>
+            <a:r>
+              <a:rPr lang="he-IL" dirty="0" smtClean="0"/>
+              <a:t> </a:t>
+            </a:r>
+            <a:r>
+              <a:rPr lang="he-IL" dirty="0" err="1" smtClean="0"/>
+              <a:t>באיזור</a:t>
+            </a:r>
+            <a:r>
+              <a:rPr lang="he-IL" dirty="0" smtClean="0"/>
+              <a:t> ה</a:t>
+            </a:r>
+            <a:r>
+              <a:rPr lang="en-US" dirty="0" smtClean="0"/>
+              <a:t>Category</a:t>
+            </a:r>
+            <a:r>
+              <a:rPr lang="he-IL" dirty="0" smtClean="0"/>
+              <a:t>. אז נבחר גדם מהאופציות הקיימות.</a:t>
+            </a:r>
+            <a:endParaRPr lang="en-US" dirty="0"/>
+          </a:p>
+        </p:txBody>
+      </p:sp>
+      <p:sp>
+        <p:nvSpPr>
+          <p:cNvPr id="4" name="Title 1"/>
+          <p:cNvSpPr txBox="1">
+            <a:spLocks/>
+          </p:cNvSpPr>
+          <p:nvPr/>
+        </p:nvSpPr>
+        <p:spPr>
+          <a:xfrm>
+            <a:off x="598621" y="1089129"/>
+            <a:ext cx="7376537" cy="763525"/>
+          </a:xfrm>
+          <a:prstGeom prst="rect">
+            <a:avLst/>
+          </a:prstGeom>
+        </p:spPr>
+        <p:txBody>
+          <a:bodyPr vert="horz" lIns="91440" tIns="45720" rIns="91440" bIns="45720" rtlCol="0" anchor="ctr">
+            <a:normAutofit fontScale="97500"/>
+          </a:bodyPr>
+          <a:lstStyle>
+            <a:lvl1pPr algn="l" defTabSz="1219170" rtl="0" eaLnBrk="1" latinLnBrk="0" hangingPunct="1">
+              <a:spcBef>
+                <a:spcPct val="0"/>
+              </a:spcBef>
+              <a:buNone/>
+              <a:defRPr sz="4800" kern="1200">
+                <a:solidFill>
+                  <a:srgbClr val="FFC000"/>
+                </a:solidFill>
+                <a:effectLst>
+                  <a:outerShdw blurRad="50800" dist="38100" dir="2700000" algn="tl" rotWithShape="0">
+                    <a:prstClr val="black">
+                      <a:alpha val="40000"/>
+                    </a:prstClr>
+                  </a:outerShdw>
+                </a:effectLst>
+                <a:latin typeface="+mj-lt"/>
+                <a:ea typeface="+mj-ea"/>
+                <a:cs typeface="+mj-cs"/>
+              </a:defRPr>
+            </a:lvl1pPr>
+          </a:lstStyle>
+          <a:p>
+            <a:pPr algn="r" rtl="1"/>
+            <a:r>
+              <a:rPr lang="he-IL" sz="4000" dirty="0">
+                <a:solidFill>
+                  <a:srgbClr val="FFE701"/>
+                </a:solidFill>
+              </a:rPr>
+              <a:t>התקנת סימולטור</a:t>
+            </a:r>
+            <a:endParaRPr lang="en-US" sz="4000" dirty="0">
+              <a:solidFill>
+                <a:srgbClr val="FFE701"/>
+              </a:solidFill>
+            </a:endParaRPr>
+          </a:p>
+        </p:txBody>
+      </p:sp>
+      <p:pic>
+        <p:nvPicPr>
+          <p:cNvPr id="5" name="Picture 4"/>
+          <p:cNvPicPr>
+            <a:picLocks noChangeAspect="1"/>
+          </p:cNvPicPr>
+          <p:nvPr/>
+        </p:nvPicPr>
+        <p:blipFill>
+          <a:blip r:embed="rId2">
+            <a:extLst>
+              <a:ext uri="{28A0092B-C50C-407E-A947-70E740481C1C}">
+                <a14:useLocalDpi xmlns:a14="http://schemas.microsoft.com/office/drawing/2010/main" val="0"/>
+              </a:ext>
+            </a:extLst>
+          </a:blip>
+          <a:stretch>
+            <a:fillRect/>
+          </a:stretch>
+        </p:blipFill>
+        <p:spPr>
+          <a:xfrm>
+            <a:off x="54891" y="1342032"/>
+            <a:ext cx="4231998" cy="2834831"/>
+          </a:xfrm>
+          <a:prstGeom prst="rect">
+            <a:avLst/>
+          </a:prstGeom>
+        </p:spPr>
+      </p:pic>
+      <p:pic>
+        <p:nvPicPr>
+          <p:cNvPr id="7" name="Picture 6"/>
+          <p:cNvPicPr>
+            <a:picLocks noChangeAspect="1"/>
+          </p:cNvPicPr>
+          <p:nvPr/>
+        </p:nvPicPr>
+        <p:blipFill>
+          <a:blip r:embed="rId3">
+            <a:extLst>
+              <a:ext uri="{28A0092B-C50C-407E-A947-70E740481C1C}">
+                <a14:useLocalDpi xmlns:a14="http://schemas.microsoft.com/office/drawing/2010/main" val="0"/>
+              </a:ext>
+            </a:extLst>
+          </a:blip>
+          <a:stretch>
+            <a:fillRect/>
+          </a:stretch>
+        </p:blipFill>
+        <p:spPr>
+          <a:xfrm>
+            <a:off x="5244513" y="3945451"/>
+            <a:ext cx="4231998" cy="2828065"/>
+          </a:xfrm>
+          <a:prstGeom prst="rect">
+            <a:avLst/>
+          </a:prstGeom>
+        </p:spPr>
+      </p:pic>
+      <p:sp>
+        <p:nvSpPr>
+          <p:cNvPr id="8" name="Content Placeholder 2"/>
+          <p:cNvSpPr txBox="1">
+            <a:spLocks/>
+          </p:cNvSpPr>
+          <p:nvPr/>
+        </p:nvSpPr>
+        <p:spPr>
+          <a:xfrm>
+            <a:off x="-152056" y="4429766"/>
+            <a:ext cx="4645892" cy="2176176"/>
+          </a:xfrm>
+          <a:prstGeom prst="rect">
+            <a:avLst/>
+          </a:prstGeom>
+        </p:spPr>
+        <p:txBody>
+          <a:bodyPr vert="horz" lIns="91440" tIns="45720" rIns="91440" bIns="45720" rtlCol="0">
+            <a:normAutofit fontScale="85000" lnSpcReduction="10000"/>
+          </a:bodyPr>
+          <a:lstStyle>
+            <a:lvl1pPr marL="457189" indent="-457189" algn="l" defTabSz="1219170" rtl="0" eaLnBrk="1" latinLnBrk="0" hangingPunct="1">
+              <a:spcBef>
+                <a:spcPct val="20000"/>
+              </a:spcBef>
+              <a:buFont typeface="Arial" pitchFamily="34" charset="0"/>
+              <a:buChar char="•"/>
+              <a:defRPr sz="3733" kern="1200">
+                <a:solidFill>
+                  <a:schemeClr val="bg1"/>
+                </a:solidFill>
+                <a:latin typeface="+mn-lt"/>
+                <a:ea typeface="+mn-ea"/>
+                <a:cs typeface="+mn-cs"/>
+              </a:defRPr>
+            </a:lvl1pPr>
+            <a:lvl2pPr marL="990575" indent="-380990" algn="l" defTabSz="1219170" rtl="0" eaLnBrk="1" latinLnBrk="0" hangingPunct="1">
+              <a:spcBef>
+                <a:spcPct val="20000"/>
+              </a:spcBef>
+              <a:buFont typeface="Arial" pitchFamily="34" charset="0"/>
+              <a:buChar char="–"/>
+              <a:defRPr sz="3733" kern="1200">
+                <a:solidFill>
+                  <a:schemeClr val="bg1"/>
+                </a:solidFill>
+                <a:latin typeface="+mn-lt"/>
+                <a:ea typeface="+mn-ea"/>
+                <a:cs typeface="+mn-cs"/>
+              </a:defRPr>
+            </a:lvl2pPr>
+            <a:lvl3pPr marL="1523962" indent="-304792" algn="l" defTabSz="1219170" rtl="0" eaLnBrk="1" latinLnBrk="0" hangingPunct="1">
+              <a:spcBef>
+                <a:spcPct val="20000"/>
+              </a:spcBef>
+              <a:buFont typeface="Arial" pitchFamily="34" charset="0"/>
+              <a:buChar char="•"/>
+              <a:defRPr sz="3200" kern="1200">
+                <a:solidFill>
+                  <a:schemeClr val="bg1"/>
+                </a:solidFill>
+                <a:latin typeface="+mn-lt"/>
+                <a:ea typeface="+mn-ea"/>
+                <a:cs typeface="+mn-cs"/>
+              </a:defRPr>
+            </a:lvl3pPr>
+            <a:lvl4pPr marL="2133547" indent="-304792" algn="l" defTabSz="1219170" rtl="0" eaLnBrk="1" latinLnBrk="0" hangingPunct="1">
+              <a:spcBef>
+                <a:spcPct val="20000"/>
+              </a:spcBef>
+              <a:buFont typeface="Arial" pitchFamily="34" charset="0"/>
+              <a:buChar char="–"/>
+              <a:defRPr sz="2667" kern="1200">
+                <a:solidFill>
+                  <a:schemeClr val="bg1"/>
+                </a:solidFill>
+                <a:latin typeface="+mn-lt"/>
+                <a:ea typeface="+mn-ea"/>
+                <a:cs typeface="+mn-cs"/>
+              </a:defRPr>
+            </a:lvl4pPr>
+            <a:lvl5pPr marL="2743131" indent="-304792" algn="l" defTabSz="1219170" rtl="0" eaLnBrk="1" latinLnBrk="0" hangingPunct="1">
+              <a:spcBef>
+                <a:spcPct val="20000"/>
+              </a:spcBef>
+              <a:buFont typeface="Arial" pitchFamily="34" charset="0"/>
+              <a:buChar char="»"/>
+              <a:defRPr sz="2667" kern="1200">
+                <a:solidFill>
+                  <a:schemeClr val="bg1"/>
+                </a:solidFill>
+                <a:latin typeface="+mn-lt"/>
+                <a:ea typeface="+mn-ea"/>
+                <a:cs typeface="+mn-cs"/>
+              </a:defRPr>
+            </a:lvl5pPr>
+            <a:lvl6pPr marL="3352716" indent="-304792" algn="l" defTabSz="1219170" rtl="0" eaLnBrk="1" latinLnBrk="0" hangingPunct="1">
+              <a:spcBef>
+                <a:spcPct val="20000"/>
+              </a:spcBef>
+              <a:buFont typeface="Arial" pitchFamily="34" charset="0"/>
+              <a:buChar char="•"/>
+              <a:defRPr sz="2667" kern="1200">
+                <a:solidFill>
+                  <a:schemeClr val="tx1"/>
+                </a:solidFill>
+                <a:latin typeface="+mn-lt"/>
+                <a:ea typeface="+mn-ea"/>
+                <a:cs typeface="+mn-cs"/>
+              </a:defRPr>
+            </a:lvl6pPr>
+            <a:lvl7pPr marL="3962301" indent="-304792" algn="l" defTabSz="1219170" rtl="0" eaLnBrk="1" latinLnBrk="0" hangingPunct="1">
+              <a:spcBef>
+                <a:spcPct val="20000"/>
+              </a:spcBef>
+              <a:buFont typeface="Arial" pitchFamily="34" charset="0"/>
+              <a:buChar char="•"/>
+              <a:defRPr sz="2667" kern="1200">
+                <a:solidFill>
+                  <a:schemeClr val="tx1"/>
+                </a:solidFill>
+                <a:latin typeface="+mn-lt"/>
+                <a:ea typeface="+mn-ea"/>
+                <a:cs typeface="+mn-cs"/>
+              </a:defRPr>
+            </a:lvl7pPr>
+            <a:lvl8pPr marL="4571886" indent="-304792" algn="l" defTabSz="1219170" rtl="0" eaLnBrk="1" latinLnBrk="0" hangingPunct="1">
+              <a:spcBef>
+                <a:spcPct val="20000"/>
+              </a:spcBef>
+              <a:buFont typeface="Arial" pitchFamily="34" charset="0"/>
+              <a:buChar char="•"/>
+              <a:defRPr sz="2667" kern="1200">
+                <a:solidFill>
+                  <a:schemeClr val="tx1"/>
+                </a:solidFill>
+                <a:latin typeface="+mn-lt"/>
+                <a:ea typeface="+mn-ea"/>
+                <a:cs typeface="+mn-cs"/>
+              </a:defRPr>
+            </a:lvl8pPr>
+            <a:lvl9pPr marL="5181470" indent="-304792" algn="l" defTabSz="1219170" rtl="0" eaLnBrk="1" latinLnBrk="0" hangingPunct="1">
+              <a:spcBef>
+                <a:spcPct val="20000"/>
+              </a:spcBef>
+              <a:buFont typeface="Arial" pitchFamily="34" charset="0"/>
+              <a:buChar char="•"/>
+              <a:defRPr sz="2667" kern="1200">
+                <a:solidFill>
+                  <a:schemeClr val="tx1"/>
+                </a:solidFill>
+                <a:latin typeface="+mn-lt"/>
+                <a:ea typeface="+mn-ea"/>
+                <a:cs typeface="+mn-cs"/>
+              </a:defRPr>
+            </a:lvl9pPr>
+          </a:lstStyle>
+          <a:p>
+            <a:pPr marL="0" indent="0" algn="r" rtl="1">
+              <a:buFont typeface="Arial" pitchFamily="34" charset="0"/>
+              <a:buNone/>
+            </a:pPr>
+            <a:r>
+              <a:rPr lang="he-IL" dirty="0" smtClean="0"/>
+              <a:t>נחבר מערכת הפעלה. בפעם הראשונה יהיה צורך להוריד אותי. ניתן לעשות זאת ע"י לחיצת הכפתור  </a:t>
+            </a:r>
+            <a:r>
+              <a:rPr lang="en-US" dirty="0" smtClean="0"/>
+              <a:t>Download</a:t>
+            </a:r>
+            <a:endParaRPr lang="en-US" dirty="0"/>
+          </a:p>
+        </p:txBody>
+      </p:sp>
+    </p:spTree>
+    <p:extLst>
+      <p:ext uri="{BB962C8B-B14F-4D97-AF65-F5344CB8AC3E}">
+        <p14:creationId xmlns:p14="http://schemas.microsoft.com/office/powerpoint/2010/main" val="1857532289"/>
+      </p:ext>
+    </p:extLst>
+  </p:cSld>
+  <p:clrMapOvr>
+    <a:masterClrMapping/>
+  </p:clrMapOvr>
+</p:sld>
+</file>
+
+<file path=ppt/slides/slide15.xml><?xml version="1.0" encoding="utf-8"?>
+<p:sld xmlns:a="http://schemas.openxmlformats.org/drawingml/2006/main" xmlns:r="http://schemas.openxmlformats.org/officeDocument/2006/relationships" xmlns:p="http://schemas.openxmlformats.org/presentationml/2006/main">
+  <p:cSld>
+    <p:spTree>
+      <p:nvGrpSpPr>
+        <p:cNvPr id="1" name=""/>
+        <p:cNvGrpSpPr/>
+        <p:nvPr/>
+      </p:nvGrpSpPr>
+      <p:grpSpPr>
+        <a:xfrm>
+          <a:off x="0" y="0"/>
+          <a:ext cx="0" cy="0"/>
+          <a:chOff x="0" y="0"/>
+          <a:chExt cx="0" cy="0"/>
+        </a:xfrm>
+      </p:grpSpPr>
+      <p:sp>
+        <p:nvSpPr>
+          <p:cNvPr id="2" name="Title 1"/>
+          <p:cNvSpPr>
+            <a:spLocks noGrp="1"/>
+          </p:cNvSpPr>
+          <p:nvPr>
+            <p:ph type="title"/>
+          </p:nvPr>
+        </p:nvSpPr>
+        <p:spPr/>
+        <p:txBody>
+          <a:bodyPr>
+            <a:normAutofit fontScale="90000"/>
+          </a:bodyPr>
+          <a:lstStyle/>
+          <a:p>
+            <a:pPr algn="r" rtl="1"/>
+            <a:r>
+              <a:rPr lang="he-IL" dirty="0"/>
+              <a:t>התקנת סביבת </a:t>
+            </a:r>
+            <a:r>
+              <a:rPr lang="he-IL" dirty="0" smtClean="0"/>
+              <a:t>העבודה</a:t>
+            </a:r>
+            <a:endParaRPr lang="en-US" dirty="0"/>
+          </a:p>
+        </p:txBody>
+      </p:sp>
+      <p:sp>
+        <p:nvSpPr>
+          <p:cNvPr id="3" name="Content Placeholder 2"/>
+          <p:cNvSpPr>
+            <a:spLocks noGrp="1"/>
+          </p:cNvSpPr>
+          <p:nvPr>
+            <p:ph idx="1"/>
+          </p:nvPr>
+        </p:nvSpPr>
+        <p:spPr>
+          <a:xfrm>
+            <a:off x="4830619" y="1852654"/>
+            <a:ext cx="4645892" cy="2176176"/>
+          </a:xfrm>
+        </p:spPr>
+        <p:txBody>
+          <a:bodyPr>
+            <a:normAutofit fontScale="85000" lnSpcReduction="10000"/>
+          </a:bodyPr>
+          <a:lstStyle/>
+          <a:p>
+            <a:pPr marL="0" indent="0" algn="r" rtl="1">
+              <a:buNone/>
+            </a:pPr>
+            <a:r>
+              <a:rPr lang="he-IL" dirty="0" smtClean="0"/>
+              <a:t>לבסוף נבחר שם לסימולטור.</a:t>
+            </a:r>
+          </a:p>
+          <a:p>
+            <a:pPr marL="0" indent="0" algn="r" rtl="1">
+              <a:buNone/>
+            </a:pPr>
+            <a:r>
+              <a:rPr lang="he-IL" dirty="0" smtClean="0"/>
+              <a:t>בכל התהליך ניתן </a:t>
+            </a:r>
+            <a:r>
+              <a:rPr lang="he-IL" dirty="0" err="1" smtClean="0"/>
+              <a:t>לקסטם</a:t>
+            </a:r>
+            <a:r>
+              <a:rPr lang="he-IL" dirty="0" smtClean="0"/>
+              <a:t> להגדרות ספציפיות אך לרוב ברירות המחדל מספקות.</a:t>
+            </a:r>
+            <a:endParaRPr lang="en-US" dirty="0"/>
+          </a:p>
+        </p:txBody>
+      </p:sp>
+      <p:sp>
+        <p:nvSpPr>
+          <p:cNvPr id="4" name="Title 1"/>
+          <p:cNvSpPr txBox="1">
+            <a:spLocks/>
+          </p:cNvSpPr>
+          <p:nvPr/>
+        </p:nvSpPr>
+        <p:spPr>
+          <a:xfrm>
+            <a:off x="598621" y="1089129"/>
+            <a:ext cx="7376537" cy="763525"/>
+          </a:xfrm>
+          <a:prstGeom prst="rect">
+            <a:avLst/>
+          </a:prstGeom>
+        </p:spPr>
+        <p:txBody>
+          <a:bodyPr vert="horz" lIns="91440" tIns="45720" rIns="91440" bIns="45720" rtlCol="0" anchor="ctr">
+            <a:normAutofit fontScale="97500"/>
+          </a:bodyPr>
+          <a:lstStyle>
+            <a:lvl1pPr algn="l" defTabSz="1219170" rtl="0" eaLnBrk="1" latinLnBrk="0" hangingPunct="1">
+              <a:spcBef>
+                <a:spcPct val="0"/>
+              </a:spcBef>
+              <a:buNone/>
+              <a:defRPr sz="4800" kern="1200">
+                <a:solidFill>
+                  <a:srgbClr val="FFC000"/>
+                </a:solidFill>
+                <a:effectLst>
+                  <a:outerShdw blurRad="50800" dist="38100" dir="2700000" algn="tl" rotWithShape="0">
+                    <a:prstClr val="black">
+                      <a:alpha val="40000"/>
+                    </a:prstClr>
+                  </a:outerShdw>
+                </a:effectLst>
+                <a:latin typeface="+mj-lt"/>
+                <a:ea typeface="+mj-ea"/>
+                <a:cs typeface="+mj-cs"/>
+              </a:defRPr>
+            </a:lvl1pPr>
+          </a:lstStyle>
+          <a:p>
+            <a:pPr algn="r" rtl="1"/>
+            <a:r>
+              <a:rPr lang="he-IL" sz="4000" dirty="0">
+                <a:solidFill>
+                  <a:srgbClr val="FFE701"/>
+                </a:solidFill>
+              </a:rPr>
+              <a:t>התקנת סימולטור</a:t>
+            </a:r>
+            <a:endParaRPr lang="en-US" sz="4000" dirty="0">
+              <a:solidFill>
+                <a:srgbClr val="FFE701"/>
+              </a:solidFill>
+            </a:endParaRPr>
+          </a:p>
+        </p:txBody>
+      </p:sp>
+      <p:pic>
+        <p:nvPicPr>
+          <p:cNvPr id="5" name="Picture 4"/>
+          <p:cNvPicPr>
+            <a:picLocks noChangeAspect="1"/>
+          </p:cNvPicPr>
+          <p:nvPr/>
+        </p:nvPicPr>
+        <p:blipFill>
+          <a:blip r:embed="rId2">
+            <a:extLst>
+              <a:ext uri="{28A0092B-C50C-407E-A947-70E740481C1C}">
+                <a14:useLocalDpi xmlns:a14="http://schemas.microsoft.com/office/drawing/2010/main" val="0"/>
+              </a:ext>
+            </a:extLst>
+          </a:blip>
+          <a:stretch>
+            <a:fillRect/>
+          </a:stretch>
+        </p:blipFill>
+        <p:spPr>
+          <a:xfrm>
+            <a:off x="55670" y="1342032"/>
+            <a:ext cx="4230440" cy="2834831"/>
+          </a:xfrm>
+          <a:prstGeom prst="rect">
+            <a:avLst/>
+          </a:prstGeom>
+        </p:spPr>
+      </p:pic>
+      <p:sp>
+        <p:nvSpPr>
+          <p:cNvPr id="8" name="Content Placeholder 2"/>
+          <p:cNvSpPr txBox="1">
+            <a:spLocks/>
+          </p:cNvSpPr>
+          <p:nvPr/>
+        </p:nvSpPr>
+        <p:spPr>
+          <a:xfrm>
+            <a:off x="-152057" y="4429766"/>
+            <a:ext cx="9628567" cy="834961"/>
+          </a:xfrm>
+          <a:prstGeom prst="rect">
+            <a:avLst/>
+          </a:prstGeom>
+        </p:spPr>
+        <p:txBody>
+          <a:bodyPr vert="horz" lIns="91440" tIns="45720" rIns="91440" bIns="45720" rtlCol="0">
+            <a:normAutofit fontScale="77500" lnSpcReduction="20000"/>
+          </a:bodyPr>
+          <a:lstStyle>
+            <a:lvl1pPr marL="457189" indent="-457189" algn="l" defTabSz="1219170" rtl="0" eaLnBrk="1" latinLnBrk="0" hangingPunct="1">
+              <a:spcBef>
+                <a:spcPct val="20000"/>
+              </a:spcBef>
+              <a:buFont typeface="Arial" pitchFamily="34" charset="0"/>
+              <a:buChar char="•"/>
+              <a:defRPr sz="3733" kern="1200">
+                <a:solidFill>
+                  <a:schemeClr val="bg1"/>
+                </a:solidFill>
+                <a:latin typeface="+mn-lt"/>
+                <a:ea typeface="+mn-ea"/>
+                <a:cs typeface="+mn-cs"/>
+              </a:defRPr>
+            </a:lvl1pPr>
+            <a:lvl2pPr marL="990575" indent="-380990" algn="l" defTabSz="1219170" rtl="0" eaLnBrk="1" latinLnBrk="0" hangingPunct="1">
+              <a:spcBef>
+                <a:spcPct val="20000"/>
+              </a:spcBef>
+              <a:buFont typeface="Arial" pitchFamily="34" charset="0"/>
+              <a:buChar char="–"/>
+              <a:defRPr sz="3733" kern="1200">
+                <a:solidFill>
+                  <a:schemeClr val="bg1"/>
+                </a:solidFill>
+                <a:latin typeface="+mn-lt"/>
+                <a:ea typeface="+mn-ea"/>
+                <a:cs typeface="+mn-cs"/>
+              </a:defRPr>
+            </a:lvl2pPr>
+            <a:lvl3pPr marL="1523962" indent="-304792" algn="l" defTabSz="1219170" rtl="0" eaLnBrk="1" latinLnBrk="0" hangingPunct="1">
+              <a:spcBef>
+                <a:spcPct val="20000"/>
+              </a:spcBef>
+              <a:buFont typeface="Arial" pitchFamily="34" charset="0"/>
+              <a:buChar char="•"/>
+              <a:defRPr sz="3200" kern="1200">
+                <a:solidFill>
+                  <a:schemeClr val="bg1"/>
+                </a:solidFill>
+                <a:latin typeface="+mn-lt"/>
+                <a:ea typeface="+mn-ea"/>
+                <a:cs typeface="+mn-cs"/>
+              </a:defRPr>
+            </a:lvl3pPr>
+            <a:lvl4pPr marL="2133547" indent="-304792" algn="l" defTabSz="1219170" rtl="0" eaLnBrk="1" latinLnBrk="0" hangingPunct="1">
+              <a:spcBef>
+                <a:spcPct val="20000"/>
+              </a:spcBef>
+              <a:buFont typeface="Arial" pitchFamily="34" charset="0"/>
+              <a:buChar char="–"/>
+              <a:defRPr sz="2667" kern="1200">
+                <a:solidFill>
+                  <a:schemeClr val="bg1"/>
+                </a:solidFill>
+                <a:latin typeface="+mn-lt"/>
+                <a:ea typeface="+mn-ea"/>
+                <a:cs typeface="+mn-cs"/>
+              </a:defRPr>
+            </a:lvl4pPr>
+            <a:lvl5pPr marL="2743131" indent="-304792" algn="l" defTabSz="1219170" rtl="0" eaLnBrk="1" latinLnBrk="0" hangingPunct="1">
+              <a:spcBef>
+                <a:spcPct val="20000"/>
+              </a:spcBef>
+              <a:buFont typeface="Arial" pitchFamily="34" charset="0"/>
+              <a:buChar char="»"/>
+              <a:defRPr sz="2667" kern="1200">
+                <a:solidFill>
+                  <a:schemeClr val="bg1"/>
+                </a:solidFill>
+                <a:latin typeface="+mn-lt"/>
+                <a:ea typeface="+mn-ea"/>
+                <a:cs typeface="+mn-cs"/>
+              </a:defRPr>
+            </a:lvl5pPr>
+            <a:lvl6pPr marL="3352716" indent="-304792" algn="l" defTabSz="1219170" rtl="0" eaLnBrk="1" latinLnBrk="0" hangingPunct="1">
+              <a:spcBef>
+                <a:spcPct val="20000"/>
+              </a:spcBef>
+              <a:buFont typeface="Arial" pitchFamily="34" charset="0"/>
+              <a:buChar char="•"/>
+              <a:defRPr sz="2667" kern="1200">
+                <a:solidFill>
+                  <a:schemeClr val="tx1"/>
+                </a:solidFill>
+                <a:latin typeface="+mn-lt"/>
+                <a:ea typeface="+mn-ea"/>
+                <a:cs typeface="+mn-cs"/>
+              </a:defRPr>
+            </a:lvl6pPr>
+            <a:lvl7pPr marL="3962301" indent="-304792" algn="l" defTabSz="1219170" rtl="0" eaLnBrk="1" latinLnBrk="0" hangingPunct="1">
+              <a:spcBef>
+                <a:spcPct val="20000"/>
+              </a:spcBef>
+              <a:buFont typeface="Arial" pitchFamily="34" charset="0"/>
+              <a:buChar char="•"/>
+              <a:defRPr sz="2667" kern="1200">
+                <a:solidFill>
+                  <a:schemeClr val="tx1"/>
+                </a:solidFill>
+                <a:latin typeface="+mn-lt"/>
+                <a:ea typeface="+mn-ea"/>
+                <a:cs typeface="+mn-cs"/>
+              </a:defRPr>
+            </a:lvl7pPr>
+            <a:lvl8pPr marL="4571886" indent="-304792" algn="l" defTabSz="1219170" rtl="0" eaLnBrk="1" latinLnBrk="0" hangingPunct="1">
+              <a:spcBef>
+                <a:spcPct val="20000"/>
+              </a:spcBef>
+              <a:buFont typeface="Arial" pitchFamily="34" charset="0"/>
+              <a:buChar char="•"/>
+              <a:defRPr sz="2667" kern="1200">
+                <a:solidFill>
+                  <a:schemeClr val="tx1"/>
+                </a:solidFill>
+                <a:latin typeface="+mn-lt"/>
+                <a:ea typeface="+mn-ea"/>
+                <a:cs typeface="+mn-cs"/>
+              </a:defRPr>
+            </a:lvl8pPr>
+            <a:lvl9pPr marL="5181470" indent="-304792" algn="l" defTabSz="1219170" rtl="0" eaLnBrk="1" latinLnBrk="0" hangingPunct="1">
+              <a:spcBef>
+                <a:spcPct val="20000"/>
+              </a:spcBef>
+              <a:buFont typeface="Arial" pitchFamily="34" charset="0"/>
+              <a:buChar char="•"/>
+              <a:defRPr sz="2667" kern="1200">
+                <a:solidFill>
+                  <a:schemeClr val="tx1"/>
+                </a:solidFill>
+                <a:latin typeface="+mn-lt"/>
+                <a:ea typeface="+mn-ea"/>
+                <a:cs typeface="+mn-cs"/>
+              </a:defRPr>
+            </a:lvl9pPr>
+          </a:lstStyle>
+          <a:p>
+            <a:pPr marL="0" indent="0" algn="r" rtl="1">
+              <a:buFont typeface="Arial" pitchFamily="34" charset="0"/>
+              <a:buNone/>
+            </a:pPr>
+            <a:r>
+              <a:rPr lang="he-IL" dirty="0" smtClean="0"/>
+              <a:t>לאחר שייווצר המכשיר </a:t>
+            </a:r>
+            <a:r>
+              <a:rPr lang="he-IL" dirty="0" err="1" smtClean="0"/>
+              <a:t>הוירטואלי</a:t>
+            </a:r>
+            <a:r>
+              <a:rPr lang="he-IL" dirty="0" smtClean="0"/>
+              <a:t> יהיה ניתן להריץ את האפליקציה ע"י בחירת המכשיר ולחיצה על כפתור ההרצה.</a:t>
+            </a:r>
+            <a:endParaRPr lang="en-US" dirty="0"/>
+          </a:p>
+        </p:txBody>
+      </p:sp>
+      <p:pic>
+        <p:nvPicPr>
+          <p:cNvPr id="9" name="Content Placeholder 6"/>
+          <p:cNvPicPr>
+            <a:picLocks noChangeAspect="1"/>
+          </p:cNvPicPr>
+          <p:nvPr/>
+        </p:nvPicPr>
+        <p:blipFill>
+          <a:blip r:embed="rId3">
+            <a:extLst>
+              <a:ext uri="{28A0092B-C50C-407E-A947-70E740481C1C}">
+                <a14:useLocalDpi xmlns:a14="http://schemas.microsoft.com/office/drawing/2010/main" val="0"/>
+              </a:ext>
+            </a:extLst>
+          </a:blip>
+          <a:stretch>
+            <a:fillRect/>
+          </a:stretch>
+        </p:blipFill>
+        <p:spPr>
+          <a:xfrm>
+            <a:off x="1535835" y="5665663"/>
+            <a:ext cx="7940675" cy="384879"/>
+          </a:xfrm>
+          <a:prstGeom prst="rect">
+            <a:avLst/>
+          </a:prstGeom>
+        </p:spPr>
+      </p:pic>
+      <p:sp>
+        <p:nvSpPr>
+          <p:cNvPr id="10" name="Rectangle 9"/>
+          <p:cNvSpPr/>
+          <p:nvPr/>
+        </p:nvSpPr>
+        <p:spPr>
+          <a:xfrm>
+            <a:off x="4687455" y="5665663"/>
+            <a:ext cx="286328" cy="325631"/>
+          </a:xfrm>
+          <a:prstGeom prst="rect">
+            <a:avLst/>
+          </a:prstGeom>
+          <a:noFill/>
+          <a:ln>
+            <a:solidFill>
+              <a:schemeClr val="accent2"/>
+            </a:solidFill>
+          </a:ln>
+        </p:spPr>
+        <p:style>
+          <a:lnRef idx="2">
+            <a:schemeClr val="accent2">
+              <a:shade val="50000"/>
+            </a:schemeClr>
+          </a:lnRef>
+          <a:fillRef idx="1">
+            <a:schemeClr val="accent2"/>
+          </a:fillRef>
+          <a:effectRef idx="0">
+            <a:schemeClr val="accent2"/>
+          </a:effectRef>
+          <a:fontRef idx="minor">
+            <a:schemeClr val="lt1"/>
+          </a:fontRef>
+        </p:style>
+        <p:txBody>
+          <a:bodyPr rtlCol="0" anchor="ctr"/>
+          <a:lstStyle/>
+          <a:p>
+            <a:pPr algn="ctr"/>
+            <a:endParaRPr lang="en-US"/>
+          </a:p>
+        </p:txBody>
+      </p:sp>
+      <p:sp>
+        <p:nvSpPr>
+          <p:cNvPr id="11" name="Rectangle 10"/>
+          <p:cNvSpPr/>
+          <p:nvPr/>
+        </p:nvSpPr>
+        <p:spPr>
+          <a:xfrm>
+            <a:off x="3001818" y="5665664"/>
+            <a:ext cx="1616364" cy="355254"/>
+          </a:xfrm>
+          <a:prstGeom prst="rect">
+            <a:avLst/>
+          </a:prstGeom>
+          <a:noFill/>
+          <a:ln>
+            <a:solidFill>
+              <a:schemeClr val="accent2"/>
+            </a:solidFill>
+          </a:ln>
+        </p:spPr>
+        <p:style>
+          <a:lnRef idx="2">
+            <a:schemeClr val="accent2">
+              <a:shade val="50000"/>
+            </a:schemeClr>
+          </a:lnRef>
+          <a:fillRef idx="1">
+            <a:schemeClr val="accent2"/>
+          </a:fillRef>
+          <a:effectRef idx="0">
+            <a:schemeClr val="accent2"/>
+          </a:effectRef>
+          <a:fontRef idx="minor">
+            <a:schemeClr val="lt1"/>
+          </a:fontRef>
+        </p:style>
+        <p:txBody>
+          <a:bodyPr rtlCol="0" anchor="ctr"/>
+          <a:lstStyle/>
+          <a:p>
+            <a:pPr algn="ctr"/>
+            <a:endParaRPr lang="en-US"/>
+          </a:p>
+        </p:txBody>
+      </p:sp>
+      <p:cxnSp>
+        <p:nvCxnSpPr>
+          <p:cNvPr id="12" name="Elbow Connector 11"/>
+          <p:cNvCxnSpPr/>
+          <p:nvPr/>
+        </p:nvCxnSpPr>
+        <p:spPr>
+          <a:xfrm rot="16200000" flipV="1">
+            <a:off x="4826365" y="6054801"/>
+            <a:ext cx="220947" cy="212434"/>
+          </a:xfrm>
+          <a:prstGeom prst="bentConnector3">
+            <a:avLst>
+              <a:gd name="adj1" fmla="val 50000"/>
+            </a:avLst>
+          </a:prstGeom>
+          <a:ln w="19050">
+            <a:solidFill>
+              <a:schemeClr val="tx1"/>
+            </a:solidFill>
+          </a:ln>
+        </p:spPr>
+        <p:style>
+          <a:lnRef idx="1">
+            <a:schemeClr val="accent1"/>
+          </a:lnRef>
+          <a:fillRef idx="0">
+            <a:schemeClr val="accent1"/>
+          </a:fillRef>
+          <a:effectRef idx="0">
+            <a:schemeClr val="accent1"/>
+          </a:effectRef>
+          <a:fontRef idx="minor">
+            <a:schemeClr val="tx1"/>
+          </a:fontRef>
+        </p:style>
+      </p:cxnSp>
+      <p:sp>
+        <p:nvSpPr>
+          <p:cNvPr id="13" name="TextBox 12"/>
+          <p:cNvSpPr txBox="1"/>
+          <p:nvPr/>
+        </p:nvSpPr>
+        <p:spPr>
+          <a:xfrm>
+            <a:off x="2503055" y="6162592"/>
+            <a:ext cx="2101274" cy="692497"/>
+          </a:xfrm>
+          <a:prstGeom prst="rect">
+            <a:avLst/>
+          </a:prstGeom>
+          <a:noFill/>
+        </p:spPr>
+        <p:txBody>
+          <a:bodyPr wrap="square" rtlCol="0">
+            <a:spAutoFit/>
+          </a:bodyPr>
+          <a:lstStyle/>
+          <a:p>
+            <a:pPr algn="r" rtl="1"/>
+            <a:r>
+              <a:rPr lang="he-IL" sz="1300" dirty="0" smtClean="0">
+                <a:solidFill>
+                  <a:schemeClr val="bg1"/>
+                </a:solidFill>
+              </a:rPr>
+              <a:t>בחירת כשיר להרצה. אם נשאיר על ברירת המחדל, האופציות השונות יקפצו</a:t>
+            </a:r>
+            <a:endParaRPr lang="en-US" sz="1300" dirty="0">
+              <a:solidFill>
+                <a:schemeClr val="bg1"/>
+              </a:solidFill>
+            </a:endParaRPr>
+          </a:p>
+        </p:txBody>
+      </p:sp>
+      <p:cxnSp>
+        <p:nvCxnSpPr>
+          <p:cNvPr id="17" name="Straight Connector 16"/>
+          <p:cNvCxnSpPr/>
+          <p:nvPr/>
+        </p:nvCxnSpPr>
+        <p:spPr>
+          <a:xfrm flipH="1" flipV="1">
+            <a:off x="3722255" y="5991068"/>
+            <a:ext cx="1" cy="207251"/>
+          </a:xfrm>
+          <a:prstGeom prst="line">
+            <a:avLst/>
+          </a:prstGeom>
+          <a:ln w="19050">
+            <a:solidFill>
+              <a:schemeClr val="tx1"/>
+            </a:solidFill>
+          </a:ln>
+        </p:spPr>
+        <p:style>
+          <a:lnRef idx="1">
+            <a:schemeClr val="accent1"/>
+          </a:lnRef>
+          <a:fillRef idx="0">
+            <a:schemeClr val="accent1"/>
+          </a:fillRef>
+          <a:effectRef idx="0">
+            <a:schemeClr val="accent1"/>
+          </a:effectRef>
+          <a:fontRef idx="minor">
+            <a:schemeClr val="tx1"/>
+          </a:fontRef>
+        </p:style>
+      </p:cxnSp>
+      <p:sp>
+        <p:nvSpPr>
+          <p:cNvPr id="24" name="TextBox 23"/>
+          <p:cNvSpPr txBox="1"/>
+          <p:nvPr/>
+        </p:nvSpPr>
+        <p:spPr>
+          <a:xfrm>
+            <a:off x="4645672" y="6262618"/>
+            <a:ext cx="656221" cy="492443"/>
+          </a:xfrm>
+          <a:prstGeom prst="rect">
+            <a:avLst/>
+          </a:prstGeom>
+          <a:noFill/>
+        </p:spPr>
+        <p:txBody>
+          <a:bodyPr wrap="square" rtlCol="0">
+            <a:spAutoFit/>
+          </a:bodyPr>
+          <a:lstStyle/>
+          <a:p>
+            <a:pPr algn="r" rtl="1"/>
+            <a:r>
+              <a:rPr lang="he-IL" sz="1300" smtClean="0">
+                <a:solidFill>
+                  <a:schemeClr val="bg1"/>
+                </a:solidFill>
+              </a:rPr>
+              <a:t>כפתור ההרצה</a:t>
+            </a:r>
+            <a:endParaRPr lang="en-US" sz="1300" dirty="0">
+              <a:solidFill>
+                <a:schemeClr val="bg1"/>
+              </a:solidFill>
+            </a:endParaRPr>
+          </a:p>
+        </p:txBody>
+      </p:sp>
+      <p:cxnSp>
+        <p:nvCxnSpPr>
+          <p:cNvPr id="25" name="Elbow Connector 24"/>
+          <p:cNvCxnSpPr>
+            <a:stCxn id="26" idx="0"/>
+          </p:cNvCxnSpPr>
+          <p:nvPr/>
+        </p:nvCxnSpPr>
+        <p:spPr>
+          <a:xfrm rot="16200000" flipV="1">
+            <a:off x="5738284" y="6120126"/>
+            <a:ext cx="258117" cy="1"/>
+          </a:xfrm>
+          <a:prstGeom prst="bentConnector3">
+            <a:avLst>
+              <a:gd name="adj1" fmla="val 50000"/>
+            </a:avLst>
+          </a:prstGeom>
+          <a:ln w="19050">
+            <a:solidFill>
+              <a:schemeClr val="tx1"/>
+            </a:solidFill>
+          </a:ln>
+        </p:spPr>
+        <p:style>
+          <a:lnRef idx="1">
+            <a:schemeClr val="accent1"/>
+          </a:lnRef>
+          <a:fillRef idx="0">
+            <a:schemeClr val="accent1"/>
+          </a:fillRef>
+          <a:effectRef idx="0">
+            <a:schemeClr val="accent1"/>
+          </a:effectRef>
+          <a:fontRef idx="minor">
+            <a:schemeClr val="tx1"/>
+          </a:fontRef>
+        </p:style>
+      </p:cxnSp>
+      <p:sp>
+        <p:nvSpPr>
+          <p:cNvPr id="26" name="TextBox 25"/>
+          <p:cNvSpPr txBox="1"/>
+          <p:nvPr/>
+        </p:nvSpPr>
+        <p:spPr>
+          <a:xfrm>
+            <a:off x="5539231" y="6249185"/>
+            <a:ext cx="656221" cy="492443"/>
+          </a:xfrm>
+          <a:prstGeom prst="rect">
+            <a:avLst/>
+          </a:prstGeom>
+          <a:noFill/>
+        </p:spPr>
+        <p:txBody>
+          <a:bodyPr wrap="square" rtlCol="0">
+            <a:spAutoFit/>
+          </a:bodyPr>
+          <a:lstStyle/>
+          <a:p>
+            <a:pPr algn="r" rtl="1"/>
+            <a:r>
+              <a:rPr lang="he-IL" sz="1300" dirty="0" smtClean="0">
+                <a:solidFill>
+                  <a:schemeClr val="bg1"/>
+                </a:solidFill>
+              </a:rPr>
+              <a:t>כפתור </a:t>
+            </a:r>
+            <a:r>
+              <a:rPr lang="he-IL" sz="1300" dirty="0" err="1" smtClean="0">
+                <a:solidFill>
+                  <a:schemeClr val="bg1"/>
+                </a:solidFill>
+              </a:rPr>
+              <a:t>דיבאג</a:t>
+            </a:r>
+            <a:endParaRPr lang="en-US" sz="1300" dirty="0">
+              <a:solidFill>
+                <a:schemeClr val="bg1"/>
+              </a:solidFill>
+            </a:endParaRPr>
+          </a:p>
+        </p:txBody>
+      </p:sp>
+    </p:spTree>
+    <p:extLst>
+      <p:ext uri="{BB962C8B-B14F-4D97-AF65-F5344CB8AC3E}">
+        <p14:creationId xmlns:p14="http://schemas.microsoft.com/office/powerpoint/2010/main" val="2013889396"/>
       </p:ext>
     </p:extLst>
   </p:cSld>

</xml_diff>

<commit_message>
finished creating the work environment
</commit_message>
<xml_diff>
--- a/Android Presentation - Java Workshop.pptx
+++ b/Android Presentation - Java Workshop.pptx
@@ -20,6 +20,7 @@
     <p:sldId id="274" r:id="rId14"/>
     <p:sldId id="275" r:id="rId15"/>
     <p:sldId id="276" r:id="rId16"/>
+    <p:sldId id="277" r:id="rId17"/>
   </p:sldIdLst>
   <p:sldSz cx="12192000" cy="6858000"/>
   <p:notesSz cx="6858000" cy="9144000"/>
@@ -6450,6 +6451,203 @@
     <p:extLst>
       <p:ext uri="{BB962C8B-B14F-4D97-AF65-F5344CB8AC3E}">
         <p14:creationId xmlns:p14="http://schemas.microsoft.com/office/powerpoint/2010/main" val="2013889396"/>
+      </p:ext>
+    </p:extLst>
+  </p:cSld>
+  <p:clrMapOvr>
+    <a:masterClrMapping/>
+  </p:clrMapOvr>
+</p:sld>
+</file>
+
+<file path=ppt/slides/slide16.xml><?xml version="1.0" encoding="utf-8"?>
+<p:sld xmlns:a="http://schemas.openxmlformats.org/drawingml/2006/main" xmlns:r="http://schemas.openxmlformats.org/officeDocument/2006/relationships" xmlns:p="http://schemas.openxmlformats.org/presentationml/2006/main">
+  <p:cSld>
+    <p:spTree>
+      <p:nvGrpSpPr>
+        <p:cNvPr id="1" name=""/>
+        <p:cNvGrpSpPr/>
+        <p:nvPr/>
+      </p:nvGrpSpPr>
+      <p:grpSpPr>
+        <a:xfrm>
+          <a:off x="0" y="0"/>
+          <a:ext cx="0" cy="0"/>
+          <a:chOff x="0" y="0"/>
+          <a:chExt cx="0" cy="0"/>
+        </a:xfrm>
+      </p:grpSpPr>
+      <p:sp>
+        <p:nvSpPr>
+          <p:cNvPr id="2" name="Title 1"/>
+          <p:cNvSpPr>
+            <a:spLocks noGrp="1"/>
+          </p:cNvSpPr>
+          <p:nvPr>
+            <p:ph type="title"/>
+          </p:nvPr>
+        </p:nvSpPr>
+        <p:spPr/>
+        <p:txBody>
+          <a:bodyPr>
+            <a:normAutofit fontScale="90000"/>
+          </a:bodyPr>
+          <a:lstStyle/>
+          <a:p>
+            <a:pPr algn="r" rtl="1"/>
+            <a:r>
+              <a:rPr lang="he-IL" dirty="0"/>
+              <a:t>התקנת סביבת </a:t>
+            </a:r>
+            <a:r>
+              <a:rPr lang="he-IL" dirty="0" smtClean="0"/>
+              <a:t>העבודה</a:t>
+            </a:r>
+            <a:endParaRPr lang="en-US" dirty="0"/>
+          </a:p>
+        </p:txBody>
+      </p:sp>
+      <p:sp>
+        <p:nvSpPr>
+          <p:cNvPr id="3" name="Content Placeholder 2"/>
+          <p:cNvSpPr>
+            <a:spLocks noGrp="1"/>
+          </p:cNvSpPr>
+          <p:nvPr>
+            <p:ph idx="1"/>
+          </p:nvPr>
+        </p:nvSpPr>
+        <p:spPr>
+          <a:xfrm>
+            <a:off x="4756727" y="2063315"/>
+            <a:ext cx="4719783" cy="3827710"/>
+          </a:xfrm>
+        </p:spPr>
+        <p:txBody>
+          <a:bodyPr>
+            <a:normAutofit/>
+          </a:bodyPr>
+          <a:lstStyle/>
+          <a:p>
+            <a:pPr marL="0" indent="0" algn="r" rtl="1">
+              <a:buNone/>
+            </a:pPr>
+            <a:r>
+              <a:rPr lang="he-IL" dirty="0" smtClean="0"/>
+              <a:t>לאחר שייפתח הסימולטור, האפליקציה אוטומטית יתוקן </a:t>
+            </a:r>
+            <a:r>
+              <a:rPr lang="he-IL" smtClean="0"/>
+              <a:t>עליו ויורץ.</a:t>
+            </a:r>
+            <a:endParaRPr lang="en-US" dirty="0"/>
+          </a:p>
+        </p:txBody>
+      </p:sp>
+      <p:sp>
+        <p:nvSpPr>
+          <p:cNvPr id="4" name="Title 1"/>
+          <p:cNvSpPr txBox="1">
+            <a:spLocks/>
+          </p:cNvSpPr>
+          <p:nvPr/>
+        </p:nvSpPr>
+        <p:spPr>
+          <a:xfrm>
+            <a:off x="598621" y="1089129"/>
+            <a:ext cx="7376537" cy="763525"/>
+          </a:xfrm>
+          <a:prstGeom prst="rect">
+            <a:avLst/>
+          </a:prstGeom>
+        </p:spPr>
+        <p:txBody>
+          <a:bodyPr vert="horz" lIns="91440" tIns="45720" rIns="91440" bIns="45720" rtlCol="0" anchor="ctr">
+            <a:normAutofit fontScale="97500"/>
+          </a:bodyPr>
+          <a:lstStyle>
+            <a:lvl1pPr algn="l" defTabSz="1219170" rtl="0" eaLnBrk="1" latinLnBrk="0" hangingPunct="1">
+              <a:spcBef>
+                <a:spcPct val="0"/>
+              </a:spcBef>
+              <a:buNone/>
+              <a:defRPr sz="4800" kern="1200">
+                <a:solidFill>
+                  <a:srgbClr val="FFC000"/>
+                </a:solidFill>
+                <a:effectLst>
+                  <a:outerShdw blurRad="50800" dist="38100" dir="2700000" algn="tl" rotWithShape="0">
+                    <a:prstClr val="black">
+                      <a:alpha val="40000"/>
+                    </a:prstClr>
+                  </a:outerShdw>
+                </a:effectLst>
+                <a:latin typeface="+mj-lt"/>
+                <a:ea typeface="+mj-ea"/>
+                <a:cs typeface="+mj-cs"/>
+              </a:defRPr>
+            </a:lvl1pPr>
+          </a:lstStyle>
+          <a:p>
+            <a:pPr algn="r" rtl="1"/>
+            <a:r>
+              <a:rPr lang="he-IL" sz="4000" dirty="0">
+                <a:solidFill>
+                  <a:srgbClr val="FFE701"/>
+                </a:solidFill>
+              </a:rPr>
+              <a:t>התקנת </a:t>
+            </a:r>
+            <a:r>
+              <a:rPr lang="he-IL" sz="4000" dirty="0" smtClean="0">
+                <a:solidFill>
+                  <a:srgbClr val="FFE701"/>
+                </a:solidFill>
+              </a:rPr>
+              <a:t>סימולטור</a:t>
+            </a:r>
+            <a:endParaRPr lang="en-US" sz="4000" dirty="0">
+              <a:solidFill>
+                <a:srgbClr val="FFE701"/>
+              </a:solidFill>
+            </a:endParaRPr>
+          </a:p>
+        </p:txBody>
+      </p:sp>
+      <p:pic>
+        <p:nvPicPr>
+          <p:cNvPr id="5" name="Picture 4"/>
+          <p:cNvPicPr>
+            <a:picLocks noChangeAspect="1"/>
+          </p:cNvPicPr>
+          <p:nvPr/>
+        </p:nvPicPr>
+        <p:blipFill>
+          <a:blip r:embed="rId2">
+            <a:extLst>
+              <a:ext uri="{28A0092B-C50C-407E-A947-70E740481C1C}">
+                <a14:useLocalDpi xmlns:a14="http://schemas.microsoft.com/office/drawing/2010/main" val="0"/>
+              </a:ext>
+            </a:extLst>
+          </a:blip>
+          <a:stretch>
+            <a:fillRect/>
+          </a:stretch>
+        </p:blipFill>
+        <p:spPr>
+          <a:xfrm>
+            <a:off x="598621" y="1089129"/>
+            <a:ext cx="3171421" cy="5551596"/>
+          </a:xfrm>
+          <a:prstGeom prst="rect">
+            <a:avLst/>
+          </a:prstGeom>
+        </p:spPr>
+      </p:pic>
+    </p:spTree>
+    <p:extLst>
+      <p:ext uri="{BB962C8B-B14F-4D97-AF65-F5344CB8AC3E}">
+        <p14:creationId xmlns:p14="http://schemas.microsoft.com/office/powerpoint/2010/main" val="1728174301"/>
       </p:ext>
     </p:extLst>
   </p:cSld>

</xml_diff>

<commit_message>
added first two pages of the inctroduction to android studio
</commit_message>
<xml_diff>
--- a/Android Presentation - Java Workshop.pptx
+++ b/Android Presentation - Java Workshop.pptx
@@ -9,18 +9,19 @@
     <p:sldId id="263" r:id="rId3"/>
     <p:sldId id="264" r:id="rId4"/>
     <p:sldId id="265" r:id="rId5"/>
-    <p:sldId id="266" r:id="rId6"/>
-    <p:sldId id="269" r:id="rId7"/>
-    <p:sldId id="267" r:id="rId8"/>
-    <p:sldId id="268" r:id="rId9"/>
-    <p:sldId id="270" r:id="rId10"/>
-    <p:sldId id="271" r:id="rId11"/>
-    <p:sldId id="272" r:id="rId12"/>
-    <p:sldId id="273" r:id="rId13"/>
-    <p:sldId id="274" r:id="rId14"/>
-    <p:sldId id="275" r:id="rId15"/>
-    <p:sldId id="276" r:id="rId16"/>
-    <p:sldId id="277" r:id="rId17"/>
+    <p:sldId id="269" r:id="rId6"/>
+    <p:sldId id="267" r:id="rId7"/>
+    <p:sldId id="268" r:id="rId8"/>
+    <p:sldId id="270" r:id="rId9"/>
+    <p:sldId id="271" r:id="rId10"/>
+    <p:sldId id="272" r:id="rId11"/>
+    <p:sldId id="273" r:id="rId12"/>
+    <p:sldId id="274" r:id="rId13"/>
+    <p:sldId id="275" r:id="rId14"/>
+    <p:sldId id="276" r:id="rId15"/>
+    <p:sldId id="277" r:id="rId16"/>
+    <p:sldId id="278" r:id="rId17"/>
+    <p:sldId id="279" r:id="rId18"/>
   </p:sldIdLst>
   <p:sldSz cx="12192000" cy="6858000"/>
   <p:notesSz cx="6858000" cy="9144000"/>
@@ -3799,13 +3800,13 @@
         </p:nvSpPr>
         <p:spPr>
           <a:xfrm>
-            <a:off x="5652655" y="2063315"/>
-            <a:ext cx="3823855" cy="3827710"/>
+            <a:off x="471056" y="5798225"/>
+            <a:ext cx="9144000" cy="916615"/>
           </a:xfrm>
         </p:spPr>
         <p:txBody>
           <a:bodyPr>
-            <a:normAutofit fontScale="40000" lnSpcReduction="20000"/>
+            <a:normAutofit fontScale="85000" lnSpcReduction="10000"/>
           </a:bodyPr>
           <a:lstStyle/>
           <a:p>
@@ -3813,24 +3814,12 @@
               <a:buNone/>
             </a:pPr>
             <a:r>
+              <a:rPr lang="en-US" dirty="0"/>
+              <a:t> </a:t>
+            </a:r>
+            <a:r>
               <a:rPr lang="he-IL" dirty="0" smtClean="0"/>
-              <a:t>ניבחר שם ליישום ואת ה</a:t>
-            </a:r>
-            <a:r>
-              <a:rPr lang="en-US" dirty="0" smtClean="0"/>
-              <a:t>package</a:t>
-            </a:r>
-            <a:r>
-              <a:rPr lang="he-IL" dirty="0" smtClean="0"/>
-              <a:t> שלו (המוכר לנו מפיתוח בשפת </a:t>
-            </a:r>
-            <a:r>
-              <a:rPr lang="en-US" dirty="0" smtClean="0"/>
-              <a:t>Java</a:t>
-            </a:r>
-            <a:r>
-              <a:rPr lang="he-IL" dirty="0" smtClean="0"/>
-              <a:t>). בנוסף נחבר מיקום לשמירת </a:t>
+              <a:t>הגענו למסך הפתיחה של </a:t>
             </a:r>
             <a:r>
               <a:rPr lang="he-IL" dirty="0" err="1" smtClean="0"/>
@@ -3838,91 +3827,7 @@
             </a:r>
             <a:r>
               <a:rPr lang="he-IL" dirty="0" smtClean="0"/>
-              <a:t> (ניתן להשאיר את המיקום עם ברירת המחדל).</a:t>
-            </a:r>
-            <a:endParaRPr lang="en-US" dirty="0"/>
-          </a:p>
-          <a:p>
-            <a:pPr marL="0" indent="0" algn="r" rtl="1">
-              <a:buNone/>
-            </a:pPr>
-            <a:endParaRPr lang="he-IL" dirty="0" smtClean="0"/>
-          </a:p>
-          <a:p>
-            <a:pPr marL="0" indent="0" algn="r" rtl="1">
-              <a:buNone/>
-            </a:pPr>
-            <a:r>
-              <a:rPr lang="he-IL" dirty="0" smtClean="0"/>
-              <a:t>יש צורך לבחור את שפת הפיתוח </a:t>
-            </a:r>
-            <a:r>
-              <a:rPr lang="he-IL" dirty="0" err="1" smtClean="0"/>
-              <a:t>לפרוייקט</a:t>
-            </a:r>
-            <a:r>
-              <a:rPr lang="he-IL" dirty="0" smtClean="0"/>
-              <a:t> מבין </a:t>
-            </a:r>
-            <a:r>
-              <a:rPr lang="en-US" dirty="0" smtClean="0"/>
-              <a:t>Java</a:t>
-            </a:r>
-            <a:r>
-              <a:rPr lang="he-IL" dirty="0" smtClean="0"/>
-              <a:t> ו</a:t>
-            </a:r>
-            <a:r>
-              <a:rPr lang="en-US" dirty="0" err="1" smtClean="0"/>
-              <a:t>Kotlin</a:t>
-            </a:r>
-            <a:r>
-              <a:rPr lang="en-US" dirty="0" smtClean="0"/>
-              <a:t> </a:t>
-            </a:r>
-            <a:r>
-              <a:rPr lang="he-IL" dirty="0" smtClean="0"/>
-              <a:t>. בדוגמה זו נבחר את </a:t>
-            </a:r>
-            <a:r>
-              <a:rPr lang="en-US" dirty="0" smtClean="0"/>
-              <a:t>Java</a:t>
-            </a:r>
-            <a:r>
-              <a:rPr lang="he-IL" dirty="0" smtClean="0"/>
-              <a:t>.</a:t>
-            </a:r>
-            <a:endParaRPr lang="en-US" dirty="0" smtClean="0"/>
-          </a:p>
-          <a:p>
-            <a:pPr marL="0" indent="0" algn="r" rtl="1">
-              <a:buNone/>
-            </a:pPr>
-            <a:endParaRPr lang="he-IL" dirty="0"/>
-          </a:p>
-          <a:p>
-            <a:pPr marL="0" indent="0" algn="r" rtl="1">
-              <a:buNone/>
-            </a:pPr>
-            <a:r>
-              <a:rPr lang="he-IL" dirty="0" smtClean="0"/>
-              <a:t>לבסוף נבחר את ה</a:t>
-            </a:r>
-            <a:r>
-              <a:rPr lang="en-US" dirty="0" smtClean="0"/>
-              <a:t>SDK</a:t>
-            </a:r>
-            <a:r>
-              <a:rPr lang="he-IL" dirty="0" smtClean="0"/>
-              <a:t> המינימלי שנתמוך בו. יש להשתמש בשיקול דעת בבחירת גרסה מינימלית. ככל הגרסה נמוכה יותר ניתן להגיע לקהל רחב יותר (עד גבול מסוים) אבל תמיכה בהרבה גרסאות מסרבל את פיתוח </a:t>
-            </a:r>
-            <a:r>
-              <a:rPr lang="he-IL" dirty="0" err="1" smtClean="0"/>
-              <a:t>הפרוייקט</a:t>
-            </a:r>
-            <a:r>
-              <a:rPr lang="he-IL" dirty="0" smtClean="0"/>
-              <a:t> כי במספר מקומות יש התנהגויות שונות לגרסאות שונות ופיצ'רים חדשים שאולי נרצה להשתמש בהם שאינם קיימים בגרסאות ישנות יותר.</a:t>
+              <a:t> שעליו נדבר בהמשך.</a:t>
             </a:r>
             <a:endParaRPr lang="en-US" dirty="0"/>
           </a:p>
@@ -4012,8 +3917,8 @@
         </p:blipFill>
         <p:spPr>
           <a:xfrm>
-            <a:off x="180110" y="2064834"/>
-            <a:ext cx="5356366" cy="3974228"/>
+            <a:off x="1639455" y="1852654"/>
+            <a:ext cx="7578435" cy="3882022"/>
           </a:xfrm>
           <a:prstGeom prst="rect">
             <a:avLst/>
@@ -4023,7 +3928,7 @@
     </p:spTree>
     <p:extLst>
       <p:ext uri="{BB962C8B-B14F-4D97-AF65-F5344CB8AC3E}">
-        <p14:creationId xmlns:p14="http://schemas.microsoft.com/office/powerpoint/2010/main" val="2045570969"/>
+        <p14:creationId xmlns:p14="http://schemas.microsoft.com/office/powerpoint/2010/main" val="1009471613"/>
       </p:ext>
     </p:extLst>
   </p:cSld>
@@ -4092,8 +3997,8 @@
         </p:nvSpPr>
         <p:spPr>
           <a:xfrm>
-            <a:off x="471056" y="5798225"/>
-            <a:ext cx="9144000" cy="916615"/>
+            <a:off x="471056" y="1852655"/>
+            <a:ext cx="9144000" cy="3873890"/>
           </a:xfrm>
         </p:spPr>
         <p:txBody>
@@ -4106,22 +4011,67 @@
               <a:buNone/>
             </a:pPr>
             <a:r>
-              <a:rPr lang="en-US" dirty="0"/>
+              <a:rPr lang="he-IL" dirty="0" smtClean="0"/>
+              <a:t>נרצה להריץ את האפליקציה שאני בונים וקיימות לזה 2 אופציות נפוצות.</a:t>
+            </a:r>
+          </a:p>
+          <a:p>
+            <a:pPr marL="742950" indent="-742950" algn="r" rtl="1">
+              <a:buFont typeface="+mj-lt"/>
+              <a:buAutoNum type="arabicPeriod"/>
+            </a:pPr>
+            <a:r>
+              <a:rPr lang="he-IL" dirty="0" smtClean="0"/>
+              <a:t>פתיחת אפשרויות מפתחים במכשיר אנדרואיד ממשי ואישור ניתור באגים באמצעות </a:t>
+            </a:r>
+            <a:r>
+              <a:rPr lang="en-US" dirty="0" smtClean="0"/>
+              <a:t>USB</a:t>
+            </a:r>
+            <a:r>
+              <a:rPr lang="he-IL" dirty="0" smtClean="0"/>
+              <a:t>.</a:t>
+            </a:r>
+            <a:r>
+              <a:rPr lang="he-IL" dirty="0"/>
               <a:t> </a:t>
             </a:r>
             <a:r>
               <a:rPr lang="he-IL" dirty="0" smtClean="0"/>
-              <a:t>הגענו למסך הפתיחה של </a:t>
-            </a:r>
-            <a:r>
-              <a:rPr lang="he-IL" dirty="0" err="1" smtClean="0"/>
-              <a:t>הפרוייקט</a:t>
-            </a:r>
+              <a:t>תהליך זה שונה ממכשיר למכשיר. למידע נוסף למכשירים שונים ניתן לעיין במסמך </a:t>
+            </a:r>
+            <a:r>
+              <a:rPr lang="en-US" sz="2800" dirty="0">
+                <a:hlinkClick r:id="rId2"/>
+              </a:rPr>
+              <a:t>https://</a:t>
+            </a:r>
+            <a:r>
+              <a:rPr lang="en-US" sz="2800" dirty="0" smtClean="0">
+                <a:hlinkClick r:id="rId2"/>
+              </a:rPr>
+              <a:t>developer.android.com/studio/debug/dev-options</a:t>
+            </a:r>
+            <a:endParaRPr lang="he-IL" sz="2800" dirty="0" smtClean="0"/>
+          </a:p>
+          <a:p>
+            <a:pPr marL="742950" indent="-742950" algn="r" rtl="1">
+              <a:buFont typeface="+mj-lt"/>
+              <a:buAutoNum type="arabicPeriod"/>
+            </a:pPr>
             <a:r>
               <a:rPr lang="he-IL" dirty="0" smtClean="0"/>
-              <a:t> שעליו נדבר בהמשך.</a:t>
-            </a:r>
-            <a:endParaRPr lang="en-US" dirty="0"/>
+              <a:t>הרצת היישום בסימולטור ש</a:t>
+            </a:r>
+            <a:r>
+              <a:rPr lang="en-US" dirty="0" smtClean="0"/>
+              <a:t>Android Studio</a:t>
+            </a:r>
+            <a:r>
+              <a:rPr lang="he-IL" dirty="0" smtClean="0"/>
+              <a:t> מספקים.</a:t>
+            </a:r>
+            <a:endParaRPr lang="he-IL" dirty="0"/>
           </a:p>
         </p:txBody>
       </p:sp>
@@ -4172,12 +4122,12 @@
           <a:p>
             <a:pPr algn="r" rtl="1"/>
             <a:r>
-              <a:rPr lang="he-IL" sz="4000" dirty="0">
+              <a:rPr lang="he-IL" sz="4000" dirty="0" smtClean="0">
                 <a:solidFill>
                   <a:srgbClr val="FFE701"/>
                 </a:solidFill>
               </a:rPr>
-              <a:t>פתיחת הסביבה</a:t>
+              <a:t>התקנת סימולטור</a:t>
             </a:r>
             <a:endParaRPr lang="en-US" sz="4000" dirty="0">
               <a:solidFill>
@@ -4187,40 +4137,181 @@
           </a:p>
         </p:txBody>
       </p:sp>
-      <p:pic>
-        <p:nvPicPr>
-          <p:cNvPr id="5" name="Picture 4"/>
-          <p:cNvPicPr>
-            <a:picLocks noChangeAspect="1"/>
-          </p:cNvPicPr>
+      <p:sp>
+        <p:nvSpPr>
+          <p:cNvPr id="6" name="Content Placeholder 2"/>
+          <p:cNvSpPr txBox="1">
+            <a:spLocks/>
+          </p:cNvSpPr>
           <p:nvPr/>
-        </p:nvPicPr>
-        <p:blipFill>
-          <a:blip r:embed="rId2">
-            <a:extLst>
-              <a:ext uri="{28A0092B-C50C-407E-A947-70E740481C1C}">
-                <a14:useLocalDpi xmlns:a14="http://schemas.microsoft.com/office/drawing/2010/main" val="0"/>
-              </a:ext>
-            </a:extLst>
-          </a:blip>
-          <a:stretch>
-            <a:fillRect/>
-          </a:stretch>
-        </p:blipFill>
+        </p:nvSpPr>
         <p:spPr>
           <a:xfrm>
-            <a:off x="1639455" y="1852654"/>
-            <a:ext cx="7578435" cy="3882022"/>
+            <a:off x="471056" y="5808059"/>
+            <a:ext cx="9144000" cy="858218"/>
           </a:xfrm>
           <a:prstGeom prst="rect">
             <a:avLst/>
           </a:prstGeom>
         </p:spPr>
-      </p:pic>
+        <p:txBody>
+          <a:bodyPr vert="horz" lIns="91440" tIns="45720" rIns="91440" bIns="45720" rtlCol="0">
+            <a:normAutofit/>
+          </a:bodyPr>
+          <a:lstStyle>
+            <a:lvl1pPr marL="457189" indent="-457189" algn="l" defTabSz="1219170" rtl="0" eaLnBrk="1" latinLnBrk="0" hangingPunct="1">
+              <a:spcBef>
+                <a:spcPct val="20000"/>
+              </a:spcBef>
+              <a:buFont typeface="Arial" pitchFamily="34" charset="0"/>
+              <a:buChar char="•"/>
+              <a:defRPr sz="3733" kern="1200">
+                <a:solidFill>
+                  <a:schemeClr val="bg1"/>
+                </a:solidFill>
+                <a:latin typeface="+mn-lt"/>
+                <a:ea typeface="+mn-ea"/>
+                <a:cs typeface="+mn-cs"/>
+              </a:defRPr>
+            </a:lvl1pPr>
+            <a:lvl2pPr marL="990575" indent="-380990" algn="l" defTabSz="1219170" rtl="0" eaLnBrk="1" latinLnBrk="0" hangingPunct="1">
+              <a:spcBef>
+                <a:spcPct val="20000"/>
+              </a:spcBef>
+              <a:buFont typeface="Arial" pitchFamily="34" charset="0"/>
+              <a:buChar char="–"/>
+              <a:defRPr sz="3733" kern="1200">
+                <a:solidFill>
+                  <a:schemeClr val="bg1"/>
+                </a:solidFill>
+                <a:latin typeface="+mn-lt"/>
+                <a:ea typeface="+mn-ea"/>
+                <a:cs typeface="+mn-cs"/>
+              </a:defRPr>
+            </a:lvl2pPr>
+            <a:lvl3pPr marL="1523962" indent="-304792" algn="l" defTabSz="1219170" rtl="0" eaLnBrk="1" latinLnBrk="0" hangingPunct="1">
+              <a:spcBef>
+                <a:spcPct val="20000"/>
+              </a:spcBef>
+              <a:buFont typeface="Arial" pitchFamily="34" charset="0"/>
+              <a:buChar char="•"/>
+              <a:defRPr sz="3200" kern="1200">
+                <a:solidFill>
+                  <a:schemeClr val="bg1"/>
+                </a:solidFill>
+                <a:latin typeface="+mn-lt"/>
+                <a:ea typeface="+mn-ea"/>
+                <a:cs typeface="+mn-cs"/>
+              </a:defRPr>
+            </a:lvl3pPr>
+            <a:lvl4pPr marL="2133547" indent="-304792" algn="l" defTabSz="1219170" rtl="0" eaLnBrk="1" latinLnBrk="0" hangingPunct="1">
+              <a:spcBef>
+                <a:spcPct val="20000"/>
+              </a:spcBef>
+              <a:buFont typeface="Arial" pitchFamily="34" charset="0"/>
+              <a:buChar char="–"/>
+              <a:defRPr sz="2667" kern="1200">
+                <a:solidFill>
+                  <a:schemeClr val="bg1"/>
+                </a:solidFill>
+                <a:latin typeface="+mn-lt"/>
+                <a:ea typeface="+mn-ea"/>
+                <a:cs typeface="+mn-cs"/>
+              </a:defRPr>
+            </a:lvl4pPr>
+            <a:lvl5pPr marL="2743131" indent="-304792" algn="l" defTabSz="1219170" rtl="0" eaLnBrk="1" latinLnBrk="0" hangingPunct="1">
+              <a:spcBef>
+                <a:spcPct val="20000"/>
+              </a:spcBef>
+              <a:buFont typeface="Arial" pitchFamily="34" charset="0"/>
+              <a:buChar char="»"/>
+              <a:defRPr sz="2667" kern="1200">
+                <a:solidFill>
+                  <a:schemeClr val="bg1"/>
+                </a:solidFill>
+                <a:latin typeface="+mn-lt"/>
+                <a:ea typeface="+mn-ea"/>
+                <a:cs typeface="+mn-cs"/>
+              </a:defRPr>
+            </a:lvl5pPr>
+            <a:lvl6pPr marL="3352716" indent="-304792" algn="l" defTabSz="1219170" rtl="0" eaLnBrk="1" latinLnBrk="0" hangingPunct="1">
+              <a:spcBef>
+                <a:spcPct val="20000"/>
+              </a:spcBef>
+              <a:buFont typeface="Arial" pitchFamily="34" charset="0"/>
+              <a:buChar char="•"/>
+              <a:defRPr sz="2667" kern="1200">
+                <a:solidFill>
+                  <a:schemeClr val="tx1"/>
+                </a:solidFill>
+                <a:latin typeface="+mn-lt"/>
+                <a:ea typeface="+mn-ea"/>
+                <a:cs typeface="+mn-cs"/>
+              </a:defRPr>
+            </a:lvl6pPr>
+            <a:lvl7pPr marL="3962301" indent="-304792" algn="l" defTabSz="1219170" rtl="0" eaLnBrk="1" latinLnBrk="0" hangingPunct="1">
+              <a:spcBef>
+                <a:spcPct val="20000"/>
+              </a:spcBef>
+              <a:buFont typeface="Arial" pitchFamily="34" charset="0"/>
+              <a:buChar char="•"/>
+              <a:defRPr sz="2667" kern="1200">
+                <a:solidFill>
+                  <a:schemeClr val="tx1"/>
+                </a:solidFill>
+                <a:latin typeface="+mn-lt"/>
+                <a:ea typeface="+mn-ea"/>
+                <a:cs typeface="+mn-cs"/>
+              </a:defRPr>
+            </a:lvl7pPr>
+            <a:lvl8pPr marL="4571886" indent="-304792" algn="l" defTabSz="1219170" rtl="0" eaLnBrk="1" latinLnBrk="0" hangingPunct="1">
+              <a:spcBef>
+                <a:spcPct val="20000"/>
+              </a:spcBef>
+              <a:buFont typeface="Arial" pitchFamily="34" charset="0"/>
+              <a:buChar char="•"/>
+              <a:defRPr sz="2667" kern="1200">
+                <a:solidFill>
+                  <a:schemeClr val="tx1"/>
+                </a:solidFill>
+                <a:latin typeface="+mn-lt"/>
+                <a:ea typeface="+mn-ea"/>
+                <a:cs typeface="+mn-cs"/>
+              </a:defRPr>
+            </a:lvl8pPr>
+            <a:lvl9pPr marL="5181470" indent="-304792" algn="l" defTabSz="1219170" rtl="0" eaLnBrk="1" latinLnBrk="0" hangingPunct="1">
+              <a:spcBef>
+                <a:spcPct val="20000"/>
+              </a:spcBef>
+              <a:buFont typeface="Arial" pitchFamily="34" charset="0"/>
+              <a:buChar char="•"/>
+              <a:defRPr sz="2667" kern="1200">
+                <a:solidFill>
+                  <a:schemeClr val="tx1"/>
+                </a:solidFill>
+                <a:latin typeface="+mn-lt"/>
+                <a:ea typeface="+mn-ea"/>
+                <a:cs typeface="+mn-cs"/>
+              </a:defRPr>
+            </a:lvl9pPr>
+          </a:lstStyle>
+          <a:p>
+            <a:pPr marL="0" indent="0" algn="r" rtl="1">
+              <a:buFont typeface="Arial" pitchFamily="34" charset="0"/>
+              <a:buNone/>
+            </a:pPr>
+            <a:r>
+              <a:rPr lang="he-IL" dirty="0" smtClean="0"/>
+              <a:t>אני נתמקד כעת באופציה מספר 2</a:t>
+            </a:r>
+            <a:endParaRPr lang="he-IL" dirty="0"/>
+          </a:p>
+        </p:txBody>
+      </p:sp>
     </p:spTree>
     <p:extLst>
       <p:ext uri="{BB962C8B-B14F-4D97-AF65-F5344CB8AC3E}">
-        <p14:creationId xmlns:p14="http://schemas.microsoft.com/office/powerpoint/2010/main" val="1009471613"/>
+        <p14:creationId xmlns:p14="http://schemas.microsoft.com/office/powerpoint/2010/main" val="1526086175"/>
       </p:ext>
     </p:extLst>
   </p:cSld>
@@ -4279,96 +4370,6 @@
       </p:sp>
       <p:sp>
         <p:nvSpPr>
-          <p:cNvPr id="3" name="Content Placeholder 2"/>
-          <p:cNvSpPr>
-            <a:spLocks noGrp="1"/>
-          </p:cNvSpPr>
-          <p:nvPr>
-            <p:ph idx="1"/>
-          </p:nvPr>
-        </p:nvSpPr>
-        <p:spPr>
-          <a:xfrm>
-            <a:off x="471056" y="1852655"/>
-            <a:ext cx="9144000" cy="3873890"/>
-          </a:xfrm>
-        </p:spPr>
-        <p:txBody>
-          <a:bodyPr>
-            <a:normAutofit fontScale="85000" lnSpcReduction="10000"/>
-          </a:bodyPr>
-          <a:lstStyle/>
-          <a:p>
-            <a:pPr marL="0" indent="0" algn="r" rtl="1">
-              <a:buNone/>
-            </a:pPr>
-            <a:r>
-              <a:rPr lang="he-IL" dirty="0" smtClean="0"/>
-              <a:t>נרצה להריץ את האפליקציה שאני בונים וקיימות לזה 2 אופציות נפוצות.</a:t>
-            </a:r>
-          </a:p>
-          <a:p>
-            <a:pPr marL="742950" indent="-742950" algn="r" rtl="1">
-              <a:buFont typeface="+mj-lt"/>
-              <a:buAutoNum type="arabicPeriod"/>
-            </a:pPr>
-            <a:r>
-              <a:rPr lang="he-IL" dirty="0" smtClean="0"/>
-              <a:t>פתיחת אפשרויות מפתחים במכשיר אנדרואיד ממשי ואישור ניתור באגים באמצעות </a:t>
-            </a:r>
-            <a:r>
-              <a:rPr lang="en-US" dirty="0" smtClean="0"/>
-              <a:t>USB</a:t>
-            </a:r>
-            <a:r>
-              <a:rPr lang="he-IL" dirty="0" smtClean="0"/>
-              <a:t>.</a:t>
-            </a:r>
-            <a:r>
-              <a:rPr lang="he-IL" dirty="0"/>
-              <a:t> </a:t>
-            </a:r>
-            <a:r>
-              <a:rPr lang="he-IL" dirty="0" smtClean="0"/>
-              <a:t>תהליך זה שונה ממכשיר למכשיר. למידע נוסף למכשירים שונים ניתן לעיין במסמך </a:t>
-            </a:r>
-            <a:r>
-              <a:rPr lang="en-US" sz="2800" dirty="0">
-                <a:hlinkClick r:id="rId2"/>
-              </a:rPr>
-              <a:t>https://</a:t>
-            </a:r>
-            <a:r>
-              <a:rPr lang="en-US" sz="2800" dirty="0" smtClean="0">
-                <a:hlinkClick r:id="rId2"/>
-              </a:rPr>
-              <a:t>developer.android.com/studio/debug/dev-options</a:t>
-            </a:r>
-            <a:endParaRPr lang="he-IL" sz="2800" dirty="0" smtClean="0"/>
-          </a:p>
-          <a:p>
-            <a:pPr marL="742950" indent="-742950" algn="r" rtl="1">
-              <a:buFont typeface="+mj-lt"/>
-              <a:buAutoNum type="arabicPeriod"/>
-            </a:pPr>
-            <a:r>
-              <a:rPr lang="he-IL" dirty="0" smtClean="0"/>
-              <a:t>הרצת היישום בסימולטור ש</a:t>
-            </a:r>
-            <a:r>
-              <a:rPr lang="en-US" dirty="0" smtClean="0"/>
-              <a:t>Android Studio</a:t>
-            </a:r>
-            <a:r>
-              <a:rPr lang="he-IL" dirty="0" smtClean="0"/>
-              <a:t> מספקים.</a:t>
-            </a:r>
-            <a:endParaRPr lang="he-IL" dirty="0"/>
-          </a:p>
-        </p:txBody>
-      </p:sp>
-      <p:sp>
-        <p:nvSpPr>
           <p:cNvPr id="4" name="Title 1"/>
           <p:cNvSpPr txBox="1">
             <a:spLocks/>
@@ -4439,8 +4440,8 @@
         </p:nvSpPr>
         <p:spPr>
           <a:xfrm>
-            <a:off x="471056" y="5808059"/>
-            <a:ext cx="9144000" cy="858218"/>
+            <a:off x="2318328" y="1996081"/>
+            <a:ext cx="6289964" cy="673228"/>
           </a:xfrm>
           <a:prstGeom prst="rect">
             <a:avLst/>
@@ -4448,7 +4449,7 @@
         </p:spPr>
         <p:txBody>
           <a:bodyPr vert="horz" lIns="91440" tIns="45720" rIns="91440" bIns="45720" rtlCol="0">
-            <a:normAutofit/>
+            <a:normAutofit fontScale="47500" lnSpcReduction="20000"/>
           </a:bodyPr>
           <a:lstStyle>
             <a:lvl1pPr marL="457189" indent="-457189" algn="l" defTabSz="1219170" rtl="0" eaLnBrk="1" latinLnBrk="0" hangingPunct="1">
@@ -4594,16 +4595,409 @@
             </a:pPr>
             <a:r>
               <a:rPr lang="he-IL" dirty="0" smtClean="0"/>
-              <a:t>אני נתמקד כעת באופציה מספר 2</a:t>
+              <a:t>בסרגל הכלים שניתן לראות בצד ימין למעלה בחון ב</a:t>
+            </a:r>
+            <a:r>
+              <a:rPr lang="en-US" dirty="0" smtClean="0"/>
+              <a:t>Android Studio </a:t>
+            </a:r>
+            <a:r>
+              <a:rPr lang="he-IL" dirty="0"/>
+              <a:t> </a:t>
+            </a:r>
+            <a:r>
+              <a:rPr lang="he-IL" dirty="0" smtClean="0"/>
+              <a:t>נלחץ על כפתור ה</a:t>
+            </a:r>
+            <a:r>
+              <a:rPr lang="en-US" dirty="0" smtClean="0"/>
+              <a:t>AVD</a:t>
+            </a:r>
+            <a:r>
+              <a:rPr lang="en-US" dirty="0"/>
+              <a:t> </a:t>
+            </a:r>
+            <a:r>
+              <a:rPr lang="en-US" dirty="0" smtClean="0"/>
+              <a:t>Manager</a:t>
+            </a:r>
+            <a:r>
+              <a:rPr lang="he-IL" dirty="0" smtClean="0"/>
+              <a:t> (</a:t>
+            </a:r>
+            <a:r>
+              <a:rPr lang="en-US" dirty="0" smtClean="0"/>
+              <a:t>Android Virtual Device</a:t>
+            </a:r>
+            <a:r>
+              <a:rPr lang="he-IL" dirty="0" smtClean="0"/>
+              <a:t>)</a:t>
             </a:r>
             <a:endParaRPr lang="he-IL" dirty="0"/>
           </a:p>
         </p:txBody>
       </p:sp>
+      <p:pic>
+        <p:nvPicPr>
+          <p:cNvPr id="7" name="Content Placeholder 6"/>
+          <p:cNvPicPr>
+            <a:picLocks noGrp="1" noChangeAspect="1"/>
+          </p:cNvPicPr>
+          <p:nvPr>
+            <p:ph idx="1"/>
+          </p:nvPr>
+        </p:nvPicPr>
+        <p:blipFill>
+          <a:blip r:embed="rId2">
+            <a:extLst>
+              <a:ext uri="{28A0092B-C50C-407E-A947-70E740481C1C}">
+                <a14:useLocalDpi xmlns:a14="http://schemas.microsoft.com/office/drawing/2010/main" val="0"/>
+              </a:ext>
+            </a:extLst>
+          </a:blip>
+          <a:stretch>
+            <a:fillRect/>
+          </a:stretch>
+        </p:blipFill>
+        <p:spPr>
+          <a:xfrm>
+            <a:off x="737034" y="2997727"/>
+            <a:ext cx="7940675" cy="384879"/>
+          </a:xfrm>
+        </p:spPr>
+      </p:pic>
+      <p:sp>
+        <p:nvSpPr>
+          <p:cNvPr id="8" name="Rectangle 7"/>
+          <p:cNvSpPr/>
+          <p:nvPr/>
+        </p:nvSpPr>
+        <p:spPr>
+          <a:xfrm>
+            <a:off x="7887855" y="2997726"/>
+            <a:ext cx="286328" cy="325631"/>
+          </a:xfrm>
+          <a:prstGeom prst="rect">
+            <a:avLst/>
+          </a:prstGeom>
+          <a:noFill/>
+          <a:ln>
+            <a:solidFill>
+              <a:schemeClr val="accent2"/>
+            </a:solidFill>
+          </a:ln>
+        </p:spPr>
+        <p:style>
+          <a:lnRef idx="2">
+            <a:schemeClr val="accent2">
+              <a:shade val="50000"/>
+            </a:schemeClr>
+          </a:lnRef>
+          <a:fillRef idx="1">
+            <a:schemeClr val="accent2"/>
+          </a:fillRef>
+          <a:effectRef idx="0">
+            <a:schemeClr val="accent2"/>
+          </a:effectRef>
+          <a:fontRef idx="minor">
+            <a:schemeClr val="lt1"/>
+          </a:fontRef>
+        </p:style>
+        <p:txBody>
+          <a:bodyPr rtlCol="0" anchor="ctr"/>
+          <a:lstStyle/>
+          <a:p>
+            <a:pPr algn="ctr"/>
+            <a:endParaRPr lang="en-US"/>
+          </a:p>
+        </p:txBody>
+      </p:sp>
+      <p:cxnSp>
+        <p:nvCxnSpPr>
+          <p:cNvPr id="26" name="Straight Connector 25"/>
+          <p:cNvCxnSpPr/>
+          <p:nvPr/>
+        </p:nvCxnSpPr>
+        <p:spPr>
+          <a:xfrm>
+            <a:off x="6428509" y="2487105"/>
+            <a:ext cx="1546649" cy="510621"/>
+          </a:xfrm>
+          <a:prstGeom prst="line">
+            <a:avLst/>
+          </a:prstGeom>
+          <a:ln w="19050">
+            <a:solidFill>
+              <a:schemeClr val="accent2"/>
+            </a:solidFill>
+          </a:ln>
+        </p:spPr>
+        <p:style>
+          <a:lnRef idx="1">
+            <a:schemeClr val="accent1"/>
+          </a:lnRef>
+          <a:fillRef idx="0">
+            <a:schemeClr val="accent1"/>
+          </a:fillRef>
+          <a:effectRef idx="0">
+            <a:schemeClr val="accent1"/>
+          </a:effectRef>
+          <a:fontRef idx="minor">
+            <a:schemeClr val="tx1"/>
+          </a:fontRef>
+        </p:style>
+      </p:cxnSp>
+      <p:sp>
+        <p:nvSpPr>
+          <p:cNvPr id="28" name="Rectangle 27"/>
+          <p:cNvSpPr/>
+          <p:nvPr/>
+        </p:nvSpPr>
+        <p:spPr>
+          <a:xfrm>
+            <a:off x="5652655" y="2234074"/>
+            <a:ext cx="2096654" cy="253031"/>
+          </a:xfrm>
+          <a:prstGeom prst="rect">
+            <a:avLst/>
+          </a:prstGeom>
+          <a:noFill/>
+          <a:ln>
+            <a:solidFill>
+              <a:schemeClr val="accent2"/>
+            </a:solidFill>
+          </a:ln>
+        </p:spPr>
+        <p:style>
+          <a:lnRef idx="2">
+            <a:schemeClr val="accent2">
+              <a:shade val="50000"/>
+            </a:schemeClr>
+          </a:lnRef>
+          <a:fillRef idx="1">
+            <a:schemeClr val="accent2"/>
+          </a:fillRef>
+          <a:effectRef idx="0">
+            <a:schemeClr val="accent2"/>
+          </a:effectRef>
+          <a:fontRef idx="minor">
+            <a:schemeClr val="lt1"/>
+          </a:fontRef>
+        </p:style>
+        <p:txBody>
+          <a:bodyPr rtlCol="0" anchor="ctr"/>
+          <a:lstStyle/>
+          <a:p>
+            <a:pPr algn="ctr"/>
+            <a:endParaRPr lang="en-US"/>
+          </a:p>
+        </p:txBody>
+      </p:sp>
+      <p:sp>
+        <p:nvSpPr>
+          <p:cNvPr id="29" name="Content Placeholder 2"/>
+          <p:cNvSpPr txBox="1">
+            <a:spLocks/>
+          </p:cNvSpPr>
+          <p:nvPr/>
+        </p:nvSpPr>
+        <p:spPr>
+          <a:xfrm>
+            <a:off x="2803382" y="3718679"/>
+            <a:ext cx="5874327" cy="673228"/>
+          </a:xfrm>
+          <a:prstGeom prst="rect">
+            <a:avLst/>
+          </a:prstGeom>
+        </p:spPr>
+        <p:txBody>
+          <a:bodyPr vert="horz" lIns="91440" tIns="45720" rIns="91440" bIns="45720" rtlCol="0">
+            <a:normAutofit fontScale="62500" lnSpcReduction="20000"/>
+          </a:bodyPr>
+          <a:lstStyle>
+            <a:lvl1pPr marL="457189" indent="-457189" algn="l" defTabSz="1219170" rtl="0" eaLnBrk="1" latinLnBrk="0" hangingPunct="1">
+              <a:spcBef>
+                <a:spcPct val="20000"/>
+              </a:spcBef>
+              <a:buFont typeface="Arial" pitchFamily="34" charset="0"/>
+              <a:buChar char="•"/>
+              <a:defRPr sz="3733" kern="1200">
+                <a:solidFill>
+                  <a:schemeClr val="bg1"/>
+                </a:solidFill>
+                <a:latin typeface="+mn-lt"/>
+                <a:ea typeface="+mn-ea"/>
+                <a:cs typeface="+mn-cs"/>
+              </a:defRPr>
+            </a:lvl1pPr>
+            <a:lvl2pPr marL="990575" indent="-380990" algn="l" defTabSz="1219170" rtl="0" eaLnBrk="1" latinLnBrk="0" hangingPunct="1">
+              <a:spcBef>
+                <a:spcPct val="20000"/>
+              </a:spcBef>
+              <a:buFont typeface="Arial" pitchFamily="34" charset="0"/>
+              <a:buChar char="–"/>
+              <a:defRPr sz="3733" kern="1200">
+                <a:solidFill>
+                  <a:schemeClr val="bg1"/>
+                </a:solidFill>
+                <a:latin typeface="+mn-lt"/>
+                <a:ea typeface="+mn-ea"/>
+                <a:cs typeface="+mn-cs"/>
+              </a:defRPr>
+            </a:lvl2pPr>
+            <a:lvl3pPr marL="1523962" indent="-304792" algn="l" defTabSz="1219170" rtl="0" eaLnBrk="1" latinLnBrk="0" hangingPunct="1">
+              <a:spcBef>
+                <a:spcPct val="20000"/>
+              </a:spcBef>
+              <a:buFont typeface="Arial" pitchFamily="34" charset="0"/>
+              <a:buChar char="•"/>
+              <a:defRPr sz="3200" kern="1200">
+                <a:solidFill>
+                  <a:schemeClr val="bg1"/>
+                </a:solidFill>
+                <a:latin typeface="+mn-lt"/>
+                <a:ea typeface="+mn-ea"/>
+                <a:cs typeface="+mn-cs"/>
+              </a:defRPr>
+            </a:lvl3pPr>
+            <a:lvl4pPr marL="2133547" indent="-304792" algn="l" defTabSz="1219170" rtl="0" eaLnBrk="1" latinLnBrk="0" hangingPunct="1">
+              <a:spcBef>
+                <a:spcPct val="20000"/>
+              </a:spcBef>
+              <a:buFont typeface="Arial" pitchFamily="34" charset="0"/>
+              <a:buChar char="–"/>
+              <a:defRPr sz="2667" kern="1200">
+                <a:solidFill>
+                  <a:schemeClr val="bg1"/>
+                </a:solidFill>
+                <a:latin typeface="+mn-lt"/>
+                <a:ea typeface="+mn-ea"/>
+                <a:cs typeface="+mn-cs"/>
+              </a:defRPr>
+            </a:lvl4pPr>
+            <a:lvl5pPr marL="2743131" indent="-304792" algn="l" defTabSz="1219170" rtl="0" eaLnBrk="1" latinLnBrk="0" hangingPunct="1">
+              <a:spcBef>
+                <a:spcPct val="20000"/>
+              </a:spcBef>
+              <a:buFont typeface="Arial" pitchFamily="34" charset="0"/>
+              <a:buChar char="»"/>
+              <a:defRPr sz="2667" kern="1200">
+                <a:solidFill>
+                  <a:schemeClr val="bg1"/>
+                </a:solidFill>
+                <a:latin typeface="+mn-lt"/>
+                <a:ea typeface="+mn-ea"/>
+                <a:cs typeface="+mn-cs"/>
+              </a:defRPr>
+            </a:lvl5pPr>
+            <a:lvl6pPr marL="3352716" indent="-304792" algn="l" defTabSz="1219170" rtl="0" eaLnBrk="1" latinLnBrk="0" hangingPunct="1">
+              <a:spcBef>
+                <a:spcPct val="20000"/>
+              </a:spcBef>
+              <a:buFont typeface="Arial" pitchFamily="34" charset="0"/>
+              <a:buChar char="•"/>
+              <a:defRPr sz="2667" kern="1200">
+                <a:solidFill>
+                  <a:schemeClr val="tx1"/>
+                </a:solidFill>
+                <a:latin typeface="+mn-lt"/>
+                <a:ea typeface="+mn-ea"/>
+                <a:cs typeface="+mn-cs"/>
+              </a:defRPr>
+            </a:lvl6pPr>
+            <a:lvl7pPr marL="3962301" indent="-304792" algn="l" defTabSz="1219170" rtl="0" eaLnBrk="1" latinLnBrk="0" hangingPunct="1">
+              <a:spcBef>
+                <a:spcPct val="20000"/>
+              </a:spcBef>
+              <a:buFont typeface="Arial" pitchFamily="34" charset="0"/>
+              <a:buChar char="•"/>
+              <a:defRPr sz="2667" kern="1200">
+                <a:solidFill>
+                  <a:schemeClr val="tx1"/>
+                </a:solidFill>
+                <a:latin typeface="+mn-lt"/>
+                <a:ea typeface="+mn-ea"/>
+                <a:cs typeface="+mn-cs"/>
+              </a:defRPr>
+            </a:lvl7pPr>
+            <a:lvl8pPr marL="4571886" indent="-304792" algn="l" defTabSz="1219170" rtl="0" eaLnBrk="1" latinLnBrk="0" hangingPunct="1">
+              <a:spcBef>
+                <a:spcPct val="20000"/>
+              </a:spcBef>
+              <a:buFont typeface="Arial" pitchFamily="34" charset="0"/>
+              <a:buChar char="•"/>
+              <a:defRPr sz="2667" kern="1200">
+                <a:solidFill>
+                  <a:schemeClr val="tx1"/>
+                </a:solidFill>
+                <a:latin typeface="+mn-lt"/>
+                <a:ea typeface="+mn-ea"/>
+                <a:cs typeface="+mn-cs"/>
+              </a:defRPr>
+            </a:lvl8pPr>
+            <a:lvl9pPr marL="5181470" indent="-304792" algn="l" defTabSz="1219170" rtl="0" eaLnBrk="1" latinLnBrk="0" hangingPunct="1">
+              <a:spcBef>
+                <a:spcPct val="20000"/>
+              </a:spcBef>
+              <a:buFont typeface="Arial" pitchFamily="34" charset="0"/>
+              <a:buChar char="•"/>
+              <a:defRPr sz="2667" kern="1200">
+                <a:solidFill>
+                  <a:schemeClr val="tx1"/>
+                </a:solidFill>
+                <a:latin typeface="+mn-lt"/>
+                <a:ea typeface="+mn-ea"/>
+                <a:cs typeface="+mn-cs"/>
+              </a:defRPr>
+            </a:lvl9pPr>
+          </a:lstStyle>
+          <a:p>
+            <a:pPr marL="0" indent="0" algn="r" rtl="1">
+              <a:buFont typeface="Arial" pitchFamily="34" charset="0"/>
+              <a:buNone/>
+            </a:pPr>
+            <a:r>
+              <a:rPr lang="he-IL" dirty="0" smtClean="0"/>
+              <a:t>אז נלחץ על כפתור ליצירת מכשיר וירטואלי חדש (סימולטור)</a:t>
+            </a:r>
+            <a:endParaRPr lang="he-IL" dirty="0"/>
+          </a:p>
+        </p:txBody>
+      </p:sp>
+      <p:pic>
+        <p:nvPicPr>
+          <p:cNvPr id="30" name="Picture 29"/>
+          <p:cNvPicPr>
+            <a:picLocks noChangeAspect="1"/>
+          </p:cNvPicPr>
+          <p:nvPr/>
+        </p:nvPicPr>
+        <p:blipFill>
+          <a:blip r:embed="rId3">
+            <a:extLst>
+              <a:ext uri="{28A0092B-C50C-407E-A947-70E740481C1C}">
+                <a14:useLocalDpi xmlns:a14="http://schemas.microsoft.com/office/drawing/2010/main" val="0"/>
+              </a:ext>
+            </a:extLst>
+          </a:blip>
+          <a:stretch>
+            <a:fillRect/>
+          </a:stretch>
+        </p:blipFill>
+        <p:spPr>
+          <a:xfrm>
+            <a:off x="3783184" y="4435880"/>
+            <a:ext cx="3263900" cy="584200"/>
+          </a:xfrm>
+          <a:prstGeom prst="rect">
+            <a:avLst/>
+          </a:prstGeom>
+        </p:spPr>
+      </p:pic>
     </p:spTree>
     <p:extLst>
       <p:ext uri="{BB962C8B-B14F-4D97-AF65-F5344CB8AC3E}">
-        <p14:creationId xmlns:p14="http://schemas.microsoft.com/office/powerpoint/2010/main" val="1526086175"/>
+        <p14:creationId xmlns:p14="http://schemas.microsoft.com/office/powerpoint/2010/main" val="253604450"/>
       </p:ext>
     </p:extLst>
   </p:cSld>
@@ -4662,6 +5056,71 @@
       </p:sp>
       <p:sp>
         <p:nvSpPr>
+          <p:cNvPr id="3" name="Content Placeholder 2"/>
+          <p:cNvSpPr>
+            <a:spLocks noGrp="1"/>
+          </p:cNvSpPr>
+          <p:nvPr>
+            <p:ph idx="1"/>
+          </p:nvPr>
+        </p:nvSpPr>
+        <p:spPr>
+          <a:xfrm>
+            <a:off x="4830619" y="1852654"/>
+            <a:ext cx="4645892" cy="2176176"/>
+          </a:xfrm>
+        </p:spPr>
+        <p:txBody>
+          <a:bodyPr>
+            <a:normAutofit fontScale="92500" lnSpcReduction="10000"/>
+          </a:bodyPr>
+          <a:lstStyle/>
+          <a:p>
+            <a:pPr marL="0" indent="0" algn="r" rtl="1">
+              <a:buNone/>
+            </a:pPr>
+            <a:r>
+              <a:rPr lang="he-IL" dirty="0" smtClean="0"/>
+              <a:t>לסימולטור </a:t>
+            </a:r>
+            <a:r>
+              <a:rPr lang="he-IL" dirty="0" err="1" smtClean="0"/>
+              <a:t>לסמטרפון</a:t>
+            </a:r>
+            <a:r>
+              <a:rPr lang="he-IL" dirty="0" smtClean="0"/>
+              <a:t> נבחר את </a:t>
+            </a:r>
+            <a:r>
+              <a:rPr lang="en-US" dirty="0" smtClean="0"/>
+              <a:t>Phone</a:t>
+            </a:r>
+            <a:r>
+              <a:rPr lang="he-IL" dirty="0" smtClean="0"/>
+              <a:t> </a:t>
+            </a:r>
+            <a:r>
+              <a:rPr lang="he-IL" dirty="0" err="1" smtClean="0"/>
+              <a:t>באיזור</a:t>
+            </a:r>
+            <a:r>
+              <a:rPr lang="he-IL" dirty="0" smtClean="0"/>
+              <a:t> ה</a:t>
+            </a:r>
+            <a:r>
+              <a:rPr lang="en-US" dirty="0" smtClean="0"/>
+              <a:t>Category</a:t>
+            </a:r>
+            <a:r>
+              <a:rPr lang="he-IL" dirty="0" smtClean="0"/>
+              <a:t>. אז נבחר גדם מהאופציות הקיימות.</a:t>
+            </a:r>
+            <a:endParaRPr lang="en-US" dirty="0"/>
+          </a:p>
+        </p:txBody>
+      </p:sp>
+      <p:sp>
+        <p:nvSpPr>
           <p:cNvPr id="4" name="Title 1"/>
           <p:cNvSpPr txBox="1">
             <a:spLocks/>
@@ -4707,7 +5166,7 @@
           <a:p>
             <a:pPr algn="r" rtl="1"/>
             <a:r>
-              <a:rPr lang="he-IL" sz="4000" dirty="0" smtClean="0">
+              <a:rPr lang="he-IL" sz="4000" dirty="0">
                 <a:solidFill>
                   <a:srgbClr val="FFE701"/>
                 </a:solidFill>
@@ -4722,222 +5181,13 @@
           </a:p>
         </p:txBody>
       </p:sp>
-      <p:sp>
-        <p:nvSpPr>
-          <p:cNvPr id="6" name="Content Placeholder 2"/>
-          <p:cNvSpPr txBox="1">
-            <a:spLocks/>
-          </p:cNvSpPr>
-          <p:nvPr/>
-        </p:nvSpPr>
-        <p:spPr>
-          <a:xfrm>
-            <a:off x="2318328" y="1996081"/>
-            <a:ext cx="6289964" cy="673228"/>
-          </a:xfrm>
-          <a:prstGeom prst="rect">
-            <a:avLst/>
-          </a:prstGeom>
-        </p:spPr>
-        <p:txBody>
-          <a:bodyPr vert="horz" lIns="91440" tIns="45720" rIns="91440" bIns="45720" rtlCol="0">
-            <a:normAutofit fontScale="47500" lnSpcReduction="20000"/>
-          </a:bodyPr>
-          <a:lstStyle>
-            <a:lvl1pPr marL="457189" indent="-457189" algn="l" defTabSz="1219170" rtl="0" eaLnBrk="1" latinLnBrk="0" hangingPunct="1">
-              <a:spcBef>
-                <a:spcPct val="20000"/>
-              </a:spcBef>
-              <a:buFont typeface="Arial" pitchFamily="34" charset="0"/>
-              <a:buChar char="•"/>
-              <a:defRPr sz="3733" kern="1200">
-                <a:solidFill>
-                  <a:schemeClr val="bg1"/>
-                </a:solidFill>
-                <a:latin typeface="+mn-lt"/>
-                <a:ea typeface="+mn-ea"/>
-                <a:cs typeface="+mn-cs"/>
-              </a:defRPr>
-            </a:lvl1pPr>
-            <a:lvl2pPr marL="990575" indent="-380990" algn="l" defTabSz="1219170" rtl="0" eaLnBrk="1" latinLnBrk="0" hangingPunct="1">
-              <a:spcBef>
-                <a:spcPct val="20000"/>
-              </a:spcBef>
-              <a:buFont typeface="Arial" pitchFamily="34" charset="0"/>
-              <a:buChar char="–"/>
-              <a:defRPr sz="3733" kern="1200">
-                <a:solidFill>
-                  <a:schemeClr val="bg1"/>
-                </a:solidFill>
-                <a:latin typeface="+mn-lt"/>
-                <a:ea typeface="+mn-ea"/>
-                <a:cs typeface="+mn-cs"/>
-              </a:defRPr>
-            </a:lvl2pPr>
-            <a:lvl3pPr marL="1523962" indent="-304792" algn="l" defTabSz="1219170" rtl="0" eaLnBrk="1" latinLnBrk="0" hangingPunct="1">
-              <a:spcBef>
-                <a:spcPct val="20000"/>
-              </a:spcBef>
-              <a:buFont typeface="Arial" pitchFamily="34" charset="0"/>
-              <a:buChar char="•"/>
-              <a:defRPr sz="3200" kern="1200">
-                <a:solidFill>
-                  <a:schemeClr val="bg1"/>
-                </a:solidFill>
-                <a:latin typeface="+mn-lt"/>
-                <a:ea typeface="+mn-ea"/>
-                <a:cs typeface="+mn-cs"/>
-              </a:defRPr>
-            </a:lvl3pPr>
-            <a:lvl4pPr marL="2133547" indent="-304792" algn="l" defTabSz="1219170" rtl="0" eaLnBrk="1" latinLnBrk="0" hangingPunct="1">
-              <a:spcBef>
-                <a:spcPct val="20000"/>
-              </a:spcBef>
-              <a:buFont typeface="Arial" pitchFamily="34" charset="0"/>
-              <a:buChar char="–"/>
-              <a:defRPr sz="2667" kern="1200">
-                <a:solidFill>
-                  <a:schemeClr val="bg1"/>
-                </a:solidFill>
-                <a:latin typeface="+mn-lt"/>
-                <a:ea typeface="+mn-ea"/>
-                <a:cs typeface="+mn-cs"/>
-              </a:defRPr>
-            </a:lvl4pPr>
-            <a:lvl5pPr marL="2743131" indent="-304792" algn="l" defTabSz="1219170" rtl="0" eaLnBrk="1" latinLnBrk="0" hangingPunct="1">
-              <a:spcBef>
-                <a:spcPct val="20000"/>
-              </a:spcBef>
-              <a:buFont typeface="Arial" pitchFamily="34" charset="0"/>
-              <a:buChar char="»"/>
-              <a:defRPr sz="2667" kern="1200">
-                <a:solidFill>
-                  <a:schemeClr val="bg1"/>
-                </a:solidFill>
-                <a:latin typeface="+mn-lt"/>
-                <a:ea typeface="+mn-ea"/>
-                <a:cs typeface="+mn-cs"/>
-              </a:defRPr>
-            </a:lvl5pPr>
-            <a:lvl6pPr marL="3352716" indent="-304792" algn="l" defTabSz="1219170" rtl="0" eaLnBrk="1" latinLnBrk="0" hangingPunct="1">
-              <a:spcBef>
-                <a:spcPct val="20000"/>
-              </a:spcBef>
-              <a:buFont typeface="Arial" pitchFamily="34" charset="0"/>
-              <a:buChar char="•"/>
-              <a:defRPr sz="2667" kern="1200">
-                <a:solidFill>
-                  <a:schemeClr val="tx1"/>
-                </a:solidFill>
-                <a:latin typeface="+mn-lt"/>
-                <a:ea typeface="+mn-ea"/>
-                <a:cs typeface="+mn-cs"/>
-              </a:defRPr>
-            </a:lvl6pPr>
-            <a:lvl7pPr marL="3962301" indent="-304792" algn="l" defTabSz="1219170" rtl="0" eaLnBrk="1" latinLnBrk="0" hangingPunct="1">
-              <a:spcBef>
-                <a:spcPct val="20000"/>
-              </a:spcBef>
-              <a:buFont typeface="Arial" pitchFamily="34" charset="0"/>
-              <a:buChar char="•"/>
-              <a:defRPr sz="2667" kern="1200">
-                <a:solidFill>
-                  <a:schemeClr val="tx1"/>
-                </a:solidFill>
-                <a:latin typeface="+mn-lt"/>
-                <a:ea typeface="+mn-ea"/>
-                <a:cs typeface="+mn-cs"/>
-              </a:defRPr>
-            </a:lvl7pPr>
-            <a:lvl8pPr marL="4571886" indent="-304792" algn="l" defTabSz="1219170" rtl="0" eaLnBrk="1" latinLnBrk="0" hangingPunct="1">
-              <a:spcBef>
-                <a:spcPct val="20000"/>
-              </a:spcBef>
-              <a:buFont typeface="Arial" pitchFamily="34" charset="0"/>
-              <a:buChar char="•"/>
-              <a:defRPr sz="2667" kern="1200">
-                <a:solidFill>
-                  <a:schemeClr val="tx1"/>
-                </a:solidFill>
-                <a:latin typeface="+mn-lt"/>
-                <a:ea typeface="+mn-ea"/>
-                <a:cs typeface="+mn-cs"/>
-              </a:defRPr>
-            </a:lvl8pPr>
-            <a:lvl9pPr marL="5181470" indent="-304792" algn="l" defTabSz="1219170" rtl="0" eaLnBrk="1" latinLnBrk="0" hangingPunct="1">
-              <a:spcBef>
-                <a:spcPct val="20000"/>
-              </a:spcBef>
-              <a:buFont typeface="Arial" pitchFamily="34" charset="0"/>
-              <a:buChar char="•"/>
-              <a:defRPr sz="2667" kern="1200">
-                <a:solidFill>
-                  <a:schemeClr val="tx1"/>
-                </a:solidFill>
-                <a:latin typeface="+mn-lt"/>
-                <a:ea typeface="+mn-ea"/>
-                <a:cs typeface="+mn-cs"/>
-              </a:defRPr>
-            </a:lvl9pPr>
-          </a:lstStyle>
-          <a:p>
-            <a:pPr marL="0" indent="0" algn="r" rtl="1">
-              <a:buFont typeface="Arial" pitchFamily="34" charset="0"/>
-              <a:buNone/>
-            </a:pPr>
-            <a:r>
-              <a:rPr lang="he-IL" dirty="0" smtClean="0"/>
-              <a:t>בסרגל הכלים שניתן לראות בצד ימין למעלה בחון ב</a:t>
-            </a:r>
-            <a:r>
-              <a:rPr lang="en-US" dirty="0" smtClean="0"/>
-              <a:t>Android Studio </a:t>
-            </a:r>
-            <a:r>
-              <a:rPr lang="he-IL" dirty="0"/>
-              <a:t> </a:t>
-            </a:r>
-            <a:r>
-              <a:rPr lang="he-IL" dirty="0" smtClean="0"/>
-              <a:t>נלחץ על כפתור ה</a:t>
-            </a:r>
-            <a:r>
-              <a:rPr lang="en-US" dirty="0" smtClean="0"/>
-              <a:t>AVD</a:t>
-            </a:r>
-            <a:r>
-              <a:rPr lang="en-US" dirty="0"/>
-              <a:t> </a:t>
-            </a:r>
-            <a:r>
-              <a:rPr lang="en-US" dirty="0" smtClean="0"/>
-              <a:t>Manager</a:t>
-            </a:r>
-            <a:r>
-              <a:rPr lang="he-IL" dirty="0" smtClean="0"/>
-              <a:t> (</a:t>
-            </a:r>
-            <a:r>
-              <a:rPr lang="en-US" dirty="0" smtClean="0"/>
-              <a:t>Android Virtual Device</a:t>
-            </a:r>
-            <a:r>
-              <a:rPr lang="he-IL" dirty="0" smtClean="0"/>
-              <a:t>)</a:t>
-            </a:r>
-            <a:endParaRPr lang="he-IL" dirty="0"/>
-          </a:p>
-        </p:txBody>
-      </p:sp>
       <p:pic>
         <p:nvPicPr>
-          <p:cNvPr id="7" name="Content Placeholder 6"/>
+          <p:cNvPr id="5" name="Picture 4"/>
           <p:cNvPicPr>
-            <a:picLocks noGrp="1" noChangeAspect="1"/>
+            <a:picLocks noChangeAspect="1"/>
           </p:cNvPicPr>
-          <p:nvPr>
-            <p:ph idx="1"/>
-          </p:nvPr>
+          <p:nvPr/>
         </p:nvPicPr>
         <p:blipFill>
           <a:blip r:embed="rId2">
@@ -4953,312 +5203,17 @@
         </p:blipFill>
         <p:spPr>
           <a:xfrm>
-            <a:off x="737034" y="2997727"/>
-            <a:ext cx="7940675" cy="384879"/>
-          </a:xfrm>
-        </p:spPr>
-      </p:pic>
-      <p:sp>
-        <p:nvSpPr>
-          <p:cNvPr id="8" name="Rectangle 7"/>
-          <p:cNvSpPr/>
-          <p:nvPr/>
-        </p:nvSpPr>
-        <p:spPr>
-          <a:xfrm>
-            <a:off x="7887855" y="2997726"/>
-            <a:ext cx="286328" cy="325631"/>
+            <a:off x="54891" y="1342032"/>
+            <a:ext cx="4231998" cy="2834831"/>
           </a:xfrm>
           <a:prstGeom prst="rect">
             <a:avLst/>
           </a:prstGeom>
-          <a:noFill/>
-          <a:ln>
-            <a:solidFill>
-              <a:schemeClr val="accent2"/>
-            </a:solidFill>
-          </a:ln>
-        </p:spPr>
-        <p:style>
-          <a:lnRef idx="2">
-            <a:schemeClr val="accent2">
-              <a:shade val="50000"/>
-            </a:schemeClr>
-          </a:lnRef>
-          <a:fillRef idx="1">
-            <a:schemeClr val="accent2"/>
-          </a:fillRef>
-          <a:effectRef idx="0">
-            <a:schemeClr val="accent2"/>
-          </a:effectRef>
-          <a:fontRef idx="minor">
-            <a:schemeClr val="lt1"/>
-          </a:fontRef>
-        </p:style>
-        <p:txBody>
-          <a:bodyPr rtlCol="0" anchor="ctr"/>
-          <a:lstStyle/>
-          <a:p>
-            <a:pPr algn="ctr"/>
-            <a:endParaRPr lang="en-US"/>
-          </a:p>
-        </p:txBody>
-      </p:sp>
-      <p:cxnSp>
-        <p:nvCxnSpPr>
-          <p:cNvPr id="26" name="Straight Connector 25"/>
-          <p:cNvCxnSpPr/>
-          <p:nvPr/>
-        </p:nvCxnSpPr>
-        <p:spPr>
-          <a:xfrm>
-            <a:off x="6428509" y="2487105"/>
-            <a:ext cx="1546649" cy="510621"/>
-          </a:xfrm>
-          <a:prstGeom prst="line">
-            <a:avLst/>
-          </a:prstGeom>
-          <a:ln w="19050">
-            <a:solidFill>
-              <a:schemeClr val="accent2"/>
-            </a:solidFill>
-          </a:ln>
-        </p:spPr>
-        <p:style>
-          <a:lnRef idx="1">
-            <a:schemeClr val="accent1"/>
-          </a:lnRef>
-          <a:fillRef idx="0">
-            <a:schemeClr val="accent1"/>
-          </a:fillRef>
-          <a:effectRef idx="0">
-            <a:schemeClr val="accent1"/>
-          </a:effectRef>
-          <a:fontRef idx="minor">
-            <a:schemeClr val="tx1"/>
-          </a:fontRef>
-        </p:style>
-      </p:cxnSp>
-      <p:sp>
-        <p:nvSpPr>
-          <p:cNvPr id="28" name="Rectangle 27"/>
-          <p:cNvSpPr/>
-          <p:nvPr/>
-        </p:nvSpPr>
-        <p:spPr>
-          <a:xfrm>
-            <a:off x="5652655" y="2234074"/>
-            <a:ext cx="2096654" cy="253031"/>
-          </a:xfrm>
-          <a:prstGeom prst="rect">
-            <a:avLst/>
-          </a:prstGeom>
-          <a:noFill/>
-          <a:ln>
-            <a:solidFill>
-              <a:schemeClr val="accent2"/>
-            </a:solidFill>
-          </a:ln>
-        </p:spPr>
-        <p:style>
-          <a:lnRef idx="2">
-            <a:schemeClr val="accent2">
-              <a:shade val="50000"/>
-            </a:schemeClr>
-          </a:lnRef>
-          <a:fillRef idx="1">
-            <a:schemeClr val="accent2"/>
-          </a:fillRef>
-          <a:effectRef idx="0">
-            <a:schemeClr val="accent2"/>
-          </a:effectRef>
-          <a:fontRef idx="minor">
-            <a:schemeClr val="lt1"/>
-          </a:fontRef>
-        </p:style>
-        <p:txBody>
-          <a:bodyPr rtlCol="0" anchor="ctr"/>
-          <a:lstStyle/>
-          <a:p>
-            <a:pPr algn="ctr"/>
-            <a:endParaRPr lang="en-US"/>
-          </a:p>
-        </p:txBody>
-      </p:sp>
-      <p:sp>
-        <p:nvSpPr>
-          <p:cNvPr id="29" name="Content Placeholder 2"/>
-          <p:cNvSpPr txBox="1">
-            <a:spLocks/>
-          </p:cNvSpPr>
-          <p:nvPr/>
-        </p:nvSpPr>
-        <p:spPr>
-          <a:xfrm>
-            <a:off x="2803382" y="3718679"/>
-            <a:ext cx="5874327" cy="673228"/>
-          </a:xfrm>
-          <a:prstGeom prst="rect">
-            <a:avLst/>
-          </a:prstGeom>
-        </p:spPr>
-        <p:txBody>
-          <a:bodyPr vert="horz" lIns="91440" tIns="45720" rIns="91440" bIns="45720" rtlCol="0">
-            <a:normAutofit fontScale="62500" lnSpcReduction="20000"/>
-          </a:bodyPr>
-          <a:lstStyle>
-            <a:lvl1pPr marL="457189" indent="-457189" algn="l" defTabSz="1219170" rtl="0" eaLnBrk="1" latinLnBrk="0" hangingPunct="1">
-              <a:spcBef>
-                <a:spcPct val="20000"/>
-              </a:spcBef>
-              <a:buFont typeface="Arial" pitchFamily="34" charset="0"/>
-              <a:buChar char="•"/>
-              <a:defRPr sz="3733" kern="1200">
-                <a:solidFill>
-                  <a:schemeClr val="bg1"/>
-                </a:solidFill>
-                <a:latin typeface="+mn-lt"/>
-                <a:ea typeface="+mn-ea"/>
-                <a:cs typeface="+mn-cs"/>
-              </a:defRPr>
-            </a:lvl1pPr>
-            <a:lvl2pPr marL="990575" indent="-380990" algn="l" defTabSz="1219170" rtl="0" eaLnBrk="1" latinLnBrk="0" hangingPunct="1">
-              <a:spcBef>
-                <a:spcPct val="20000"/>
-              </a:spcBef>
-              <a:buFont typeface="Arial" pitchFamily="34" charset="0"/>
-              <a:buChar char="–"/>
-              <a:defRPr sz="3733" kern="1200">
-                <a:solidFill>
-                  <a:schemeClr val="bg1"/>
-                </a:solidFill>
-                <a:latin typeface="+mn-lt"/>
-                <a:ea typeface="+mn-ea"/>
-                <a:cs typeface="+mn-cs"/>
-              </a:defRPr>
-            </a:lvl2pPr>
-            <a:lvl3pPr marL="1523962" indent="-304792" algn="l" defTabSz="1219170" rtl="0" eaLnBrk="1" latinLnBrk="0" hangingPunct="1">
-              <a:spcBef>
-                <a:spcPct val="20000"/>
-              </a:spcBef>
-              <a:buFont typeface="Arial" pitchFamily="34" charset="0"/>
-              <a:buChar char="•"/>
-              <a:defRPr sz="3200" kern="1200">
-                <a:solidFill>
-                  <a:schemeClr val="bg1"/>
-                </a:solidFill>
-                <a:latin typeface="+mn-lt"/>
-                <a:ea typeface="+mn-ea"/>
-                <a:cs typeface="+mn-cs"/>
-              </a:defRPr>
-            </a:lvl3pPr>
-            <a:lvl4pPr marL="2133547" indent="-304792" algn="l" defTabSz="1219170" rtl="0" eaLnBrk="1" latinLnBrk="0" hangingPunct="1">
-              <a:spcBef>
-                <a:spcPct val="20000"/>
-              </a:spcBef>
-              <a:buFont typeface="Arial" pitchFamily="34" charset="0"/>
-              <a:buChar char="–"/>
-              <a:defRPr sz="2667" kern="1200">
-                <a:solidFill>
-                  <a:schemeClr val="bg1"/>
-                </a:solidFill>
-                <a:latin typeface="+mn-lt"/>
-                <a:ea typeface="+mn-ea"/>
-                <a:cs typeface="+mn-cs"/>
-              </a:defRPr>
-            </a:lvl4pPr>
-            <a:lvl5pPr marL="2743131" indent="-304792" algn="l" defTabSz="1219170" rtl="0" eaLnBrk="1" latinLnBrk="0" hangingPunct="1">
-              <a:spcBef>
-                <a:spcPct val="20000"/>
-              </a:spcBef>
-              <a:buFont typeface="Arial" pitchFamily="34" charset="0"/>
-              <a:buChar char="»"/>
-              <a:defRPr sz="2667" kern="1200">
-                <a:solidFill>
-                  <a:schemeClr val="bg1"/>
-                </a:solidFill>
-                <a:latin typeface="+mn-lt"/>
-                <a:ea typeface="+mn-ea"/>
-                <a:cs typeface="+mn-cs"/>
-              </a:defRPr>
-            </a:lvl5pPr>
-            <a:lvl6pPr marL="3352716" indent="-304792" algn="l" defTabSz="1219170" rtl="0" eaLnBrk="1" latinLnBrk="0" hangingPunct="1">
-              <a:spcBef>
-                <a:spcPct val="20000"/>
-              </a:spcBef>
-              <a:buFont typeface="Arial" pitchFamily="34" charset="0"/>
-              <a:buChar char="•"/>
-              <a:defRPr sz="2667" kern="1200">
-                <a:solidFill>
-                  <a:schemeClr val="tx1"/>
-                </a:solidFill>
-                <a:latin typeface="+mn-lt"/>
-                <a:ea typeface="+mn-ea"/>
-                <a:cs typeface="+mn-cs"/>
-              </a:defRPr>
-            </a:lvl6pPr>
-            <a:lvl7pPr marL="3962301" indent="-304792" algn="l" defTabSz="1219170" rtl="0" eaLnBrk="1" latinLnBrk="0" hangingPunct="1">
-              <a:spcBef>
-                <a:spcPct val="20000"/>
-              </a:spcBef>
-              <a:buFont typeface="Arial" pitchFamily="34" charset="0"/>
-              <a:buChar char="•"/>
-              <a:defRPr sz="2667" kern="1200">
-                <a:solidFill>
-                  <a:schemeClr val="tx1"/>
-                </a:solidFill>
-                <a:latin typeface="+mn-lt"/>
-                <a:ea typeface="+mn-ea"/>
-                <a:cs typeface="+mn-cs"/>
-              </a:defRPr>
-            </a:lvl7pPr>
-            <a:lvl8pPr marL="4571886" indent="-304792" algn="l" defTabSz="1219170" rtl="0" eaLnBrk="1" latinLnBrk="0" hangingPunct="1">
-              <a:spcBef>
-                <a:spcPct val="20000"/>
-              </a:spcBef>
-              <a:buFont typeface="Arial" pitchFamily="34" charset="0"/>
-              <a:buChar char="•"/>
-              <a:defRPr sz="2667" kern="1200">
-                <a:solidFill>
-                  <a:schemeClr val="tx1"/>
-                </a:solidFill>
-                <a:latin typeface="+mn-lt"/>
-                <a:ea typeface="+mn-ea"/>
-                <a:cs typeface="+mn-cs"/>
-              </a:defRPr>
-            </a:lvl8pPr>
-            <a:lvl9pPr marL="5181470" indent="-304792" algn="l" defTabSz="1219170" rtl="0" eaLnBrk="1" latinLnBrk="0" hangingPunct="1">
-              <a:spcBef>
-                <a:spcPct val="20000"/>
-              </a:spcBef>
-              <a:buFont typeface="Arial" pitchFamily="34" charset="0"/>
-              <a:buChar char="•"/>
-              <a:defRPr sz="2667" kern="1200">
-                <a:solidFill>
-                  <a:schemeClr val="tx1"/>
-                </a:solidFill>
-                <a:latin typeface="+mn-lt"/>
-                <a:ea typeface="+mn-ea"/>
-                <a:cs typeface="+mn-cs"/>
-              </a:defRPr>
-            </a:lvl9pPr>
-          </a:lstStyle>
-          <a:p>
-            <a:pPr marL="0" indent="0" algn="r" rtl="1">
-              <a:buFont typeface="Arial" pitchFamily="34" charset="0"/>
-              <a:buNone/>
-            </a:pPr>
-            <a:r>
-              <a:rPr lang="he-IL" dirty="0" smtClean="0"/>
-              <a:t>אז נלחץ על כפתור ליצירת מכשיר וירטואלי חדש (סימולטור)</a:t>
-            </a:r>
-            <a:endParaRPr lang="he-IL" dirty="0"/>
-          </a:p>
-        </p:txBody>
-      </p:sp>
+        </p:spPr>
+      </p:pic>
       <p:pic>
         <p:nvPicPr>
-          <p:cNvPr id="30" name="Picture 29"/>
+          <p:cNvPr id="7" name="Picture 6"/>
           <p:cNvPicPr>
             <a:picLocks noChangeAspect="1"/>
           </p:cNvPicPr>
@@ -5278,18 +5233,193 @@
         </p:blipFill>
         <p:spPr>
           <a:xfrm>
-            <a:off x="3783184" y="4435880"/>
-            <a:ext cx="3263900" cy="584200"/>
+            <a:off x="5244513" y="3945451"/>
+            <a:ext cx="4231998" cy="2828065"/>
           </a:xfrm>
           <a:prstGeom prst="rect">
             <a:avLst/>
           </a:prstGeom>
         </p:spPr>
       </p:pic>
+      <p:sp>
+        <p:nvSpPr>
+          <p:cNvPr id="8" name="Content Placeholder 2"/>
+          <p:cNvSpPr txBox="1">
+            <a:spLocks/>
+          </p:cNvSpPr>
+          <p:nvPr/>
+        </p:nvSpPr>
+        <p:spPr>
+          <a:xfrm>
+            <a:off x="-152056" y="4429766"/>
+            <a:ext cx="4645892" cy="2176176"/>
+          </a:xfrm>
+          <a:prstGeom prst="rect">
+            <a:avLst/>
+          </a:prstGeom>
+        </p:spPr>
+        <p:txBody>
+          <a:bodyPr vert="horz" lIns="91440" tIns="45720" rIns="91440" bIns="45720" rtlCol="0">
+            <a:normAutofit fontScale="85000" lnSpcReduction="10000"/>
+          </a:bodyPr>
+          <a:lstStyle>
+            <a:lvl1pPr marL="457189" indent="-457189" algn="l" defTabSz="1219170" rtl="0" eaLnBrk="1" latinLnBrk="0" hangingPunct="1">
+              <a:spcBef>
+                <a:spcPct val="20000"/>
+              </a:spcBef>
+              <a:buFont typeface="Arial" pitchFamily="34" charset="0"/>
+              <a:buChar char="•"/>
+              <a:defRPr sz="3733" kern="1200">
+                <a:solidFill>
+                  <a:schemeClr val="bg1"/>
+                </a:solidFill>
+                <a:latin typeface="+mn-lt"/>
+                <a:ea typeface="+mn-ea"/>
+                <a:cs typeface="+mn-cs"/>
+              </a:defRPr>
+            </a:lvl1pPr>
+            <a:lvl2pPr marL="990575" indent="-380990" algn="l" defTabSz="1219170" rtl="0" eaLnBrk="1" latinLnBrk="0" hangingPunct="1">
+              <a:spcBef>
+                <a:spcPct val="20000"/>
+              </a:spcBef>
+              <a:buFont typeface="Arial" pitchFamily="34" charset="0"/>
+              <a:buChar char="–"/>
+              <a:defRPr sz="3733" kern="1200">
+                <a:solidFill>
+                  <a:schemeClr val="bg1"/>
+                </a:solidFill>
+                <a:latin typeface="+mn-lt"/>
+                <a:ea typeface="+mn-ea"/>
+                <a:cs typeface="+mn-cs"/>
+              </a:defRPr>
+            </a:lvl2pPr>
+            <a:lvl3pPr marL="1523962" indent="-304792" algn="l" defTabSz="1219170" rtl="0" eaLnBrk="1" latinLnBrk="0" hangingPunct="1">
+              <a:spcBef>
+                <a:spcPct val="20000"/>
+              </a:spcBef>
+              <a:buFont typeface="Arial" pitchFamily="34" charset="0"/>
+              <a:buChar char="•"/>
+              <a:defRPr sz="3200" kern="1200">
+                <a:solidFill>
+                  <a:schemeClr val="bg1"/>
+                </a:solidFill>
+                <a:latin typeface="+mn-lt"/>
+                <a:ea typeface="+mn-ea"/>
+                <a:cs typeface="+mn-cs"/>
+              </a:defRPr>
+            </a:lvl3pPr>
+            <a:lvl4pPr marL="2133547" indent="-304792" algn="l" defTabSz="1219170" rtl="0" eaLnBrk="1" latinLnBrk="0" hangingPunct="1">
+              <a:spcBef>
+                <a:spcPct val="20000"/>
+              </a:spcBef>
+              <a:buFont typeface="Arial" pitchFamily="34" charset="0"/>
+              <a:buChar char="–"/>
+              <a:defRPr sz="2667" kern="1200">
+                <a:solidFill>
+                  <a:schemeClr val="bg1"/>
+                </a:solidFill>
+                <a:latin typeface="+mn-lt"/>
+                <a:ea typeface="+mn-ea"/>
+                <a:cs typeface="+mn-cs"/>
+              </a:defRPr>
+            </a:lvl4pPr>
+            <a:lvl5pPr marL="2743131" indent="-304792" algn="l" defTabSz="1219170" rtl="0" eaLnBrk="1" latinLnBrk="0" hangingPunct="1">
+              <a:spcBef>
+                <a:spcPct val="20000"/>
+              </a:spcBef>
+              <a:buFont typeface="Arial" pitchFamily="34" charset="0"/>
+              <a:buChar char="»"/>
+              <a:defRPr sz="2667" kern="1200">
+                <a:solidFill>
+                  <a:schemeClr val="bg1"/>
+                </a:solidFill>
+                <a:latin typeface="+mn-lt"/>
+                <a:ea typeface="+mn-ea"/>
+                <a:cs typeface="+mn-cs"/>
+              </a:defRPr>
+            </a:lvl5pPr>
+            <a:lvl6pPr marL="3352716" indent="-304792" algn="l" defTabSz="1219170" rtl="0" eaLnBrk="1" latinLnBrk="0" hangingPunct="1">
+              <a:spcBef>
+                <a:spcPct val="20000"/>
+              </a:spcBef>
+              <a:buFont typeface="Arial" pitchFamily="34" charset="0"/>
+              <a:buChar char="•"/>
+              <a:defRPr sz="2667" kern="1200">
+                <a:solidFill>
+                  <a:schemeClr val="tx1"/>
+                </a:solidFill>
+                <a:latin typeface="+mn-lt"/>
+                <a:ea typeface="+mn-ea"/>
+                <a:cs typeface="+mn-cs"/>
+              </a:defRPr>
+            </a:lvl6pPr>
+            <a:lvl7pPr marL="3962301" indent="-304792" algn="l" defTabSz="1219170" rtl="0" eaLnBrk="1" latinLnBrk="0" hangingPunct="1">
+              <a:spcBef>
+                <a:spcPct val="20000"/>
+              </a:spcBef>
+              <a:buFont typeface="Arial" pitchFamily="34" charset="0"/>
+              <a:buChar char="•"/>
+              <a:defRPr sz="2667" kern="1200">
+                <a:solidFill>
+                  <a:schemeClr val="tx1"/>
+                </a:solidFill>
+                <a:latin typeface="+mn-lt"/>
+                <a:ea typeface="+mn-ea"/>
+                <a:cs typeface="+mn-cs"/>
+              </a:defRPr>
+            </a:lvl7pPr>
+            <a:lvl8pPr marL="4571886" indent="-304792" algn="l" defTabSz="1219170" rtl="0" eaLnBrk="1" latinLnBrk="0" hangingPunct="1">
+              <a:spcBef>
+                <a:spcPct val="20000"/>
+              </a:spcBef>
+              <a:buFont typeface="Arial" pitchFamily="34" charset="0"/>
+              <a:buChar char="•"/>
+              <a:defRPr sz="2667" kern="1200">
+                <a:solidFill>
+                  <a:schemeClr val="tx1"/>
+                </a:solidFill>
+                <a:latin typeface="+mn-lt"/>
+                <a:ea typeface="+mn-ea"/>
+                <a:cs typeface="+mn-cs"/>
+              </a:defRPr>
+            </a:lvl8pPr>
+            <a:lvl9pPr marL="5181470" indent="-304792" algn="l" defTabSz="1219170" rtl="0" eaLnBrk="1" latinLnBrk="0" hangingPunct="1">
+              <a:spcBef>
+                <a:spcPct val="20000"/>
+              </a:spcBef>
+              <a:buFont typeface="Arial" pitchFamily="34" charset="0"/>
+              <a:buChar char="•"/>
+              <a:defRPr sz="2667" kern="1200">
+                <a:solidFill>
+                  <a:schemeClr val="tx1"/>
+                </a:solidFill>
+                <a:latin typeface="+mn-lt"/>
+                <a:ea typeface="+mn-ea"/>
+                <a:cs typeface="+mn-cs"/>
+              </a:defRPr>
+            </a:lvl9pPr>
+          </a:lstStyle>
+          <a:p>
+            <a:pPr marL="0" indent="0" algn="r" rtl="1">
+              <a:buFont typeface="Arial" pitchFamily="34" charset="0"/>
+              <a:buNone/>
+            </a:pPr>
+            <a:r>
+              <a:rPr lang="he-IL" dirty="0" smtClean="0"/>
+              <a:t>נחבר מערכת הפעלה. בפעם הראשונה יהיה צורך להוריד אותי. ניתן לעשות זאת ע"י לחיצת הכפתור  </a:t>
+            </a:r>
+            <a:r>
+              <a:rPr lang="en-US" dirty="0" smtClean="0"/>
+              <a:t>Download</a:t>
+            </a:r>
+            <a:endParaRPr lang="en-US" dirty="0"/>
+          </a:p>
+        </p:txBody>
+      </p:sp>
     </p:spTree>
     <p:extLst>
       <p:ext uri="{BB962C8B-B14F-4D97-AF65-F5344CB8AC3E}">
-        <p14:creationId xmlns:p14="http://schemas.microsoft.com/office/powerpoint/2010/main" val="253604450"/>
+        <p14:creationId xmlns:p14="http://schemas.microsoft.com/office/powerpoint/2010/main" val="1857532289"/>
       </p:ext>
     </p:extLst>
   </p:cSld>
@@ -5364,7 +5494,7 @@
         </p:spPr>
         <p:txBody>
           <a:bodyPr>
-            <a:normAutofit fontScale="92500" lnSpcReduction="10000"/>
+            <a:normAutofit fontScale="85000" lnSpcReduction="10000"/>
           </a:bodyPr>
           <a:lstStyle/>
           <a:p>
@@ -5373,39 +5503,24 @@
             </a:pPr>
             <a:r>
               <a:rPr lang="he-IL" dirty="0" smtClean="0"/>
-              <a:t>לסימולטור </a:t>
+              <a:t>לבסוף נבחר שם לסימולטור.</a:t>
+            </a:r>
+          </a:p>
+          <a:p>
+            <a:pPr marL="0" indent="0" algn="r" rtl="1">
+              <a:buNone/>
+            </a:pPr>
+            <a:r>
+              <a:rPr lang="he-IL" dirty="0" smtClean="0"/>
+              <a:t>בכל התהליך ניתן </a:t>
             </a:r>
             <a:r>
               <a:rPr lang="he-IL" dirty="0" err="1" smtClean="0"/>
-              <a:t>לסמטרפון</a:t>
+              <a:t>לקסטם</a:t>
             </a:r>
             <a:r>
               <a:rPr lang="he-IL" dirty="0" smtClean="0"/>
-              <a:t> נבחר את </a:t>
-            </a:r>
-            <a:r>
-              <a:rPr lang="en-US" dirty="0" smtClean="0"/>
-              <a:t>Phone</a:t>
-            </a:r>
-            <a:r>
-              <a:rPr lang="he-IL" dirty="0" smtClean="0"/>
-              <a:t> </a:t>
-            </a:r>
-            <a:r>
-              <a:rPr lang="he-IL" dirty="0" err="1" smtClean="0"/>
-              <a:t>באיזור</a:t>
-            </a:r>
-            <a:r>
-              <a:rPr lang="he-IL" dirty="0" smtClean="0"/>
-              <a:t> ה</a:t>
-            </a:r>
-            <a:r>
-              <a:rPr lang="en-US" dirty="0" smtClean="0"/>
-              <a:t>Category</a:t>
-            </a:r>
-            <a:r>
-              <a:rPr lang="he-IL" dirty="0" smtClean="0"/>
-              <a:t>. אז נבחר גדם מהאופציות הקיימות.</a:t>
+              <a:t> להגדרות ספציפיות אך לרוב ברירות המחדל מספקות.</a:t>
             </a:r>
             <a:endParaRPr lang="en-US" dirty="0"/>
           </a:p>
@@ -5495,17 +5610,196 @@
         </p:blipFill>
         <p:spPr>
           <a:xfrm>
-            <a:off x="54891" y="1342032"/>
-            <a:ext cx="4231998" cy="2834831"/>
+            <a:off x="55670" y="1342032"/>
+            <a:ext cx="4230440" cy="2834831"/>
           </a:xfrm>
           <a:prstGeom prst="rect">
             <a:avLst/>
           </a:prstGeom>
         </p:spPr>
       </p:pic>
+      <p:sp>
+        <p:nvSpPr>
+          <p:cNvPr id="8" name="Content Placeholder 2"/>
+          <p:cNvSpPr txBox="1">
+            <a:spLocks/>
+          </p:cNvSpPr>
+          <p:nvPr/>
+        </p:nvSpPr>
+        <p:spPr>
+          <a:xfrm>
+            <a:off x="-152057" y="4429766"/>
+            <a:ext cx="9628567" cy="834961"/>
+          </a:xfrm>
+          <a:prstGeom prst="rect">
+            <a:avLst/>
+          </a:prstGeom>
+        </p:spPr>
+        <p:txBody>
+          <a:bodyPr vert="horz" lIns="91440" tIns="45720" rIns="91440" bIns="45720" rtlCol="0">
+            <a:normAutofit fontScale="77500" lnSpcReduction="20000"/>
+          </a:bodyPr>
+          <a:lstStyle>
+            <a:lvl1pPr marL="457189" indent="-457189" algn="l" defTabSz="1219170" rtl="0" eaLnBrk="1" latinLnBrk="0" hangingPunct="1">
+              <a:spcBef>
+                <a:spcPct val="20000"/>
+              </a:spcBef>
+              <a:buFont typeface="Arial" pitchFamily="34" charset="0"/>
+              <a:buChar char="•"/>
+              <a:defRPr sz="3733" kern="1200">
+                <a:solidFill>
+                  <a:schemeClr val="bg1"/>
+                </a:solidFill>
+                <a:latin typeface="+mn-lt"/>
+                <a:ea typeface="+mn-ea"/>
+                <a:cs typeface="+mn-cs"/>
+              </a:defRPr>
+            </a:lvl1pPr>
+            <a:lvl2pPr marL="990575" indent="-380990" algn="l" defTabSz="1219170" rtl="0" eaLnBrk="1" latinLnBrk="0" hangingPunct="1">
+              <a:spcBef>
+                <a:spcPct val="20000"/>
+              </a:spcBef>
+              <a:buFont typeface="Arial" pitchFamily="34" charset="0"/>
+              <a:buChar char="–"/>
+              <a:defRPr sz="3733" kern="1200">
+                <a:solidFill>
+                  <a:schemeClr val="bg1"/>
+                </a:solidFill>
+                <a:latin typeface="+mn-lt"/>
+                <a:ea typeface="+mn-ea"/>
+                <a:cs typeface="+mn-cs"/>
+              </a:defRPr>
+            </a:lvl2pPr>
+            <a:lvl3pPr marL="1523962" indent="-304792" algn="l" defTabSz="1219170" rtl="0" eaLnBrk="1" latinLnBrk="0" hangingPunct="1">
+              <a:spcBef>
+                <a:spcPct val="20000"/>
+              </a:spcBef>
+              <a:buFont typeface="Arial" pitchFamily="34" charset="0"/>
+              <a:buChar char="•"/>
+              <a:defRPr sz="3200" kern="1200">
+                <a:solidFill>
+                  <a:schemeClr val="bg1"/>
+                </a:solidFill>
+                <a:latin typeface="+mn-lt"/>
+                <a:ea typeface="+mn-ea"/>
+                <a:cs typeface="+mn-cs"/>
+              </a:defRPr>
+            </a:lvl3pPr>
+            <a:lvl4pPr marL="2133547" indent="-304792" algn="l" defTabSz="1219170" rtl="0" eaLnBrk="1" latinLnBrk="0" hangingPunct="1">
+              <a:spcBef>
+                <a:spcPct val="20000"/>
+              </a:spcBef>
+              <a:buFont typeface="Arial" pitchFamily="34" charset="0"/>
+              <a:buChar char="–"/>
+              <a:defRPr sz="2667" kern="1200">
+                <a:solidFill>
+                  <a:schemeClr val="bg1"/>
+                </a:solidFill>
+                <a:latin typeface="+mn-lt"/>
+                <a:ea typeface="+mn-ea"/>
+                <a:cs typeface="+mn-cs"/>
+              </a:defRPr>
+            </a:lvl4pPr>
+            <a:lvl5pPr marL="2743131" indent="-304792" algn="l" defTabSz="1219170" rtl="0" eaLnBrk="1" latinLnBrk="0" hangingPunct="1">
+              <a:spcBef>
+                <a:spcPct val="20000"/>
+              </a:spcBef>
+              <a:buFont typeface="Arial" pitchFamily="34" charset="0"/>
+              <a:buChar char="»"/>
+              <a:defRPr sz="2667" kern="1200">
+                <a:solidFill>
+                  <a:schemeClr val="bg1"/>
+                </a:solidFill>
+                <a:latin typeface="+mn-lt"/>
+                <a:ea typeface="+mn-ea"/>
+                <a:cs typeface="+mn-cs"/>
+              </a:defRPr>
+            </a:lvl5pPr>
+            <a:lvl6pPr marL="3352716" indent="-304792" algn="l" defTabSz="1219170" rtl="0" eaLnBrk="1" latinLnBrk="0" hangingPunct="1">
+              <a:spcBef>
+                <a:spcPct val="20000"/>
+              </a:spcBef>
+              <a:buFont typeface="Arial" pitchFamily="34" charset="0"/>
+              <a:buChar char="•"/>
+              <a:defRPr sz="2667" kern="1200">
+                <a:solidFill>
+                  <a:schemeClr val="tx1"/>
+                </a:solidFill>
+                <a:latin typeface="+mn-lt"/>
+                <a:ea typeface="+mn-ea"/>
+                <a:cs typeface="+mn-cs"/>
+              </a:defRPr>
+            </a:lvl6pPr>
+            <a:lvl7pPr marL="3962301" indent="-304792" algn="l" defTabSz="1219170" rtl="0" eaLnBrk="1" latinLnBrk="0" hangingPunct="1">
+              <a:spcBef>
+                <a:spcPct val="20000"/>
+              </a:spcBef>
+              <a:buFont typeface="Arial" pitchFamily="34" charset="0"/>
+              <a:buChar char="•"/>
+              <a:defRPr sz="2667" kern="1200">
+                <a:solidFill>
+                  <a:schemeClr val="tx1"/>
+                </a:solidFill>
+                <a:latin typeface="+mn-lt"/>
+                <a:ea typeface="+mn-ea"/>
+                <a:cs typeface="+mn-cs"/>
+              </a:defRPr>
+            </a:lvl7pPr>
+            <a:lvl8pPr marL="4571886" indent="-304792" algn="l" defTabSz="1219170" rtl="0" eaLnBrk="1" latinLnBrk="0" hangingPunct="1">
+              <a:spcBef>
+                <a:spcPct val="20000"/>
+              </a:spcBef>
+              <a:buFont typeface="Arial" pitchFamily="34" charset="0"/>
+              <a:buChar char="•"/>
+              <a:defRPr sz="2667" kern="1200">
+                <a:solidFill>
+                  <a:schemeClr val="tx1"/>
+                </a:solidFill>
+                <a:latin typeface="+mn-lt"/>
+                <a:ea typeface="+mn-ea"/>
+                <a:cs typeface="+mn-cs"/>
+              </a:defRPr>
+            </a:lvl8pPr>
+            <a:lvl9pPr marL="5181470" indent="-304792" algn="l" defTabSz="1219170" rtl="0" eaLnBrk="1" latinLnBrk="0" hangingPunct="1">
+              <a:spcBef>
+                <a:spcPct val="20000"/>
+              </a:spcBef>
+              <a:buFont typeface="Arial" pitchFamily="34" charset="0"/>
+              <a:buChar char="•"/>
+              <a:defRPr sz="2667" kern="1200">
+                <a:solidFill>
+                  <a:schemeClr val="tx1"/>
+                </a:solidFill>
+                <a:latin typeface="+mn-lt"/>
+                <a:ea typeface="+mn-ea"/>
+                <a:cs typeface="+mn-cs"/>
+              </a:defRPr>
+            </a:lvl9pPr>
+          </a:lstStyle>
+          <a:p>
+            <a:pPr marL="0" indent="0" algn="r" rtl="1">
+              <a:buFont typeface="Arial" pitchFamily="34" charset="0"/>
+              <a:buNone/>
+            </a:pPr>
+            <a:r>
+              <a:rPr lang="he-IL" dirty="0" smtClean="0"/>
+              <a:t>לאחר שייווצר המכשיר </a:t>
+            </a:r>
+            <a:r>
+              <a:rPr lang="he-IL" dirty="0" err="1" smtClean="0"/>
+              <a:t>הוירטואלי</a:t>
+            </a:r>
+            <a:r>
+              <a:rPr lang="he-IL" dirty="0" smtClean="0"/>
+              <a:t> יהיה ניתן להריץ את האפליקציה ע"י בחירת המכשיר ולחיצה על כפתור ההרצה.</a:t>
+            </a:r>
+            <a:endParaRPr lang="en-US" dirty="0"/>
+          </a:p>
+        </p:txBody>
+      </p:sp>
       <p:pic>
         <p:nvPicPr>
-          <p:cNvPr id="7" name="Picture 6"/>
+          <p:cNvPr id="9" name="Content Placeholder 6"/>
           <p:cNvPicPr>
             <a:picLocks noChangeAspect="1"/>
           </p:cNvPicPr>
@@ -5525,8 +5819,8 @@
         </p:blipFill>
         <p:spPr>
           <a:xfrm>
-            <a:off x="5244513" y="3945451"/>
-            <a:ext cx="4231998" cy="2828065"/>
+            <a:off x="1535835" y="5665663"/>
+            <a:ext cx="7940675" cy="384879"/>
           </a:xfrm>
           <a:prstGeom prst="rect">
             <a:avLst/>
@@ -5535,183 +5829,336 @@
       </p:pic>
       <p:sp>
         <p:nvSpPr>
-          <p:cNvPr id="8" name="Content Placeholder 2"/>
-          <p:cNvSpPr txBox="1">
-            <a:spLocks/>
-          </p:cNvSpPr>
+          <p:cNvPr id="10" name="Rectangle 9"/>
+          <p:cNvSpPr/>
           <p:nvPr/>
         </p:nvSpPr>
         <p:spPr>
           <a:xfrm>
-            <a:off x="-152056" y="4429766"/>
-            <a:ext cx="4645892" cy="2176176"/>
+            <a:off x="4687455" y="5665663"/>
+            <a:ext cx="286328" cy="325631"/>
           </a:xfrm>
           <a:prstGeom prst="rect">
             <a:avLst/>
           </a:prstGeom>
-        </p:spPr>
-        <p:txBody>
-          <a:bodyPr vert="horz" lIns="91440" tIns="45720" rIns="91440" bIns="45720" rtlCol="0">
-            <a:normAutofit fontScale="85000" lnSpcReduction="10000"/>
+          <a:noFill/>
+          <a:ln>
+            <a:solidFill>
+              <a:schemeClr val="accent2"/>
+            </a:solidFill>
+          </a:ln>
+        </p:spPr>
+        <p:style>
+          <a:lnRef idx="2">
+            <a:schemeClr val="accent2">
+              <a:shade val="50000"/>
+            </a:schemeClr>
+          </a:lnRef>
+          <a:fillRef idx="1">
+            <a:schemeClr val="accent2"/>
+          </a:fillRef>
+          <a:effectRef idx="0">
+            <a:schemeClr val="accent2"/>
+          </a:effectRef>
+          <a:fontRef idx="minor">
+            <a:schemeClr val="lt1"/>
+          </a:fontRef>
+        </p:style>
+        <p:txBody>
+          <a:bodyPr rtlCol="0" anchor="ctr"/>
+          <a:lstStyle/>
+          <a:p>
+            <a:pPr algn="ctr"/>
+            <a:endParaRPr lang="en-US"/>
+          </a:p>
+        </p:txBody>
+      </p:sp>
+      <p:sp>
+        <p:nvSpPr>
+          <p:cNvPr id="11" name="Rectangle 10"/>
+          <p:cNvSpPr/>
+          <p:nvPr/>
+        </p:nvSpPr>
+        <p:spPr>
+          <a:xfrm>
+            <a:off x="3001818" y="5665664"/>
+            <a:ext cx="1616364" cy="355254"/>
+          </a:xfrm>
+          <a:prstGeom prst="rect">
+            <a:avLst/>
+          </a:prstGeom>
+          <a:noFill/>
+          <a:ln>
+            <a:solidFill>
+              <a:schemeClr val="accent2"/>
+            </a:solidFill>
+          </a:ln>
+        </p:spPr>
+        <p:style>
+          <a:lnRef idx="2">
+            <a:schemeClr val="accent2">
+              <a:shade val="50000"/>
+            </a:schemeClr>
+          </a:lnRef>
+          <a:fillRef idx="1">
+            <a:schemeClr val="accent2"/>
+          </a:fillRef>
+          <a:effectRef idx="0">
+            <a:schemeClr val="accent2"/>
+          </a:effectRef>
+          <a:fontRef idx="minor">
+            <a:schemeClr val="lt1"/>
+          </a:fontRef>
+        </p:style>
+        <p:txBody>
+          <a:bodyPr rtlCol="0" anchor="ctr"/>
+          <a:lstStyle/>
+          <a:p>
+            <a:pPr algn="ctr"/>
+            <a:endParaRPr lang="en-US"/>
+          </a:p>
+        </p:txBody>
+      </p:sp>
+      <p:cxnSp>
+        <p:nvCxnSpPr>
+          <p:cNvPr id="12" name="Elbow Connector 11"/>
+          <p:cNvCxnSpPr/>
+          <p:nvPr/>
+        </p:nvCxnSpPr>
+        <p:spPr>
+          <a:xfrm rot="16200000" flipV="1">
+            <a:off x="4826365" y="6054801"/>
+            <a:ext cx="220947" cy="212434"/>
+          </a:xfrm>
+          <a:prstGeom prst="bentConnector3">
+            <a:avLst>
+              <a:gd name="adj1" fmla="val 50000"/>
+            </a:avLst>
+          </a:prstGeom>
+          <a:ln w="19050">
+            <a:solidFill>
+              <a:schemeClr val="tx1"/>
+            </a:solidFill>
+          </a:ln>
+        </p:spPr>
+        <p:style>
+          <a:lnRef idx="1">
+            <a:schemeClr val="accent1"/>
+          </a:lnRef>
+          <a:fillRef idx="0">
+            <a:schemeClr val="accent1"/>
+          </a:fillRef>
+          <a:effectRef idx="0">
+            <a:schemeClr val="accent1"/>
+          </a:effectRef>
+          <a:fontRef idx="minor">
+            <a:schemeClr val="tx1"/>
+          </a:fontRef>
+        </p:style>
+      </p:cxnSp>
+      <p:sp>
+        <p:nvSpPr>
+          <p:cNvPr id="13" name="TextBox 12"/>
+          <p:cNvSpPr txBox="1"/>
+          <p:nvPr/>
+        </p:nvSpPr>
+        <p:spPr>
+          <a:xfrm>
+            <a:off x="2503055" y="6162592"/>
+            <a:ext cx="2101274" cy="692497"/>
+          </a:xfrm>
+          <a:prstGeom prst="rect">
+            <a:avLst/>
+          </a:prstGeom>
+          <a:noFill/>
+        </p:spPr>
+        <p:txBody>
+          <a:bodyPr wrap="square" rtlCol="0">
+            <a:spAutoFit/>
           </a:bodyPr>
-          <a:lstStyle>
-            <a:lvl1pPr marL="457189" indent="-457189" algn="l" defTabSz="1219170" rtl="0" eaLnBrk="1" latinLnBrk="0" hangingPunct="1">
-              <a:spcBef>
-                <a:spcPct val="20000"/>
-              </a:spcBef>
-              <a:buFont typeface="Arial" pitchFamily="34" charset="0"/>
-              <a:buChar char="•"/>
-              <a:defRPr sz="3733" kern="1200">
+          <a:lstStyle/>
+          <a:p>
+            <a:pPr algn="r" rtl="1"/>
+            <a:r>
+              <a:rPr lang="he-IL" sz="1300" dirty="0" smtClean="0">
                 <a:solidFill>
                   <a:schemeClr val="bg1"/>
                 </a:solidFill>
-                <a:latin typeface="+mn-lt"/>
-                <a:ea typeface="+mn-ea"/>
-                <a:cs typeface="+mn-cs"/>
-              </a:defRPr>
-            </a:lvl1pPr>
-            <a:lvl2pPr marL="990575" indent="-380990" algn="l" defTabSz="1219170" rtl="0" eaLnBrk="1" latinLnBrk="0" hangingPunct="1">
-              <a:spcBef>
-                <a:spcPct val="20000"/>
-              </a:spcBef>
-              <a:buFont typeface="Arial" pitchFamily="34" charset="0"/>
-              <a:buChar char="–"/>
-              <a:defRPr sz="3733" kern="1200">
+              </a:rPr>
+              <a:t>בחירת כשיר להרצה. אם נשאיר על ברירת המחדל, האופציות השונות יקפצו</a:t>
+            </a:r>
+            <a:endParaRPr lang="en-US" sz="1300" dirty="0">
+              <a:solidFill>
+                <a:schemeClr val="bg1"/>
+              </a:solidFill>
+            </a:endParaRPr>
+          </a:p>
+        </p:txBody>
+      </p:sp>
+      <p:cxnSp>
+        <p:nvCxnSpPr>
+          <p:cNvPr id="17" name="Straight Connector 16"/>
+          <p:cNvCxnSpPr/>
+          <p:nvPr/>
+        </p:nvCxnSpPr>
+        <p:spPr>
+          <a:xfrm flipH="1" flipV="1">
+            <a:off x="3722255" y="5991068"/>
+            <a:ext cx="1" cy="207251"/>
+          </a:xfrm>
+          <a:prstGeom prst="line">
+            <a:avLst/>
+          </a:prstGeom>
+          <a:ln w="19050">
+            <a:solidFill>
+              <a:schemeClr val="tx1"/>
+            </a:solidFill>
+          </a:ln>
+        </p:spPr>
+        <p:style>
+          <a:lnRef idx="1">
+            <a:schemeClr val="accent1"/>
+          </a:lnRef>
+          <a:fillRef idx="0">
+            <a:schemeClr val="accent1"/>
+          </a:fillRef>
+          <a:effectRef idx="0">
+            <a:schemeClr val="accent1"/>
+          </a:effectRef>
+          <a:fontRef idx="minor">
+            <a:schemeClr val="tx1"/>
+          </a:fontRef>
+        </p:style>
+      </p:cxnSp>
+      <p:sp>
+        <p:nvSpPr>
+          <p:cNvPr id="24" name="TextBox 23"/>
+          <p:cNvSpPr txBox="1"/>
+          <p:nvPr/>
+        </p:nvSpPr>
+        <p:spPr>
+          <a:xfrm>
+            <a:off x="4645672" y="6262618"/>
+            <a:ext cx="656221" cy="492443"/>
+          </a:xfrm>
+          <a:prstGeom prst="rect">
+            <a:avLst/>
+          </a:prstGeom>
+          <a:noFill/>
+        </p:spPr>
+        <p:txBody>
+          <a:bodyPr wrap="square" rtlCol="0">
+            <a:spAutoFit/>
+          </a:bodyPr>
+          <a:lstStyle/>
+          <a:p>
+            <a:pPr algn="r" rtl="1"/>
+            <a:r>
+              <a:rPr lang="he-IL" sz="1300" smtClean="0">
                 <a:solidFill>
                   <a:schemeClr val="bg1"/>
                 </a:solidFill>
-                <a:latin typeface="+mn-lt"/>
-                <a:ea typeface="+mn-ea"/>
-                <a:cs typeface="+mn-cs"/>
-              </a:defRPr>
-            </a:lvl2pPr>
-            <a:lvl3pPr marL="1523962" indent="-304792" algn="l" defTabSz="1219170" rtl="0" eaLnBrk="1" latinLnBrk="0" hangingPunct="1">
-              <a:spcBef>
-                <a:spcPct val="20000"/>
-              </a:spcBef>
-              <a:buFont typeface="Arial" pitchFamily="34" charset="0"/>
-              <a:buChar char="•"/>
-              <a:defRPr sz="3200" kern="1200">
+              </a:rPr>
+              <a:t>כפתור ההרצה</a:t>
+            </a:r>
+            <a:endParaRPr lang="en-US" sz="1300" dirty="0">
+              <a:solidFill>
+                <a:schemeClr val="bg1"/>
+              </a:solidFill>
+            </a:endParaRPr>
+          </a:p>
+        </p:txBody>
+      </p:sp>
+      <p:cxnSp>
+        <p:nvCxnSpPr>
+          <p:cNvPr id="25" name="Elbow Connector 24"/>
+          <p:cNvCxnSpPr>
+            <a:stCxn id="26" idx="0"/>
+          </p:cNvCxnSpPr>
+          <p:nvPr/>
+        </p:nvCxnSpPr>
+        <p:spPr>
+          <a:xfrm rot="16200000" flipV="1">
+            <a:off x="5738284" y="6120126"/>
+            <a:ext cx="258117" cy="1"/>
+          </a:xfrm>
+          <a:prstGeom prst="bentConnector3">
+            <a:avLst>
+              <a:gd name="adj1" fmla="val 50000"/>
+            </a:avLst>
+          </a:prstGeom>
+          <a:ln w="19050">
+            <a:solidFill>
+              <a:schemeClr val="tx1"/>
+            </a:solidFill>
+          </a:ln>
+        </p:spPr>
+        <p:style>
+          <a:lnRef idx="1">
+            <a:schemeClr val="accent1"/>
+          </a:lnRef>
+          <a:fillRef idx="0">
+            <a:schemeClr val="accent1"/>
+          </a:fillRef>
+          <a:effectRef idx="0">
+            <a:schemeClr val="accent1"/>
+          </a:effectRef>
+          <a:fontRef idx="minor">
+            <a:schemeClr val="tx1"/>
+          </a:fontRef>
+        </p:style>
+      </p:cxnSp>
+      <p:sp>
+        <p:nvSpPr>
+          <p:cNvPr id="26" name="TextBox 25"/>
+          <p:cNvSpPr txBox="1"/>
+          <p:nvPr/>
+        </p:nvSpPr>
+        <p:spPr>
+          <a:xfrm>
+            <a:off x="5539231" y="6249185"/>
+            <a:ext cx="656221" cy="492443"/>
+          </a:xfrm>
+          <a:prstGeom prst="rect">
+            <a:avLst/>
+          </a:prstGeom>
+          <a:noFill/>
+        </p:spPr>
+        <p:txBody>
+          <a:bodyPr wrap="square" rtlCol="0">
+            <a:spAutoFit/>
+          </a:bodyPr>
+          <a:lstStyle/>
+          <a:p>
+            <a:pPr algn="r" rtl="1"/>
+            <a:r>
+              <a:rPr lang="he-IL" sz="1300" dirty="0" smtClean="0">
                 <a:solidFill>
                   <a:schemeClr val="bg1"/>
                 </a:solidFill>
-                <a:latin typeface="+mn-lt"/>
-                <a:ea typeface="+mn-ea"/>
-                <a:cs typeface="+mn-cs"/>
-              </a:defRPr>
-            </a:lvl3pPr>
-            <a:lvl4pPr marL="2133547" indent="-304792" algn="l" defTabSz="1219170" rtl="0" eaLnBrk="1" latinLnBrk="0" hangingPunct="1">
-              <a:spcBef>
-                <a:spcPct val="20000"/>
-              </a:spcBef>
-              <a:buFont typeface="Arial" pitchFamily="34" charset="0"/>
-              <a:buChar char="–"/>
-              <a:defRPr sz="2667" kern="1200">
+              </a:rPr>
+              <a:t>כפתור </a:t>
+            </a:r>
+            <a:r>
+              <a:rPr lang="he-IL" sz="1300" dirty="0" err="1" smtClean="0">
                 <a:solidFill>
                   <a:schemeClr val="bg1"/>
                 </a:solidFill>
-                <a:latin typeface="+mn-lt"/>
-                <a:ea typeface="+mn-ea"/>
-                <a:cs typeface="+mn-cs"/>
-              </a:defRPr>
-            </a:lvl4pPr>
-            <a:lvl5pPr marL="2743131" indent="-304792" algn="l" defTabSz="1219170" rtl="0" eaLnBrk="1" latinLnBrk="0" hangingPunct="1">
-              <a:spcBef>
-                <a:spcPct val="20000"/>
-              </a:spcBef>
-              <a:buFont typeface="Arial" pitchFamily="34" charset="0"/>
-              <a:buChar char="»"/>
-              <a:defRPr sz="2667" kern="1200">
-                <a:solidFill>
-                  <a:schemeClr val="bg1"/>
-                </a:solidFill>
-                <a:latin typeface="+mn-lt"/>
-                <a:ea typeface="+mn-ea"/>
-                <a:cs typeface="+mn-cs"/>
-              </a:defRPr>
-            </a:lvl5pPr>
-            <a:lvl6pPr marL="3352716" indent="-304792" algn="l" defTabSz="1219170" rtl="0" eaLnBrk="1" latinLnBrk="0" hangingPunct="1">
-              <a:spcBef>
-                <a:spcPct val="20000"/>
-              </a:spcBef>
-              <a:buFont typeface="Arial" pitchFamily="34" charset="0"/>
-              <a:buChar char="•"/>
-              <a:defRPr sz="2667" kern="1200">
-                <a:solidFill>
-                  <a:schemeClr val="tx1"/>
-                </a:solidFill>
-                <a:latin typeface="+mn-lt"/>
-                <a:ea typeface="+mn-ea"/>
-                <a:cs typeface="+mn-cs"/>
-              </a:defRPr>
-            </a:lvl6pPr>
-            <a:lvl7pPr marL="3962301" indent="-304792" algn="l" defTabSz="1219170" rtl="0" eaLnBrk="1" latinLnBrk="0" hangingPunct="1">
-              <a:spcBef>
-                <a:spcPct val="20000"/>
-              </a:spcBef>
-              <a:buFont typeface="Arial" pitchFamily="34" charset="0"/>
-              <a:buChar char="•"/>
-              <a:defRPr sz="2667" kern="1200">
-                <a:solidFill>
-                  <a:schemeClr val="tx1"/>
-                </a:solidFill>
-                <a:latin typeface="+mn-lt"/>
-                <a:ea typeface="+mn-ea"/>
-                <a:cs typeface="+mn-cs"/>
-              </a:defRPr>
-            </a:lvl7pPr>
-            <a:lvl8pPr marL="4571886" indent="-304792" algn="l" defTabSz="1219170" rtl="0" eaLnBrk="1" latinLnBrk="0" hangingPunct="1">
-              <a:spcBef>
-                <a:spcPct val="20000"/>
-              </a:spcBef>
-              <a:buFont typeface="Arial" pitchFamily="34" charset="0"/>
-              <a:buChar char="•"/>
-              <a:defRPr sz="2667" kern="1200">
-                <a:solidFill>
-                  <a:schemeClr val="tx1"/>
-                </a:solidFill>
-                <a:latin typeface="+mn-lt"/>
-                <a:ea typeface="+mn-ea"/>
-                <a:cs typeface="+mn-cs"/>
-              </a:defRPr>
-            </a:lvl8pPr>
-            <a:lvl9pPr marL="5181470" indent="-304792" algn="l" defTabSz="1219170" rtl="0" eaLnBrk="1" latinLnBrk="0" hangingPunct="1">
-              <a:spcBef>
-                <a:spcPct val="20000"/>
-              </a:spcBef>
-              <a:buFont typeface="Arial" pitchFamily="34" charset="0"/>
-              <a:buChar char="•"/>
-              <a:defRPr sz="2667" kern="1200">
-                <a:solidFill>
-                  <a:schemeClr val="tx1"/>
-                </a:solidFill>
-                <a:latin typeface="+mn-lt"/>
-                <a:ea typeface="+mn-ea"/>
-                <a:cs typeface="+mn-cs"/>
-              </a:defRPr>
-            </a:lvl9pPr>
-          </a:lstStyle>
-          <a:p>
-            <a:pPr marL="0" indent="0" algn="r" rtl="1">
-              <a:buFont typeface="Arial" pitchFamily="34" charset="0"/>
-              <a:buNone/>
-            </a:pPr>
-            <a:r>
-              <a:rPr lang="he-IL" dirty="0" smtClean="0"/>
-              <a:t>נחבר מערכת הפעלה. בפעם הראשונה יהיה צורך להוריד אותי. ניתן לעשות זאת ע"י לחיצת הכפתור  </a:t>
-            </a:r>
-            <a:r>
-              <a:rPr lang="en-US" dirty="0" smtClean="0"/>
-              <a:t>Download</a:t>
-            </a:r>
-            <a:endParaRPr lang="en-US" dirty="0"/>
+              </a:rPr>
+              <a:t>דיבאג</a:t>
+            </a:r>
+            <a:endParaRPr lang="en-US" sz="1300" dirty="0">
+              <a:solidFill>
+                <a:schemeClr val="bg1"/>
+              </a:solidFill>
+            </a:endParaRPr>
           </a:p>
         </p:txBody>
       </p:sp>
     </p:spTree>
     <p:extLst>
       <p:ext uri="{BB962C8B-B14F-4D97-AF65-F5344CB8AC3E}">
-        <p14:creationId xmlns:p14="http://schemas.microsoft.com/office/powerpoint/2010/main" val="1857532289"/>
+        <p14:creationId xmlns:p14="http://schemas.microsoft.com/office/powerpoint/2010/main" val="2013889396"/>
       </p:ext>
     </p:extLst>
   </p:cSld>
@@ -5780,13 +6227,13 @@
         </p:nvSpPr>
         <p:spPr>
           <a:xfrm>
-            <a:off x="4830619" y="1852654"/>
-            <a:ext cx="4645892" cy="2176176"/>
+            <a:off x="4756727" y="2063315"/>
+            <a:ext cx="4719783" cy="3827710"/>
           </a:xfrm>
         </p:spPr>
         <p:txBody>
           <a:bodyPr>
-            <a:normAutofit fontScale="85000" lnSpcReduction="10000"/>
+            <a:normAutofit/>
           </a:bodyPr>
           <a:lstStyle/>
           <a:p>
@@ -5795,24 +6242,7 @@
             </a:pPr>
             <a:r>
               <a:rPr lang="he-IL" dirty="0" smtClean="0"/>
-              <a:t>לבסוף נבחר שם לסימולטור.</a:t>
-            </a:r>
-          </a:p>
-          <a:p>
-            <a:pPr marL="0" indent="0" algn="r" rtl="1">
-              <a:buNone/>
-            </a:pPr>
-            <a:r>
-              <a:rPr lang="he-IL" dirty="0" smtClean="0"/>
-              <a:t>בכל התהליך ניתן </a:t>
-            </a:r>
-            <a:r>
-              <a:rPr lang="he-IL" dirty="0" err="1" smtClean="0"/>
-              <a:t>לקסטם</a:t>
-            </a:r>
-            <a:r>
-              <a:rPr lang="he-IL" dirty="0" smtClean="0"/>
-              <a:t> להגדרות ספציפיות אך לרוב ברירות המחדל מספקות.</a:t>
+              <a:t>לאחר שייפתח הסימולטור, האפליקציה אוטומטית יתוקן עליו ויורץ.</a:t>
             </a:r>
             <a:endParaRPr lang="en-US" dirty="0"/>
           </a:p>
@@ -5870,7 +6300,15 @@
                   <a:srgbClr val="FFE701"/>
                 </a:solidFill>
               </a:rPr>
-              <a:t>התקנת סימולטור</a:t>
+              <a:t>התקנת </a:t>
+            </a:r>
+            <a:r>
+              <a:rPr lang="he-IL" sz="4000" dirty="0" smtClean="0">
+                <a:solidFill>
+                  <a:srgbClr val="FFE701"/>
+                </a:solidFill>
+              </a:rPr>
+              <a:t>סימולטור</a:t>
             </a:r>
             <a:endParaRPr lang="en-US" sz="4000" dirty="0">
               <a:solidFill>
@@ -5902,555 +6340,18 @@
         </p:blipFill>
         <p:spPr>
           <a:xfrm>
-            <a:off x="55670" y="1342032"/>
-            <a:ext cx="4230440" cy="2834831"/>
+            <a:off x="598621" y="1089129"/>
+            <a:ext cx="3171421" cy="5551596"/>
           </a:xfrm>
           <a:prstGeom prst="rect">
             <a:avLst/>
           </a:prstGeom>
         </p:spPr>
       </p:pic>
-      <p:sp>
-        <p:nvSpPr>
-          <p:cNvPr id="8" name="Content Placeholder 2"/>
-          <p:cNvSpPr txBox="1">
-            <a:spLocks/>
-          </p:cNvSpPr>
-          <p:nvPr/>
-        </p:nvSpPr>
-        <p:spPr>
-          <a:xfrm>
-            <a:off x="-152057" y="4429766"/>
-            <a:ext cx="9628567" cy="834961"/>
-          </a:xfrm>
-          <a:prstGeom prst="rect">
-            <a:avLst/>
-          </a:prstGeom>
-        </p:spPr>
-        <p:txBody>
-          <a:bodyPr vert="horz" lIns="91440" tIns="45720" rIns="91440" bIns="45720" rtlCol="0">
-            <a:normAutofit fontScale="77500" lnSpcReduction="20000"/>
-          </a:bodyPr>
-          <a:lstStyle>
-            <a:lvl1pPr marL="457189" indent="-457189" algn="l" defTabSz="1219170" rtl="0" eaLnBrk="1" latinLnBrk="0" hangingPunct="1">
-              <a:spcBef>
-                <a:spcPct val="20000"/>
-              </a:spcBef>
-              <a:buFont typeface="Arial" pitchFamily="34" charset="0"/>
-              <a:buChar char="•"/>
-              <a:defRPr sz="3733" kern="1200">
-                <a:solidFill>
-                  <a:schemeClr val="bg1"/>
-                </a:solidFill>
-                <a:latin typeface="+mn-lt"/>
-                <a:ea typeface="+mn-ea"/>
-                <a:cs typeface="+mn-cs"/>
-              </a:defRPr>
-            </a:lvl1pPr>
-            <a:lvl2pPr marL="990575" indent="-380990" algn="l" defTabSz="1219170" rtl="0" eaLnBrk="1" latinLnBrk="0" hangingPunct="1">
-              <a:spcBef>
-                <a:spcPct val="20000"/>
-              </a:spcBef>
-              <a:buFont typeface="Arial" pitchFamily="34" charset="0"/>
-              <a:buChar char="–"/>
-              <a:defRPr sz="3733" kern="1200">
-                <a:solidFill>
-                  <a:schemeClr val="bg1"/>
-                </a:solidFill>
-                <a:latin typeface="+mn-lt"/>
-                <a:ea typeface="+mn-ea"/>
-                <a:cs typeface="+mn-cs"/>
-              </a:defRPr>
-            </a:lvl2pPr>
-            <a:lvl3pPr marL="1523962" indent="-304792" algn="l" defTabSz="1219170" rtl="0" eaLnBrk="1" latinLnBrk="0" hangingPunct="1">
-              <a:spcBef>
-                <a:spcPct val="20000"/>
-              </a:spcBef>
-              <a:buFont typeface="Arial" pitchFamily="34" charset="0"/>
-              <a:buChar char="•"/>
-              <a:defRPr sz="3200" kern="1200">
-                <a:solidFill>
-                  <a:schemeClr val="bg1"/>
-                </a:solidFill>
-                <a:latin typeface="+mn-lt"/>
-                <a:ea typeface="+mn-ea"/>
-                <a:cs typeface="+mn-cs"/>
-              </a:defRPr>
-            </a:lvl3pPr>
-            <a:lvl4pPr marL="2133547" indent="-304792" algn="l" defTabSz="1219170" rtl="0" eaLnBrk="1" latinLnBrk="0" hangingPunct="1">
-              <a:spcBef>
-                <a:spcPct val="20000"/>
-              </a:spcBef>
-              <a:buFont typeface="Arial" pitchFamily="34" charset="0"/>
-              <a:buChar char="–"/>
-              <a:defRPr sz="2667" kern="1200">
-                <a:solidFill>
-                  <a:schemeClr val="bg1"/>
-                </a:solidFill>
-                <a:latin typeface="+mn-lt"/>
-                <a:ea typeface="+mn-ea"/>
-                <a:cs typeface="+mn-cs"/>
-              </a:defRPr>
-            </a:lvl4pPr>
-            <a:lvl5pPr marL="2743131" indent="-304792" algn="l" defTabSz="1219170" rtl="0" eaLnBrk="1" latinLnBrk="0" hangingPunct="1">
-              <a:spcBef>
-                <a:spcPct val="20000"/>
-              </a:spcBef>
-              <a:buFont typeface="Arial" pitchFamily="34" charset="0"/>
-              <a:buChar char="»"/>
-              <a:defRPr sz="2667" kern="1200">
-                <a:solidFill>
-                  <a:schemeClr val="bg1"/>
-                </a:solidFill>
-                <a:latin typeface="+mn-lt"/>
-                <a:ea typeface="+mn-ea"/>
-                <a:cs typeface="+mn-cs"/>
-              </a:defRPr>
-            </a:lvl5pPr>
-            <a:lvl6pPr marL="3352716" indent="-304792" algn="l" defTabSz="1219170" rtl="0" eaLnBrk="1" latinLnBrk="0" hangingPunct="1">
-              <a:spcBef>
-                <a:spcPct val="20000"/>
-              </a:spcBef>
-              <a:buFont typeface="Arial" pitchFamily="34" charset="0"/>
-              <a:buChar char="•"/>
-              <a:defRPr sz="2667" kern="1200">
-                <a:solidFill>
-                  <a:schemeClr val="tx1"/>
-                </a:solidFill>
-                <a:latin typeface="+mn-lt"/>
-                <a:ea typeface="+mn-ea"/>
-                <a:cs typeface="+mn-cs"/>
-              </a:defRPr>
-            </a:lvl6pPr>
-            <a:lvl7pPr marL="3962301" indent="-304792" algn="l" defTabSz="1219170" rtl="0" eaLnBrk="1" latinLnBrk="0" hangingPunct="1">
-              <a:spcBef>
-                <a:spcPct val="20000"/>
-              </a:spcBef>
-              <a:buFont typeface="Arial" pitchFamily="34" charset="0"/>
-              <a:buChar char="•"/>
-              <a:defRPr sz="2667" kern="1200">
-                <a:solidFill>
-                  <a:schemeClr val="tx1"/>
-                </a:solidFill>
-                <a:latin typeface="+mn-lt"/>
-                <a:ea typeface="+mn-ea"/>
-                <a:cs typeface="+mn-cs"/>
-              </a:defRPr>
-            </a:lvl7pPr>
-            <a:lvl8pPr marL="4571886" indent="-304792" algn="l" defTabSz="1219170" rtl="0" eaLnBrk="1" latinLnBrk="0" hangingPunct="1">
-              <a:spcBef>
-                <a:spcPct val="20000"/>
-              </a:spcBef>
-              <a:buFont typeface="Arial" pitchFamily="34" charset="0"/>
-              <a:buChar char="•"/>
-              <a:defRPr sz="2667" kern="1200">
-                <a:solidFill>
-                  <a:schemeClr val="tx1"/>
-                </a:solidFill>
-                <a:latin typeface="+mn-lt"/>
-                <a:ea typeface="+mn-ea"/>
-                <a:cs typeface="+mn-cs"/>
-              </a:defRPr>
-            </a:lvl8pPr>
-            <a:lvl9pPr marL="5181470" indent="-304792" algn="l" defTabSz="1219170" rtl="0" eaLnBrk="1" latinLnBrk="0" hangingPunct="1">
-              <a:spcBef>
-                <a:spcPct val="20000"/>
-              </a:spcBef>
-              <a:buFont typeface="Arial" pitchFamily="34" charset="0"/>
-              <a:buChar char="•"/>
-              <a:defRPr sz="2667" kern="1200">
-                <a:solidFill>
-                  <a:schemeClr val="tx1"/>
-                </a:solidFill>
-                <a:latin typeface="+mn-lt"/>
-                <a:ea typeface="+mn-ea"/>
-                <a:cs typeface="+mn-cs"/>
-              </a:defRPr>
-            </a:lvl9pPr>
-          </a:lstStyle>
-          <a:p>
-            <a:pPr marL="0" indent="0" algn="r" rtl="1">
-              <a:buFont typeface="Arial" pitchFamily="34" charset="0"/>
-              <a:buNone/>
-            </a:pPr>
-            <a:r>
-              <a:rPr lang="he-IL" dirty="0" smtClean="0"/>
-              <a:t>לאחר שייווצר המכשיר </a:t>
-            </a:r>
-            <a:r>
-              <a:rPr lang="he-IL" dirty="0" err="1" smtClean="0"/>
-              <a:t>הוירטואלי</a:t>
-            </a:r>
-            <a:r>
-              <a:rPr lang="he-IL" dirty="0" smtClean="0"/>
-              <a:t> יהיה ניתן להריץ את האפליקציה ע"י בחירת המכשיר ולחיצה על כפתור ההרצה.</a:t>
-            </a:r>
-            <a:endParaRPr lang="en-US" dirty="0"/>
-          </a:p>
-        </p:txBody>
-      </p:sp>
-      <p:pic>
-        <p:nvPicPr>
-          <p:cNvPr id="9" name="Content Placeholder 6"/>
-          <p:cNvPicPr>
-            <a:picLocks noChangeAspect="1"/>
-          </p:cNvPicPr>
-          <p:nvPr/>
-        </p:nvPicPr>
-        <p:blipFill>
-          <a:blip r:embed="rId3">
-            <a:extLst>
-              <a:ext uri="{28A0092B-C50C-407E-A947-70E740481C1C}">
-                <a14:useLocalDpi xmlns:a14="http://schemas.microsoft.com/office/drawing/2010/main" val="0"/>
-              </a:ext>
-            </a:extLst>
-          </a:blip>
-          <a:stretch>
-            <a:fillRect/>
-          </a:stretch>
-        </p:blipFill>
-        <p:spPr>
-          <a:xfrm>
-            <a:off x="1535835" y="5665663"/>
-            <a:ext cx="7940675" cy="384879"/>
-          </a:xfrm>
-          <a:prstGeom prst="rect">
-            <a:avLst/>
-          </a:prstGeom>
-        </p:spPr>
-      </p:pic>
-      <p:sp>
-        <p:nvSpPr>
-          <p:cNvPr id="10" name="Rectangle 9"/>
-          <p:cNvSpPr/>
-          <p:nvPr/>
-        </p:nvSpPr>
-        <p:spPr>
-          <a:xfrm>
-            <a:off x="4687455" y="5665663"/>
-            <a:ext cx="286328" cy="325631"/>
-          </a:xfrm>
-          <a:prstGeom prst="rect">
-            <a:avLst/>
-          </a:prstGeom>
-          <a:noFill/>
-          <a:ln>
-            <a:solidFill>
-              <a:schemeClr val="accent2"/>
-            </a:solidFill>
-          </a:ln>
-        </p:spPr>
-        <p:style>
-          <a:lnRef idx="2">
-            <a:schemeClr val="accent2">
-              <a:shade val="50000"/>
-            </a:schemeClr>
-          </a:lnRef>
-          <a:fillRef idx="1">
-            <a:schemeClr val="accent2"/>
-          </a:fillRef>
-          <a:effectRef idx="0">
-            <a:schemeClr val="accent2"/>
-          </a:effectRef>
-          <a:fontRef idx="minor">
-            <a:schemeClr val="lt1"/>
-          </a:fontRef>
-        </p:style>
-        <p:txBody>
-          <a:bodyPr rtlCol="0" anchor="ctr"/>
-          <a:lstStyle/>
-          <a:p>
-            <a:pPr algn="ctr"/>
-            <a:endParaRPr lang="en-US"/>
-          </a:p>
-        </p:txBody>
-      </p:sp>
-      <p:sp>
-        <p:nvSpPr>
-          <p:cNvPr id="11" name="Rectangle 10"/>
-          <p:cNvSpPr/>
-          <p:nvPr/>
-        </p:nvSpPr>
-        <p:spPr>
-          <a:xfrm>
-            <a:off x="3001818" y="5665664"/>
-            <a:ext cx="1616364" cy="355254"/>
-          </a:xfrm>
-          <a:prstGeom prst="rect">
-            <a:avLst/>
-          </a:prstGeom>
-          <a:noFill/>
-          <a:ln>
-            <a:solidFill>
-              <a:schemeClr val="accent2"/>
-            </a:solidFill>
-          </a:ln>
-        </p:spPr>
-        <p:style>
-          <a:lnRef idx="2">
-            <a:schemeClr val="accent2">
-              <a:shade val="50000"/>
-            </a:schemeClr>
-          </a:lnRef>
-          <a:fillRef idx="1">
-            <a:schemeClr val="accent2"/>
-          </a:fillRef>
-          <a:effectRef idx="0">
-            <a:schemeClr val="accent2"/>
-          </a:effectRef>
-          <a:fontRef idx="minor">
-            <a:schemeClr val="lt1"/>
-          </a:fontRef>
-        </p:style>
-        <p:txBody>
-          <a:bodyPr rtlCol="0" anchor="ctr"/>
-          <a:lstStyle/>
-          <a:p>
-            <a:pPr algn="ctr"/>
-            <a:endParaRPr lang="en-US"/>
-          </a:p>
-        </p:txBody>
-      </p:sp>
-      <p:cxnSp>
-        <p:nvCxnSpPr>
-          <p:cNvPr id="12" name="Elbow Connector 11"/>
-          <p:cNvCxnSpPr/>
-          <p:nvPr/>
-        </p:nvCxnSpPr>
-        <p:spPr>
-          <a:xfrm rot="16200000" flipV="1">
-            <a:off x="4826365" y="6054801"/>
-            <a:ext cx="220947" cy="212434"/>
-          </a:xfrm>
-          <a:prstGeom prst="bentConnector3">
-            <a:avLst>
-              <a:gd name="adj1" fmla="val 50000"/>
-            </a:avLst>
-          </a:prstGeom>
-          <a:ln w="19050">
-            <a:solidFill>
-              <a:schemeClr val="tx1"/>
-            </a:solidFill>
-          </a:ln>
-        </p:spPr>
-        <p:style>
-          <a:lnRef idx="1">
-            <a:schemeClr val="accent1"/>
-          </a:lnRef>
-          <a:fillRef idx="0">
-            <a:schemeClr val="accent1"/>
-          </a:fillRef>
-          <a:effectRef idx="0">
-            <a:schemeClr val="accent1"/>
-          </a:effectRef>
-          <a:fontRef idx="minor">
-            <a:schemeClr val="tx1"/>
-          </a:fontRef>
-        </p:style>
-      </p:cxnSp>
-      <p:sp>
-        <p:nvSpPr>
-          <p:cNvPr id="13" name="TextBox 12"/>
-          <p:cNvSpPr txBox="1"/>
-          <p:nvPr/>
-        </p:nvSpPr>
-        <p:spPr>
-          <a:xfrm>
-            <a:off x="2503055" y="6162592"/>
-            <a:ext cx="2101274" cy="692497"/>
-          </a:xfrm>
-          <a:prstGeom prst="rect">
-            <a:avLst/>
-          </a:prstGeom>
-          <a:noFill/>
-        </p:spPr>
-        <p:txBody>
-          <a:bodyPr wrap="square" rtlCol="0">
-            <a:spAutoFit/>
-          </a:bodyPr>
-          <a:lstStyle/>
-          <a:p>
-            <a:pPr algn="r" rtl="1"/>
-            <a:r>
-              <a:rPr lang="he-IL" sz="1300" dirty="0" smtClean="0">
-                <a:solidFill>
-                  <a:schemeClr val="bg1"/>
-                </a:solidFill>
-              </a:rPr>
-              <a:t>בחירת כשיר להרצה. אם נשאיר על ברירת המחדל, האופציות השונות יקפצו</a:t>
-            </a:r>
-            <a:endParaRPr lang="en-US" sz="1300" dirty="0">
-              <a:solidFill>
-                <a:schemeClr val="bg1"/>
-              </a:solidFill>
-            </a:endParaRPr>
-          </a:p>
-        </p:txBody>
-      </p:sp>
-      <p:cxnSp>
-        <p:nvCxnSpPr>
-          <p:cNvPr id="17" name="Straight Connector 16"/>
-          <p:cNvCxnSpPr/>
-          <p:nvPr/>
-        </p:nvCxnSpPr>
-        <p:spPr>
-          <a:xfrm flipH="1" flipV="1">
-            <a:off x="3722255" y="5991068"/>
-            <a:ext cx="1" cy="207251"/>
-          </a:xfrm>
-          <a:prstGeom prst="line">
-            <a:avLst/>
-          </a:prstGeom>
-          <a:ln w="19050">
-            <a:solidFill>
-              <a:schemeClr val="tx1"/>
-            </a:solidFill>
-          </a:ln>
-        </p:spPr>
-        <p:style>
-          <a:lnRef idx="1">
-            <a:schemeClr val="accent1"/>
-          </a:lnRef>
-          <a:fillRef idx="0">
-            <a:schemeClr val="accent1"/>
-          </a:fillRef>
-          <a:effectRef idx="0">
-            <a:schemeClr val="accent1"/>
-          </a:effectRef>
-          <a:fontRef idx="minor">
-            <a:schemeClr val="tx1"/>
-          </a:fontRef>
-        </p:style>
-      </p:cxnSp>
-      <p:sp>
-        <p:nvSpPr>
-          <p:cNvPr id="24" name="TextBox 23"/>
-          <p:cNvSpPr txBox="1"/>
-          <p:nvPr/>
-        </p:nvSpPr>
-        <p:spPr>
-          <a:xfrm>
-            <a:off x="4645672" y="6262618"/>
-            <a:ext cx="656221" cy="492443"/>
-          </a:xfrm>
-          <a:prstGeom prst="rect">
-            <a:avLst/>
-          </a:prstGeom>
-          <a:noFill/>
-        </p:spPr>
-        <p:txBody>
-          <a:bodyPr wrap="square" rtlCol="0">
-            <a:spAutoFit/>
-          </a:bodyPr>
-          <a:lstStyle/>
-          <a:p>
-            <a:pPr algn="r" rtl="1"/>
-            <a:r>
-              <a:rPr lang="he-IL" sz="1300" smtClean="0">
-                <a:solidFill>
-                  <a:schemeClr val="bg1"/>
-                </a:solidFill>
-              </a:rPr>
-              <a:t>כפתור ההרצה</a:t>
-            </a:r>
-            <a:endParaRPr lang="en-US" sz="1300" dirty="0">
-              <a:solidFill>
-                <a:schemeClr val="bg1"/>
-              </a:solidFill>
-            </a:endParaRPr>
-          </a:p>
-        </p:txBody>
-      </p:sp>
-      <p:cxnSp>
-        <p:nvCxnSpPr>
-          <p:cNvPr id="25" name="Elbow Connector 24"/>
-          <p:cNvCxnSpPr>
-            <a:stCxn id="26" idx="0"/>
-          </p:cNvCxnSpPr>
-          <p:nvPr/>
-        </p:nvCxnSpPr>
-        <p:spPr>
-          <a:xfrm rot="16200000" flipV="1">
-            <a:off x="5738284" y="6120126"/>
-            <a:ext cx="258117" cy="1"/>
-          </a:xfrm>
-          <a:prstGeom prst="bentConnector3">
-            <a:avLst>
-              <a:gd name="adj1" fmla="val 50000"/>
-            </a:avLst>
-          </a:prstGeom>
-          <a:ln w="19050">
-            <a:solidFill>
-              <a:schemeClr val="tx1"/>
-            </a:solidFill>
-          </a:ln>
-        </p:spPr>
-        <p:style>
-          <a:lnRef idx="1">
-            <a:schemeClr val="accent1"/>
-          </a:lnRef>
-          <a:fillRef idx="0">
-            <a:schemeClr val="accent1"/>
-          </a:fillRef>
-          <a:effectRef idx="0">
-            <a:schemeClr val="accent1"/>
-          </a:effectRef>
-          <a:fontRef idx="minor">
-            <a:schemeClr val="tx1"/>
-          </a:fontRef>
-        </p:style>
-      </p:cxnSp>
-      <p:sp>
-        <p:nvSpPr>
-          <p:cNvPr id="26" name="TextBox 25"/>
-          <p:cNvSpPr txBox="1"/>
-          <p:nvPr/>
-        </p:nvSpPr>
-        <p:spPr>
-          <a:xfrm>
-            <a:off x="5539231" y="6249185"/>
-            <a:ext cx="656221" cy="492443"/>
-          </a:xfrm>
-          <a:prstGeom prst="rect">
-            <a:avLst/>
-          </a:prstGeom>
-          <a:noFill/>
-        </p:spPr>
-        <p:txBody>
-          <a:bodyPr wrap="square" rtlCol="0">
-            <a:spAutoFit/>
-          </a:bodyPr>
-          <a:lstStyle/>
-          <a:p>
-            <a:pPr algn="r" rtl="1"/>
-            <a:r>
-              <a:rPr lang="he-IL" sz="1300" dirty="0" smtClean="0">
-                <a:solidFill>
-                  <a:schemeClr val="bg1"/>
-                </a:solidFill>
-              </a:rPr>
-              <a:t>כפתור </a:t>
-            </a:r>
-            <a:r>
-              <a:rPr lang="he-IL" sz="1300" dirty="0" err="1" smtClean="0">
-                <a:solidFill>
-                  <a:schemeClr val="bg1"/>
-                </a:solidFill>
-              </a:rPr>
-              <a:t>דיבאג</a:t>
-            </a:r>
-            <a:endParaRPr lang="en-US" sz="1300" dirty="0">
-              <a:solidFill>
-                <a:schemeClr val="bg1"/>
-              </a:solidFill>
-            </a:endParaRPr>
-          </a:p>
-        </p:txBody>
-      </p:sp>
     </p:spTree>
     <p:extLst>
       <p:ext uri="{BB962C8B-B14F-4D97-AF65-F5344CB8AC3E}">
-        <p14:creationId xmlns:p14="http://schemas.microsoft.com/office/powerpoint/2010/main" val="2013889396"/>
+        <p14:creationId xmlns:p14="http://schemas.microsoft.com/office/powerpoint/2010/main" val="1728174301"/>
       </p:ext>
     </p:extLst>
   </p:cSld>
@@ -6497,11 +6398,11 @@
             <a:pPr algn="r" rtl="1"/>
             <a:r>
               <a:rPr lang="he-IL" dirty="0"/>
-              <a:t>התקנת סביבת </a:t>
-            </a:r>
-            <a:r>
-              <a:rPr lang="he-IL" dirty="0" smtClean="0"/>
-              <a:t>העבודה</a:t>
+              <a:t>הרכב </a:t>
+            </a:r>
+            <a:r>
+              <a:rPr lang="he-IL" dirty="0" err="1" smtClean="0"/>
+              <a:t>הפרוייקט</a:t>
             </a:r>
             <a:endParaRPr lang="en-US" dirty="0"/>
           </a:p>
@@ -6519,8 +6420,8 @@
         </p:nvSpPr>
         <p:spPr>
           <a:xfrm>
-            <a:off x="4756727" y="2063315"/>
-            <a:ext cx="4719783" cy="3827710"/>
+            <a:off x="598621" y="1852654"/>
+            <a:ext cx="7940660" cy="4426840"/>
           </a:xfrm>
         </p:spPr>
         <p:txBody>
@@ -6529,12 +6430,67 @@
           </a:bodyPr>
           <a:lstStyle/>
           <a:p>
-            <a:pPr marL="0" indent="0" algn="r" rtl="1">
-              <a:buNone/>
-            </a:pPr>
+            <a:pPr algn="r" rtl="1"/>
             <a:r>
               <a:rPr lang="he-IL" dirty="0" smtClean="0"/>
-              <a:t>לאחר שייפתח הסימולטור, האפליקציה אוטומטית יתוקן עליו ויורץ.</a:t>
+              <a:t>אזורים חשובים ב</a:t>
+            </a:r>
+            <a:r>
+              <a:rPr lang="en-US" dirty="0" smtClean="0"/>
+              <a:t>   Android Studio </a:t>
+            </a:r>
+          </a:p>
+          <a:p>
+            <a:pPr algn="r" rtl="1"/>
+            <a:r>
+              <a:rPr lang="he-IL" dirty="0" smtClean="0"/>
+              <a:t>קובץ ה </a:t>
+            </a:r>
+            <a:r>
+              <a:rPr lang="en-US" dirty="0" err="1" smtClean="0"/>
+              <a:t>AndroidManifest</a:t>
+            </a:r>
+            <a:endParaRPr lang="en-US" dirty="0" smtClean="0"/>
+          </a:p>
+          <a:p>
+            <a:pPr algn="r" rtl="1"/>
+            <a:r>
+              <a:rPr lang="he-IL" dirty="0" smtClean="0"/>
+              <a:t>קבצי ה</a:t>
+            </a:r>
+            <a:r>
+              <a:rPr lang="en-US" dirty="0" smtClean="0"/>
+              <a:t> </a:t>
+            </a:r>
+            <a:r>
+              <a:rPr lang="en-US" dirty="0" err="1" smtClean="0"/>
+              <a:t>gradle</a:t>
+            </a:r>
+            <a:r>
+              <a:rPr lang="en-US" dirty="0" smtClean="0"/>
+              <a:t> </a:t>
+            </a:r>
+          </a:p>
+          <a:p>
+            <a:pPr algn="r" rtl="1"/>
+            <a:r>
+              <a:rPr lang="he-IL" dirty="0" smtClean="0"/>
+              <a:t>תיקיית </a:t>
+            </a:r>
+            <a:r>
+              <a:rPr lang="en-US" dirty="0" smtClean="0"/>
+              <a:t>res</a:t>
+            </a:r>
+          </a:p>
+          <a:p>
+            <a:pPr algn="r" rtl="1"/>
+            <a:r>
+              <a:rPr lang="he-IL" dirty="0" smtClean="0"/>
+              <a:t>תיקיית </a:t>
+            </a:r>
+            <a:r>
+              <a:rPr lang="en-US" dirty="0" smtClean="0"/>
+              <a:t>java</a:t>
             </a:r>
             <a:endParaRPr lang="en-US" dirty="0"/>
           </a:p>
@@ -6587,20 +6543,142 @@
           <a:p>
             <a:pPr algn="r" rtl="1"/>
             <a:r>
-              <a:rPr lang="he-IL" sz="4000" dirty="0">
+              <a:rPr lang="he-IL" sz="4000" dirty="0" smtClean="0">
                 <a:solidFill>
                   <a:srgbClr val="FFE701"/>
                 </a:solidFill>
               </a:rPr>
-              <a:t>התקנת </a:t>
-            </a:r>
+              <a:t>תוכן עניינים</a:t>
+            </a:r>
+            <a:endParaRPr lang="en-US" sz="4000" dirty="0">
+              <a:solidFill>
+                <a:srgbClr val="FFE701"/>
+              </a:solidFill>
+            </a:endParaRPr>
+          </a:p>
+        </p:txBody>
+      </p:sp>
+    </p:spTree>
+    <p:extLst>
+      <p:ext uri="{BB962C8B-B14F-4D97-AF65-F5344CB8AC3E}">
+        <p14:creationId xmlns:p14="http://schemas.microsoft.com/office/powerpoint/2010/main" val="1520901309"/>
+      </p:ext>
+    </p:extLst>
+  </p:cSld>
+  <p:clrMapOvr>
+    <a:masterClrMapping/>
+  </p:clrMapOvr>
+</p:sld>
+</file>
+
+<file path=ppt/slides/slide17.xml><?xml version="1.0" encoding="utf-8"?>
+<p:sld xmlns:a="http://schemas.openxmlformats.org/drawingml/2006/main" xmlns:r="http://schemas.openxmlformats.org/officeDocument/2006/relationships" xmlns:p="http://schemas.openxmlformats.org/presentationml/2006/main">
+  <p:cSld>
+    <p:spTree>
+      <p:nvGrpSpPr>
+        <p:cNvPr id="1" name=""/>
+        <p:cNvGrpSpPr/>
+        <p:nvPr/>
+      </p:nvGrpSpPr>
+      <p:grpSpPr>
+        <a:xfrm>
+          <a:off x="0" y="0"/>
+          <a:ext cx="0" cy="0"/>
+          <a:chOff x="0" y="0"/>
+          <a:chExt cx="0" cy="0"/>
+        </a:xfrm>
+      </p:grpSpPr>
+      <p:sp>
+        <p:nvSpPr>
+          <p:cNvPr id="2" name="Title 1"/>
+          <p:cNvSpPr>
+            <a:spLocks noGrp="1"/>
+          </p:cNvSpPr>
+          <p:nvPr>
+            <p:ph type="title"/>
+          </p:nvPr>
+        </p:nvSpPr>
+        <p:spPr/>
+        <p:txBody>
+          <a:bodyPr>
+            <a:normAutofit fontScale="90000"/>
+          </a:bodyPr>
+          <a:lstStyle/>
+          <a:p>
+            <a:pPr algn="r" rtl="1"/>
+            <a:r>
+              <a:rPr lang="he-IL" dirty="0"/>
+              <a:t>הרכב </a:t>
+            </a:r>
+            <a:r>
+              <a:rPr lang="he-IL" dirty="0" err="1"/>
+              <a:t>הפרוייקט</a:t>
+            </a:r>
+            <a:endParaRPr lang="en-US" dirty="0"/>
+          </a:p>
+        </p:txBody>
+      </p:sp>
+      <p:sp>
+        <p:nvSpPr>
+          <p:cNvPr id="4" name="Title 1"/>
+          <p:cNvSpPr txBox="1">
+            <a:spLocks/>
+          </p:cNvSpPr>
+          <p:nvPr/>
+        </p:nvSpPr>
+        <p:spPr>
+          <a:xfrm>
+            <a:off x="598621" y="1089129"/>
+            <a:ext cx="7376537" cy="763525"/>
+          </a:xfrm>
+          <a:prstGeom prst="rect">
+            <a:avLst/>
+          </a:prstGeom>
+        </p:spPr>
+        <p:txBody>
+          <a:bodyPr vert="horz" lIns="91440" tIns="45720" rIns="91440" bIns="45720" rtlCol="0" anchor="ctr">
+            <a:normAutofit fontScale="97500"/>
+          </a:bodyPr>
+          <a:lstStyle>
+            <a:lvl1pPr algn="l" defTabSz="1219170" rtl="0" eaLnBrk="1" latinLnBrk="0" hangingPunct="1">
+              <a:spcBef>
+                <a:spcPct val="0"/>
+              </a:spcBef>
+              <a:buNone/>
+              <a:defRPr sz="4800" kern="1200">
+                <a:solidFill>
+                  <a:srgbClr val="FFC000"/>
+                </a:solidFill>
+                <a:effectLst>
+                  <a:outerShdw blurRad="50800" dist="38100" dir="2700000" algn="tl" rotWithShape="0">
+                    <a:prstClr val="black">
+                      <a:alpha val="40000"/>
+                    </a:prstClr>
+                  </a:outerShdw>
+                </a:effectLst>
+                <a:latin typeface="+mj-lt"/>
+                <a:ea typeface="+mj-ea"/>
+                <a:cs typeface="+mj-cs"/>
+              </a:defRPr>
+            </a:lvl1pPr>
+          </a:lstStyle>
+          <a:p>
+            <a:pPr algn="r" rtl="1"/>
             <a:r>
               <a:rPr lang="he-IL" sz="4000" dirty="0" smtClean="0">
                 <a:solidFill>
                   <a:srgbClr val="FFE701"/>
                 </a:solidFill>
               </a:rPr>
-              <a:t>סימולטור</a:t>
+              <a:t>אזורים חשובים ב</a:t>
+            </a:r>
+            <a:r>
+              <a:rPr lang="en-US" sz="4000" dirty="0" smtClean="0">
+                <a:solidFill>
+                  <a:srgbClr val="FFE701"/>
+                </a:solidFill>
+              </a:rPr>
+              <a:t>Android Studio </a:t>
             </a:r>
             <a:endParaRPr lang="en-US" sz="4000" dirty="0">
               <a:solidFill>
@@ -6632,18 +6710,663 @@
         </p:blipFill>
         <p:spPr>
           <a:xfrm>
-            <a:off x="598621" y="1089129"/>
-            <a:ext cx="3171421" cy="5551596"/>
+            <a:off x="1292221" y="2042519"/>
+            <a:ext cx="8182664" cy="4206401"/>
           </a:xfrm>
           <a:prstGeom prst="rect">
             <a:avLst/>
           </a:prstGeom>
         </p:spPr>
       </p:pic>
+      <p:sp>
+        <p:nvSpPr>
+          <p:cNvPr id="8" name="Rectangle 7"/>
+          <p:cNvSpPr/>
+          <p:nvPr/>
+        </p:nvSpPr>
+        <p:spPr>
+          <a:xfrm>
+            <a:off x="2872506" y="2290619"/>
+            <a:ext cx="6474694" cy="2254422"/>
+          </a:xfrm>
+          <a:prstGeom prst="rect">
+            <a:avLst/>
+          </a:prstGeom>
+          <a:noFill/>
+          <a:ln>
+            <a:solidFill>
+              <a:schemeClr val="accent2"/>
+            </a:solidFill>
+          </a:ln>
+        </p:spPr>
+        <p:style>
+          <a:lnRef idx="2">
+            <a:schemeClr val="accent2">
+              <a:shade val="50000"/>
+            </a:schemeClr>
+          </a:lnRef>
+          <a:fillRef idx="1">
+            <a:schemeClr val="accent2"/>
+          </a:fillRef>
+          <a:effectRef idx="0">
+            <a:schemeClr val="accent2"/>
+          </a:effectRef>
+          <a:fontRef idx="minor">
+            <a:schemeClr val="lt1"/>
+          </a:fontRef>
+        </p:style>
+        <p:txBody>
+          <a:bodyPr rtlCol="0" anchor="ctr"/>
+          <a:lstStyle/>
+          <a:p>
+            <a:pPr algn="ctr"/>
+            <a:endParaRPr lang="en-US"/>
+          </a:p>
+        </p:txBody>
+      </p:sp>
+      <p:sp>
+        <p:nvSpPr>
+          <p:cNvPr id="10" name="TextBox 9"/>
+          <p:cNvSpPr txBox="1"/>
+          <p:nvPr/>
+        </p:nvSpPr>
+        <p:spPr>
+          <a:xfrm>
+            <a:off x="7684655" y="2567859"/>
+            <a:ext cx="1277713" cy="892552"/>
+          </a:xfrm>
+          <a:prstGeom prst="rect">
+            <a:avLst/>
+          </a:prstGeom>
+          <a:noFill/>
+        </p:spPr>
+        <p:txBody>
+          <a:bodyPr wrap="square" rtlCol="0">
+            <a:spAutoFit/>
+          </a:bodyPr>
+          <a:lstStyle/>
+          <a:p>
+            <a:pPr algn="r" rtl="1"/>
+            <a:r>
+              <a:rPr lang="he-IL" sz="1300" dirty="0" smtClean="0">
+                <a:solidFill>
+                  <a:schemeClr val="bg1"/>
+                </a:solidFill>
+              </a:rPr>
+              <a:t>החלון המרכזי בו ניתן לראות ולערוץ את קבצי </a:t>
+            </a:r>
+            <a:r>
+              <a:rPr lang="he-IL" sz="1300" dirty="0" err="1" smtClean="0">
+                <a:solidFill>
+                  <a:schemeClr val="bg1"/>
+                </a:solidFill>
+              </a:rPr>
+              <a:t>הפרוייקט</a:t>
+            </a:r>
+            <a:endParaRPr lang="en-US" sz="1300" dirty="0">
+              <a:solidFill>
+                <a:schemeClr val="bg1"/>
+              </a:solidFill>
+            </a:endParaRPr>
+          </a:p>
+        </p:txBody>
+      </p:sp>
+      <p:sp>
+        <p:nvSpPr>
+          <p:cNvPr id="11" name="Rectangle 10"/>
+          <p:cNvSpPr/>
+          <p:nvPr/>
+        </p:nvSpPr>
+        <p:spPr>
+          <a:xfrm>
+            <a:off x="1385451" y="2290619"/>
+            <a:ext cx="1487055" cy="2235199"/>
+          </a:xfrm>
+          <a:prstGeom prst="rect">
+            <a:avLst/>
+          </a:prstGeom>
+          <a:noFill/>
+          <a:ln>
+            <a:solidFill>
+              <a:schemeClr val="accent2"/>
+            </a:solidFill>
+          </a:ln>
+        </p:spPr>
+        <p:style>
+          <a:lnRef idx="2">
+            <a:schemeClr val="accent2">
+              <a:shade val="50000"/>
+            </a:schemeClr>
+          </a:lnRef>
+          <a:fillRef idx="1">
+            <a:schemeClr val="accent2"/>
+          </a:fillRef>
+          <a:effectRef idx="0">
+            <a:schemeClr val="accent2"/>
+          </a:effectRef>
+          <a:fontRef idx="minor">
+            <a:schemeClr val="lt1"/>
+          </a:fontRef>
+        </p:style>
+        <p:txBody>
+          <a:bodyPr rtlCol="0" anchor="ctr"/>
+          <a:lstStyle/>
+          <a:p>
+            <a:pPr algn="ctr"/>
+            <a:endParaRPr lang="en-US"/>
+          </a:p>
+        </p:txBody>
+      </p:sp>
+      <p:sp>
+        <p:nvSpPr>
+          <p:cNvPr id="12" name="Rectangle 11"/>
+          <p:cNvSpPr/>
+          <p:nvPr/>
+        </p:nvSpPr>
+        <p:spPr>
+          <a:xfrm>
+            <a:off x="1260000" y="2290619"/>
+            <a:ext cx="125452" cy="452581"/>
+          </a:xfrm>
+          <a:prstGeom prst="rect">
+            <a:avLst/>
+          </a:prstGeom>
+          <a:noFill/>
+          <a:ln>
+            <a:solidFill>
+              <a:schemeClr val="accent2"/>
+            </a:solidFill>
+          </a:ln>
+        </p:spPr>
+        <p:style>
+          <a:lnRef idx="2">
+            <a:schemeClr val="accent2">
+              <a:shade val="50000"/>
+            </a:schemeClr>
+          </a:lnRef>
+          <a:fillRef idx="1">
+            <a:schemeClr val="accent2"/>
+          </a:fillRef>
+          <a:effectRef idx="0">
+            <a:schemeClr val="accent2"/>
+          </a:effectRef>
+          <a:fontRef idx="minor">
+            <a:schemeClr val="lt1"/>
+          </a:fontRef>
+        </p:style>
+        <p:txBody>
+          <a:bodyPr rtlCol="0" anchor="ctr"/>
+          <a:lstStyle/>
+          <a:p>
+            <a:pPr algn="ctr"/>
+            <a:endParaRPr lang="en-US"/>
+          </a:p>
+        </p:txBody>
+      </p:sp>
+      <p:cxnSp>
+        <p:nvCxnSpPr>
+          <p:cNvPr id="13" name="Elbow Connector 12"/>
+          <p:cNvCxnSpPr>
+            <a:stCxn id="12" idx="1"/>
+          </p:cNvCxnSpPr>
+          <p:nvPr/>
+        </p:nvCxnSpPr>
+        <p:spPr>
+          <a:xfrm rot="10800000">
+            <a:off x="1017128" y="2516910"/>
+            <a:ext cx="242872" cy="1"/>
+          </a:xfrm>
+          <a:prstGeom prst="bentConnector3">
+            <a:avLst>
+              <a:gd name="adj1" fmla="val 50000"/>
+            </a:avLst>
+          </a:prstGeom>
+          <a:ln w="19050">
+            <a:solidFill>
+              <a:schemeClr val="tx1"/>
+            </a:solidFill>
+          </a:ln>
+        </p:spPr>
+        <p:style>
+          <a:lnRef idx="1">
+            <a:schemeClr val="accent1"/>
+          </a:lnRef>
+          <a:fillRef idx="0">
+            <a:schemeClr val="accent1"/>
+          </a:fillRef>
+          <a:effectRef idx="0">
+            <a:schemeClr val="accent1"/>
+          </a:effectRef>
+          <a:fontRef idx="minor">
+            <a:schemeClr val="tx1"/>
+          </a:fontRef>
+        </p:style>
+      </p:cxnSp>
+      <p:sp>
+        <p:nvSpPr>
+          <p:cNvPr id="16" name="TextBox 15"/>
+          <p:cNvSpPr txBox="1"/>
+          <p:nvPr/>
+        </p:nvSpPr>
+        <p:spPr>
+          <a:xfrm>
+            <a:off x="-64655" y="1803545"/>
+            <a:ext cx="1145307" cy="2462213"/>
+          </a:xfrm>
+          <a:prstGeom prst="rect">
+            <a:avLst/>
+          </a:prstGeom>
+          <a:noFill/>
+        </p:spPr>
+        <p:txBody>
+          <a:bodyPr wrap="square" rtlCol="0">
+            <a:spAutoFit/>
+          </a:bodyPr>
+          <a:lstStyle/>
+          <a:p>
+            <a:pPr algn="r" rtl="1"/>
+            <a:r>
+              <a:rPr lang="en-US" sz="1100" b="1" dirty="0" smtClean="0">
+                <a:solidFill>
+                  <a:schemeClr val="bg1"/>
+                </a:solidFill>
+              </a:rPr>
+              <a:t>Project Explorer</a:t>
+            </a:r>
+          </a:p>
+          <a:p>
+            <a:pPr algn="r" rtl="1"/>
+            <a:r>
+              <a:rPr lang="he-IL" sz="1100" dirty="0" smtClean="0">
+                <a:solidFill>
+                  <a:schemeClr val="bg1"/>
+                </a:solidFill>
+              </a:rPr>
+              <a:t>ניתן לבחור את צורת הצגת </a:t>
+            </a:r>
+            <a:r>
+              <a:rPr lang="he-IL" sz="1100" dirty="0" err="1" smtClean="0">
+                <a:solidFill>
+                  <a:schemeClr val="bg1"/>
+                </a:solidFill>
+              </a:rPr>
+              <a:t>הפרוייקט</a:t>
+            </a:r>
+            <a:r>
+              <a:rPr lang="he-IL" sz="1100" dirty="0" smtClean="0">
+                <a:solidFill>
+                  <a:schemeClr val="bg1"/>
+                </a:solidFill>
+              </a:rPr>
+              <a:t> (</a:t>
+            </a:r>
+            <a:r>
+              <a:rPr lang="he-IL" sz="1100" dirty="0" err="1" smtClean="0">
+                <a:solidFill>
+                  <a:schemeClr val="bg1"/>
+                </a:solidFill>
+              </a:rPr>
+              <a:t>הברירת</a:t>
+            </a:r>
+            <a:r>
+              <a:rPr lang="he-IL" sz="1100" dirty="0" smtClean="0">
+                <a:solidFill>
+                  <a:schemeClr val="bg1"/>
+                </a:solidFill>
+              </a:rPr>
+              <a:t> מחדל זה </a:t>
+            </a:r>
+            <a:r>
+              <a:rPr lang="en-US" sz="1100" dirty="0" smtClean="0">
+                <a:solidFill>
+                  <a:schemeClr val="bg1"/>
+                </a:solidFill>
+              </a:rPr>
+              <a:t>Android</a:t>
+            </a:r>
+            <a:r>
+              <a:rPr lang="he-IL" sz="1100" dirty="0" smtClean="0">
+                <a:solidFill>
+                  <a:schemeClr val="bg1"/>
+                </a:solidFill>
+              </a:rPr>
+              <a:t> שמחלק את הקבצים לצורה נוחה אך יש עוד כגון</a:t>
+            </a:r>
+            <a:r>
+              <a:rPr lang="en-US" sz="1100" dirty="0" smtClean="0">
+                <a:solidFill>
+                  <a:schemeClr val="bg1"/>
+                </a:solidFill>
+              </a:rPr>
+              <a:t> Project </a:t>
+            </a:r>
+            <a:r>
+              <a:rPr lang="he-IL" sz="1100" dirty="0" smtClean="0">
+                <a:solidFill>
+                  <a:schemeClr val="bg1"/>
+                </a:solidFill>
+              </a:rPr>
+              <a:t> שנותן תצוגה יותר </a:t>
+            </a:r>
+            <a:r>
+              <a:rPr lang="he-IL" sz="1100" dirty="0" err="1" smtClean="0">
+                <a:solidFill>
+                  <a:schemeClr val="bg1"/>
+                </a:solidFill>
+              </a:rPr>
+              <a:t>אמיתית</a:t>
+            </a:r>
+            <a:r>
+              <a:rPr lang="he-IL" sz="1100" dirty="0" smtClean="0">
+                <a:solidFill>
+                  <a:schemeClr val="bg1"/>
+                </a:solidFill>
+              </a:rPr>
+              <a:t> של </a:t>
+            </a:r>
+            <a:r>
+              <a:rPr lang="he-IL" sz="1100" dirty="0" err="1" smtClean="0">
+                <a:solidFill>
+                  <a:schemeClr val="bg1"/>
+                </a:solidFill>
+              </a:rPr>
+              <a:t>הרארכיית</a:t>
+            </a:r>
+            <a:r>
+              <a:rPr lang="he-IL" sz="1100" dirty="0" smtClean="0">
+                <a:solidFill>
+                  <a:schemeClr val="bg1"/>
+                </a:solidFill>
+              </a:rPr>
+              <a:t> הקבצים.</a:t>
+            </a:r>
+            <a:endParaRPr lang="en-US" sz="1100" dirty="0">
+              <a:solidFill>
+                <a:schemeClr val="bg1"/>
+              </a:solidFill>
+            </a:endParaRPr>
+          </a:p>
+        </p:txBody>
+      </p:sp>
+      <p:cxnSp>
+        <p:nvCxnSpPr>
+          <p:cNvPr id="18" name="Elbow Connector 17"/>
+          <p:cNvCxnSpPr>
+            <a:stCxn id="11" idx="1"/>
+            <a:endCxn id="16" idx="3"/>
+          </p:cNvCxnSpPr>
+          <p:nvPr/>
+        </p:nvCxnSpPr>
+        <p:spPr>
+          <a:xfrm rot="10800000">
+            <a:off x="1080653" y="3034653"/>
+            <a:ext cx="304799" cy="373567"/>
+          </a:xfrm>
+          <a:prstGeom prst="bentConnector3">
+            <a:avLst>
+              <a:gd name="adj1" fmla="val 50000"/>
+            </a:avLst>
+          </a:prstGeom>
+          <a:ln w="19050">
+            <a:solidFill>
+              <a:schemeClr val="tx1"/>
+            </a:solidFill>
+          </a:ln>
+        </p:spPr>
+        <p:style>
+          <a:lnRef idx="1">
+            <a:schemeClr val="accent1"/>
+          </a:lnRef>
+          <a:fillRef idx="0">
+            <a:schemeClr val="accent1"/>
+          </a:fillRef>
+          <a:effectRef idx="0">
+            <a:schemeClr val="accent1"/>
+          </a:effectRef>
+          <a:fontRef idx="minor">
+            <a:schemeClr val="tx1"/>
+          </a:fontRef>
+        </p:style>
+      </p:cxnSp>
+      <p:sp>
+        <p:nvSpPr>
+          <p:cNvPr id="25" name="Rectangle 24"/>
+          <p:cNvSpPr/>
+          <p:nvPr/>
+        </p:nvSpPr>
+        <p:spPr>
+          <a:xfrm>
+            <a:off x="2512291" y="6012873"/>
+            <a:ext cx="461819" cy="101600"/>
+          </a:xfrm>
+          <a:prstGeom prst="rect">
+            <a:avLst/>
+          </a:prstGeom>
+          <a:noFill/>
+          <a:ln>
+            <a:solidFill>
+              <a:schemeClr val="accent2"/>
+            </a:solidFill>
+          </a:ln>
+        </p:spPr>
+        <p:style>
+          <a:lnRef idx="2">
+            <a:schemeClr val="accent2">
+              <a:shade val="50000"/>
+            </a:schemeClr>
+          </a:lnRef>
+          <a:fillRef idx="1">
+            <a:schemeClr val="accent2"/>
+          </a:fillRef>
+          <a:effectRef idx="0">
+            <a:schemeClr val="accent2"/>
+          </a:effectRef>
+          <a:fontRef idx="minor">
+            <a:schemeClr val="lt1"/>
+          </a:fontRef>
+        </p:style>
+        <p:txBody>
+          <a:bodyPr rtlCol="0" anchor="ctr"/>
+          <a:lstStyle/>
+          <a:p>
+            <a:pPr algn="ctr"/>
+            <a:endParaRPr lang="en-US"/>
+          </a:p>
+        </p:txBody>
+      </p:sp>
+      <p:sp>
+        <p:nvSpPr>
+          <p:cNvPr id="26" name="Rectangle 25"/>
+          <p:cNvSpPr/>
+          <p:nvPr/>
+        </p:nvSpPr>
+        <p:spPr>
+          <a:xfrm>
+            <a:off x="1385450" y="4545041"/>
+            <a:ext cx="7961750" cy="1467832"/>
+          </a:xfrm>
+          <a:prstGeom prst="rect">
+            <a:avLst/>
+          </a:prstGeom>
+          <a:noFill/>
+          <a:ln>
+            <a:solidFill>
+              <a:schemeClr val="accent2"/>
+            </a:solidFill>
+          </a:ln>
+        </p:spPr>
+        <p:style>
+          <a:lnRef idx="2">
+            <a:schemeClr val="accent2">
+              <a:shade val="50000"/>
+            </a:schemeClr>
+          </a:lnRef>
+          <a:fillRef idx="1">
+            <a:schemeClr val="accent2"/>
+          </a:fillRef>
+          <a:effectRef idx="0">
+            <a:schemeClr val="accent2"/>
+          </a:effectRef>
+          <a:fontRef idx="minor">
+            <a:schemeClr val="lt1"/>
+          </a:fontRef>
+        </p:style>
+        <p:txBody>
+          <a:bodyPr rtlCol="0" anchor="ctr"/>
+          <a:lstStyle/>
+          <a:p>
+            <a:pPr algn="ctr"/>
+            <a:endParaRPr lang="en-US"/>
+          </a:p>
+        </p:txBody>
+      </p:sp>
+      <p:sp>
+        <p:nvSpPr>
+          <p:cNvPr id="27" name="TextBox 26"/>
+          <p:cNvSpPr txBox="1"/>
+          <p:nvPr/>
+        </p:nvSpPr>
+        <p:spPr>
+          <a:xfrm>
+            <a:off x="-64655" y="4513217"/>
+            <a:ext cx="1146438" cy="2123658"/>
+          </a:xfrm>
+          <a:prstGeom prst="rect">
+            <a:avLst/>
+          </a:prstGeom>
+          <a:noFill/>
+        </p:spPr>
+        <p:txBody>
+          <a:bodyPr wrap="square" rtlCol="0">
+            <a:spAutoFit/>
+          </a:bodyPr>
+          <a:lstStyle/>
+          <a:p>
+            <a:pPr algn="r" rtl="1"/>
+            <a:r>
+              <a:rPr lang="en-US" sz="1100" b="1" dirty="0" smtClean="0">
+                <a:solidFill>
+                  <a:schemeClr val="bg1"/>
+                </a:solidFill>
+              </a:rPr>
+              <a:t>Logcat</a:t>
+            </a:r>
+          </a:p>
+          <a:p>
+            <a:pPr algn="r" rtl="1"/>
+            <a:r>
+              <a:rPr lang="he-IL" sz="1100" dirty="0" smtClean="0">
+                <a:solidFill>
+                  <a:schemeClr val="bg1"/>
+                </a:solidFill>
+              </a:rPr>
+              <a:t>ניתן לראות את הדפסי הלוגים במכשיר שנבחר אם אופציות סינון רבות (למשל ע"י אפליקציה </a:t>
+            </a:r>
+            <a:r>
+              <a:rPr lang="he-IL" sz="1100" dirty="0" err="1" smtClean="0">
+                <a:solidFill>
+                  <a:schemeClr val="bg1"/>
+                </a:solidFill>
+              </a:rPr>
+              <a:t>מסויימת</a:t>
+            </a:r>
+            <a:r>
+              <a:rPr lang="he-IL" sz="1100" dirty="0" smtClean="0">
+                <a:solidFill>
+                  <a:schemeClr val="bg1"/>
+                </a:solidFill>
+              </a:rPr>
+              <a:t> או ע"י הלוג). חשוב לזכור שבלשונית זו נראה גם את הדפסי השגיאות.</a:t>
+            </a:r>
+            <a:endParaRPr lang="en-US" sz="1100" dirty="0" smtClean="0">
+              <a:solidFill>
+                <a:schemeClr val="bg1"/>
+              </a:solidFill>
+            </a:endParaRPr>
+          </a:p>
+        </p:txBody>
+      </p:sp>
+      <p:cxnSp>
+        <p:nvCxnSpPr>
+          <p:cNvPr id="30" name="Elbow Connector 29"/>
+          <p:cNvCxnSpPr>
+            <a:stCxn id="26" idx="1"/>
+            <a:endCxn id="27" idx="3"/>
+          </p:cNvCxnSpPr>
+          <p:nvPr/>
+        </p:nvCxnSpPr>
+        <p:spPr>
+          <a:xfrm rot="10800000" flipV="1">
+            <a:off x="1081784" y="5278956"/>
+            <a:ext cx="303667" cy="296089"/>
+          </a:xfrm>
+          <a:prstGeom prst="bentConnector3">
+            <a:avLst>
+              <a:gd name="adj1" fmla="val 50000"/>
+            </a:avLst>
+          </a:prstGeom>
+          <a:ln w="19050">
+            <a:solidFill>
+              <a:schemeClr val="tx1"/>
+            </a:solidFill>
+          </a:ln>
+        </p:spPr>
+        <p:style>
+          <a:lnRef idx="1">
+            <a:schemeClr val="accent1"/>
+          </a:lnRef>
+          <a:fillRef idx="0">
+            <a:schemeClr val="accent1"/>
+          </a:fillRef>
+          <a:effectRef idx="0">
+            <a:schemeClr val="accent1"/>
+          </a:effectRef>
+          <a:fontRef idx="minor">
+            <a:schemeClr val="tx1"/>
+          </a:fontRef>
+        </p:style>
+      </p:cxnSp>
+      <p:cxnSp>
+        <p:nvCxnSpPr>
+          <p:cNvPr id="33" name="Elbow Connector 32"/>
+          <p:cNvCxnSpPr>
+            <a:stCxn id="25" idx="2"/>
+          </p:cNvCxnSpPr>
+          <p:nvPr/>
+        </p:nvCxnSpPr>
+        <p:spPr>
+          <a:xfrm rot="5400000">
+            <a:off x="1718008" y="5413592"/>
+            <a:ext cx="324312" cy="1726074"/>
+          </a:xfrm>
+          <a:prstGeom prst="bentConnector2">
+            <a:avLst/>
+          </a:prstGeom>
+          <a:ln w="19050">
+            <a:solidFill>
+              <a:schemeClr val="tx1"/>
+            </a:solidFill>
+          </a:ln>
+        </p:spPr>
+        <p:style>
+          <a:lnRef idx="1">
+            <a:schemeClr val="accent1"/>
+          </a:lnRef>
+          <a:fillRef idx="0">
+            <a:schemeClr val="accent1"/>
+          </a:fillRef>
+          <a:effectRef idx="0">
+            <a:schemeClr val="accent1"/>
+          </a:effectRef>
+          <a:fontRef idx="minor">
+            <a:schemeClr val="tx1"/>
+          </a:fontRef>
+        </p:style>
+      </p:cxnSp>
     </p:spTree>
     <p:extLst>
       <p:ext uri="{BB962C8B-B14F-4D97-AF65-F5344CB8AC3E}">
-        <p14:creationId xmlns:p14="http://schemas.microsoft.com/office/powerpoint/2010/main" val="1728174301"/>
+        <p14:creationId xmlns:p14="http://schemas.microsoft.com/office/powerpoint/2010/main" val="1057079194"/>
       </p:ext>
     </p:extLst>
   </p:cSld>
@@ -6784,15 +7507,7 @@
                   <a:prstClr val="white"/>
                 </a:solidFill>
               </a:rPr>
-              <a:t>java, and </a:t>
-            </a:r>
-            <a:r>
-              <a:rPr lang="en-US" sz="1400" smtClean="0">
-                <a:solidFill>
-                  <a:prstClr val="white"/>
-                </a:solidFill>
-              </a:rPr>
-              <a:t>some windows like log cat]</a:t>
+              <a:t>java, and some windows like log cat]</a:t>
             </a:r>
             <a:endParaRPr lang="en-US" sz="2800" dirty="0" smtClean="0"/>
           </a:p>
@@ -6808,8 +7523,25 @@
             </a:r>
             <a:r>
               <a:rPr lang="he-IL" sz="2800" dirty="0" smtClean="0"/>
-              <a:t> באנדרואיד</a:t>
-            </a:r>
+              <a:t> </a:t>
+            </a:r>
+            <a:r>
+              <a:rPr lang="he-IL" sz="2800" dirty="0" smtClean="0"/>
+              <a:t>באנדרואיד</a:t>
+            </a:r>
+            <a:r>
+              <a:rPr lang="en-US" sz="2800" dirty="0" smtClean="0"/>
+              <a:t> </a:t>
+            </a:r>
+            <a:r>
+              <a:rPr lang="en-US" sz="1400" dirty="0" smtClean="0"/>
+              <a:t>[include simple events]</a:t>
+            </a:r>
+            <a:r>
+              <a:rPr lang="en-US" sz="2800" dirty="0" smtClean="0"/>
+              <a:t> </a:t>
+            </a:r>
+            <a:endParaRPr lang="he-IL" sz="2800" dirty="0" smtClean="0"/>
           </a:p>
           <a:p>
             <a:pPr algn="r" rtl="1"/>
@@ -7245,7 +7977,7 @@
     </p:spTree>
     <p:extLst>
       <p:ext uri="{BB962C8B-B14F-4D97-AF65-F5344CB8AC3E}">
-        <p14:creationId xmlns:p14="http://schemas.microsoft.com/office/powerpoint/2010/main" val="9956677"/>
+        <p14:creationId xmlns:p14="http://schemas.microsoft.com/office/powerpoint/2010/main" val="381732308"/>
       </p:ext>
     </p:extLst>
   </p:cSld>
@@ -7320,227 +8052,6 @@
         </p:spPr>
         <p:txBody>
           <a:bodyPr>
-            <a:normAutofit fontScale="85000" lnSpcReduction="10000"/>
-          </a:bodyPr>
-          <a:lstStyle/>
-          <a:p>
-            <a:pPr marL="0" indent="0" algn="r" rtl="1">
-              <a:buNone/>
-            </a:pPr>
-            <a:r>
-              <a:rPr lang="he-IL" dirty="0" smtClean="0"/>
-              <a:t>סביבת העבודה העיקרית בה משתמשים לפיתוח אנדרואיד הינה </a:t>
-            </a:r>
-            <a:r>
-              <a:rPr lang="en-US" dirty="0" smtClean="0"/>
-              <a:t>Android Studio</a:t>
-            </a:r>
-            <a:r>
-              <a:rPr lang="he-IL" dirty="0" smtClean="0"/>
-              <a:t> מחברת </a:t>
-            </a:r>
-            <a:r>
-              <a:rPr lang="en-US" dirty="0" err="1" smtClean="0"/>
-              <a:t>JetBrains</a:t>
-            </a:r>
-            <a:r>
-              <a:rPr lang="he-IL" dirty="0" smtClean="0"/>
-              <a:t>.</a:t>
-            </a:r>
-          </a:p>
-          <a:p>
-            <a:pPr marL="0" indent="0" algn="r" rtl="1">
-              <a:buNone/>
-            </a:pPr>
-            <a:r>
-              <a:rPr lang="he-IL" dirty="0" smtClean="0"/>
-              <a:t>זאת לא סביבת הפיתוח היחידה שהייתה בשימוש מאז תולדות פיתוח אנדרואיד לסמרטפונים. לדוגמה לפני </a:t>
-            </a:r>
-            <a:r>
-              <a:rPr lang="en-US" dirty="0" smtClean="0"/>
-              <a:t>Android Studio</a:t>
-            </a:r>
-            <a:r>
-              <a:rPr lang="he-IL" dirty="0" smtClean="0"/>
-              <a:t> היה נפוץ להשתמש ב</a:t>
-            </a:r>
-            <a:r>
-              <a:rPr lang="en-US" dirty="0" smtClean="0"/>
-              <a:t>Eclipse</a:t>
-            </a:r>
-            <a:r>
-              <a:rPr lang="he-IL" dirty="0" smtClean="0"/>
-              <a:t> עם </a:t>
-            </a:r>
-            <a:r>
-              <a:rPr lang="en-US" dirty="0" smtClean="0"/>
-              <a:t>plugins</a:t>
-            </a:r>
-            <a:r>
-              <a:rPr lang="he-IL" dirty="0" smtClean="0"/>
-              <a:t> יעודיות לפיתוח באנדרואיד.</a:t>
-            </a:r>
-          </a:p>
-          <a:p>
-            <a:pPr marL="0" indent="0" algn="r" rtl="1">
-              <a:buNone/>
-            </a:pPr>
-            <a:r>
-              <a:rPr lang="he-IL" dirty="0" smtClean="0"/>
-              <a:t>אך כבר שנים רבות </a:t>
-            </a:r>
-            <a:r>
-              <a:rPr lang="en-US" dirty="0" smtClean="0"/>
-              <a:t>Android Studio</a:t>
-            </a:r>
-            <a:r>
-              <a:rPr lang="he-IL" dirty="0" smtClean="0"/>
-              <a:t> היא הסביבה העיקרית ורישמית לפיתוח אנדרואיד.</a:t>
-            </a:r>
-            <a:endParaRPr lang="en-US" dirty="0"/>
-          </a:p>
-        </p:txBody>
-      </p:sp>
-      <p:sp>
-        <p:nvSpPr>
-          <p:cNvPr id="4" name="Title 1"/>
-          <p:cNvSpPr txBox="1">
-            <a:spLocks/>
-          </p:cNvSpPr>
-          <p:nvPr/>
-        </p:nvSpPr>
-        <p:spPr>
-          <a:xfrm>
-            <a:off x="598621" y="1089129"/>
-            <a:ext cx="7376537" cy="763525"/>
-          </a:xfrm>
-          <a:prstGeom prst="rect">
-            <a:avLst/>
-          </a:prstGeom>
-        </p:spPr>
-        <p:txBody>
-          <a:bodyPr vert="horz" lIns="91440" tIns="45720" rIns="91440" bIns="45720" rtlCol="0" anchor="ctr">
-            <a:normAutofit fontScale="97500"/>
-          </a:bodyPr>
-          <a:lstStyle>
-            <a:lvl1pPr algn="l" defTabSz="1219170" rtl="0" eaLnBrk="1" latinLnBrk="0" hangingPunct="1">
-              <a:spcBef>
-                <a:spcPct val="0"/>
-              </a:spcBef>
-              <a:buNone/>
-              <a:defRPr sz="4800" kern="1200">
-                <a:solidFill>
-                  <a:srgbClr val="FFC000"/>
-                </a:solidFill>
-                <a:effectLst>
-                  <a:outerShdw blurRad="50800" dist="38100" dir="2700000" algn="tl" rotWithShape="0">
-                    <a:prstClr val="black">
-                      <a:alpha val="40000"/>
-                    </a:prstClr>
-                  </a:outerShdw>
-                </a:effectLst>
-                <a:latin typeface="+mj-lt"/>
-                <a:ea typeface="+mj-ea"/>
-                <a:cs typeface="+mj-cs"/>
-              </a:defRPr>
-            </a:lvl1pPr>
-          </a:lstStyle>
-          <a:p>
-            <a:pPr algn="r" rtl="1"/>
-            <a:r>
-              <a:rPr lang="he-IL" sz="4000" dirty="0" smtClean="0">
-                <a:solidFill>
-                  <a:srgbClr val="FFE701"/>
-                </a:solidFill>
-              </a:rPr>
-              <a:t>הקדמה</a:t>
-            </a:r>
-            <a:endParaRPr lang="en-US" sz="4000" dirty="0">
-              <a:solidFill>
-                <a:srgbClr val="FFE701"/>
-              </a:solidFill>
-            </a:endParaRPr>
-          </a:p>
-        </p:txBody>
-      </p:sp>
-    </p:spTree>
-    <p:extLst>
-      <p:ext uri="{BB962C8B-B14F-4D97-AF65-F5344CB8AC3E}">
-        <p14:creationId xmlns:p14="http://schemas.microsoft.com/office/powerpoint/2010/main" val="381732308"/>
-      </p:ext>
-    </p:extLst>
-  </p:cSld>
-  <p:clrMapOvr>
-    <a:masterClrMapping/>
-  </p:clrMapOvr>
-</p:sld>
-</file>
-
-<file path=ppt/slides/slide7.xml><?xml version="1.0" encoding="utf-8"?>
-<p:sld xmlns:a="http://schemas.openxmlformats.org/drawingml/2006/main" xmlns:r="http://schemas.openxmlformats.org/officeDocument/2006/relationships" xmlns:p="http://schemas.openxmlformats.org/presentationml/2006/main">
-  <p:cSld>
-    <p:spTree>
-      <p:nvGrpSpPr>
-        <p:cNvPr id="1" name=""/>
-        <p:cNvGrpSpPr/>
-        <p:nvPr/>
-      </p:nvGrpSpPr>
-      <p:grpSpPr>
-        <a:xfrm>
-          <a:off x="0" y="0"/>
-          <a:ext cx="0" cy="0"/>
-          <a:chOff x="0" y="0"/>
-          <a:chExt cx="0" cy="0"/>
-        </a:xfrm>
-      </p:grpSpPr>
-      <p:sp>
-        <p:nvSpPr>
-          <p:cNvPr id="2" name="Title 1"/>
-          <p:cNvSpPr>
-            <a:spLocks noGrp="1"/>
-          </p:cNvSpPr>
-          <p:nvPr>
-            <p:ph type="title"/>
-          </p:nvPr>
-        </p:nvSpPr>
-        <p:spPr/>
-        <p:txBody>
-          <a:bodyPr>
-            <a:normAutofit fontScale="90000"/>
-          </a:bodyPr>
-          <a:lstStyle/>
-          <a:p>
-            <a:pPr algn="r" rtl="1"/>
-            <a:r>
-              <a:rPr lang="he-IL" dirty="0"/>
-              <a:t>התקנת סביבת </a:t>
-            </a:r>
-            <a:r>
-              <a:rPr lang="he-IL" dirty="0" smtClean="0"/>
-              <a:t>העבודה</a:t>
-            </a:r>
-            <a:endParaRPr lang="en-US" dirty="0"/>
-          </a:p>
-        </p:txBody>
-      </p:sp>
-      <p:sp>
-        <p:nvSpPr>
-          <p:cNvPr id="3" name="Content Placeholder 2"/>
-          <p:cNvSpPr>
-            <a:spLocks noGrp="1"/>
-          </p:cNvSpPr>
-          <p:nvPr>
-            <p:ph idx="1"/>
-          </p:nvPr>
-        </p:nvSpPr>
-        <p:spPr>
-          <a:xfrm>
-            <a:off x="598621" y="1852654"/>
-            <a:ext cx="7940660" cy="4426840"/>
-          </a:xfrm>
-        </p:spPr>
-        <p:txBody>
-          <a:bodyPr>
             <a:normAutofit lnSpcReduction="10000"/>
           </a:bodyPr>
           <a:lstStyle/>
@@ -7705,7 +8216,7 @@
 </p:sld>
 </file>
 
-<file path=ppt/slides/slide8.xml><?xml version="1.0" encoding="utf-8"?>
+<file path=ppt/slides/slide7.xml><?xml version="1.0" encoding="utf-8"?>
 <p:sld xmlns:a="http://schemas.openxmlformats.org/drawingml/2006/main" xmlns:r="http://schemas.openxmlformats.org/officeDocument/2006/relationships" xmlns:p="http://schemas.openxmlformats.org/presentationml/2006/main">
   <p:cSld>
     <p:spTree>
@@ -8472,7 +8983,7 @@
 </p:sld>
 </file>
 
-<file path=ppt/slides/slide9.xml><?xml version="1.0" encoding="utf-8"?>
+<file path=ppt/slides/slide8.xml><?xml version="1.0" encoding="utf-8"?>
 <p:sld xmlns:a="http://schemas.openxmlformats.org/drawingml/2006/main" xmlns:r="http://schemas.openxmlformats.org/officeDocument/2006/relationships" xmlns:p="http://schemas.openxmlformats.org/presentationml/2006/main">
   <p:cSld>
     <p:spTree>
@@ -8699,6 +9210,299 @@
     <p:extLst>
       <p:ext uri="{BB962C8B-B14F-4D97-AF65-F5344CB8AC3E}">
         <p14:creationId xmlns:p14="http://schemas.microsoft.com/office/powerpoint/2010/main" val="352469291"/>
+      </p:ext>
+    </p:extLst>
+  </p:cSld>
+  <p:clrMapOvr>
+    <a:masterClrMapping/>
+  </p:clrMapOvr>
+</p:sld>
+</file>
+
+<file path=ppt/slides/slide9.xml><?xml version="1.0" encoding="utf-8"?>
+<p:sld xmlns:a="http://schemas.openxmlformats.org/drawingml/2006/main" xmlns:r="http://schemas.openxmlformats.org/officeDocument/2006/relationships" xmlns:p="http://schemas.openxmlformats.org/presentationml/2006/main">
+  <p:cSld>
+    <p:spTree>
+      <p:nvGrpSpPr>
+        <p:cNvPr id="1" name=""/>
+        <p:cNvGrpSpPr/>
+        <p:nvPr/>
+      </p:nvGrpSpPr>
+      <p:grpSpPr>
+        <a:xfrm>
+          <a:off x="0" y="0"/>
+          <a:ext cx="0" cy="0"/>
+          <a:chOff x="0" y="0"/>
+          <a:chExt cx="0" cy="0"/>
+        </a:xfrm>
+      </p:grpSpPr>
+      <p:sp>
+        <p:nvSpPr>
+          <p:cNvPr id="2" name="Title 1"/>
+          <p:cNvSpPr>
+            <a:spLocks noGrp="1"/>
+          </p:cNvSpPr>
+          <p:nvPr>
+            <p:ph type="title"/>
+          </p:nvPr>
+        </p:nvSpPr>
+        <p:spPr/>
+        <p:txBody>
+          <a:bodyPr>
+            <a:normAutofit fontScale="90000"/>
+          </a:bodyPr>
+          <a:lstStyle/>
+          <a:p>
+            <a:pPr algn="r" rtl="1"/>
+            <a:r>
+              <a:rPr lang="he-IL" dirty="0"/>
+              <a:t>התקנת סביבת </a:t>
+            </a:r>
+            <a:r>
+              <a:rPr lang="he-IL" dirty="0" smtClean="0"/>
+              <a:t>העבודה</a:t>
+            </a:r>
+            <a:endParaRPr lang="en-US" dirty="0"/>
+          </a:p>
+        </p:txBody>
+      </p:sp>
+      <p:sp>
+        <p:nvSpPr>
+          <p:cNvPr id="3" name="Content Placeholder 2"/>
+          <p:cNvSpPr>
+            <a:spLocks noGrp="1"/>
+          </p:cNvSpPr>
+          <p:nvPr>
+            <p:ph idx="1"/>
+          </p:nvPr>
+        </p:nvSpPr>
+        <p:spPr>
+          <a:xfrm>
+            <a:off x="5652655" y="2063315"/>
+            <a:ext cx="3823855" cy="3827710"/>
+          </a:xfrm>
+        </p:spPr>
+        <p:txBody>
+          <a:bodyPr>
+            <a:normAutofit fontScale="40000" lnSpcReduction="20000"/>
+          </a:bodyPr>
+          <a:lstStyle/>
+          <a:p>
+            <a:pPr marL="0" indent="0" algn="r" rtl="1">
+              <a:buNone/>
+            </a:pPr>
+            <a:r>
+              <a:rPr lang="he-IL" dirty="0" smtClean="0"/>
+              <a:t>ניבחר שם ליישום ואת ה</a:t>
+            </a:r>
+            <a:r>
+              <a:rPr lang="en-US" dirty="0" smtClean="0"/>
+              <a:t>package</a:t>
+            </a:r>
+            <a:r>
+              <a:rPr lang="he-IL" dirty="0" smtClean="0"/>
+              <a:t> שלו (המוכר לנו מפיתוח בשפת </a:t>
+            </a:r>
+            <a:r>
+              <a:rPr lang="en-US" dirty="0" smtClean="0"/>
+              <a:t>Java</a:t>
+            </a:r>
+            <a:r>
+              <a:rPr lang="he-IL" dirty="0" smtClean="0"/>
+              <a:t>). בנוסף נחבר מיקום לשמירת </a:t>
+            </a:r>
+            <a:r>
+              <a:rPr lang="he-IL" dirty="0" err="1" smtClean="0"/>
+              <a:t>הפרוייקט</a:t>
+            </a:r>
+            <a:r>
+              <a:rPr lang="he-IL" dirty="0" smtClean="0"/>
+              <a:t> (ניתן להשאיר את המיקום עם ברירת המחדל).</a:t>
+            </a:r>
+            <a:endParaRPr lang="en-US" dirty="0"/>
+          </a:p>
+          <a:p>
+            <a:pPr marL="0" indent="0" algn="r" rtl="1">
+              <a:buNone/>
+            </a:pPr>
+            <a:endParaRPr lang="he-IL" dirty="0" smtClean="0"/>
+          </a:p>
+          <a:p>
+            <a:pPr marL="0" indent="0" algn="r" rtl="1">
+              <a:buNone/>
+            </a:pPr>
+            <a:r>
+              <a:rPr lang="he-IL" dirty="0" smtClean="0"/>
+              <a:t>יש צורך לבחור את שפת הפיתוח </a:t>
+            </a:r>
+            <a:r>
+              <a:rPr lang="he-IL" dirty="0" err="1" smtClean="0"/>
+              <a:t>לפרוייקט</a:t>
+            </a:r>
+            <a:r>
+              <a:rPr lang="he-IL" dirty="0" smtClean="0"/>
+              <a:t> מבין </a:t>
+            </a:r>
+            <a:r>
+              <a:rPr lang="en-US" dirty="0" smtClean="0"/>
+              <a:t>Java</a:t>
+            </a:r>
+            <a:r>
+              <a:rPr lang="he-IL" dirty="0" smtClean="0"/>
+              <a:t> ו</a:t>
+            </a:r>
+            <a:r>
+              <a:rPr lang="en-US" dirty="0" err="1" smtClean="0"/>
+              <a:t>Kotlin</a:t>
+            </a:r>
+            <a:r>
+              <a:rPr lang="en-US" dirty="0" smtClean="0"/>
+              <a:t> </a:t>
+            </a:r>
+            <a:r>
+              <a:rPr lang="he-IL" dirty="0" smtClean="0"/>
+              <a:t>. בדוגמה זו נבחר את </a:t>
+            </a:r>
+            <a:r>
+              <a:rPr lang="en-US" dirty="0" smtClean="0"/>
+              <a:t>Java</a:t>
+            </a:r>
+            <a:r>
+              <a:rPr lang="he-IL" dirty="0" smtClean="0"/>
+              <a:t>.</a:t>
+            </a:r>
+            <a:endParaRPr lang="en-US" dirty="0" smtClean="0"/>
+          </a:p>
+          <a:p>
+            <a:pPr marL="0" indent="0" algn="r" rtl="1">
+              <a:buNone/>
+            </a:pPr>
+            <a:endParaRPr lang="he-IL" dirty="0"/>
+          </a:p>
+          <a:p>
+            <a:pPr marL="0" indent="0" algn="r" rtl="1">
+              <a:buNone/>
+            </a:pPr>
+            <a:r>
+              <a:rPr lang="he-IL" dirty="0" smtClean="0"/>
+              <a:t>לבסוף נבחר את ה</a:t>
+            </a:r>
+            <a:r>
+              <a:rPr lang="en-US" dirty="0" smtClean="0"/>
+              <a:t>SDK</a:t>
+            </a:r>
+            <a:r>
+              <a:rPr lang="he-IL" dirty="0" smtClean="0"/>
+              <a:t> המינימלי שנתמוך בו. יש להשתמש בשיקול דעת בבחירת גרסה מינימלית. ככל הגרסה נמוכה יותר ניתן להגיע לקהל רחב יותר (עד גבול מסוים) אבל תמיכה בהרבה גרסאות מסרבל את פיתוח </a:t>
+            </a:r>
+            <a:r>
+              <a:rPr lang="he-IL" dirty="0" err="1" smtClean="0"/>
+              <a:t>הפרוייקט</a:t>
+            </a:r>
+            <a:r>
+              <a:rPr lang="he-IL" dirty="0" smtClean="0"/>
+              <a:t> כי במספר מקומות יש התנהגויות שונות לגרסאות שונות ופיצ'רים חדשים שאולי נרצה להשתמש בהם שאינם קיימים בגרסאות ישנות יותר.</a:t>
+            </a:r>
+            <a:endParaRPr lang="en-US" dirty="0"/>
+          </a:p>
+        </p:txBody>
+      </p:sp>
+      <p:sp>
+        <p:nvSpPr>
+          <p:cNvPr id="4" name="Title 1"/>
+          <p:cNvSpPr txBox="1">
+            <a:spLocks/>
+          </p:cNvSpPr>
+          <p:nvPr/>
+        </p:nvSpPr>
+        <p:spPr>
+          <a:xfrm>
+            <a:off x="598621" y="1089129"/>
+            <a:ext cx="7376537" cy="763525"/>
+          </a:xfrm>
+          <a:prstGeom prst="rect">
+            <a:avLst/>
+          </a:prstGeom>
+        </p:spPr>
+        <p:txBody>
+          <a:bodyPr vert="horz" lIns="91440" tIns="45720" rIns="91440" bIns="45720" rtlCol="0" anchor="ctr">
+            <a:normAutofit fontScale="97500"/>
+          </a:bodyPr>
+          <a:lstStyle>
+            <a:lvl1pPr algn="l" defTabSz="1219170" rtl="0" eaLnBrk="1" latinLnBrk="0" hangingPunct="1">
+              <a:spcBef>
+                <a:spcPct val="0"/>
+              </a:spcBef>
+              <a:buNone/>
+              <a:defRPr sz="4800" kern="1200">
+                <a:solidFill>
+                  <a:srgbClr val="FFC000"/>
+                </a:solidFill>
+                <a:effectLst>
+                  <a:outerShdw blurRad="50800" dist="38100" dir="2700000" algn="tl" rotWithShape="0">
+                    <a:prstClr val="black">
+                      <a:alpha val="40000"/>
+                    </a:prstClr>
+                  </a:outerShdw>
+                </a:effectLst>
+                <a:latin typeface="+mj-lt"/>
+                <a:ea typeface="+mj-ea"/>
+                <a:cs typeface="+mj-cs"/>
+              </a:defRPr>
+            </a:lvl1pPr>
+          </a:lstStyle>
+          <a:p>
+            <a:pPr algn="r" rtl="1"/>
+            <a:r>
+              <a:rPr lang="he-IL" sz="4000" dirty="0">
+                <a:solidFill>
+                  <a:srgbClr val="FFE701"/>
+                </a:solidFill>
+              </a:rPr>
+              <a:t>פתיחת הסביבה</a:t>
+            </a:r>
+            <a:endParaRPr lang="en-US" sz="4000" dirty="0">
+              <a:solidFill>
+                <a:srgbClr val="FFE701"/>
+              </a:solidFill>
+            </a:endParaRPr>
+          </a:p>
+        </p:txBody>
+      </p:sp>
+      <p:pic>
+        <p:nvPicPr>
+          <p:cNvPr id="5" name="Picture 4"/>
+          <p:cNvPicPr>
+            <a:picLocks noChangeAspect="1"/>
+          </p:cNvPicPr>
+          <p:nvPr/>
+        </p:nvPicPr>
+        <p:blipFill>
+          <a:blip r:embed="rId2">
+            <a:extLst>
+              <a:ext uri="{28A0092B-C50C-407E-A947-70E740481C1C}">
+                <a14:useLocalDpi xmlns:a14="http://schemas.microsoft.com/office/drawing/2010/main" val="0"/>
+              </a:ext>
+            </a:extLst>
+          </a:blip>
+          <a:stretch>
+            <a:fillRect/>
+          </a:stretch>
+        </p:blipFill>
+        <p:spPr>
+          <a:xfrm>
+            <a:off x="180110" y="2064834"/>
+            <a:ext cx="5356366" cy="3974228"/>
+          </a:xfrm>
+          <a:prstGeom prst="rect">
+            <a:avLst/>
+          </a:prstGeom>
+        </p:spPr>
+      </p:pic>
+    </p:spTree>
+    <p:extLst>
+      <p:ext uri="{BB962C8B-B14F-4D97-AF65-F5344CB8AC3E}">
+        <p14:creationId xmlns:p14="http://schemas.microsoft.com/office/powerpoint/2010/main" val="2045570969"/>
       </p:ext>
     </p:extLst>
   </p:cSld>

</xml_diff>

<commit_message>
added image and placeholder for manifest
</commit_message>
<xml_diff>
--- a/Android Presentation - Java Workshop.pptx
+++ b/Android Presentation - Java Workshop.pptx
@@ -22,6 +22,7 @@
     <p:sldId id="277" r:id="rId16"/>
     <p:sldId id="278" r:id="rId17"/>
     <p:sldId id="279" r:id="rId18"/>
+    <p:sldId id="280" r:id="rId19"/>
   </p:sldIdLst>
   <p:sldSz cx="12192000" cy="6858000"/>
   <p:notesSz cx="6858000" cy="9144000"/>
@@ -3738,6 +3739,13 @@
   <p:clrMapOvr>
     <a:masterClrMapping/>
   </p:clrMapOvr>
+  <p:timing>
+    <p:tnLst>
+      <p:par>
+        <p:cTn id="1" dur="indefinite" restart="never" nodeType="tmRoot"/>
+      </p:par>
+    </p:tnLst>
+  </p:timing>
 </p:sld>
 </file>
 
@@ -3935,6 +3943,13 @@
   <p:clrMapOvr>
     <a:masterClrMapping/>
   </p:clrMapOvr>
+  <p:timing>
+    <p:tnLst>
+      <p:par>
+        <p:cTn id="1" dur="indefinite" restart="never" nodeType="tmRoot"/>
+      </p:par>
+    </p:tnLst>
+  </p:timing>
 </p:sld>
 </file>
 
@@ -4318,6 +4333,13 @@
   <p:clrMapOvr>
     <a:masterClrMapping/>
   </p:clrMapOvr>
+  <p:timing>
+    <p:tnLst>
+      <p:par>
+        <p:cTn id="1" dur="indefinite" restart="never" nodeType="tmRoot"/>
+      </p:par>
+    </p:tnLst>
+  </p:timing>
 </p:sld>
 </file>
 
@@ -5004,6 +5026,13 @@
   <p:clrMapOvr>
     <a:masterClrMapping/>
   </p:clrMapOvr>
+  <p:timing>
+    <p:tnLst>
+      <p:par>
+        <p:cTn id="1" dur="indefinite" restart="never" nodeType="tmRoot"/>
+      </p:par>
+    </p:tnLst>
+  </p:timing>
 </p:sld>
 </file>
 
@@ -5426,6 +5455,13 @@
   <p:clrMapOvr>
     <a:masterClrMapping/>
   </p:clrMapOvr>
+  <p:timing>
+    <p:tnLst>
+      <p:par>
+        <p:cTn id="1" dur="indefinite" restart="never" nodeType="tmRoot"/>
+      </p:par>
+    </p:tnLst>
+  </p:timing>
 </p:sld>
 </file>
 
@@ -6165,6 +6201,13 @@
   <p:clrMapOvr>
     <a:masterClrMapping/>
   </p:clrMapOvr>
+  <p:timing>
+    <p:tnLst>
+      <p:par>
+        <p:cTn id="1" dur="indefinite" restart="never" nodeType="tmRoot"/>
+      </p:par>
+    </p:tnLst>
+  </p:timing>
 </p:sld>
 </file>
 
@@ -6358,6 +6401,13 @@
   <p:clrMapOvr>
     <a:masterClrMapping/>
   </p:clrMapOvr>
+  <p:timing>
+    <p:tnLst>
+      <p:par>
+        <p:cTn id="1" dur="indefinite" restart="never" nodeType="tmRoot"/>
+      </p:par>
+    </p:tnLst>
+  </p:timing>
 </p:sld>
 </file>
 
@@ -6568,6 +6618,13 @@
   <p:clrMapOvr>
     <a:masterClrMapping/>
   </p:clrMapOvr>
+  <p:timing>
+    <p:tnLst>
+      <p:par>
+        <p:cTn id="1" dur="indefinite" restart="never" nodeType="tmRoot"/>
+      </p:par>
+    </p:tnLst>
+  </p:timing>
 </p:sld>
 </file>
 
@@ -7373,6 +7430,283 @@
   <p:clrMapOvr>
     <a:masterClrMapping/>
   </p:clrMapOvr>
+  <p:timing>
+    <p:tnLst>
+      <p:par>
+        <p:cTn id="1" dur="indefinite" restart="never" nodeType="tmRoot"/>
+      </p:par>
+    </p:tnLst>
+  </p:timing>
+</p:sld>
+</file>
+
+<file path=ppt/slides/slide18.xml><?xml version="1.0" encoding="utf-8"?>
+<p:sld xmlns:a="http://schemas.openxmlformats.org/drawingml/2006/main" xmlns:r="http://schemas.openxmlformats.org/officeDocument/2006/relationships" xmlns:p="http://schemas.openxmlformats.org/presentationml/2006/main">
+  <p:cSld>
+    <p:spTree>
+      <p:nvGrpSpPr>
+        <p:cNvPr id="1" name=""/>
+        <p:cNvGrpSpPr/>
+        <p:nvPr/>
+      </p:nvGrpSpPr>
+      <p:grpSpPr>
+        <a:xfrm>
+          <a:off x="0" y="0"/>
+          <a:ext cx="0" cy="0"/>
+          <a:chOff x="0" y="0"/>
+          <a:chExt cx="0" cy="0"/>
+        </a:xfrm>
+      </p:grpSpPr>
+      <p:sp>
+        <p:nvSpPr>
+          <p:cNvPr id="2" name="Title 1"/>
+          <p:cNvSpPr>
+            <a:spLocks noGrp="1"/>
+          </p:cNvSpPr>
+          <p:nvPr>
+            <p:ph type="title"/>
+          </p:nvPr>
+        </p:nvSpPr>
+        <p:spPr/>
+        <p:txBody>
+          <a:bodyPr>
+            <a:normAutofit fontScale="90000"/>
+          </a:bodyPr>
+          <a:lstStyle/>
+          <a:p>
+            <a:pPr algn="r" rtl="1"/>
+            <a:r>
+              <a:rPr lang="he-IL" dirty="0"/>
+              <a:t>הרכב </a:t>
+            </a:r>
+            <a:r>
+              <a:rPr lang="he-IL" dirty="0" err="1" smtClean="0"/>
+              <a:t>הפרוייקט</a:t>
+            </a:r>
+            <a:endParaRPr lang="en-US" dirty="0"/>
+          </a:p>
+        </p:txBody>
+      </p:sp>
+      <p:sp>
+        <p:nvSpPr>
+          <p:cNvPr id="3" name="Content Placeholder 2"/>
+          <p:cNvSpPr>
+            <a:spLocks noGrp="1"/>
+          </p:cNvSpPr>
+          <p:nvPr>
+            <p:ph idx="1"/>
+          </p:nvPr>
+        </p:nvSpPr>
+        <p:spPr>
+          <a:xfrm>
+            <a:off x="6474691" y="1852654"/>
+            <a:ext cx="2064590" cy="4426840"/>
+          </a:xfrm>
+        </p:spPr>
+        <p:txBody>
+          <a:bodyPr>
+            <a:normAutofit/>
+          </a:bodyPr>
+          <a:lstStyle/>
+          <a:p>
+            <a:pPr marL="0" indent="0" algn="r" rtl="1">
+              <a:buNone/>
+            </a:pPr>
+            <a:r>
+              <a:rPr lang="en-US" dirty="0" smtClean="0"/>
+              <a:t>[some text about the manifest]</a:t>
+            </a:r>
+            <a:endParaRPr lang="en-US" dirty="0"/>
+          </a:p>
+        </p:txBody>
+      </p:sp>
+      <p:sp>
+        <p:nvSpPr>
+          <p:cNvPr id="4" name="Title 1"/>
+          <p:cNvSpPr txBox="1">
+            <a:spLocks/>
+          </p:cNvSpPr>
+          <p:nvPr/>
+        </p:nvSpPr>
+        <p:spPr>
+          <a:xfrm>
+            <a:off x="598621" y="1089129"/>
+            <a:ext cx="7376537" cy="763525"/>
+          </a:xfrm>
+          <a:prstGeom prst="rect">
+            <a:avLst/>
+          </a:prstGeom>
+        </p:spPr>
+        <p:txBody>
+          <a:bodyPr vert="horz" lIns="91440" tIns="45720" rIns="91440" bIns="45720" rtlCol="0" anchor="ctr">
+            <a:normAutofit fontScale="97500"/>
+          </a:bodyPr>
+          <a:lstStyle>
+            <a:lvl1pPr algn="l" defTabSz="1219170" rtl="0" eaLnBrk="1" latinLnBrk="0" hangingPunct="1">
+              <a:spcBef>
+                <a:spcPct val="0"/>
+              </a:spcBef>
+              <a:buNone/>
+              <a:defRPr sz="4800" kern="1200">
+                <a:solidFill>
+                  <a:srgbClr val="FFC000"/>
+                </a:solidFill>
+                <a:effectLst>
+                  <a:outerShdw blurRad="50800" dist="38100" dir="2700000" algn="tl" rotWithShape="0">
+                    <a:prstClr val="black">
+                      <a:alpha val="40000"/>
+                    </a:prstClr>
+                  </a:outerShdw>
+                </a:effectLst>
+                <a:latin typeface="+mj-lt"/>
+                <a:ea typeface="+mj-ea"/>
+                <a:cs typeface="+mj-cs"/>
+              </a:defRPr>
+            </a:lvl1pPr>
+          </a:lstStyle>
+          <a:p>
+            <a:pPr algn="r" rtl="1"/>
+            <a:r>
+              <a:rPr lang="en-US" sz="4000" dirty="0" err="1">
+                <a:solidFill>
+                  <a:srgbClr val="FFE701"/>
+                </a:solidFill>
+              </a:rPr>
+              <a:t>קובץ</a:t>
+            </a:r>
+            <a:r>
+              <a:rPr lang="en-US" sz="4000" dirty="0">
+                <a:solidFill>
+                  <a:srgbClr val="FFE701"/>
+                </a:solidFill>
+              </a:rPr>
+              <a:t> </a:t>
+            </a:r>
+            <a:r>
+              <a:rPr lang="en-US" sz="4000" dirty="0" err="1">
+                <a:solidFill>
+                  <a:srgbClr val="FFE701"/>
+                </a:solidFill>
+              </a:rPr>
+              <a:t>ה</a:t>
+            </a:r>
+            <a:r>
+              <a:rPr lang="en-US" sz="4000" dirty="0">
+                <a:solidFill>
+                  <a:srgbClr val="FFE701"/>
+                </a:solidFill>
+              </a:rPr>
+              <a:t> </a:t>
+            </a:r>
+            <a:r>
+              <a:rPr lang="en-US" sz="4000" dirty="0" err="1">
+                <a:solidFill>
+                  <a:srgbClr val="FFE701"/>
+                </a:solidFill>
+              </a:rPr>
+              <a:t>AndroidManifest</a:t>
+            </a:r>
+            <a:endParaRPr lang="en-US" sz="4000" dirty="0">
+              <a:solidFill>
+                <a:srgbClr val="FFE701"/>
+              </a:solidFill>
+            </a:endParaRPr>
+          </a:p>
+        </p:txBody>
+      </p:sp>
+      <p:pic>
+        <p:nvPicPr>
+          <p:cNvPr id="5" name="Picture 4"/>
+          <p:cNvPicPr>
+            <a:picLocks noChangeAspect="1"/>
+          </p:cNvPicPr>
+          <p:nvPr/>
+        </p:nvPicPr>
+        <p:blipFill>
+          <a:blip r:embed="rId2">
+            <a:extLst>
+              <a:ext uri="{28A0092B-C50C-407E-A947-70E740481C1C}">
+                <a14:useLocalDpi xmlns:a14="http://schemas.microsoft.com/office/drawing/2010/main" val="0"/>
+              </a:ext>
+            </a:extLst>
+          </a:blip>
+          <a:stretch>
+            <a:fillRect/>
+          </a:stretch>
+        </p:blipFill>
+        <p:spPr>
+          <a:xfrm>
+            <a:off x="216243" y="1852654"/>
+            <a:ext cx="5360651" cy="3341088"/>
+          </a:xfrm>
+          <a:prstGeom prst="rect">
+            <a:avLst/>
+          </a:prstGeom>
+        </p:spPr>
+      </p:pic>
+      <p:sp>
+        <p:nvSpPr>
+          <p:cNvPr id="6" name="Rectangle 5"/>
+          <p:cNvSpPr/>
+          <p:nvPr/>
+        </p:nvSpPr>
+        <p:spPr>
+          <a:xfrm>
+            <a:off x="360219" y="2253673"/>
+            <a:ext cx="812799" cy="193963"/>
+          </a:xfrm>
+          <a:prstGeom prst="rect">
+            <a:avLst/>
+          </a:prstGeom>
+          <a:noFill/>
+          <a:ln>
+            <a:solidFill>
+              <a:schemeClr val="accent2"/>
+            </a:solidFill>
+          </a:ln>
+        </p:spPr>
+        <p:style>
+          <a:lnRef idx="2">
+            <a:schemeClr val="accent2">
+              <a:shade val="50000"/>
+            </a:schemeClr>
+          </a:lnRef>
+          <a:fillRef idx="1">
+            <a:schemeClr val="accent2"/>
+          </a:fillRef>
+          <a:effectRef idx="0">
+            <a:schemeClr val="accent2"/>
+          </a:effectRef>
+          <a:fontRef idx="minor">
+            <a:schemeClr val="lt1"/>
+          </a:fontRef>
+        </p:style>
+        <p:txBody>
+          <a:bodyPr rtlCol="0" anchor="ctr"/>
+          <a:lstStyle/>
+          <a:p>
+            <a:pPr algn="ctr"/>
+            <a:endParaRPr lang="en-US"/>
+          </a:p>
+        </p:txBody>
+      </p:sp>
+    </p:spTree>
+    <p:extLst>
+      <p:ext uri="{BB962C8B-B14F-4D97-AF65-F5344CB8AC3E}">
+        <p14:creationId xmlns:p14="http://schemas.microsoft.com/office/powerpoint/2010/main" val="637691303"/>
+      </p:ext>
+    </p:extLst>
+  </p:cSld>
+  <p:clrMapOvr>
+    <a:masterClrMapping/>
+  </p:clrMapOvr>
+  <p:timing>
+    <p:tnLst>
+      <p:par>
+        <p:cTn id="1" dur="indefinite" restart="never" nodeType="tmRoot"/>
+      </p:par>
+    </p:tnLst>
+  </p:timing>
 </p:sld>
 </file>
 
@@ -7594,6 +7928,13 @@
   <p:clrMapOvr>
     <a:masterClrMapping/>
   </p:clrMapOvr>
+  <p:timing>
+    <p:tnLst>
+      <p:par>
+        <p:cTn id="1" dur="indefinite" restart="never" nodeType="tmRoot"/>
+      </p:par>
+    </p:tnLst>
+  </p:timing>
 </p:sld>
 </file>
 
@@ -7674,6 +8015,13 @@
   <p:clrMapOvr>
     <a:masterClrMapping/>
   </p:clrMapOvr>
+  <p:timing>
+    <p:tnLst>
+      <p:par>
+        <p:cTn id="1" dur="indefinite" restart="never" nodeType="tmRoot"/>
+      </p:par>
+    </p:tnLst>
+  </p:timing>
 </p:sld>
 </file>
 
@@ -7763,6 +8111,13 @@
   <p:clrMapOvr>
     <a:masterClrMapping/>
   </p:clrMapOvr>
+  <p:timing>
+    <p:tnLst>
+      <p:par>
+        <p:cTn id="1" dur="indefinite" restart="never" nodeType="tmRoot"/>
+      </p:par>
+    </p:tnLst>
+  </p:timing>
 </p:sld>
 </file>
 
@@ -7984,6 +8339,13 @@
   <p:clrMapOvr>
     <a:masterClrMapping/>
   </p:clrMapOvr>
+  <p:timing>
+    <p:tnLst>
+      <p:par>
+        <p:cTn id="1" dur="indefinite" restart="never" nodeType="tmRoot"/>
+      </p:par>
+    </p:tnLst>
+  </p:timing>
 </p:sld>
 </file>
 
@@ -8213,6 +8575,13 @@
   <p:clrMapOvr>
     <a:masterClrMapping/>
   </p:clrMapOvr>
+  <p:timing>
+    <p:tnLst>
+      <p:par>
+        <p:cTn id="1" dur="indefinite" restart="never" nodeType="tmRoot"/>
+      </p:par>
+    </p:tnLst>
+  </p:timing>
 </p:sld>
 </file>
 
@@ -8980,6 +9349,13 @@
   <p:clrMapOvr>
     <a:masterClrMapping/>
   </p:clrMapOvr>
+  <p:timing>
+    <p:tnLst>
+      <p:par>
+        <p:cTn id="1" dur="indefinite" restart="never" nodeType="tmRoot"/>
+      </p:par>
+    </p:tnLst>
+  </p:timing>
 </p:sld>
 </file>
 
@@ -9216,6 +9592,13 @@
   <p:clrMapOvr>
     <a:masterClrMapping/>
   </p:clrMapOvr>
+  <p:timing>
+    <p:tnLst>
+      <p:par>
+        <p:cTn id="1" dur="indefinite" restart="never" nodeType="tmRoot"/>
+      </p:par>
+    </p:tnLst>
+  </p:timing>
 </p:sld>
 </file>
 
@@ -9509,6 +9892,13 @@
   <p:clrMapOvr>
     <a:masterClrMapping/>
   </p:clrMapOvr>
+  <p:timing>
+    <p:tnLst>
+      <p:par>
+        <p:cTn id="1" dur="indefinite" restart="never" nodeType="tmRoot"/>
+      </p:par>
+    </p:tnLst>
+  </p:timing>
 </p:sld>
 </file>
 

</xml_diff>

<commit_message>
added image and placeholder for gradle
</commit_message>
<xml_diff>
--- a/Android Presentation - Java Workshop.pptx
+++ b/Android Presentation - Java Workshop.pptx
@@ -23,6 +23,7 @@
     <p:sldId id="278" r:id="rId17"/>
     <p:sldId id="279" r:id="rId18"/>
     <p:sldId id="280" r:id="rId19"/>
+    <p:sldId id="281" r:id="rId20"/>
   </p:sldIdLst>
   <p:sldSz cx="12192000" cy="6858000"/>
   <p:notesSz cx="6858000" cy="9144000"/>
@@ -7694,6 +7695,434 @@
     <p:extLst>
       <p:ext uri="{BB962C8B-B14F-4D97-AF65-F5344CB8AC3E}">
         <p14:creationId xmlns:p14="http://schemas.microsoft.com/office/powerpoint/2010/main" val="637691303"/>
+      </p:ext>
+    </p:extLst>
+  </p:cSld>
+  <p:clrMapOvr>
+    <a:masterClrMapping/>
+  </p:clrMapOvr>
+  <p:timing>
+    <p:tnLst>
+      <p:par>
+        <p:cTn id="1" dur="indefinite" restart="never" nodeType="tmRoot"/>
+      </p:par>
+    </p:tnLst>
+  </p:timing>
+</p:sld>
+</file>
+
+<file path=ppt/slides/slide19.xml><?xml version="1.0" encoding="utf-8"?>
+<p:sld xmlns:a="http://schemas.openxmlformats.org/drawingml/2006/main" xmlns:r="http://schemas.openxmlformats.org/officeDocument/2006/relationships" xmlns:p="http://schemas.openxmlformats.org/presentationml/2006/main">
+  <p:cSld>
+    <p:spTree>
+      <p:nvGrpSpPr>
+        <p:cNvPr id="1" name=""/>
+        <p:cNvGrpSpPr/>
+        <p:nvPr/>
+      </p:nvGrpSpPr>
+      <p:grpSpPr>
+        <a:xfrm>
+          <a:off x="0" y="0"/>
+          <a:ext cx="0" cy="0"/>
+          <a:chOff x="0" y="0"/>
+          <a:chExt cx="0" cy="0"/>
+        </a:xfrm>
+      </p:grpSpPr>
+      <p:sp>
+        <p:nvSpPr>
+          <p:cNvPr id="2" name="Title 1"/>
+          <p:cNvSpPr>
+            <a:spLocks noGrp="1"/>
+          </p:cNvSpPr>
+          <p:nvPr>
+            <p:ph type="title"/>
+          </p:nvPr>
+        </p:nvSpPr>
+        <p:spPr/>
+        <p:txBody>
+          <a:bodyPr>
+            <a:normAutofit fontScale="90000"/>
+          </a:bodyPr>
+          <a:lstStyle/>
+          <a:p>
+            <a:pPr algn="r" rtl="1"/>
+            <a:r>
+              <a:rPr lang="he-IL" dirty="0"/>
+              <a:t>הרכב </a:t>
+            </a:r>
+            <a:r>
+              <a:rPr lang="he-IL" dirty="0" err="1" smtClean="0"/>
+              <a:t>הפרוייקט</a:t>
+            </a:r>
+            <a:endParaRPr lang="en-US" dirty="0"/>
+          </a:p>
+        </p:txBody>
+      </p:sp>
+      <p:sp>
+        <p:nvSpPr>
+          <p:cNvPr id="3" name="Content Placeholder 2"/>
+          <p:cNvSpPr>
+            <a:spLocks noGrp="1"/>
+          </p:cNvSpPr>
+          <p:nvPr>
+            <p:ph idx="1"/>
+          </p:nvPr>
+        </p:nvSpPr>
+        <p:spPr>
+          <a:xfrm>
+            <a:off x="3426692" y="5258250"/>
+            <a:ext cx="5020226" cy="1144076"/>
+          </a:xfrm>
+        </p:spPr>
+        <p:txBody>
+          <a:bodyPr>
+            <a:normAutofit fontScale="92500" lnSpcReduction="10000"/>
+          </a:bodyPr>
+          <a:lstStyle/>
+          <a:p>
+            <a:pPr marL="0" indent="0" algn="r" rtl="1">
+              <a:buNone/>
+            </a:pPr>
+            <a:r>
+              <a:rPr lang="en-US" dirty="0" smtClean="0"/>
+              <a:t>[some text about the </a:t>
+            </a:r>
+            <a:r>
+              <a:rPr lang="en-US" dirty="0" err="1" smtClean="0"/>
+              <a:t>gradle</a:t>
+            </a:r>
+            <a:r>
+              <a:rPr lang="en-US" dirty="0" smtClean="0"/>
+              <a:t>]</a:t>
+            </a:r>
+            <a:endParaRPr lang="en-US" dirty="0"/>
+          </a:p>
+        </p:txBody>
+      </p:sp>
+      <p:sp>
+        <p:nvSpPr>
+          <p:cNvPr id="4" name="Title 1"/>
+          <p:cNvSpPr txBox="1">
+            <a:spLocks/>
+          </p:cNvSpPr>
+          <p:nvPr/>
+        </p:nvSpPr>
+        <p:spPr>
+          <a:xfrm>
+            <a:off x="598621" y="1089129"/>
+            <a:ext cx="7376537" cy="763525"/>
+          </a:xfrm>
+          <a:prstGeom prst="rect">
+            <a:avLst/>
+          </a:prstGeom>
+        </p:spPr>
+        <p:txBody>
+          <a:bodyPr vert="horz" lIns="91440" tIns="45720" rIns="91440" bIns="45720" rtlCol="0" anchor="ctr">
+            <a:normAutofit fontScale="97500"/>
+          </a:bodyPr>
+          <a:lstStyle>
+            <a:lvl1pPr algn="l" defTabSz="1219170" rtl="0" eaLnBrk="1" latinLnBrk="0" hangingPunct="1">
+              <a:spcBef>
+                <a:spcPct val="0"/>
+              </a:spcBef>
+              <a:buNone/>
+              <a:defRPr sz="4800" kern="1200">
+                <a:solidFill>
+                  <a:srgbClr val="FFC000"/>
+                </a:solidFill>
+                <a:effectLst>
+                  <a:outerShdw blurRad="50800" dist="38100" dir="2700000" algn="tl" rotWithShape="0">
+                    <a:prstClr val="black">
+                      <a:alpha val="40000"/>
+                    </a:prstClr>
+                  </a:outerShdw>
+                </a:effectLst>
+                <a:latin typeface="+mj-lt"/>
+                <a:ea typeface="+mj-ea"/>
+                <a:cs typeface="+mj-cs"/>
+              </a:defRPr>
+            </a:lvl1pPr>
+          </a:lstStyle>
+          <a:p>
+            <a:pPr algn="r" rtl="1"/>
+            <a:r>
+              <a:rPr lang="he-IL" sz="4000" dirty="0">
+                <a:solidFill>
+                  <a:srgbClr val="FFE701"/>
+                </a:solidFill>
+              </a:rPr>
+              <a:t>קבצי ה </a:t>
+            </a:r>
+            <a:r>
+              <a:rPr lang="he-IL" sz="4000" dirty="0" err="1">
+                <a:solidFill>
+                  <a:srgbClr val="FFE701"/>
+                </a:solidFill>
+              </a:rPr>
+              <a:t>gradle</a:t>
+            </a:r>
+            <a:r>
+              <a:rPr lang="he-IL" sz="4000" dirty="0">
+                <a:solidFill>
+                  <a:srgbClr val="FFE701"/>
+                </a:solidFill>
+              </a:rPr>
+              <a:t> </a:t>
+            </a:r>
+          </a:p>
+        </p:txBody>
+      </p:sp>
+      <p:pic>
+        <p:nvPicPr>
+          <p:cNvPr id="5" name="Picture 4"/>
+          <p:cNvPicPr>
+            <a:picLocks noChangeAspect="1"/>
+          </p:cNvPicPr>
+          <p:nvPr/>
+        </p:nvPicPr>
+        <p:blipFill>
+          <a:blip r:embed="rId2">
+            <a:extLst>
+              <a:ext uri="{28A0092B-C50C-407E-A947-70E740481C1C}">
+                <a14:useLocalDpi xmlns:a14="http://schemas.microsoft.com/office/drawing/2010/main" val="0"/>
+              </a:ext>
+            </a:extLst>
+          </a:blip>
+          <a:stretch>
+            <a:fillRect/>
+          </a:stretch>
+        </p:blipFill>
+        <p:spPr>
+          <a:xfrm>
+            <a:off x="116319" y="1791112"/>
+            <a:ext cx="6640355" cy="3399723"/>
+          </a:xfrm>
+          <a:prstGeom prst="rect">
+            <a:avLst/>
+          </a:prstGeom>
+        </p:spPr>
+      </p:pic>
+      <p:sp>
+        <p:nvSpPr>
+          <p:cNvPr id="6" name="Rectangle 5"/>
+          <p:cNvSpPr/>
+          <p:nvPr/>
+        </p:nvSpPr>
+        <p:spPr>
+          <a:xfrm>
+            <a:off x="221674" y="2198254"/>
+            <a:ext cx="1431646" cy="260653"/>
+          </a:xfrm>
+          <a:prstGeom prst="rect">
+            <a:avLst/>
+          </a:prstGeom>
+          <a:noFill/>
+          <a:ln>
+            <a:solidFill>
+              <a:schemeClr val="accent2"/>
+            </a:solidFill>
+          </a:ln>
+        </p:spPr>
+        <p:style>
+          <a:lnRef idx="2">
+            <a:schemeClr val="accent2">
+              <a:shade val="50000"/>
+            </a:schemeClr>
+          </a:lnRef>
+          <a:fillRef idx="1">
+            <a:schemeClr val="accent2"/>
+          </a:fillRef>
+          <a:effectRef idx="0">
+            <a:schemeClr val="accent2"/>
+          </a:effectRef>
+          <a:fontRef idx="minor">
+            <a:schemeClr val="lt1"/>
+          </a:fontRef>
+        </p:style>
+        <p:txBody>
+          <a:bodyPr rtlCol="0" anchor="ctr"/>
+          <a:lstStyle/>
+          <a:p>
+            <a:pPr algn="ctr"/>
+            <a:endParaRPr lang="en-US"/>
+          </a:p>
+        </p:txBody>
+      </p:sp>
+      <p:sp>
+        <p:nvSpPr>
+          <p:cNvPr id="7" name="Content Placeholder 2"/>
+          <p:cNvSpPr txBox="1">
+            <a:spLocks/>
+          </p:cNvSpPr>
+          <p:nvPr/>
+        </p:nvSpPr>
+        <p:spPr>
+          <a:xfrm>
+            <a:off x="6862029" y="2156065"/>
+            <a:ext cx="2784762" cy="1144076"/>
+          </a:xfrm>
+          <a:prstGeom prst="rect">
+            <a:avLst/>
+          </a:prstGeom>
+        </p:spPr>
+        <p:txBody>
+          <a:bodyPr vert="horz" lIns="91440" tIns="45720" rIns="91440" bIns="45720" rtlCol="0">
+            <a:normAutofit fontScale="77500" lnSpcReduction="20000"/>
+          </a:bodyPr>
+          <a:lstStyle>
+            <a:lvl1pPr marL="457189" indent="-457189" algn="l" defTabSz="1219170" rtl="0" eaLnBrk="1" latinLnBrk="0" hangingPunct="1">
+              <a:spcBef>
+                <a:spcPct val="20000"/>
+              </a:spcBef>
+              <a:buFont typeface="Arial" pitchFamily="34" charset="0"/>
+              <a:buChar char="•"/>
+              <a:defRPr sz="3733" kern="1200">
+                <a:solidFill>
+                  <a:schemeClr val="bg1"/>
+                </a:solidFill>
+                <a:latin typeface="+mn-lt"/>
+                <a:ea typeface="+mn-ea"/>
+                <a:cs typeface="+mn-cs"/>
+              </a:defRPr>
+            </a:lvl1pPr>
+            <a:lvl2pPr marL="990575" indent="-380990" algn="l" defTabSz="1219170" rtl="0" eaLnBrk="1" latinLnBrk="0" hangingPunct="1">
+              <a:spcBef>
+                <a:spcPct val="20000"/>
+              </a:spcBef>
+              <a:buFont typeface="Arial" pitchFamily="34" charset="0"/>
+              <a:buChar char="–"/>
+              <a:defRPr sz="3733" kern="1200">
+                <a:solidFill>
+                  <a:schemeClr val="bg1"/>
+                </a:solidFill>
+                <a:latin typeface="+mn-lt"/>
+                <a:ea typeface="+mn-ea"/>
+                <a:cs typeface="+mn-cs"/>
+              </a:defRPr>
+            </a:lvl2pPr>
+            <a:lvl3pPr marL="1523962" indent="-304792" algn="l" defTabSz="1219170" rtl="0" eaLnBrk="1" latinLnBrk="0" hangingPunct="1">
+              <a:spcBef>
+                <a:spcPct val="20000"/>
+              </a:spcBef>
+              <a:buFont typeface="Arial" pitchFamily="34" charset="0"/>
+              <a:buChar char="•"/>
+              <a:defRPr sz="3200" kern="1200">
+                <a:solidFill>
+                  <a:schemeClr val="bg1"/>
+                </a:solidFill>
+                <a:latin typeface="+mn-lt"/>
+                <a:ea typeface="+mn-ea"/>
+                <a:cs typeface="+mn-cs"/>
+              </a:defRPr>
+            </a:lvl3pPr>
+            <a:lvl4pPr marL="2133547" indent="-304792" algn="l" defTabSz="1219170" rtl="0" eaLnBrk="1" latinLnBrk="0" hangingPunct="1">
+              <a:spcBef>
+                <a:spcPct val="20000"/>
+              </a:spcBef>
+              <a:buFont typeface="Arial" pitchFamily="34" charset="0"/>
+              <a:buChar char="–"/>
+              <a:defRPr sz="2667" kern="1200">
+                <a:solidFill>
+                  <a:schemeClr val="bg1"/>
+                </a:solidFill>
+                <a:latin typeface="+mn-lt"/>
+                <a:ea typeface="+mn-ea"/>
+                <a:cs typeface="+mn-cs"/>
+              </a:defRPr>
+            </a:lvl4pPr>
+            <a:lvl5pPr marL="2743131" indent="-304792" algn="l" defTabSz="1219170" rtl="0" eaLnBrk="1" latinLnBrk="0" hangingPunct="1">
+              <a:spcBef>
+                <a:spcPct val="20000"/>
+              </a:spcBef>
+              <a:buFont typeface="Arial" pitchFamily="34" charset="0"/>
+              <a:buChar char="»"/>
+              <a:defRPr sz="2667" kern="1200">
+                <a:solidFill>
+                  <a:schemeClr val="bg1"/>
+                </a:solidFill>
+                <a:latin typeface="+mn-lt"/>
+                <a:ea typeface="+mn-ea"/>
+                <a:cs typeface="+mn-cs"/>
+              </a:defRPr>
+            </a:lvl5pPr>
+            <a:lvl6pPr marL="3352716" indent="-304792" algn="l" defTabSz="1219170" rtl="0" eaLnBrk="1" latinLnBrk="0" hangingPunct="1">
+              <a:spcBef>
+                <a:spcPct val="20000"/>
+              </a:spcBef>
+              <a:buFont typeface="Arial" pitchFamily="34" charset="0"/>
+              <a:buChar char="•"/>
+              <a:defRPr sz="2667" kern="1200">
+                <a:solidFill>
+                  <a:schemeClr val="tx1"/>
+                </a:solidFill>
+                <a:latin typeface="+mn-lt"/>
+                <a:ea typeface="+mn-ea"/>
+                <a:cs typeface="+mn-cs"/>
+              </a:defRPr>
+            </a:lvl6pPr>
+            <a:lvl7pPr marL="3962301" indent="-304792" algn="l" defTabSz="1219170" rtl="0" eaLnBrk="1" latinLnBrk="0" hangingPunct="1">
+              <a:spcBef>
+                <a:spcPct val="20000"/>
+              </a:spcBef>
+              <a:buFont typeface="Arial" pitchFamily="34" charset="0"/>
+              <a:buChar char="•"/>
+              <a:defRPr sz="2667" kern="1200">
+                <a:solidFill>
+                  <a:schemeClr val="tx1"/>
+                </a:solidFill>
+                <a:latin typeface="+mn-lt"/>
+                <a:ea typeface="+mn-ea"/>
+                <a:cs typeface="+mn-cs"/>
+              </a:defRPr>
+            </a:lvl7pPr>
+            <a:lvl8pPr marL="4571886" indent="-304792" algn="l" defTabSz="1219170" rtl="0" eaLnBrk="1" latinLnBrk="0" hangingPunct="1">
+              <a:spcBef>
+                <a:spcPct val="20000"/>
+              </a:spcBef>
+              <a:buFont typeface="Arial" pitchFamily="34" charset="0"/>
+              <a:buChar char="•"/>
+              <a:defRPr sz="2667" kern="1200">
+                <a:solidFill>
+                  <a:schemeClr val="tx1"/>
+                </a:solidFill>
+                <a:latin typeface="+mn-lt"/>
+                <a:ea typeface="+mn-ea"/>
+                <a:cs typeface="+mn-cs"/>
+              </a:defRPr>
+            </a:lvl8pPr>
+            <a:lvl9pPr marL="5181470" indent="-304792" algn="l" defTabSz="1219170" rtl="0" eaLnBrk="1" latinLnBrk="0" hangingPunct="1">
+              <a:spcBef>
+                <a:spcPct val="20000"/>
+              </a:spcBef>
+              <a:buFont typeface="Arial" pitchFamily="34" charset="0"/>
+              <a:buChar char="•"/>
+              <a:defRPr sz="2667" kern="1200">
+                <a:solidFill>
+                  <a:schemeClr val="tx1"/>
+                </a:solidFill>
+                <a:latin typeface="+mn-lt"/>
+                <a:ea typeface="+mn-ea"/>
+                <a:cs typeface="+mn-cs"/>
+              </a:defRPr>
+            </a:lvl9pPr>
+          </a:lstStyle>
+          <a:p>
+            <a:pPr marL="0" indent="0" algn="r" rtl="1">
+              <a:buFont typeface="Arial" pitchFamily="34" charset="0"/>
+              <a:buNone/>
+            </a:pPr>
+            <a:r>
+              <a:rPr lang="en-US" smtClean="0"/>
+              <a:t>[some text about the gradle]</a:t>
+            </a:r>
+            <a:endParaRPr lang="en-US" dirty="0"/>
+          </a:p>
+        </p:txBody>
+      </p:sp>
+    </p:spTree>
+    <p:extLst>
+      <p:ext uri="{BB962C8B-B14F-4D97-AF65-F5344CB8AC3E}">
+        <p14:creationId xmlns:p14="http://schemas.microsoft.com/office/powerpoint/2010/main" val="1664941983"/>
       </p:ext>
     </p:extLst>
   </p:cSld>

</xml_diff>

<commit_message>
added image and placeholder for res folder 1
</commit_message>
<xml_diff>
--- a/Android Presentation - Java Workshop.pptx
+++ b/Android Presentation - Java Workshop.pptx
@@ -24,6 +24,7 @@
     <p:sldId id="279" r:id="rId18"/>
     <p:sldId id="280" r:id="rId19"/>
     <p:sldId id="281" r:id="rId20"/>
+    <p:sldId id="282" r:id="rId21"/>
   </p:sldIdLst>
   <p:sldSz cx="12192000" cy="6858000"/>
   <p:notesSz cx="6858000" cy="9144000"/>
@@ -8351,6 +8352,390 @@
     <p:extLst>
       <p:ext uri="{BB962C8B-B14F-4D97-AF65-F5344CB8AC3E}">
         <p14:creationId xmlns:p14="http://schemas.microsoft.com/office/powerpoint/2010/main" val="3213140402"/>
+      </p:ext>
+    </p:extLst>
+  </p:cSld>
+  <p:clrMapOvr>
+    <a:masterClrMapping/>
+  </p:clrMapOvr>
+  <p:timing>
+    <p:tnLst>
+      <p:par>
+        <p:cTn id="1" dur="indefinite" restart="never" nodeType="tmRoot"/>
+      </p:par>
+    </p:tnLst>
+  </p:timing>
+</p:sld>
+</file>
+
+<file path=ppt/slides/slide20.xml><?xml version="1.0" encoding="utf-8"?>
+<p:sld xmlns:a="http://schemas.openxmlformats.org/drawingml/2006/main" xmlns:r="http://schemas.openxmlformats.org/officeDocument/2006/relationships" xmlns:p="http://schemas.openxmlformats.org/presentationml/2006/main">
+  <p:cSld>
+    <p:spTree>
+      <p:nvGrpSpPr>
+        <p:cNvPr id="1" name=""/>
+        <p:cNvGrpSpPr/>
+        <p:nvPr/>
+      </p:nvGrpSpPr>
+      <p:grpSpPr>
+        <a:xfrm>
+          <a:off x="0" y="0"/>
+          <a:ext cx="0" cy="0"/>
+          <a:chOff x="0" y="0"/>
+          <a:chExt cx="0" cy="0"/>
+        </a:xfrm>
+      </p:grpSpPr>
+      <p:sp>
+        <p:nvSpPr>
+          <p:cNvPr id="2" name="Title 1"/>
+          <p:cNvSpPr>
+            <a:spLocks noGrp="1"/>
+          </p:cNvSpPr>
+          <p:nvPr>
+            <p:ph type="title"/>
+          </p:nvPr>
+        </p:nvSpPr>
+        <p:spPr/>
+        <p:txBody>
+          <a:bodyPr>
+            <a:normAutofit fontScale="90000"/>
+          </a:bodyPr>
+          <a:lstStyle/>
+          <a:p>
+            <a:pPr algn="r" rtl="1"/>
+            <a:r>
+              <a:rPr lang="he-IL" dirty="0"/>
+              <a:t>הרכב </a:t>
+            </a:r>
+            <a:r>
+              <a:rPr lang="he-IL" dirty="0" err="1" smtClean="0"/>
+              <a:t>הפרוייקט</a:t>
+            </a:r>
+            <a:endParaRPr lang="en-US" dirty="0"/>
+          </a:p>
+        </p:txBody>
+      </p:sp>
+      <p:sp>
+        <p:nvSpPr>
+          <p:cNvPr id="4" name="Title 1"/>
+          <p:cNvSpPr txBox="1">
+            <a:spLocks/>
+          </p:cNvSpPr>
+          <p:nvPr/>
+        </p:nvSpPr>
+        <p:spPr>
+          <a:xfrm>
+            <a:off x="598621" y="1089129"/>
+            <a:ext cx="7376537" cy="763525"/>
+          </a:xfrm>
+          <a:prstGeom prst="rect">
+            <a:avLst/>
+          </a:prstGeom>
+        </p:spPr>
+        <p:txBody>
+          <a:bodyPr vert="horz" lIns="91440" tIns="45720" rIns="91440" bIns="45720" rtlCol="0" anchor="ctr">
+            <a:normAutofit fontScale="97500"/>
+          </a:bodyPr>
+          <a:lstStyle>
+            <a:lvl1pPr algn="l" defTabSz="1219170" rtl="0" eaLnBrk="1" latinLnBrk="0" hangingPunct="1">
+              <a:spcBef>
+                <a:spcPct val="0"/>
+              </a:spcBef>
+              <a:buNone/>
+              <a:defRPr sz="4800" kern="1200">
+                <a:solidFill>
+                  <a:srgbClr val="FFC000"/>
+                </a:solidFill>
+                <a:effectLst>
+                  <a:outerShdw blurRad="50800" dist="38100" dir="2700000" algn="tl" rotWithShape="0">
+                    <a:prstClr val="black">
+                      <a:alpha val="40000"/>
+                    </a:prstClr>
+                  </a:outerShdw>
+                </a:effectLst>
+                <a:latin typeface="+mj-lt"/>
+                <a:ea typeface="+mj-ea"/>
+                <a:cs typeface="+mj-cs"/>
+              </a:defRPr>
+            </a:lvl1pPr>
+          </a:lstStyle>
+          <a:p>
+            <a:pPr algn="r" rtl="1"/>
+            <a:r>
+              <a:rPr lang="he-IL" sz="4000" dirty="0">
+                <a:solidFill>
+                  <a:srgbClr val="FFE701"/>
+                </a:solidFill>
+              </a:rPr>
+              <a:t>תיקיית </a:t>
+            </a:r>
+            <a:r>
+              <a:rPr lang="he-IL" sz="4000" dirty="0" err="1">
+                <a:solidFill>
+                  <a:srgbClr val="FFE701"/>
+                </a:solidFill>
+              </a:rPr>
+              <a:t>res</a:t>
+            </a:r>
+            <a:endParaRPr lang="he-IL" sz="4000" dirty="0">
+              <a:solidFill>
+                <a:srgbClr val="FFE701"/>
+              </a:solidFill>
+            </a:endParaRPr>
+          </a:p>
+        </p:txBody>
+      </p:sp>
+      <p:pic>
+        <p:nvPicPr>
+          <p:cNvPr id="5" name="Picture 4"/>
+          <p:cNvPicPr>
+            <a:picLocks noChangeAspect="1"/>
+          </p:cNvPicPr>
+          <p:nvPr/>
+        </p:nvPicPr>
+        <p:blipFill>
+          <a:blip r:embed="rId2">
+            <a:extLst>
+              <a:ext uri="{28A0092B-C50C-407E-A947-70E740481C1C}">
+                <a14:useLocalDpi xmlns:a14="http://schemas.microsoft.com/office/drawing/2010/main" val="0"/>
+              </a:ext>
+            </a:extLst>
+          </a:blip>
+          <a:stretch>
+            <a:fillRect/>
+          </a:stretch>
+        </p:blipFill>
+        <p:spPr>
+          <a:xfrm>
+            <a:off x="259264" y="1485509"/>
+            <a:ext cx="2046334" cy="2115870"/>
+          </a:xfrm>
+          <a:prstGeom prst="rect">
+            <a:avLst/>
+          </a:prstGeom>
+        </p:spPr>
+      </p:pic>
+      <p:sp>
+        <p:nvSpPr>
+          <p:cNvPr id="6" name="Rectangle 5"/>
+          <p:cNvSpPr/>
+          <p:nvPr/>
+        </p:nvSpPr>
+        <p:spPr>
+          <a:xfrm>
+            <a:off x="259264" y="2156065"/>
+            <a:ext cx="2046334" cy="1144076"/>
+          </a:xfrm>
+          <a:prstGeom prst="rect">
+            <a:avLst/>
+          </a:prstGeom>
+          <a:noFill/>
+          <a:ln>
+            <a:solidFill>
+              <a:schemeClr val="accent2"/>
+            </a:solidFill>
+          </a:ln>
+        </p:spPr>
+        <p:style>
+          <a:lnRef idx="2">
+            <a:schemeClr val="accent2">
+              <a:shade val="50000"/>
+            </a:schemeClr>
+          </a:lnRef>
+          <a:fillRef idx="1">
+            <a:schemeClr val="accent2"/>
+          </a:fillRef>
+          <a:effectRef idx="0">
+            <a:schemeClr val="accent2"/>
+          </a:effectRef>
+          <a:fontRef idx="minor">
+            <a:schemeClr val="lt1"/>
+          </a:fontRef>
+        </p:style>
+        <p:txBody>
+          <a:bodyPr rtlCol="0" anchor="ctr"/>
+          <a:lstStyle/>
+          <a:p>
+            <a:pPr algn="ctr"/>
+            <a:endParaRPr lang="en-US"/>
+          </a:p>
+        </p:txBody>
+      </p:sp>
+      <p:sp>
+        <p:nvSpPr>
+          <p:cNvPr id="7" name="Content Placeholder 2"/>
+          <p:cNvSpPr txBox="1">
+            <a:spLocks/>
+          </p:cNvSpPr>
+          <p:nvPr/>
+        </p:nvSpPr>
+        <p:spPr>
+          <a:xfrm>
+            <a:off x="2586182" y="2156064"/>
+            <a:ext cx="6788727" cy="4244735"/>
+          </a:xfrm>
+          <a:prstGeom prst="rect">
+            <a:avLst/>
+          </a:prstGeom>
+        </p:spPr>
+        <p:txBody>
+          <a:bodyPr vert="horz" lIns="91440" tIns="45720" rIns="91440" bIns="45720" rtlCol="0">
+            <a:normAutofit/>
+          </a:bodyPr>
+          <a:lstStyle>
+            <a:lvl1pPr marL="457189" indent="-457189" algn="l" defTabSz="1219170" rtl="0" eaLnBrk="1" latinLnBrk="0" hangingPunct="1">
+              <a:spcBef>
+                <a:spcPct val="20000"/>
+              </a:spcBef>
+              <a:buFont typeface="Arial" pitchFamily="34" charset="0"/>
+              <a:buChar char="•"/>
+              <a:defRPr sz="3733" kern="1200">
+                <a:solidFill>
+                  <a:schemeClr val="bg1"/>
+                </a:solidFill>
+                <a:latin typeface="+mn-lt"/>
+                <a:ea typeface="+mn-ea"/>
+                <a:cs typeface="+mn-cs"/>
+              </a:defRPr>
+            </a:lvl1pPr>
+            <a:lvl2pPr marL="990575" indent="-380990" algn="l" defTabSz="1219170" rtl="0" eaLnBrk="1" latinLnBrk="0" hangingPunct="1">
+              <a:spcBef>
+                <a:spcPct val="20000"/>
+              </a:spcBef>
+              <a:buFont typeface="Arial" pitchFamily="34" charset="0"/>
+              <a:buChar char="–"/>
+              <a:defRPr sz="3733" kern="1200">
+                <a:solidFill>
+                  <a:schemeClr val="bg1"/>
+                </a:solidFill>
+                <a:latin typeface="+mn-lt"/>
+                <a:ea typeface="+mn-ea"/>
+                <a:cs typeface="+mn-cs"/>
+              </a:defRPr>
+            </a:lvl2pPr>
+            <a:lvl3pPr marL="1523962" indent="-304792" algn="l" defTabSz="1219170" rtl="0" eaLnBrk="1" latinLnBrk="0" hangingPunct="1">
+              <a:spcBef>
+                <a:spcPct val="20000"/>
+              </a:spcBef>
+              <a:buFont typeface="Arial" pitchFamily="34" charset="0"/>
+              <a:buChar char="•"/>
+              <a:defRPr sz="3200" kern="1200">
+                <a:solidFill>
+                  <a:schemeClr val="bg1"/>
+                </a:solidFill>
+                <a:latin typeface="+mn-lt"/>
+                <a:ea typeface="+mn-ea"/>
+                <a:cs typeface="+mn-cs"/>
+              </a:defRPr>
+            </a:lvl3pPr>
+            <a:lvl4pPr marL="2133547" indent="-304792" algn="l" defTabSz="1219170" rtl="0" eaLnBrk="1" latinLnBrk="0" hangingPunct="1">
+              <a:spcBef>
+                <a:spcPct val="20000"/>
+              </a:spcBef>
+              <a:buFont typeface="Arial" pitchFamily="34" charset="0"/>
+              <a:buChar char="–"/>
+              <a:defRPr sz="2667" kern="1200">
+                <a:solidFill>
+                  <a:schemeClr val="bg1"/>
+                </a:solidFill>
+                <a:latin typeface="+mn-lt"/>
+                <a:ea typeface="+mn-ea"/>
+                <a:cs typeface="+mn-cs"/>
+              </a:defRPr>
+            </a:lvl4pPr>
+            <a:lvl5pPr marL="2743131" indent="-304792" algn="l" defTabSz="1219170" rtl="0" eaLnBrk="1" latinLnBrk="0" hangingPunct="1">
+              <a:spcBef>
+                <a:spcPct val="20000"/>
+              </a:spcBef>
+              <a:buFont typeface="Arial" pitchFamily="34" charset="0"/>
+              <a:buChar char="»"/>
+              <a:defRPr sz="2667" kern="1200">
+                <a:solidFill>
+                  <a:schemeClr val="bg1"/>
+                </a:solidFill>
+                <a:latin typeface="+mn-lt"/>
+                <a:ea typeface="+mn-ea"/>
+                <a:cs typeface="+mn-cs"/>
+              </a:defRPr>
+            </a:lvl5pPr>
+            <a:lvl6pPr marL="3352716" indent="-304792" algn="l" defTabSz="1219170" rtl="0" eaLnBrk="1" latinLnBrk="0" hangingPunct="1">
+              <a:spcBef>
+                <a:spcPct val="20000"/>
+              </a:spcBef>
+              <a:buFont typeface="Arial" pitchFamily="34" charset="0"/>
+              <a:buChar char="•"/>
+              <a:defRPr sz="2667" kern="1200">
+                <a:solidFill>
+                  <a:schemeClr val="tx1"/>
+                </a:solidFill>
+                <a:latin typeface="+mn-lt"/>
+                <a:ea typeface="+mn-ea"/>
+                <a:cs typeface="+mn-cs"/>
+              </a:defRPr>
+            </a:lvl6pPr>
+            <a:lvl7pPr marL="3962301" indent="-304792" algn="l" defTabSz="1219170" rtl="0" eaLnBrk="1" latinLnBrk="0" hangingPunct="1">
+              <a:spcBef>
+                <a:spcPct val="20000"/>
+              </a:spcBef>
+              <a:buFont typeface="Arial" pitchFamily="34" charset="0"/>
+              <a:buChar char="•"/>
+              <a:defRPr sz="2667" kern="1200">
+                <a:solidFill>
+                  <a:schemeClr val="tx1"/>
+                </a:solidFill>
+                <a:latin typeface="+mn-lt"/>
+                <a:ea typeface="+mn-ea"/>
+                <a:cs typeface="+mn-cs"/>
+              </a:defRPr>
+            </a:lvl7pPr>
+            <a:lvl8pPr marL="4571886" indent="-304792" algn="l" defTabSz="1219170" rtl="0" eaLnBrk="1" latinLnBrk="0" hangingPunct="1">
+              <a:spcBef>
+                <a:spcPct val="20000"/>
+              </a:spcBef>
+              <a:buFont typeface="Arial" pitchFamily="34" charset="0"/>
+              <a:buChar char="•"/>
+              <a:defRPr sz="2667" kern="1200">
+                <a:solidFill>
+                  <a:schemeClr val="tx1"/>
+                </a:solidFill>
+                <a:latin typeface="+mn-lt"/>
+                <a:ea typeface="+mn-ea"/>
+                <a:cs typeface="+mn-cs"/>
+              </a:defRPr>
+            </a:lvl8pPr>
+            <a:lvl9pPr marL="5181470" indent="-304792" algn="l" defTabSz="1219170" rtl="0" eaLnBrk="1" latinLnBrk="0" hangingPunct="1">
+              <a:spcBef>
+                <a:spcPct val="20000"/>
+              </a:spcBef>
+              <a:buFont typeface="Arial" pitchFamily="34" charset="0"/>
+              <a:buChar char="•"/>
+              <a:defRPr sz="2667" kern="1200">
+                <a:solidFill>
+                  <a:schemeClr val="tx1"/>
+                </a:solidFill>
+                <a:latin typeface="+mn-lt"/>
+                <a:ea typeface="+mn-ea"/>
+                <a:cs typeface="+mn-cs"/>
+              </a:defRPr>
+            </a:lvl9pPr>
+          </a:lstStyle>
+          <a:p>
+            <a:pPr marL="0" indent="0" algn="r" rtl="1">
+              <a:buFont typeface="Arial" pitchFamily="34" charset="0"/>
+              <a:buNone/>
+            </a:pPr>
+            <a:r>
+              <a:rPr lang="en-US" dirty="0" smtClean="0"/>
+              <a:t>[some text about all the things that are in the res folder]</a:t>
+            </a:r>
+            <a:endParaRPr lang="en-US" dirty="0"/>
+          </a:p>
+        </p:txBody>
+      </p:sp>
+    </p:spTree>
+    <p:extLst>
+      <p:ext uri="{BB962C8B-B14F-4D97-AF65-F5344CB8AC3E}">
+        <p14:creationId xmlns:p14="http://schemas.microsoft.com/office/powerpoint/2010/main" val="1327159404"/>
       </p:ext>
     </p:extLst>
   </p:cSld>

</xml_diff>

<commit_message>
added image and placeholder for res folder 2
</commit_message>
<xml_diff>
--- a/Android Presentation - Java Workshop.pptx
+++ b/Android Presentation - Java Workshop.pptx
@@ -25,6 +25,8 @@
     <p:sldId id="280" r:id="rId19"/>
     <p:sldId id="281" r:id="rId20"/>
     <p:sldId id="282" r:id="rId21"/>
+    <p:sldId id="283" r:id="rId22"/>
+    <p:sldId id="284" r:id="rId23"/>
   </p:sldIdLst>
   <p:sldSz cx="12192000" cy="6858000"/>
   <p:notesSz cx="6858000" cy="9144000"/>
@@ -8726,7 +8728,39 @@
             </a:pPr>
             <a:r>
               <a:rPr lang="en-US" dirty="0" smtClean="0"/>
-              <a:t>[some text about all the things that are in the res folder]</a:t>
+              <a:t>[some text about all the things that are in the res folder. Mention </a:t>
+            </a:r>
+            <a:r>
+              <a:rPr lang="en-US" dirty="0" err="1" smtClean="0"/>
+              <a:t>drawable</a:t>
+            </a:r>
+            <a:r>
+              <a:rPr lang="en-US" dirty="0" smtClean="0"/>
+              <a:t> and </a:t>
+            </a:r>
+            <a:r>
+              <a:rPr lang="en-US" dirty="0" err="1" smtClean="0"/>
+              <a:t>mipmap</a:t>
+            </a:r>
+            <a:r>
+              <a:rPr lang="en-US" dirty="0" smtClean="0"/>
+              <a:t> here along with things that may be added like </a:t>
+            </a:r>
+            <a:r>
+              <a:rPr lang="en-US" dirty="0" err="1" smtClean="0"/>
+              <a:t>anim</a:t>
+            </a:r>
+            <a:r>
+              <a:rPr lang="en-US" dirty="0" smtClean="0"/>
+              <a:t>, xml, raw,</a:t>
+            </a:r>
+            <a:r>
+              <a:rPr lang="mr-IN" dirty="0" smtClean="0"/>
+              <a:t>…</a:t>
+            </a:r>
+            <a:r>
+              <a:rPr lang="en-US" dirty="0" smtClean="0"/>
+              <a:t>]</a:t>
             </a:r>
             <a:endParaRPr lang="en-US" dirty="0"/>
           </a:p>
@@ -8736,6 +8770,820 @@
     <p:extLst>
       <p:ext uri="{BB962C8B-B14F-4D97-AF65-F5344CB8AC3E}">
         <p14:creationId xmlns:p14="http://schemas.microsoft.com/office/powerpoint/2010/main" val="1327159404"/>
+      </p:ext>
+    </p:extLst>
+  </p:cSld>
+  <p:clrMapOvr>
+    <a:masterClrMapping/>
+  </p:clrMapOvr>
+  <p:timing>
+    <p:tnLst>
+      <p:par>
+        <p:cTn id="1" dur="indefinite" restart="never" nodeType="tmRoot"/>
+      </p:par>
+    </p:tnLst>
+  </p:timing>
+</p:sld>
+</file>
+
+<file path=ppt/slides/slide21.xml><?xml version="1.0" encoding="utf-8"?>
+<p:sld xmlns:a="http://schemas.openxmlformats.org/drawingml/2006/main" xmlns:r="http://schemas.openxmlformats.org/officeDocument/2006/relationships" xmlns:p="http://schemas.openxmlformats.org/presentationml/2006/main">
+  <p:cSld>
+    <p:spTree>
+      <p:nvGrpSpPr>
+        <p:cNvPr id="1" name=""/>
+        <p:cNvGrpSpPr/>
+        <p:nvPr/>
+      </p:nvGrpSpPr>
+      <p:grpSpPr>
+        <a:xfrm>
+          <a:off x="0" y="0"/>
+          <a:ext cx="0" cy="0"/>
+          <a:chOff x="0" y="0"/>
+          <a:chExt cx="0" cy="0"/>
+        </a:xfrm>
+      </p:grpSpPr>
+      <p:sp>
+        <p:nvSpPr>
+          <p:cNvPr id="2" name="Title 1"/>
+          <p:cNvSpPr>
+            <a:spLocks noGrp="1"/>
+          </p:cNvSpPr>
+          <p:nvPr>
+            <p:ph type="title"/>
+          </p:nvPr>
+        </p:nvSpPr>
+        <p:spPr/>
+        <p:txBody>
+          <a:bodyPr>
+            <a:normAutofit fontScale="90000"/>
+          </a:bodyPr>
+          <a:lstStyle/>
+          <a:p>
+            <a:pPr algn="r" rtl="1"/>
+            <a:r>
+              <a:rPr lang="he-IL" dirty="0"/>
+              <a:t>הרכב </a:t>
+            </a:r>
+            <a:r>
+              <a:rPr lang="he-IL" dirty="0" err="1" smtClean="0"/>
+              <a:t>הפרוייקט</a:t>
+            </a:r>
+            <a:endParaRPr lang="en-US" dirty="0"/>
+          </a:p>
+        </p:txBody>
+      </p:sp>
+      <p:sp>
+        <p:nvSpPr>
+          <p:cNvPr id="4" name="Title 1"/>
+          <p:cNvSpPr txBox="1">
+            <a:spLocks/>
+          </p:cNvSpPr>
+          <p:nvPr/>
+        </p:nvSpPr>
+        <p:spPr>
+          <a:xfrm>
+            <a:off x="598621" y="1089129"/>
+            <a:ext cx="7376537" cy="763525"/>
+          </a:xfrm>
+          <a:prstGeom prst="rect">
+            <a:avLst/>
+          </a:prstGeom>
+        </p:spPr>
+        <p:txBody>
+          <a:bodyPr vert="horz" lIns="91440" tIns="45720" rIns="91440" bIns="45720" rtlCol="0" anchor="ctr">
+            <a:normAutofit fontScale="97500"/>
+          </a:bodyPr>
+          <a:lstStyle>
+            <a:lvl1pPr algn="l" defTabSz="1219170" rtl="0" eaLnBrk="1" latinLnBrk="0" hangingPunct="1">
+              <a:spcBef>
+                <a:spcPct val="0"/>
+              </a:spcBef>
+              <a:buNone/>
+              <a:defRPr sz="4800" kern="1200">
+                <a:solidFill>
+                  <a:srgbClr val="FFC000"/>
+                </a:solidFill>
+                <a:effectLst>
+                  <a:outerShdw blurRad="50800" dist="38100" dir="2700000" algn="tl" rotWithShape="0">
+                    <a:prstClr val="black">
+                      <a:alpha val="40000"/>
+                    </a:prstClr>
+                  </a:outerShdw>
+                </a:effectLst>
+                <a:latin typeface="+mj-lt"/>
+                <a:ea typeface="+mj-ea"/>
+                <a:cs typeface="+mj-cs"/>
+              </a:defRPr>
+            </a:lvl1pPr>
+          </a:lstStyle>
+          <a:p>
+            <a:pPr algn="r" rtl="1"/>
+            <a:r>
+              <a:rPr lang="he-IL" sz="4000" dirty="0">
+                <a:solidFill>
+                  <a:srgbClr val="FFE701"/>
+                </a:solidFill>
+              </a:rPr>
+              <a:t>תיקיית </a:t>
+            </a:r>
+            <a:r>
+              <a:rPr lang="he-IL" sz="4000" dirty="0" err="1">
+                <a:solidFill>
+                  <a:srgbClr val="FFE701"/>
+                </a:solidFill>
+              </a:rPr>
+              <a:t>res</a:t>
+            </a:r>
+            <a:endParaRPr lang="he-IL" sz="4000" dirty="0">
+              <a:solidFill>
+                <a:srgbClr val="FFE701"/>
+              </a:solidFill>
+            </a:endParaRPr>
+          </a:p>
+        </p:txBody>
+      </p:sp>
+      <p:pic>
+        <p:nvPicPr>
+          <p:cNvPr id="5" name="Picture 4"/>
+          <p:cNvPicPr>
+            <a:picLocks noChangeAspect="1"/>
+          </p:cNvPicPr>
+          <p:nvPr/>
+        </p:nvPicPr>
+        <p:blipFill>
+          <a:blip r:embed="rId2">
+            <a:extLst>
+              <a:ext uri="{28A0092B-C50C-407E-A947-70E740481C1C}">
+                <a14:useLocalDpi xmlns:a14="http://schemas.microsoft.com/office/drawing/2010/main" val="0"/>
+              </a:ext>
+            </a:extLst>
+          </a:blip>
+          <a:stretch>
+            <a:fillRect/>
+          </a:stretch>
+        </p:blipFill>
+        <p:spPr>
+          <a:xfrm>
+            <a:off x="123061" y="1791112"/>
+            <a:ext cx="6626871" cy="3399723"/>
+          </a:xfrm>
+          <a:prstGeom prst="rect">
+            <a:avLst/>
+          </a:prstGeom>
+        </p:spPr>
+      </p:pic>
+      <p:sp>
+        <p:nvSpPr>
+          <p:cNvPr id="6" name="Rectangle 5"/>
+          <p:cNvSpPr/>
+          <p:nvPr/>
+        </p:nvSpPr>
+        <p:spPr>
+          <a:xfrm>
+            <a:off x="5837382" y="2088650"/>
+            <a:ext cx="812800" cy="146550"/>
+          </a:xfrm>
+          <a:prstGeom prst="rect">
+            <a:avLst/>
+          </a:prstGeom>
+          <a:noFill/>
+          <a:ln>
+            <a:solidFill>
+              <a:schemeClr val="accent2"/>
+            </a:solidFill>
+          </a:ln>
+        </p:spPr>
+        <p:style>
+          <a:lnRef idx="2">
+            <a:schemeClr val="accent2">
+              <a:shade val="50000"/>
+            </a:schemeClr>
+          </a:lnRef>
+          <a:fillRef idx="1">
+            <a:schemeClr val="accent2"/>
+          </a:fillRef>
+          <a:effectRef idx="0">
+            <a:schemeClr val="accent2"/>
+          </a:effectRef>
+          <a:fontRef idx="minor">
+            <a:schemeClr val="lt1"/>
+          </a:fontRef>
+        </p:style>
+        <p:txBody>
+          <a:bodyPr rtlCol="0" anchor="ctr"/>
+          <a:lstStyle/>
+          <a:p>
+            <a:pPr algn="ctr"/>
+            <a:endParaRPr lang="en-US"/>
+          </a:p>
+        </p:txBody>
+      </p:sp>
+      <p:sp>
+        <p:nvSpPr>
+          <p:cNvPr id="7" name="Content Placeholder 2"/>
+          <p:cNvSpPr txBox="1">
+            <a:spLocks/>
+          </p:cNvSpPr>
+          <p:nvPr/>
+        </p:nvSpPr>
+        <p:spPr>
+          <a:xfrm>
+            <a:off x="6862029" y="2156065"/>
+            <a:ext cx="2784762" cy="1144076"/>
+          </a:xfrm>
+          <a:prstGeom prst="rect">
+            <a:avLst/>
+          </a:prstGeom>
+        </p:spPr>
+        <p:txBody>
+          <a:bodyPr vert="horz" lIns="91440" tIns="45720" rIns="91440" bIns="45720" rtlCol="0">
+            <a:normAutofit fontScale="55000" lnSpcReduction="20000"/>
+          </a:bodyPr>
+          <a:lstStyle>
+            <a:lvl1pPr marL="457189" indent="-457189" algn="l" defTabSz="1219170" rtl="0" eaLnBrk="1" latinLnBrk="0" hangingPunct="1">
+              <a:spcBef>
+                <a:spcPct val="20000"/>
+              </a:spcBef>
+              <a:buFont typeface="Arial" pitchFamily="34" charset="0"/>
+              <a:buChar char="•"/>
+              <a:defRPr sz="3733" kern="1200">
+                <a:solidFill>
+                  <a:schemeClr val="bg1"/>
+                </a:solidFill>
+                <a:latin typeface="+mn-lt"/>
+                <a:ea typeface="+mn-ea"/>
+                <a:cs typeface="+mn-cs"/>
+              </a:defRPr>
+            </a:lvl1pPr>
+            <a:lvl2pPr marL="990575" indent="-380990" algn="l" defTabSz="1219170" rtl="0" eaLnBrk="1" latinLnBrk="0" hangingPunct="1">
+              <a:spcBef>
+                <a:spcPct val="20000"/>
+              </a:spcBef>
+              <a:buFont typeface="Arial" pitchFamily="34" charset="0"/>
+              <a:buChar char="–"/>
+              <a:defRPr sz="3733" kern="1200">
+                <a:solidFill>
+                  <a:schemeClr val="bg1"/>
+                </a:solidFill>
+                <a:latin typeface="+mn-lt"/>
+                <a:ea typeface="+mn-ea"/>
+                <a:cs typeface="+mn-cs"/>
+              </a:defRPr>
+            </a:lvl2pPr>
+            <a:lvl3pPr marL="1523962" indent="-304792" algn="l" defTabSz="1219170" rtl="0" eaLnBrk="1" latinLnBrk="0" hangingPunct="1">
+              <a:spcBef>
+                <a:spcPct val="20000"/>
+              </a:spcBef>
+              <a:buFont typeface="Arial" pitchFamily="34" charset="0"/>
+              <a:buChar char="•"/>
+              <a:defRPr sz="3200" kern="1200">
+                <a:solidFill>
+                  <a:schemeClr val="bg1"/>
+                </a:solidFill>
+                <a:latin typeface="+mn-lt"/>
+                <a:ea typeface="+mn-ea"/>
+                <a:cs typeface="+mn-cs"/>
+              </a:defRPr>
+            </a:lvl3pPr>
+            <a:lvl4pPr marL="2133547" indent="-304792" algn="l" defTabSz="1219170" rtl="0" eaLnBrk="1" latinLnBrk="0" hangingPunct="1">
+              <a:spcBef>
+                <a:spcPct val="20000"/>
+              </a:spcBef>
+              <a:buFont typeface="Arial" pitchFamily="34" charset="0"/>
+              <a:buChar char="–"/>
+              <a:defRPr sz="2667" kern="1200">
+                <a:solidFill>
+                  <a:schemeClr val="bg1"/>
+                </a:solidFill>
+                <a:latin typeface="+mn-lt"/>
+                <a:ea typeface="+mn-ea"/>
+                <a:cs typeface="+mn-cs"/>
+              </a:defRPr>
+            </a:lvl4pPr>
+            <a:lvl5pPr marL="2743131" indent="-304792" algn="l" defTabSz="1219170" rtl="0" eaLnBrk="1" latinLnBrk="0" hangingPunct="1">
+              <a:spcBef>
+                <a:spcPct val="20000"/>
+              </a:spcBef>
+              <a:buFont typeface="Arial" pitchFamily="34" charset="0"/>
+              <a:buChar char="»"/>
+              <a:defRPr sz="2667" kern="1200">
+                <a:solidFill>
+                  <a:schemeClr val="bg1"/>
+                </a:solidFill>
+                <a:latin typeface="+mn-lt"/>
+                <a:ea typeface="+mn-ea"/>
+                <a:cs typeface="+mn-cs"/>
+              </a:defRPr>
+            </a:lvl5pPr>
+            <a:lvl6pPr marL="3352716" indent="-304792" algn="l" defTabSz="1219170" rtl="0" eaLnBrk="1" latinLnBrk="0" hangingPunct="1">
+              <a:spcBef>
+                <a:spcPct val="20000"/>
+              </a:spcBef>
+              <a:buFont typeface="Arial" pitchFamily="34" charset="0"/>
+              <a:buChar char="•"/>
+              <a:defRPr sz="2667" kern="1200">
+                <a:solidFill>
+                  <a:schemeClr val="tx1"/>
+                </a:solidFill>
+                <a:latin typeface="+mn-lt"/>
+                <a:ea typeface="+mn-ea"/>
+                <a:cs typeface="+mn-cs"/>
+              </a:defRPr>
+            </a:lvl6pPr>
+            <a:lvl7pPr marL="3962301" indent="-304792" algn="l" defTabSz="1219170" rtl="0" eaLnBrk="1" latinLnBrk="0" hangingPunct="1">
+              <a:spcBef>
+                <a:spcPct val="20000"/>
+              </a:spcBef>
+              <a:buFont typeface="Arial" pitchFamily="34" charset="0"/>
+              <a:buChar char="•"/>
+              <a:defRPr sz="2667" kern="1200">
+                <a:solidFill>
+                  <a:schemeClr val="tx1"/>
+                </a:solidFill>
+                <a:latin typeface="+mn-lt"/>
+                <a:ea typeface="+mn-ea"/>
+                <a:cs typeface="+mn-cs"/>
+              </a:defRPr>
+            </a:lvl7pPr>
+            <a:lvl8pPr marL="4571886" indent="-304792" algn="l" defTabSz="1219170" rtl="0" eaLnBrk="1" latinLnBrk="0" hangingPunct="1">
+              <a:spcBef>
+                <a:spcPct val="20000"/>
+              </a:spcBef>
+              <a:buFont typeface="Arial" pitchFamily="34" charset="0"/>
+              <a:buChar char="•"/>
+              <a:defRPr sz="2667" kern="1200">
+                <a:solidFill>
+                  <a:schemeClr val="tx1"/>
+                </a:solidFill>
+                <a:latin typeface="+mn-lt"/>
+                <a:ea typeface="+mn-ea"/>
+                <a:cs typeface="+mn-cs"/>
+              </a:defRPr>
+            </a:lvl8pPr>
+            <a:lvl9pPr marL="5181470" indent="-304792" algn="l" defTabSz="1219170" rtl="0" eaLnBrk="1" latinLnBrk="0" hangingPunct="1">
+              <a:spcBef>
+                <a:spcPct val="20000"/>
+              </a:spcBef>
+              <a:buFont typeface="Arial" pitchFamily="34" charset="0"/>
+              <a:buChar char="•"/>
+              <a:defRPr sz="2667" kern="1200">
+                <a:solidFill>
+                  <a:schemeClr val="tx1"/>
+                </a:solidFill>
+                <a:latin typeface="+mn-lt"/>
+                <a:ea typeface="+mn-ea"/>
+                <a:cs typeface="+mn-cs"/>
+              </a:defRPr>
+            </a:lvl9pPr>
+          </a:lstStyle>
+          <a:p>
+            <a:pPr marL="0" indent="0" algn="r" rtl="1">
+              <a:buFont typeface="Arial" pitchFamily="34" charset="0"/>
+              <a:buNone/>
+            </a:pPr>
+            <a:r>
+              <a:rPr lang="en-US" dirty="0" smtClean="0"/>
+              <a:t>[some text about layout options (not in depth, just the different tabs)]</a:t>
+            </a:r>
+            <a:endParaRPr lang="en-US" dirty="0"/>
+          </a:p>
+        </p:txBody>
+      </p:sp>
+      <p:sp>
+        <p:nvSpPr>
+          <p:cNvPr id="11" name="Rectangle 10"/>
+          <p:cNvSpPr/>
+          <p:nvPr/>
+        </p:nvSpPr>
+        <p:spPr>
+          <a:xfrm>
+            <a:off x="374073" y="2641599"/>
+            <a:ext cx="743527" cy="166256"/>
+          </a:xfrm>
+          <a:prstGeom prst="rect">
+            <a:avLst/>
+          </a:prstGeom>
+          <a:noFill/>
+          <a:ln>
+            <a:solidFill>
+              <a:schemeClr val="accent2"/>
+            </a:solidFill>
+          </a:ln>
+        </p:spPr>
+        <p:style>
+          <a:lnRef idx="2">
+            <a:schemeClr val="accent2">
+              <a:shade val="50000"/>
+            </a:schemeClr>
+          </a:lnRef>
+          <a:fillRef idx="1">
+            <a:schemeClr val="accent2"/>
+          </a:fillRef>
+          <a:effectRef idx="0">
+            <a:schemeClr val="accent2"/>
+          </a:effectRef>
+          <a:fontRef idx="minor">
+            <a:schemeClr val="lt1"/>
+          </a:fontRef>
+        </p:style>
+        <p:txBody>
+          <a:bodyPr rtlCol="0" anchor="ctr"/>
+          <a:lstStyle/>
+          <a:p>
+            <a:pPr algn="ctr"/>
+            <a:endParaRPr lang="en-US"/>
+          </a:p>
+        </p:txBody>
+      </p:sp>
+    </p:spTree>
+    <p:extLst>
+      <p:ext uri="{BB962C8B-B14F-4D97-AF65-F5344CB8AC3E}">
+        <p14:creationId xmlns:p14="http://schemas.microsoft.com/office/powerpoint/2010/main" val="1704570684"/>
+      </p:ext>
+    </p:extLst>
+  </p:cSld>
+  <p:clrMapOvr>
+    <a:masterClrMapping/>
+  </p:clrMapOvr>
+  <p:timing>
+    <p:tnLst>
+      <p:par>
+        <p:cTn id="1" dur="indefinite" restart="never" nodeType="tmRoot"/>
+      </p:par>
+    </p:tnLst>
+  </p:timing>
+</p:sld>
+</file>
+
+<file path=ppt/slides/slide22.xml><?xml version="1.0" encoding="utf-8"?>
+<p:sld xmlns:a="http://schemas.openxmlformats.org/drawingml/2006/main" xmlns:r="http://schemas.openxmlformats.org/officeDocument/2006/relationships" xmlns:p="http://schemas.openxmlformats.org/presentationml/2006/main">
+  <p:cSld>
+    <p:spTree>
+      <p:nvGrpSpPr>
+        <p:cNvPr id="1" name=""/>
+        <p:cNvGrpSpPr/>
+        <p:nvPr/>
+      </p:nvGrpSpPr>
+      <p:grpSpPr>
+        <a:xfrm>
+          <a:off x="0" y="0"/>
+          <a:ext cx="0" cy="0"/>
+          <a:chOff x="0" y="0"/>
+          <a:chExt cx="0" cy="0"/>
+        </a:xfrm>
+      </p:grpSpPr>
+      <p:sp>
+        <p:nvSpPr>
+          <p:cNvPr id="2" name="Title 1"/>
+          <p:cNvSpPr>
+            <a:spLocks noGrp="1"/>
+          </p:cNvSpPr>
+          <p:nvPr>
+            <p:ph type="title"/>
+          </p:nvPr>
+        </p:nvSpPr>
+        <p:spPr/>
+        <p:txBody>
+          <a:bodyPr>
+            <a:normAutofit fontScale="90000"/>
+          </a:bodyPr>
+          <a:lstStyle/>
+          <a:p>
+            <a:pPr algn="r" rtl="1"/>
+            <a:r>
+              <a:rPr lang="he-IL" dirty="0"/>
+              <a:t>הרכב </a:t>
+            </a:r>
+            <a:r>
+              <a:rPr lang="he-IL" dirty="0" err="1" smtClean="0"/>
+              <a:t>הפרוייקט</a:t>
+            </a:r>
+            <a:endParaRPr lang="en-US" dirty="0"/>
+          </a:p>
+        </p:txBody>
+      </p:sp>
+      <p:sp>
+        <p:nvSpPr>
+          <p:cNvPr id="4" name="Title 1"/>
+          <p:cNvSpPr txBox="1">
+            <a:spLocks/>
+          </p:cNvSpPr>
+          <p:nvPr/>
+        </p:nvSpPr>
+        <p:spPr>
+          <a:xfrm>
+            <a:off x="598621" y="1089129"/>
+            <a:ext cx="7376537" cy="763525"/>
+          </a:xfrm>
+          <a:prstGeom prst="rect">
+            <a:avLst/>
+          </a:prstGeom>
+        </p:spPr>
+        <p:txBody>
+          <a:bodyPr vert="horz" lIns="91440" tIns="45720" rIns="91440" bIns="45720" rtlCol="0" anchor="ctr">
+            <a:normAutofit fontScale="97500"/>
+          </a:bodyPr>
+          <a:lstStyle>
+            <a:lvl1pPr algn="l" defTabSz="1219170" rtl="0" eaLnBrk="1" latinLnBrk="0" hangingPunct="1">
+              <a:spcBef>
+                <a:spcPct val="0"/>
+              </a:spcBef>
+              <a:buNone/>
+              <a:defRPr sz="4800" kern="1200">
+                <a:solidFill>
+                  <a:srgbClr val="FFC000"/>
+                </a:solidFill>
+                <a:effectLst>
+                  <a:outerShdw blurRad="50800" dist="38100" dir="2700000" algn="tl" rotWithShape="0">
+                    <a:prstClr val="black">
+                      <a:alpha val="40000"/>
+                    </a:prstClr>
+                  </a:outerShdw>
+                </a:effectLst>
+                <a:latin typeface="+mj-lt"/>
+                <a:ea typeface="+mj-ea"/>
+                <a:cs typeface="+mj-cs"/>
+              </a:defRPr>
+            </a:lvl1pPr>
+          </a:lstStyle>
+          <a:p>
+            <a:pPr algn="r" rtl="1"/>
+            <a:r>
+              <a:rPr lang="he-IL" sz="4000" dirty="0">
+                <a:solidFill>
+                  <a:srgbClr val="FFE701"/>
+                </a:solidFill>
+              </a:rPr>
+              <a:t>תיקיית </a:t>
+            </a:r>
+            <a:r>
+              <a:rPr lang="he-IL" sz="4000" dirty="0" err="1">
+                <a:solidFill>
+                  <a:srgbClr val="FFE701"/>
+                </a:solidFill>
+              </a:rPr>
+              <a:t>res</a:t>
+            </a:r>
+            <a:endParaRPr lang="he-IL" sz="4000" dirty="0">
+              <a:solidFill>
+                <a:srgbClr val="FFE701"/>
+              </a:solidFill>
+            </a:endParaRPr>
+          </a:p>
+        </p:txBody>
+      </p:sp>
+      <p:pic>
+        <p:nvPicPr>
+          <p:cNvPr id="5" name="Picture 4"/>
+          <p:cNvPicPr>
+            <a:picLocks noChangeAspect="1"/>
+          </p:cNvPicPr>
+          <p:nvPr/>
+        </p:nvPicPr>
+        <p:blipFill>
+          <a:blip r:embed="rId2">
+            <a:extLst>
+              <a:ext uri="{28A0092B-C50C-407E-A947-70E740481C1C}">
+                <a14:useLocalDpi xmlns:a14="http://schemas.microsoft.com/office/drawing/2010/main" val="0"/>
+              </a:ext>
+            </a:extLst>
+          </a:blip>
+          <a:stretch>
+            <a:fillRect/>
+          </a:stretch>
+        </p:blipFill>
+        <p:spPr>
+          <a:xfrm>
+            <a:off x="123061" y="1823901"/>
+            <a:ext cx="6626871" cy="3334144"/>
+          </a:xfrm>
+          <a:prstGeom prst="rect">
+            <a:avLst/>
+          </a:prstGeom>
+        </p:spPr>
+      </p:pic>
+      <p:sp>
+        <p:nvSpPr>
+          <p:cNvPr id="6" name="Rectangle 5"/>
+          <p:cNvSpPr/>
+          <p:nvPr/>
+        </p:nvSpPr>
+        <p:spPr>
+          <a:xfrm>
+            <a:off x="392809" y="2848176"/>
+            <a:ext cx="613955" cy="356841"/>
+          </a:xfrm>
+          <a:prstGeom prst="rect">
+            <a:avLst/>
+          </a:prstGeom>
+          <a:noFill/>
+          <a:ln>
+            <a:solidFill>
+              <a:schemeClr val="accent2"/>
+            </a:solidFill>
+          </a:ln>
+        </p:spPr>
+        <p:style>
+          <a:lnRef idx="2">
+            <a:schemeClr val="accent2">
+              <a:shade val="50000"/>
+            </a:schemeClr>
+          </a:lnRef>
+          <a:fillRef idx="1">
+            <a:schemeClr val="accent2"/>
+          </a:fillRef>
+          <a:effectRef idx="0">
+            <a:schemeClr val="accent2"/>
+          </a:effectRef>
+          <a:fontRef idx="minor">
+            <a:schemeClr val="lt1"/>
+          </a:fontRef>
+        </p:style>
+        <p:txBody>
+          <a:bodyPr rtlCol="0" anchor="ctr"/>
+          <a:lstStyle/>
+          <a:p>
+            <a:pPr algn="ctr"/>
+            <a:endParaRPr lang="en-US"/>
+          </a:p>
+        </p:txBody>
+      </p:sp>
+      <p:sp>
+        <p:nvSpPr>
+          <p:cNvPr id="7" name="Content Placeholder 2"/>
+          <p:cNvSpPr txBox="1">
+            <a:spLocks/>
+          </p:cNvSpPr>
+          <p:nvPr/>
+        </p:nvSpPr>
+        <p:spPr>
+          <a:xfrm>
+            <a:off x="6862029" y="2156065"/>
+            <a:ext cx="2784762" cy="1144076"/>
+          </a:xfrm>
+          <a:prstGeom prst="rect">
+            <a:avLst/>
+          </a:prstGeom>
+        </p:spPr>
+        <p:txBody>
+          <a:bodyPr vert="horz" lIns="91440" tIns="45720" rIns="91440" bIns="45720" rtlCol="0">
+            <a:normAutofit fontScale="77500" lnSpcReduction="20000"/>
+          </a:bodyPr>
+          <a:lstStyle>
+            <a:lvl1pPr marL="457189" indent="-457189" algn="l" defTabSz="1219170" rtl="0" eaLnBrk="1" latinLnBrk="0" hangingPunct="1">
+              <a:spcBef>
+                <a:spcPct val="20000"/>
+              </a:spcBef>
+              <a:buFont typeface="Arial" pitchFamily="34" charset="0"/>
+              <a:buChar char="•"/>
+              <a:defRPr sz="3733" kern="1200">
+                <a:solidFill>
+                  <a:schemeClr val="bg1"/>
+                </a:solidFill>
+                <a:latin typeface="+mn-lt"/>
+                <a:ea typeface="+mn-ea"/>
+                <a:cs typeface="+mn-cs"/>
+              </a:defRPr>
+            </a:lvl1pPr>
+            <a:lvl2pPr marL="990575" indent="-380990" algn="l" defTabSz="1219170" rtl="0" eaLnBrk="1" latinLnBrk="0" hangingPunct="1">
+              <a:spcBef>
+                <a:spcPct val="20000"/>
+              </a:spcBef>
+              <a:buFont typeface="Arial" pitchFamily="34" charset="0"/>
+              <a:buChar char="–"/>
+              <a:defRPr sz="3733" kern="1200">
+                <a:solidFill>
+                  <a:schemeClr val="bg1"/>
+                </a:solidFill>
+                <a:latin typeface="+mn-lt"/>
+                <a:ea typeface="+mn-ea"/>
+                <a:cs typeface="+mn-cs"/>
+              </a:defRPr>
+            </a:lvl2pPr>
+            <a:lvl3pPr marL="1523962" indent="-304792" algn="l" defTabSz="1219170" rtl="0" eaLnBrk="1" latinLnBrk="0" hangingPunct="1">
+              <a:spcBef>
+                <a:spcPct val="20000"/>
+              </a:spcBef>
+              <a:buFont typeface="Arial" pitchFamily="34" charset="0"/>
+              <a:buChar char="•"/>
+              <a:defRPr sz="3200" kern="1200">
+                <a:solidFill>
+                  <a:schemeClr val="bg1"/>
+                </a:solidFill>
+                <a:latin typeface="+mn-lt"/>
+                <a:ea typeface="+mn-ea"/>
+                <a:cs typeface="+mn-cs"/>
+              </a:defRPr>
+            </a:lvl3pPr>
+            <a:lvl4pPr marL="2133547" indent="-304792" algn="l" defTabSz="1219170" rtl="0" eaLnBrk="1" latinLnBrk="0" hangingPunct="1">
+              <a:spcBef>
+                <a:spcPct val="20000"/>
+              </a:spcBef>
+              <a:buFont typeface="Arial" pitchFamily="34" charset="0"/>
+              <a:buChar char="–"/>
+              <a:defRPr sz="2667" kern="1200">
+                <a:solidFill>
+                  <a:schemeClr val="bg1"/>
+                </a:solidFill>
+                <a:latin typeface="+mn-lt"/>
+                <a:ea typeface="+mn-ea"/>
+                <a:cs typeface="+mn-cs"/>
+              </a:defRPr>
+            </a:lvl4pPr>
+            <a:lvl5pPr marL="2743131" indent="-304792" algn="l" defTabSz="1219170" rtl="0" eaLnBrk="1" latinLnBrk="0" hangingPunct="1">
+              <a:spcBef>
+                <a:spcPct val="20000"/>
+              </a:spcBef>
+              <a:buFont typeface="Arial" pitchFamily="34" charset="0"/>
+              <a:buChar char="»"/>
+              <a:defRPr sz="2667" kern="1200">
+                <a:solidFill>
+                  <a:schemeClr val="bg1"/>
+                </a:solidFill>
+                <a:latin typeface="+mn-lt"/>
+                <a:ea typeface="+mn-ea"/>
+                <a:cs typeface="+mn-cs"/>
+              </a:defRPr>
+            </a:lvl5pPr>
+            <a:lvl6pPr marL="3352716" indent="-304792" algn="l" defTabSz="1219170" rtl="0" eaLnBrk="1" latinLnBrk="0" hangingPunct="1">
+              <a:spcBef>
+                <a:spcPct val="20000"/>
+              </a:spcBef>
+              <a:buFont typeface="Arial" pitchFamily="34" charset="0"/>
+              <a:buChar char="•"/>
+              <a:defRPr sz="2667" kern="1200">
+                <a:solidFill>
+                  <a:schemeClr val="tx1"/>
+                </a:solidFill>
+                <a:latin typeface="+mn-lt"/>
+                <a:ea typeface="+mn-ea"/>
+                <a:cs typeface="+mn-cs"/>
+              </a:defRPr>
+            </a:lvl6pPr>
+            <a:lvl7pPr marL="3962301" indent="-304792" algn="l" defTabSz="1219170" rtl="0" eaLnBrk="1" latinLnBrk="0" hangingPunct="1">
+              <a:spcBef>
+                <a:spcPct val="20000"/>
+              </a:spcBef>
+              <a:buFont typeface="Arial" pitchFamily="34" charset="0"/>
+              <a:buChar char="•"/>
+              <a:defRPr sz="2667" kern="1200">
+                <a:solidFill>
+                  <a:schemeClr val="tx1"/>
+                </a:solidFill>
+                <a:latin typeface="+mn-lt"/>
+                <a:ea typeface="+mn-ea"/>
+                <a:cs typeface="+mn-cs"/>
+              </a:defRPr>
+            </a:lvl7pPr>
+            <a:lvl8pPr marL="4571886" indent="-304792" algn="l" defTabSz="1219170" rtl="0" eaLnBrk="1" latinLnBrk="0" hangingPunct="1">
+              <a:spcBef>
+                <a:spcPct val="20000"/>
+              </a:spcBef>
+              <a:buFont typeface="Arial" pitchFamily="34" charset="0"/>
+              <a:buChar char="•"/>
+              <a:defRPr sz="2667" kern="1200">
+                <a:solidFill>
+                  <a:schemeClr val="tx1"/>
+                </a:solidFill>
+                <a:latin typeface="+mn-lt"/>
+                <a:ea typeface="+mn-ea"/>
+                <a:cs typeface="+mn-cs"/>
+              </a:defRPr>
+            </a:lvl8pPr>
+            <a:lvl9pPr marL="5181470" indent="-304792" algn="l" defTabSz="1219170" rtl="0" eaLnBrk="1" latinLnBrk="0" hangingPunct="1">
+              <a:spcBef>
+                <a:spcPct val="20000"/>
+              </a:spcBef>
+              <a:buFont typeface="Arial" pitchFamily="34" charset="0"/>
+              <a:buChar char="•"/>
+              <a:defRPr sz="2667" kern="1200">
+                <a:solidFill>
+                  <a:schemeClr val="tx1"/>
+                </a:solidFill>
+                <a:latin typeface="+mn-lt"/>
+                <a:ea typeface="+mn-ea"/>
+                <a:cs typeface="+mn-cs"/>
+              </a:defRPr>
+            </a:lvl9pPr>
+          </a:lstStyle>
+          <a:p>
+            <a:pPr marL="0" indent="0" algn="r" rtl="1">
+              <a:buFont typeface="Arial" pitchFamily="34" charset="0"/>
+              <a:buNone/>
+            </a:pPr>
+            <a:r>
+              <a:rPr lang="en-US" dirty="0" smtClean="0"/>
+              <a:t>[some text about values xml files)]</a:t>
+            </a:r>
+            <a:endParaRPr lang="en-US" dirty="0"/>
+          </a:p>
+        </p:txBody>
+      </p:sp>
+    </p:spTree>
+    <p:extLst>
+      <p:ext uri="{BB962C8B-B14F-4D97-AF65-F5344CB8AC3E}">
+        <p14:creationId xmlns:p14="http://schemas.microsoft.com/office/powerpoint/2010/main" val="1872650052"/>
       </p:ext>
     </p:extLst>
   </p:cSld>

</xml_diff>

<commit_message>
added image and placeholder for java folder
</commit_message>
<xml_diff>
--- a/Android Presentation - Java Workshop.pptx
+++ b/Android Presentation - Java Workshop.pptx
@@ -27,6 +27,7 @@
     <p:sldId id="282" r:id="rId21"/>
     <p:sldId id="283" r:id="rId22"/>
     <p:sldId id="284" r:id="rId23"/>
+    <p:sldId id="285" r:id="rId24"/>
   </p:sldIdLst>
   <p:sldSz cx="12192000" cy="6858000"/>
   <p:notesSz cx="6858000" cy="9144000"/>
@@ -9584,6 +9585,394 @@
     <p:extLst>
       <p:ext uri="{BB962C8B-B14F-4D97-AF65-F5344CB8AC3E}">
         <p14:creationId xmlns:p14="http://schemas.microsoft.com/office/powerpoint/2010/main" val="1872650052"/>
+      </p:ext>
+    </p:extLst>
+  </p:cSld>
+  <p:clrMapOvr>
+    <a:masterClrMapping/>
+  </p:clrMapOvr>
+  <p:timing>
+    <p:tnLst>
+      <p:par>
+        <p:cTn id="1" dur="indefinite" restart="never" nodeType="tmRoot"/>
+      </p:par>
+    </p:tnLst>
+  </p:timing>
+</p:sld>
+</file>
+
+<file path=ppt/slides/slide23.xml><?xml version="1.0" encoding="utf-8"?>
+<p:sld xmlns:a="http://schemas.openxmlformats.org/drawingml/2006/main" xmlns:r="http://schemas.openxmlformats.org/officeDocument/2006/relationships" xmlns:p="http://schemas.openxmlformats.org/presentationml/2006/main">
+  <p:cSld>
+    <p:spTree>
+      <p:nvGrpSpPr>
+        <p:cNvPr id="1" name=""/>
+        <p:cNvGrpSpPr/>
+        <p:nvPr/>
+      </p:nvGrpSpPr>
+      <p:grpSpPr>
+        <a:xfrm>
+          <a:off x="0" y="0"/>
+          <a:ext cx="0" cy="0"/>
+          <a:chOff x="0" y="0"/>
+          <a:chExt cx="0" cy="0"/>
+        </a:xfrm>
+      </p:grpSpPr>
+      <p:sp>
+        <p:nvSpPr>
+          <p:cNvPr id="2" name="Title 1"/>
+          <p:cNvSpPr>
+            <a:spLocks noGrp="1"/>
+          </p:cNvSpPr>
+          <p:nvPr>
+            <p:ph type="title"/>
+          </p:nvPr>
+        </p:nvSpPr>
+        <p:spPr/>
+        <p:txBody>
+          <a:bodyPr>
+            <a:normAutofit fontScale="90000"/>
+          </a:bodyPr>
+          <a:lstStyle/>
+          <a:p>
+            <a:pPr algn="r" rtl="1"/>
+            <a:r>
+              <a:rPr lang="he-IL" dirty="0"/>
+              <a:t>הרכב </a:t>
+            </a:r>
+            <a:r>
+              <a:rPr lang="he-IL" dirty="0" err="1" smtClean="0"/>
+              <a:t>הפרוייקט</a:t>
+            </a:r>
+            <a:endParaRPr lang="en-US" dirty="0"/>
+          </a:p>
+        </p:txBody>
+      </p:sp>
+      <p:sp>
+        <p:nvSpPr>
+          <p:cNvPr id="4" name="Title 1"/>
+          <p:cNvSpPr txBox="1">
+            <a:spLocks/>
+          </p:cNvSpPr>
+          <p:nvPr/>
+        </p:nvSpPr>
+        <p:spPr>
+          <a:xfrm>
+            <a:off x="598621" y="1089129"/>
+            <a:ext cx="7376537" cy="763525"/>
+          </a:xfrm>
+          <a:prstGeom prst="rect">
+            <a:avLst/>
+          </a:prstGeom>
+        </p:spPr>
+        <p:txBody>
+          <a:bodyPr vert="horz" lIns="91440" tIns="45720" rIns="91440" bIns="45720" rtlCol="0" anchor="ctr">
+            <a:normAutofit fontScale="97500"/>
+          </a:bodyPr>
+          <a:lstStyle>
+            <a:lvl1pPr algn="l" defTabSz="1219170" rtl="0" eaLnBrk="1" latinLnBrk="0" hangingPunct="1">
+              <a:spcBef>
+                <a:spcPct val="0"/>
+              </a:spcBef>
+              <a:buNone/>
+              <a:defRPr sz="4800" kern="1200">
+                <a:solidFill>
+                  <a:srgbClr val="FFC000"/>
+                </a:solidFill>
+                <a:effectLst>
+                  <a:outerShdw blurRad="50800" dist="38100" dir="2700000" algn="tl" rotWithShape="0">
+                    <a:prstClr val="black">
+                      <a:alpha val="40000"/>
+                    </a:prstClr>
+                  </a:outerShdw>
+                </a:effectLst>
+                <a:latin typeface="+mj-lt"/>
+                <a:ea typeface="+mj-ea"/>
+                <a:cs typeface="+mj-cs"/>
+              </a:defRPr>
+            </a:lvl1pPr>
+          </a:lstStyle>
+          <a:p>
+            <a:pPr algn="r" rtl="1"/>
+            <a:r>
+              <a:rPr lang="he-IL" sz="4000" dirty="0">
+                <a:solidFill>
+                  <a:srgbClr val="FFE701"/>
+                </a:solidFill>
+              </a:rPr>
+              <a:t>תיקיית </a:t>
+            </a:r>
+            <a:r>
+              <a:rPr lang="he-IL" sz="4000" dirty="0" err="1">
+                <a:solidFill>
+                  <a:srgbClr val="FFE701"/>
+                </a:solidFill>
+              </a:rPr>
+              <a:t>java</a:t>
+            </a:r>
+            <a:endParaRPr lang="he-IL" sz="4000" dirty="0">
+              <a:solidFill>
+                <a:srgbClr val="FFE701"/>
+              </a:solidFill>
+            </a:endParaRPr>
+          </a:p>
+        </p:txBody>
+      </p:sp>
+      <p:pic>
+        <p:nvPicPr>
+          <p:cNvPr id="5" name="Picture 4"/>
+          <p:cNvPicPr>
+            <a:picLocks noChangeAspect="1"/>
+          </p:cNvPicPr>
+          <p:nvPr/>
+        </p:nvPicPr>
+        <p:blipFill>
+          <a:blip r:embed="rId2">
+            <a:extLst>
+              <a:ext uri="{28A0092B-C50C-407E-A947-70E740481C1C}">
+                <a14:useLocalDpi xmlns:a14="http://schemas.microsoft.com/office/drawing/2010/main" val="0"/>
+              </a:ext>
+            </a:extLst>
+          </a:blip>
+          <a:stretch>
+            <a:fillRect/>
+          </a:stretch>
+        </p:blipFill>
+        <p:spPr>
+          <a:xfrm>
+            <a:off x="259264" y="1751848"/>
+            <a:ext cx="2046334" cy="1583191"/>
+          </a:xfrm>
+          <a:prstGeom prst="rect">
+            <a:avLst/>
+          </a:prstGeom>
+        </p:spPr>
+      </p:pic>
+      <p:sp>
+        <p:nvSpPr>
+          <p:cNvPr id="6" name="Rectangle 5"/>
+          <p:cNvSpPr/>
+          <p:nvPr/>
+        </p:nvSpPr>
+        <p:spPr>
+          <a:xfrm>
+            <a:off x="259264" y="2156065"/>
+            <a:ext cx="2046334" cy="605608"/>
+          </a:xfrm>
+          <a:prstGeom prst="rect">
+            <a:avLst/>
+          </a:prstGeom>
+          <a:noFill/>
+          <a:ln>
+            <a:solidFill>
+              <a:schemeClr val="accent2"/>
+            </a:solidFill>
+          </a:ln>
+        </p:spPr>
+        <p:style>
+          <a:lnRef idx="2">
+            <a:schemeClr val="accent2">
+              <a:shade val="50000"/>
+            </a:schemeClr>
+          </a:lnRef>
+          <a:fillRef idx="1">
+            <a:schemeClr val="accent2"/>
+          </a:fillRef>
+          <a:effectRef idx="0">
+            <a:schemeClr val="accent2"/>
+          </a:effectRef>
+          <a:fontRef idx="minor">
+            <a:schemeClr val="lt1"/>
+          </a:fontRef>
+        </p:style>
+        <p:txBody>
+          <a:bodyPr rtlCol="0" anchor="ctr"/>
+          <a:lstStyle/>
+          <a:p>
+            <a:pPr algn="ctr"/>
+            <a:endParaRPr lang="en-US"/>
+          </a:p>
+        </p:txBody>
+      </p:sp>
+      <p:sp>
+        <p:nvSpPr>
+          <p:cNvPr id="7" name="Content Placeholder 2"/>
+          <p:cNvSpPr txBox="1">
+            <a:spLocks/>
+          </p:cNvSpPr>
+          <p:nvPr/>
+        </p:nvSpPr>
+        <p:spPr>
+          <a:xfrm>
+            <a:off x="2586182" y="2156064"/>
+            <a:ext cx="6788727" cy="4244735"/>
+          </a:xfrm>
+          <a:prstGeom prst="rect">
+            <a:avLst/>
+          </a:prstGeom>
+        </p:spPr>
+        <p:txBody>
+          <a:bodyPr vert="horz" lIns="91440" tIns="45720" rIns="91440" bIns="45720" rtlCol="0">
+            <a:normAutofit/>
+          </a:bodyPr>
+          <a:lstStyle>
+            <a:lvl1pPr marL="457189" indent="-457189" algn="l" defTabSz="1219170" rtl="0" eaLnBrk="1" latinLnBrk="0" hangingPunct="1">
+              <a:spcBef>
+                <a:spcPct val="20000"/>
+              </a:spcBef>
+              <a:buFont typeface="Arial" pitchFamily="34" charset="0"/>
+              <a:buChar char="•"/>
+              <a:defRPr sz="3733" kern="1200">
+                <a:solidFill>
+                  <a:schemeClr val="bg1"/>
+                </a:solidFill>
+                <a:latin typeface="+mn-lt"/>
+                <a:ea typeface="+mn-ea"/>
+                <a:cs typeface="+mn-cs"/>
+              </a:defRPr>
+            </a:lvl1pPr>
+            <a:lvl2pPr marL="990575" indent="-380990" algn="l" defTabSz="1219170" rtl="0" eaLnBrk="1" latinLnBrk="0" hangingPunct="1">
+              <a:spcBef>
+                <a:spcPct val="20000"/>
+              </a:spcBef>
+              <a:buFont typeface="Arial" pitchFamily="34" charset="0"/>
+              <a:buChar char="–"/>
+              <a:defRPr sz="3733" kern="1200">
+                <a:solidFill>
+                  <a:schemeClr val="bg1"/>
+                </a:solidFill>
+                <a:latin typeface="+mn-lt"/>
+                <a:ea typeface="+mn-ea"/>
+                <a:cs typeface="+mn-cs"/>
+              </a:defRPr>
+            </a:lvl2pPr>
+            <a:lvl3pPr marL="1523962" indent="-304792" algn="l" defTabSz="1219170" rtl="0" eaLnBrk="1" latinLnBrk="0" hangingPunct="1">
+              <a:spcBef>
+                <a:spcPct val="20000"/>
+              </a:spcBef>
+              <a:buFont typeface="Arial" pitchFamily="34" charset="0"/>
+              <a:buChar char="•"/>
+              <a:defRPr sz="3200" kern="1200">
+                <a:solidFill>
+                  <a:schemeClr val="bg1"/>
+                </a:solidFill>
+                <a:latin typeface="+mn-lt"/>
+                <a:ea typeface="+mn-ea"/>
+                <a:cs typeface="+mn-cs"/>
+              </a:defRPr>
+            </a:lvl3pPr>
+            <a:lvl4pPr marL="2133547" indent="-304792" algn="l" defTabSz="1219170" rtl="0" eaLnBrk="1" latinLnBrk="0" hangingPunct="1">
+              <a:spcBef>
+                <a:spcPct val="20000"/>
+              </a:spcBef>
+              <a:buFont typeface="Arial" pitchFamily="34" charset="0"/>
+              <a:buChar char="–"/>
+              <a:defRPr sz="2667" kern="1200">
+                <a:solidFill>
+                  <a:schemeClr val="bg1"/>
+                </a:solidFill>
+                <a:latin typeface="+mn-lt"/>
+                <a:ea typeface="+mn-ea"/>
+                <a:cs typeface="+mn-cs"/>
+              </a:defRPr>
+            </a:lvl4pPr>
+            <a:lvl5pPr marL="2743131" indent="-304792" algn="l" defTabSz="1219170" rtl="0" eaLnBrk="1" latinLnBrk="0" hangingPunct="1">
+              <a:spcBef>
+                <a:spcPct val="20000"/>
+              </a:spcBef>
+              <a:buFont typeface="Arial" pitchFamily="34" charset="0"/>
+              <a:buChar char="»"/>
+              <a:defRPr sz="2667" kern="1200">
+                <a:solidFill>
+                  <a:schemeClr val="bg1"/>
+                </a:solidFill>
+                <a:latin typeface="+mn-lt"/>
+                <a:ea typeface="+mn-ea"/>
+                <a:cs typeface="+mn-cs"/>
+              </a:defRPr>
+            </a:lvl5pPr>
+            <a:lvl6pPr marL="3352716" indent="-304792" algn="l" defTabSz="1219170" rtl="0" eaLnBrk="1" latinLnBrk="0" hangingPunct="1">
+              <a:spcBef>
+                <a:spcPct val="20000"/>
+              </a:spcBef>
+              <a:buFont typeface="Arial" pitchFamily="34" charset="0"/>
+              <a:buChar char="•"/>
+              <a:defRPr sz="2667" kern="1200">
+                <a:solidFill>
+                  <a:schemeClr val="tx1"/>
+                </a:solidFill>
+                <a:latin typeface="+mn-lt"/>
+                <a:ea typeface="+mn-ea"/>
+                <a:cs typeface="+mn-cs"/>
+              </a:defRPr>
+            </a:lvl6pPr>
+            <a:lvl7pPr marL="3962301" indent="-304792" algn="l" defTabSz="1219170" rtl="0" eaLnBrk="1" latinLnBrk="0" hangingPunct="1">
+              <a:spcBef>
+                <a:spcPct val="20000"/>
+              </a:spcBef>
+              <a:buFont typeface="Arial" pitchFamily="34" charset="0"/>
+              <a:buChar char="•"/>
+              <a:defRPr sz="2667" kern="1200">
+                <a:solidFill>
+                  <a:schemeClr val="tx1"/>
+                </a:solidFill>
+                <a:latin typeface="+mn-lt"/>
+                <a:ea typeface="+mn-ea"/>
+                <a:cs typeface="+mn-cs"/>
+              </a:defRPr>
+            </a:lvl7pPr>
+            <a:lvl8pPr marL="4571886" indent="-304792" algn="l" defTabSz="1219170" rtl="0" eaLnBrk="1" latinLnBrk="0" hangingPunct="1">
+              <a:spcBef>
+                <a:spcPct val="20000"/>
+              </a:spcBef>
+              <a:buFont typeface="Arial" pitchFamily="34" charset="0"/>
+              <a:buChar char="•"/>
+              <a:defRPr sz="2667" kern="1200">
+                <a:solidFill>
+                  <a:schemeClr val="tx1"/>
+                </a:solidFill>
+                <a:latin typeface="+mn-lt"/>
+                <a:ea typeface="+mn-ea"/>
+                <a:cs typeface="+mn-cs"/>
+              </a:defRPr>
+            </a:lvl8pPr>
+            <a:lvl9pPr marL="5181470" indent="-304792" algn="l" defTabSz="1219170" rtl="0" eaLnBrk="1" latinLnBrk="0" hangingPunct="1">
+              <a:spcBef>
+                <a:spcPct val="20000"/>
+              </a:spcBef>
+              <a:buFont typeface="Arial" pitchFamily="34" charset="0"/>
+              <a:buChar char="•"/>
+              <a:defRPr sz="2667" kern="1200">
+                <a:solidFill>
+                  <a:schemeClr val="tx1"/>
+                </a:solidFill>
+                <a:latin typeface="+mn-lt"/>
+                <a:ea typeface="+mn-ea"/>
+                <a:cs typeface="+mn-cs"/>
+              </a:defRPr>
+            </a:lvl9pPr>
+          </a:lstStyle>
+          <a:p>
+            <a:pPr marL="0" indent="0" algn="r" rtl="1">
+              <a:buFont typeface="Arial" pitchFamily="34" charset="0"/>
+              <a:buNone/>
+            </a:pPr>
+            <a:r>
+              <a:rPr lang="en-US" dirty="0" smtClean="0"/>
+              <a:t>[some text about the java folder, about how we are talking about the one that isn’t related to “test”. Like the root of a normal </a:t>
+            </a:r>
+            <a:r>
+              <a:rPr lang="en-US" smtClean="0"/>
+              <a:t>java project]</a:t>
+            </a:r>
+            <a:endParaRPr lang="en-US" dirty="0"/>
+          </a:p>
+        </p:txBody>
+      </p:sp>
+    </p:spTree>
+    <p:extLst>
+      <p:ext uri="{BB962C8B-B14F-4D97-AF65-F5344CB8AC3E}">
+        <p14:creationId xmlns:p14="http://schemas.microsoft.com/office/powerpoint/2010/main" val="1868763568"/>
       </p:ext>
     </p:extLst>
   </p:cSld>

</xml_diff>

<commit_message>
filled in manifest page
</commit_message>
<xml_diff>
--- a/Android Presentation - Java Workshop.pptx
+++ b/Android Presentation - Java Workshop.pptx
@@ -356,7 +356,7 @@
             <a:fld id="{53074F12-AA26-4AC8-9962-C36BB8F32554}" type="datetimeFigureOut">
               <a:rPr lang="en-US" smtClean="0"/>
               <a:pPr/>
-              <a:t>5/21/21</a:t>
+              <a:t>21-May-21</a:t>
             </a:fld>
             <a:endParaRPr lang="en-US"/>
           </a:p>
@@ -611,7 +611,7 @@
             <a:fld id="{53074F12-AA26-4AC8-9962-C36BB8F32554}" type="datetimeFigureOut">
               <a:rPr lang="en-US" smtClean="0"/>
               <a:pPr/>
-              <a:t>5/21/21</a:t>
+              <a:t>21-May-21</a:t>
             </a:fld>
             <a:endParaRPr lang="en-US"/>
           </a:p>
@@ -783,7 +783,7 @@
             <a:fld id="{53074F12-AA26-4AC8-9962-C36BB8F32554}" type="datetimeFigureOut">
               <a:rPr lang="en-US" smtClean="0"/>
               <a:pPr/>
-              <a:t>5/21/21</a:t>
+              <a:t>21-May-21</a:t>
             </a:fld>
             <a:endParaRPr lang="en-US"/>
           </a:p>
@@ -965,7 +965,7 @@
             <a:fld id="{53074F12-AA26-4AC8-9962-C36BB8F32554}" type="datetimeFigureOut">
               <a:rPr lang="en-US" smtClean="0"/>
               <a:pPr/>
-              <a:t>5/21/21</a:t>
+              <a:t>21-May-21</a:t>
             </a:fld>
             <a:endParaRPr lang="en-US"/>
           </a:p>
@@ -1200,7 +1200,7 @@
             <a:fld id="{53074F12-AA26-4AC8-9962-C36BB8F32554}" type="datetimeFigureOut">
               <a:rPr lang="en-US" smtClean="0"/>
               <a:pPr/>
-              <a:t>5/21/21</a:t>
+              <a:t>21-May-21</a:t>
             </a:fld>
             <a:endParaRPr lang="en-US"/>
           </a:p>
@@ -1449,7 +1449,7 @@
             <a:fld id="{53074F12-AA26-4AC8-9962-C36BB8F32554}" type="datetimeFigureOut">
               <a:rPr lang="en-US" smtClean="0"/>
               <a:pPr/>
-              <a:t>5/21/21</a:t>
+              <a:t>21-May-21</a:t>
             </a:fld>
             <a:endParaRPr lang="en-US"/>
           </a:p>
@@ -1697,7 +1697,7 @@
             <a:fld id="{53074F12-AA26-4AC8-9962-C36BB8F32554}" type="datetimeFigureOut">
               <a:rPr lang="en-US" smtClean="0"/>
               <a:pPr/>
-              <a:t>5/21/21</a:t>
+              <a:t>21-May-21</a:t>
             </a:fld>
             <a:endParaRPr lang="en-US"/>
           </a:p>
@@ -1987,7 +1987,7 @@
             <a:fld id="{53074F12-AA26-4AC8-9962-C36BB8F32554}" type="datetimeFigureOut">
               <a:rPr lang="en-US" smtClean="0"/>
               <a:pPr/>
-              <a:t>5/21/21</a:t>
+              <a:t>21-May-21</a:t>
             </a:fld>
             <a:endParaRPr lang="en-US"/>
           </a:p>
@@ -2477,7 +2477,7 @@
             <a:fld id="{53074F12-AA26-4AC8-9962-C36BB8F32554}" type="datetimeFigureOut">
               <a:rPr lang="en-US" smtClean="0"/>
               <a:pPr/>
-              <a:t>5/21/21</a:t>
+              <a:t>21-May-21</a:t>
             </a:fld>
             <a:endParaRPr lang="en-US"/>
           </a:p>
@@ -2597,7 +2597,7 @@
             <a:fld id="{53074F12-AA26-4AC8-9962-C36BB8F32554}" type="datetimeFigureOut">
               <a:rPr lang="en-US" smtClean="0"/>
               <a:pPr/>
-              <a:t>5/21/21</a:t>
+              <a:t>21-May-21</a:t>
             </a:fld>
             <a:endParaRPr lang="en-US"/>
           </a:p>
@@ -2694,7 +2694,7 @@
             <a:fld id="{53074F12-AA26-4AC8-9962-C36BB8F32554}" type="datetimeFigureOut">
               <a:rPr lang="en-US" smtClean="0"/>
               <a:pPr/>
-              <a:t>5/21/21</a:t>
+              <a:t>21-May-21</a:t>
             </a:fld>
             <a:endParaRPr lang="en-US"/>
           </a:p>
@@ -2973,7 +2973,7 @@
             <a:fld id="{53074F12-AA26-4AC8-9962-C36BB8F32554}" type="datetimeFigureOut">
               <a:rPr lang="en-US" smtClean="0"/>
               <a:pPr/>
-              <a:t>5/21/21</a:t>
+              <a:t>21-May-21</a:t>
             </a:fld>
             <a:endParaRPr lang="en-US"/>
           </a:p>
@@ -3197,7 +3197,7 @@
             <a:fld id="{53074F12-AA26-4AC8-9962-C36BB8F32554}" type="datetimeFigureOut">
               <a:rPr lang="en-US" smtClean="0"/>
               <a:pPr/>
-              <a:t>5/21/21</a:t>
+              <a:t>21-May-21</a:t>
             </a:fld>
             <a:endParaRPr lang="en-US"/>
           </a:p>
@@ -7504,13 +7504,13 @@
         </p:nvSpPr>
         <p:spPr>
           <a:xfrm>
-            <a:off x="6474691" y="1852654"/>
-            <a:ext cx="2064590" cy="4426840"/>
+            <a:off x="6050943" y="1852654"/>
+            <a:ext cx="2488338" cy="4426840"/>
           </a:xfrm>
         </p:spPr>
         <p:txBody>
           <a:bodyPr>
-            <a:normAutofit/>
+            <a:normAutofit fontScale="47500" lnSpcReduction="20000"/>
           </a:bodyPr>
           <a:lstStyle/>
           <a:p>
@@ -7518,10 +7518,115 @@
               <a:buNone/>
             </a:pPr>
             <a:r>
+              <a:rPr lang="he-IL" dirty="0" smtClean="0"/>
+              <a:t>קובץ </a:t>
+            </a:r>
+            <a:r>
               <a:rPr lang="en-US" dirty="0" smtClean="0"/>
-              <a:t>[some text about the manifest]</a:t>
-            </a:r>
-            <a:endParaRPr lang="en-US" dirty="0"/>
+              <a:t>XML</a:t>
+            </a:r>
+            <a:r>
+              <a:rPr lang="he-IL" dirty="0" smtClean="0"/>
+              <a:t> המכיל את הגדרות האפליקציה.</a:t>
+            </a:r>
+          </a:p>
+          <a:p>
+            <a:pPr marL="0" indent="0" algn="r" rtl="1">
+              <a:buNone/>
+            </a:pPr>
+            <a:endParaRPr lang="he-IL" dirty="0"/>
+          </a:p>
+          <a:p>
+            <a:pPr marL="0" indent="0" algn="r" rtl="1">
+              <a:buNone/>
+            </a:pPr>
+            <a:r>
+              <a:rPr lang="he-IL" dirty="0" smtClean="0"/>
+              <a:t>יש בו מספר סוגי הגדרות שונות של האפליקצייה, בין היתר נכללים:</a:t>
+            </a:r>
+          </a:p>
+          <a:p>
+            <a:pPr algn="r" rtl="1"/>
+            <a:r>
+              <a:rPr lang="he-IL" dirty="0" smtClean="0"/>
+              <a:t>אייקון</a:t>
+            </a:r>
+          </a:p>
+          <a:p>
+            <a:pPr algn="r" rtl="1"/>
+            <a:r>
+              <a:rPr lang="he-IL" dirty="0" smtClean="0"/>
+              <a:t>כותרת</a:t>
+            </a:r>
+          </a:p>
+          <a:p>
+            <a:pPr algn="r" rtl="1"/>
+            <a:r>
+              <a:rPr lang="he-IL" dirty="0" smtClean="0"/>
+              <a:t>הרשאות דרושות</a:t>
+            </a:r>
+          </a:p>
+          <a:p>
+            <a:pPr algn="r" rtl="1"/>
+            <a:r>
+              <a:rPr lang="en-US" dirty="0" smtClean="0"/>
+              <a:t> activities</a:t>
+            </a:r>
+            <a:endParaRPr lang="he-IL" dirty="0" smtClean="0"/>
+          </a:p>
+          <a:p>
+            <a:pPr algn="r" rtl="1"/>
+            <a:r>
+              <a:rPr lang="en-US" dirty="0" smtClean="0"/>
+              <a:t>services</a:t>
+            </a:r>
+            <a:endParaRPr lang="he-IL" dirty="0" smtClean="0"/>
+          </a:p>
+          <a:p>
+            <a:pPr algn="r" rtl="1"/>
+            <a:r>
+              <a:rPr lang="en-US" dirty="0" smtClean="0"/>
+              <a:t>broadcast receivers</a:t>
+            </a:r>
+            <a:endParaRPr lang="he-IL" dirty="0" smtClean="0"/>
+          </a:p>
+          <a:p>
+            <a:pPr algn="r" rtl="1"/>
+            <a:r>
+              <a:rPr lang="en-US" dirty="0" smtClean="0"/>
+              <a:t>content providers</a:t>
+            </a:r>
+            <a:endParaRPr lang="he-IL" dirty="0" smtClean="0"/>
+          </a:p>
+          <a:p>
+            <a:pPr marL="0" indent="0" algn="r" rtl="1">
+              <a:buNone/>
+            </a:pPr>
+            <a:r>
+              <a:rPr lang="he-IL" dirty="0" smtClean="0"/>
+              <a:t>בדוגמה ניתן לראות דוגמה של קובץ</a:t>
+            </a:r>
+            <a:r>
+              <a:rPr lang="en-US" dirty="0" smtClean="0"/>
+              <a:t>Manifest </a:t>
+            </a:r>
+            <a:r>
+              <a:rPr lang="he-IL" dirty="0" smtClean="0"/>
+              <a:t> בסיסי על יישום הכולל </a:t>
+            </a:r>
+            <a:r>
+              <a:rPr lang="en-US" dirty="0" smtClean="0"/>
+              <a:t>activity</a:t>
+            </a:r>
+            <a:r>
+              <a:rPr lang="he-IL" dirty="0"/>
+              <a:t> </a:t>
+            </a:r>
+            <a:r>
+              <a:rPr lang="he-IL" dirty="0" smtClean="0"/>
+              <a:t>בודד.</a:t>
+            </a:r>
+            <a:endParaRPr lang="en-US" dirty="0" smtClean="0"/>
           </a:p>
         </p:txBody>
       </p:sp>
@@ -7692,6 +7797,450 @@
           <a:p>
             <a:pPr algn="ctr"/>
             <a:endParaRPr lang="en-US"/>
+          </a:p>
+        </p:txBody>
+      </p:sp>
+      <p:cxnSp>
+        <p:nvCxnSpPr>
+          <p:cNvPr id="7" name="Elbow Connector 6"/>
+          <p:cNvCxnSpPr/>
+          <p:nvPr/>
+        </p:nvCxnSpPr>
+        <p:spPr>
+          <a:xfrm rot="5400000">
+            <a:off x="83170" y="3883893"/>
+            <a:ext cx="2703445" cy="835528"/>
+          </a:xfrm>
+          <a:prstGeom prst="bentConnector3">
+            <a:avLst>
+              <a:gd name="adj1" fmla="val 0"/>
+            </a:avLst>
+          </a:prstGeom>
+          <a:ln w="19050">
+            <a:solidFill>
+              <a:schemeClr val="tx1"/>
+            </a:solidFill>
+          </a:ln>
+        </p:spPr>
+        <p:style>
+          <a:lnRef idx="1">
+            <a:schemeClr val="accent1"/>
+          </a:lnRef>
+          <a:fillRef idx="0">
+            <a:schemeClr val="accent1"/>
+          </a:fillRef>
+          <a:effectRef idx="0">
+            <a:schemeClr val="accent1"/>
+          </a:effectRef>
+          <a:fontRef idx="minor">
+            <a:schemeClr val="tx1"/>
+          </a:fontRef>
+        </p:style>
+      </p:cxnSp>
+      <p:cxnSp>
+        <p:nvCxnSpPr>
+          <p:cNvPr id="14" name="Elbow Connector 13"/>
+          <p:cNvCxnSpPr/>
+          <p:nvPr/>
+        </p:nvCxnSpPr>
+        <p:spPr>
+          <a:xfrm rot="5400000">
+            <a:off x="290568" y="4091291"/>
+            <a:ext cx="2441053" cy="683129"/>
+          </a:xfrm>
+          <a:prstGeom prst="bentConnector3">
+            <a:avLst>
+              <a:gd name="adj1" fmla="val 163"/>
+            </a:avLst>
+          </a:prstGeom>
+          <a:ln w="19050">
+            <a:solidFill>
+              <a:schemeClr val="tx1"/>
+            </a:solidFill>
+          </a:ln>
+        </p:spPr>
+        <p:style>
+          <a:lnRef idx="1">
+            <a:schemeClr val="accent1"/>
+          </a:lnRef>
+          <a:fillRef idx="0">
+            <a:schemeClr val="accent1"/>
+          </a:fillRef>
+          <a:effectRef idx="0">
+            <a:schemeClr val="accent1"/>
+          </a:effectRef>
+          <a:fontRef idx="minor">
+            <a:schemeClr val="tx1"/>
+          </a:fontRef>
+        </p:style>
+      </p:cxnSp>
+      <p:sp>
+        <p:nvSpPr>
+          <p:cNvPr id="19" name="TextBox 18"/>
+          <p:cNvSpPr txBox="1"/>
+          <p:nvPr/>
+        </p:nvSpPr>
+        <p:spPr>
+          <a:xfrm>
+            <a:off x="216243" y="5589767"/>
+            <a:ext cx="2241543" cy="1107996"/>
+          </a:xfrm>
+          <a:prstGeom prst="rect">
+            <a:avLst/>
+          </a:prstGeom>
+          <a:noFill/>
+        </p:spPr>
+        <p:txBody>
+          <a:bodyPr wrap="square" rtlCol="0">
+            <a:spAutoFit/>
+          </a:bodyPr>
+          <a:lstStyle/>
+          <a:p>
+            <a:pPr algn="r" rtl="1"/>
+            <a:r>
+              <a:rPr lang="he-IL" sz="1100" dirty="0" smtClean="0">
+                <a:solidFill>
+                  <a:schemeClr val="bg1"/>
+                </a:solidFill>
+              </a:rPr>
+              <a:t>אייקון האפליקצייה. </a:t>
+            </a:r>
+            <a:r>
+              <a:rPr lang="he-IL" sz="1100" dirty="0" smtClean="0">
+                <a:solidFill>
+                  <a:schemeClr val="bg1"/>
+                </a:solidFill>
+              </a:rPr>
+              <a:t>ניתן להגדיר גרסה רגילה וגרסה למכשירים אשר משתמשים באייקונים מעוגלים.</a:t>
+            </a:r>
+          </a:p>
+          <a:p>
+            <a:pPr algn="r" rtl="1"/>
+            <a:r>
+              <a:rPr lang="he-IL" sz="1100" dirty="0" smtClean="0">
+                <a:solidFill>
+                  <a:schemeClr val="bg1"/>
+                </a:solidFill>
+              </a:rPr>
+              <a:t>נהוג שתמונת/ות של אייקון האפליקצייה יימצא בתיקיית </a:t>
+            </a:r>
+            <a:r>
+              <a:rPr lang="en-US" sz="1100" dirty="0" err="1" smtClean="0">
+                <a:solidFill>
+                  <a:schemeClr val="bg1"/>
+                </a:solidFill>
+              </a:rPr>
+              <a:t>mipmap</a:t>
+            </a:r>
+            <a:r>
+              <a:rPr lang="he-IL" sz="1100" dirty="0" smtClean="0">
+                <a:solidFill>
+                  <a:schemeClr val="bg1"/>
+                </a:solidFill>
+              </a:rPr>
+              <a:t> אשר נמצא בתיקיית </a:t>
+            </a:r>
+            <a:r>
+              <a:rPr lang="en-US" sz="1100" dirty="0" smtClean="0">
+                <a:solidFill>
+                  <a:schemeClr val="bg1"/>
+                </a:solidFill>
+              </a:rPr>
+              <a:t>res</a:t>
+            </a:r>
+            <a:endParaRPr lang="en-US" sz="1100" dirty="0">
+              <a:solidFill>
+                <a:schemeClr val="bg1"/>
+              </a:solidFill>
+            </a:endParaRPr>
+          </a:p>
+        </p:txBody>
+      </p:sp>
+      <p:cxnSp>
+        <p:nvCxnSpPr>
+          <p:cNvPr id="20" name="Elbow Connector 19"/>
+          <p:cNvCxnSpPr/>
+          <p:nvPr/>
+        </p:nvCxnSpPr>
+        <p:spPr>
+          <a:xfrm rot="16200000" flipH="1">
+            <a:off x="3032485" y="3582682"/>
+            <a:ext cx="3198363" cy="2195263"/>
+          </a:xfrm>
+          <a:prstGeom prst="bentConnector3">
+            <a:avLst>
+              <a:gd name="adj1" fmla="val 279"/>
+            </a:avLst>
+          </a:prstGeom>
+          <a:ln w="19050">
+            <a:solidFill>
+              <a:schemeClr val="tx1"/>
+            </a:solidFill>
+          </a:ln>
+        </p:spPr>
+        <p:style>
+          <a:lnRef idx="1">
+            <a:schemeClr val="accent1"/>
+          </a:lnRef>
+          <a:fillRef idx="0">
+            <a:schemeClr val="accent1"/>
+          </a:fillRef>
+          <a:effectRef idx="0">
+            <a:schemeClr val="accent1"/>
+          </a:effectRef>
+          <a:fontRef idx="minor">
+            <a:schemeClr val="tx1"/>
+          </a:fontRef>
+        </p:style>
+      </p:cxnSp>
+      <p:sp>
+        <p:nvSpPr>
+          <p:cNvPr id="25" name="TextBox 24"/>
+          <p:cNvSpPr txBox="1"/>
+          <p:nvPr/>
+        </p:nvSpPr>
+        <p:spPr>
+          <a:xfrm>
+            <a:off x="4381948" y="6241179"/>
+            <a:ext cx="2241543" cy="430887"/>
+          </a:xfrm>
+          <a:prstGeom prst="rect">
+            <a:avLst/>
+          </a:prstGeom>
+          <a:noFill/>
+        </p:spPr>
+        <p:txBody>
+          <a:bodyPr wrap="square" rtlCol="0">
+            <a:spAutoFit/>
+          </a:bodyPr>
+          <a:lstStyle/>
+          <a:p>
+            <a:pPr algn="r" rtl="1"/>
+            <a:r>
+              <a:rPr lang="he-IL" sz="1100" dirty="0" smtClean="0">
+                <a:solidFill>
+                  <a:schemeClr val="bg1"/>
+                </a:solidFill>
+              </a:rPr>
+              <a:t>כותרת האפליקצייה הלקוחה מקובץ </a:t>
+            </a:r>
+            <a:r>
+              <a:rPr lang="en-US" sz="1100" dirty="0" smtClean="0">
+                <a:solidFill>
+                  <a:schemeClr val="bg1"/>
+                </a:solidFill>
+              </a:rPr>
+              <a:t>strings </a:t>
+            </a:r>
+            <a:r>
+              <a:rPr lang="he-IL" sz="1100" dirty="0" smtClean="0">
+                <a:solidFill>
+                  <a:schemeClr val="bg1"/>
+                </a:solidFill>
+              </a:rPr>
+              <a:t> (</a:t>
+            </a:r>
+            <a:r>
+              <a:rPr lang="he-IL" sz="1100" dirty="0" smtClean="0">
+                <a:solidFill>
+                  <a:schemeClr val="bg1"/>
+                </a:solidFill>
+              </a:rPr>
+              <a:t>נרחיב בהמשך)</a:t>
+            </a:r>
+            <a:endParaRPr lang="en-US" sz="1100" dirty="0">
+              <a:solidFill>
+                <a:schemeClr val="bg1"/>
+              </a:solidFill>
+            </a:endParaRPr>
+          </a:p>
+        </p:txBody>
+      </p:sp>
+      <p:sp>
+        <p:nvSpPr>
+          <p:cNvPr id="26" name="Rectangle 25"/>
+          <p:cNvSpPr/>
+          <p:nvPr/>
+        </p:nvSpPr>
+        <p:spPr>
+          <a:xfrm>
+            <a:off x="1893354" y="3520026"/>
+            <a:ext cx="3529436" cy="837289"/>
+          </a:xfrm>
+          <a:prstGeom prst="rect">
+            <a:avLst/>
+          </a:prstGeom>
+          <a:noFill/>
+          <a:ln>
+            <a:solidFill>
+              <a:schemeClr val="accent2"/>
+            </a:solidFill>
+          </a:ln>
+        </p:spPr>
+        <p:style>
+          <a:lnRef idx="2">
+            <a:schemeClr val="accent2">
+              <a:shade val="50000"/>
+            </a:schemeClr>
+          </a:lnRef>
+          <a:fillRef idx="1">
+            <a:schemeClr val="accent2"/>
+          </a:fillRef>
+          <a:effectRef idx="0">
+            <a:schemeClr val="accent2"/>
+          </a:effectRef>
+          <a:fontRef idx="minor">
+            <a:schemeClr val="lt1"/>
+          </a:fontRef>
+        </p:style>
+        <p:txBody>
+          <a:bodyPr rtlCol="0" anchor="ctr"/>
+          <a:lstStyle/>
+          <a:p>
+            <a:pPr algn="ctr"/>
+            <a:endParaRPr lang="en-US"/>
+          </a:p>
+        </p:txBody>
+      </p:sp>
+      <p:cxnSp>
+        <p:nvCxnSpPr>
+          <p:cNvPr id="28" name="Elbow Connector 27"/>
+          <p:cNvCxnSpPr>
+            <a:stCxn id="26" idx="2"/>
+          </p:cNvCxnSpPr>
+          <p:nvPr/>
+        </p:nvCxnSpPr>
+        <p:spPr>
+          <a:xfrm rot="16200000" flipH="1">
+            <a:off x="3161114" y="4854272"/>
+            <a:ext cx="993917" cy="1"/>
+          </a:xfrm>
+          <a:prstGeom prst="bentConnector3">
+            <a:avLst>
+              <a:gd name="adj1" fmla="val 50000"/>
+            </a:avLst>
+          </a:prstGeom>
+          <a:ln w="19050">
+            <a:solidFill>
+              <a:schemeClr val="tx1"/>
+            </a:solidFill>
+          </a:ln>
+        </p:spPr>
+        <p:style>
+          <a:lnRef idx="1">
+            <a:schemeClr val="accent1"/>
+          </a:lnRef>
+          <a:fillRef idx="0">
+            <a:schemeClr val="accent1"/>
+          </a:fillRef>
+          <a:effectRef idx="0">
+            <a:schemeClr val="accent1"/>
+          </a:effectRef>
+          <a:fontRef idx="minor">
+            <a:schemeClr val="tx1"/>
+          </a:fontRef>
+        </p:style>
+      </p:cxnSp>
+      <p:sp>
+        <p:nvSpPr>
+          <p:cNvPr id="33" name="TextBox 32"/>
+          <p:cNvSpPr txBox="1"/>
+          <p:nvPr/>
+        </p:nvSpPr>
+        <p:spPr>
+          <a:xfrm>
+            <a:off x="2451604" y="5340953"/>
+            <a:ext cx="2241543" cy="600164"/>
+          </a:xfrm>
+          <a:prstGeom prst="rect">
+            <a:avLst/>
+          </a:prstGeom>
+          <a:noFill/>
+        </p:spPr>
+        <p:txBody>
+          <a:bodyPr wrap="square" rtlCol="0">
+            <a:spAutoFit/>
+          </a:bodyPr>
+          <a:lstStyle/>
+          <a:p>
+            <a:pPr algn="r" rtl="1"/>
+            <a:r>
+              <a:rPr lang="he-IL" sz="1100" dirty="0" smtClean="0">
+                <a:solidFill>
+                  <a:schemeClr val="bg1"/>
+                </a:solidFill>
+              </a:rPr>
+              <a:t>הגדרת </a:t>
+            </a:r>
+            <a:r>
+              <a:rPr lang="en-US" sz="1100" dirty="0" smtClean="0">
+                <a:solidFill>
+                  <a:schemeClr val="bg1"/>
+                </a:solidFill>
+              </a:rPr>
+              <a:t>activity</a:t>
+            </a:r>
+            <a:r>
+              <a:rPr lang="he-IL" sz="1100" dirty="0" smtClean="0">
+                <a:solidFill>
+                  <a:schemeClr val="bg1"/>
+                </a:solidFill>
+              </a:rPr>
+              <a:t> ראשי שמחלקת ה</a:t>
+            </a:r>
+            <a:r>
+              <a:rPr lang="en-US" sz="1100" dirty="0" smtClean="0">
+                <a:solidFill>
+                  <a:schemeClr val="bg1"/>
+                </a:solidFill>
+              </a:rPr>
+              <a:t>Java</a:t>
+            </a:r>
+            <a:r>
+              <a:rPr lang="he-IL" sz="1100" dirty="0" smtClean="0">
+                <a:solidFill>
+                  <a:schemeClr val="bg1"/>
+                </a:solidFill>
+              </a:rPr>
+              <a:t> המתאימה לו נקראת </a:t>
+            </a:r>
+            <a:r>
+              <a:rPr lang="en-US" sz="1100" dirty="0" err="1" smtClean="0">
+                <a:solidFill>
+                  <a:schemeClr val="bg1"/>
+                </a:solidFill>
+              </a:rPr>
+              <a:t>MainActivity</a:t>
+            </a:r>
+            <a:r>
+              <a:rPr lang="he-IL" sz="1100" dirty="0" smtClean="0">
+                <a:solidFill>
+                  <a:schemeClr val="bg1"/>
+                </a:solidFill>
+              </a:rPr>
+              <a:t>. </a:t>
+            </a:r>
+            <a:r>
+              <a:rPr lang="he-IL" sz="1100" smtClean="0">
+                <a:solidFill>
+                  <a:schemeClr val="bg1"/>
+                </a:solidFill>
+              </a:rPr>
+              <a:t>(נפרט </a:t>
+            </a:r>
+            <a:r>
+              <a:rPr lang="he-IL" sz="1100" dirty="0" smtClean="0">
+                <a:solidFill>
+                  <a:schemeClr val="bg1"/>
+                </a:solidFill>
+              </a:rPr>
+              <a:t>בהמשך)</a:t>
+            </a:r>
+            <a:endParaRPr lang="en-US" sz="1100" dirty="0">
+              <a:solidFill>
+                <a:schemeClr val="bg1"/>
+              </a:solidFill>
+            </a:endParaRPr>
           </a:p>
         </p:txBody>
       </p:sp>
@@ -8222,13 +8771,8 @@
             <a:pPr algn="r" rtl="1"/>
             <a:r>
               <a:rPr lang="he-IL" sz="2800" dirty="0" smtClean="0"/>
-              <a:t>התקנת סביבת </a:t>
-            </a:r>
-            <a:r>
-              <a:rPr lang="he-IL" sz="2800" dirty="0" smtClean="0"/>
-              <a:t>העבודה</a:t>
-            </a:r>
-            <a:endParaRPr lang="he-IL" sz="2800" dirty="0" smtClean="0"/>
+              <a:t>התקנת סביבת העבודה</a:t>
+            </a:r>
           </a:p>
           <a:p>
             <a:pPr algn="r" rtl="1"/>
@@ -8290,11 +8834,7 @@
             </a:r>
             <a:r>
               <a:rPr lang="he-IL" sz="2800" dirty="0" smtClean="0"/>
-              <a:t> </a:t>
-            </a:r>
-            <a:r>
-              <a:rPr lang="he-IL" sz="2800" dirty="0" smtClean="0"/>
-              <a:t>באנדרואיד</a:t>
+              <a:t> באנדרואיד</a:t>
             </a:r>
             <a:r>
               <a:rPr lang="en-US" sz="2800" dirty="0" smtClean="0"/>
@@ -11503,11 +12043,7 @@
             </a:pPr>
             <a:r>
               <a:rPr lang="he-IL" dirty="0" smtClean="0"/>
-              <a:t>אז יש </a:t>
-            </a:r>
-            <a:r>
-              <a:rPr lang="he-IL" dirty="0" smtClean="0"/>
-              <a:t>לבחור בין מספר סוגי </a:t>
+              <a:t>אז יש לבחור בין מספר סוגי </a:t>
             </a:r>
             <a:r>
               <a:rPr lang="he-IL" dirty="0" err="1" smtClean="0"/>

</xml_diff>

<commit_message>
filled in gradle page
</commit_message>
<xml_diff>
--- a/Android Presentation - Java Workshop.pptx
+++ b/Android Presentation - Java Workshop.pptx
@@ -8218,23 +8218,7 @@
                   <a:schemeClr val="bg1"/>
                 </a:solidFill>
               </a:rPr>
-              <a:t>. </a:t>
-            </a:r>
-            <a:r>
-              <a:rPr lang="he-IL" sz="1100" smtClean="0">
-                <a:solidFill>
-                  <a:schemeClr val="bg1"/>
-                </a:solidFill>
-              </a:rPr>
-              <a:t>(נפרט </a:t>
-            </a:r>
-            <a:r>
-              <a:rPr lang="he-IL" sz="1100" dirty="0" smtClean="0">
-                <a:solidFill>
-                  <a:schemeClr val="bg1"/>
-                </a:solidFill>
-              </a:rPr>
-              <a:t>בהמשך)</a:t>
+              <a:t>. (נפרט בהמשך)</a:t>
             </a:r>
             <a:endParaRPr lang="en-US" sz="1100" dirty="0">
               <a:solidFill>
@@ -8323,13 +8307,13 @@
         </p:nvSpPr>
         <p:spPr>
           <a:xfrm>
-            <a:off x="3426692" y="5258250"/>
-            <a:ext cx="5020226" cy="1144076"/>
+            <a:off x="116319" y="5412723"/>
+            <a:ext cx="9409343" cy="1144076"/>
           </a:xfrm>
         </p:spPr>
         <p:txBody>
           <a:bodyPr>
-            <a:normAutofit fontScale="92500" lnSpcReduction="10000"/>
+            <a:normAutofit fontScale="32500" lnSpcReduction="20000"/>
           </a:bodyPr>
           <a:lstStyle/>
           <a:p>
@@ -8337,16 +8321,188 @@
               <a:buNone/>
             </a:pPr>
             <a:r>
-              <a:rPr lang="en-US" dirty="0" smtClean="0"/>
-              <a:t>[some text about the </a:t>
+              <a:rPr lang="he-IL" dirty="0" smtClean="0"/>
+              <a:t>קובץ ה</a:t>
             </a:r>
             <a:r>
               <a:rPr lang="en-US" dirty="0" err="1" smtClean="0"/>
               <a:t>gradle</a:t>
             </a:r>
             <a:r>
+              <a:rPr lang="he-IL" dirty="0"/>
+              <a:t> </a:t>
+            </a:r>
+            <a:r>
+              <a:rPr lang="he-IL" dirty="0" smtClean="0"/>
+              <a:t>ברמת המודול מכיל את ההגדות לאפליקציה (ה</a:t>
+            </a:r>
+            <a:r>
+              <a:rPr lang="en-US" dirty="0" err="1" smtClean="0"/>
+              <a:t>defaultConfig</a:t>
+            </a:r>
+            <a:r>
+              <a:rPr lang="he-IL" dirty="0" smtClean="0"/>
+              <a:t>) למשל </a:t>
+            </a:r>
+            <a:r>
+              <a:rPr lang="he-IL" dirty="0"/>
+              <a:t>ה</a:t>
+            </a:r>
+            <a:r>
+              <a:rPr lang="en-US" dirty="0"/>
+              <a:t>SDK</a:t>
+            </a:r>
+            <a:r>
+              <a:rPr lang="he-IL" dirty="0"/>
+              <a:t> המינימום ומטרה, מספר גרסה </a:t>
+            </a:r>
+            <a:r>
+              <a:rPr lang="he-IL" dirty="0" smtClean="0"/>
+              <a:t>(מספר שלם), </a:t>
+            </a:r>
+            <a:r>
+              <a:rPr lang="he-IL" dirty="0"/>
+              <a:t>שם גרסה </a:t>
+            </a:r>
+            <a:r>
+              <a:rPr lang="he-IL" dirty="0" smtClean="0"/>
+              <a:t>(טקסט) ואת המזהה של האפליקצייה (בטלפון ובחנות של גוגל והינו בכרירת מחדש ה</a:t>
+            </a:r>
+            <a:r>
               <a:rPr lang="en-US" dirty="0" smtClean="0"/>
-              <a:t>]</a:t>
+              <a:t>package</a:t>
+            </a:r>
+            <a:r>
+              <a:rPr lang="he-IL" dirty="0" smtClean="0"/>
+              <a:t> שבחרנו בבפתיחת הפרוייקט). בגרסאות מתקדמות יותר נראה ב</a:t>
+            </a:r>
+            <a:r>
+              <a:rPr lang="en-US" dirty="0" err="1" smtClean="0"/>
+              <a:t>compileOptions</a:t>
+            </a:r>
+            <a:r>
+              <a:rPr lang="he-IL" dirty="0"/>
+              <a:t> </a:t>
+            </a:r>
+            <a:r>
+              <a:rPr lang="he-IL" dirty="0" smtClean="0"/>
+              <a:t>את ההגרה שמשתמשים ב</a:t>
+            </a:r>
+            <a:r>
+              <a:rPr lang="en-US" dirty="0" smtClean="0"/>
+              <a:t> Java 8</a:t>
+            </a:r>
+            <a:r>
+              <a:rPr lang="he-IL" dirty="0" smtClean="0"/>
+              <a:t>לגרסת </a:t>
+            </a:r>
+            <a:r>
+              <a:rPr lang="en-US" dirty="0" smtClean="0"/>
+              <a:t>Java</a:t>
+            </a:r>
+            <a:r>
+              <a:rPr lang="he-IL" dirty="0" smtClean="0"/>
+              <a:t>. והחלק שנמצא בשימוש הרחב ביותר, התלויות של האליקצייה. האזור ה</a:t>
+            </a:r>
+            <a:r>
+              <a:rPr lang="en-US" dirty="0" smtClean="0"/>
+              <a:t>dependencies</a:t>
+            </a:r>
+            <a:r>
+              <a:rPr lang="he-IL" dirty="0" smtClean="0"/>
+              <a:t> אנחנו רואים קישורים ל</a:t>
+            </a:r>
+            <a:r>
+              <a:rPr lang="en-US" dirty="0" smtClean="0"/>
+              <a:t>repositories</a:t>
+            </a:r>
+            <a:r>
+              <a:rPr lang="he-IL" dirty="0"/>
+              <a:t> </a:t>
+            </a:r>
+            <a:r>
+              <a:rPr lang="he-IL" dirty="0" smtClean="0"/>
+              <a:t>או נתיבים מקומיים לקיבצי מקור נוספים שרצה שאינם נכללים ה</a:t>
+            </a:r>
+            <a:r>
+              <a:rPr lang="en-US" dirty="0" smtClean="0"/>
+              <a:t>SDK</a:t>
+            </a:r>
+            <a:r>
+              <a:rPr lang="he-IL" dirty="0" smtClean="0"/>
+              <a:t> של </a:t>
+            </a:r>
+            <a:r>
+              <a:rPr lang="en-US" dirty="0" smtClean="0"/>
+              <a:t>Android </a:t>
+            </a:r>
+            <a:r>
+              <a:rPr lang="he-IL" dirty="0" smtClean="0"/>
+              <a:t> או </a:t>
+            </a:r>
+            <a:r>
+              <a:rPr lang="en-US" dirty="0" smtClean="0"/>
+              <a:t>Java</a:t>
+            </a:r>
+            <a:r>
+              <a:rPr lang="he-IL" dirty="0"/>
+              <a:t> </a:t>
+            </a:r>
+            <a:r>
+              <a:rPr lang="he-IL" dirty="0" smtClean="0"/>
+              <a:t>שנרה לצרף לפרוייקט לצורץ הפיתוח. דוגמאות נפוצות לתלויות כנ"ל הם </a:t>
+            </a:r>
+            <a:r>
+              <a:rPr lang="en-US" dirty="0" err="1" smtClean="0"/>
+              <a:t>refrofit</a:t>
+            </a:r>
+            <a:r>
+              <a:rPr lang="he-IL" dirty="0"/>
+              <a:t> </a:t>
+            </a:r>
+            <a:r>
+              <a:rPr lang="he-IL" dirty="0" smtClean="0"/>
+              <a:t>לתקשורת ו </a:t>
+            </a:r>
+            <a:r>
+              <a:rPr lang="en-US" dirty="0" smtClean="0"/>
+              <a:t>glide</a:t>
+            </a:r>
+            <a:r>
+              <a:rPr lang="he-IL" smtClean="0"/>
+              <a:t> ועבודה </a:t>
+            </a:r>
+            <a:r>
+              <a:rPr lang="he-IL" dirty="0" smtClean="0"/>
+              <a:t>עם תמונות. לבסוף בחלק העליון נראה קישור ל</a:t>
+            </a:r>
+            <a:r>
+              <a:rPr lang="en-US" dirty="0" smtClean="0"/>
+              <a:t>plugin</a:t>
+            </a:r>
+            <a:r>
+              <a:rPr lang="he-IL" dirty="0" smtClean="0"/>
+              <a:t> של </a:t>
+            </a:r>
+            <a:r>
+              <a:rPr lang="en-US" dirty="0" smtClean="0"/>
+              <a:t>android</a:t>
+            </a:r>
+            <a:r>
+              <a:rPr lang="he-IL" dirty="0" smtClean="0"/>
+              <a:t>. שם יש את הגדרות וברירות מחדש של תהליך הבנייה של </a:t>
+            </a:r>
+            <a:r>
+              <a:rPr lang="en-US" dirty="0" err="1" smtClean="0"/>
+              <a:t>gradle</a:t>
+            </a:r>
+            <a:r>
+              <a:rPr lang="he-IL" dirty="0"/>
+              <a:t> פ</a:t>
+            </a:r>
+            <a:r>
+              <a:rPr lang="he-IL" dirty="0" smtClean="0"/>
+              <a:t>רוייקטים של אנדרואיד.</a:t>
             </a:r>
             <a:endParaRPr lang="en-US" dirty="0"/>
           </a:p>
@@ -8447,8 +8603,8 @@
         </p:blipFill>
         <p:spPr>
           <a:xfrm>
-            <a:off x="116319" y="1791112"/>
-            <a:ext cx="6640355" cy="3399723"/>
+            <a:off x="92467" y="1910380"/>
+            <a:ext cx="6515068" cy="3335579"/>
           </a:xfrm>
           <a:prstGeom prst="rect">
             <a:avLst/>
@@ -8511,8 +8667,8 @@
         </p:nvSpPr>
         <p:spPr>
           <a:xfrm>
-            <a:off x="6862029" y="2156065"/>
-            <a:ext cx="2784762" cy="1144076"/>
+            <a:off x="6607534" y="2156065"/>
+            <a:ext cx="2926080" cy="2964575"/>
           </a:xfrm>
           <a:prstGeom prst="rect">
             <a:avLst/>
@@ -8520,7 +8676,7 @@
         </p:spPr>
         <p:txBody>
           <a:bodyPr vert="horz" lIns="91440" tIns="45720" rIns="91440" bIns="45720" rtlCol="0">
-            <a:normAutofit fontScale="77500" lnSpcReduction="20000"/>
+            <a:noAutofit/>
           </a:bodyPr>
           <a:lstStyle>
             <a:lvl1pPr marL="457189" indent="-457189" algn="l" defTabSz="1219170" rtl="0" eaLnBrk="1" latinLnBrk="0" hangingPunct="1">
@@ -8665,10 +8821,193 @@
               <a:buNone/>
             </a:pPr>
             <a:r>
-              <a:rPr lang="en-US" smtClean="0"/>
-              <a:t>[some text about the gradle]</a:t>
-            </a:r>
-            <a:endParaRPr lang="en-US" dirty="0"/>
+              <a:rPr lang="he-IL" sz="1050" dirty="0" smtClean="0"/>
+              <a:t>קיבצי ה</a:t>
+            </a:r>
+            <a:r>
+              <a:rPr lang="en-US" sz="1050" dirty="0" err="1" smtClean="0"/>
+              <a:t>Gradle</a:t>
+            </a:r>
+            <a:r>
+              <a:rPr lang="he-IL" sz="1050" dirty="0"/>
+              <a:t> </a:t>
+            </a:r>
+            <a:r>
+              <a:rPr lang="he-IL" sz="1050" dirty="0" smtClean="0"/>
+              <a:t>הינם קבצי הגדרה לבניית אפליקצייה הכתובות השפת </a:t>
+            </a:r>
+            <a:r>
+              <a:rPr lang="en-US" sz="1050" dirty="0" smtClean="0"/>
+              <a:t>groovy</a:t>
+            </a:r>
+            <a:r>
+              <a:rPr lang="he-IL" sz="1050" dirty="0" smtClean="0"/>
+              <a:t>. </a:t>
+            </a:r>
+          </a:p>
+          <a:p>
+            <a:pPr marL="0" indent="0" algn="r" rtl="1">
+              <a:buFont typeface="Arial" pitchFamily="34" charset="0"/>
+              <a:buNone/>
+            </a:pPr>
+            <a:r>
+              <a:rPr lang="he-IL" sz="1050" dirty="0" smtClean="0"/>
+              <a:t>הם כוללים את תהליך הבנייה עצמה, את התלויות לבניית האפליקצייה, הגדרות שונות של האפליקצייה</a:t>
+            </a:r>
+            <a:endParaRPr lang="en-US" sz="1050" dirty="0" smtClean="0"/>
+          </a:p>
+          <a:p>
+            <a:pPr marL="0" indent="0" algn="r" rtl="1">
+              <a:buFont typeface="Arial" pitchFamily="34" charset="0"/>
+              <a:buNone/>
+            </a:pPr>
+            <a:r>
+              <a:rPr lang="he-IL" sz="1050" dirty="0" smtClean="0"/>
+              <a:t>כברירת מחדל </a:t>
+            </a:r>
+            <a:r>
+              <a:rPr lang="en-US" sz="1050" dirty="0" smtClean="0"/>
+              <a:t>Android Studio</a:t>
+            </a:r>
+            <a:r>
+              <a:rPr lang="he-IL" sz="1050" dirty="0" smtClean="0"/>
+              <a:t> מייצר שני קבצי </a:t>
+            </a:r>
+            <a:r>
+              <a:rPr lang="en-US" sz="1050" dirty="0" err="1" smtClean="0"/>
+              <a:t>gradle</a:t>
+            </a:r>
+            <a:r>
+              <a:rPr lang="he-IL" sz="1050" dirty="0"/>
+              <a:t> </a:t>
+            </a:r>
+            <a:r>
+              <a:rPr lang="he-IL" sz="1050" dirty="0" smtClean="0"/>
+              <a:t>עיקריים בשם </a:t>
+            </a:r>
+            <a:r>
+              <a:rPr lang="en-US" sz="1050" dirty="0" err="1" smtClean="0"/>
+              <a:t>build.gradle</a:t>
+            </a:r>
+            <a:r>
+              <a:rPr lang="he-IL" sz="1050" dirty="0"/>
+              <a:t> </a:t>
+            </a:r>
+            <a:r>
+              <a:rPr lang="he-IL" sz="1050" dirty="0" smtClean="0"/>
+              <a:t>שאחריים על הגדרות הפרוייקט (</a:t>
+            </a:r>
+            <a:r>
+              <a:rPr lang="en-US" sz="1050" dirty="0" smtClean="0"/>
+              <a:t>Project:…</a:t>
+            </a:r>
+            <a:r>
+              <a:rPr lang="he-IL" sz="1050" dirty="0" smtClean="0"/>
+              <a:t>) ומודול (</a:t>
+            </a:r>
+            <a:r>
+              <a:rPr lang="en-US" sz="1050" dirty="0" smtClean="0"/>
+              <a:t>Module:…</a:t>
+            </a:r>
+            <a:r>
+              <a:rPr lang="he-IL" sz="1050" dirty="0" smtClean="0"/>
+              <a:t>).</a:t>
+            </a:r>
+          </a:p>
+          <a:p>
+            <a:pPr marL="0" indent="0" algn="r" rtl="1">
+              <a:buFont typeface="Arial" pitchFamily="34" charset="0"/>
+              <a:buNone/>
+            </a:pPr>
+            <a:endParaRPr lang="he-IL" sz="1050" dirty="0" smtClean="0"/>
+          </a:p>
+          <a:p>
+            <a:pPr marL="0" indent="0" algn="r" rtl="1">
+              <a:buNone/>
+            </a:pPr>
+            <a:r>
+              <a:rPr lang="he-IL" sz="1050" dirty="0"/>
+              <a:t>קובץ ה</a:t>
+            </a:r>
+            <a:r>
+              <a:rPr lang="en-US" sz="1050" dirty="0" err="1"/>
+              <a:t>gradle</a:t>
+            </a:r>
+            <a:r>
+              <a:rPr lang="he-IL" sz="1050" dirty="0"/>
+              <a:t> ברמת הפרוייקט אחראי על הגדרות של כל הפרוייקט (לכל תתי הפרוייקטים/מודולים). נראהשם את  התלויות של ה פרוייקט שמגדיר ה</a:t>
+            </a:r>
+            <a:r>
+              <a:rPr lang="en-US" sz="1050" dirty="0" err="1"/>
+              <a:t>classpaths</a:t>
+            </a:r>
+            <a:r>
+              <a:rPr lang="he-IL" sz="1050" dirty="0"/>
+              <a:t> השונים</a:t>
+            </a:r>
+            <a:r>
+              <a:rPr lang="en-US" sz="1050" dirty="0"/>
+              <a:t> </a:t>
+            </a:r>
+            <a:r>
+              <a:rPr lang="he-IL" sz="1050" dirty="0"/>
+              <a:t>כגון את הגדרת הגרסת ה</a:t>
+            </a:r>
+            <a:r>
+              <a:rPr lang="en-US" sz="1050" dirty="0" err="1"/>
+              <a:t>gradle</a:t>
+            </a:r>
+            <a:r>
+              <a:rPr lang="he-IL" sz="1050" dirty="0"/>
+              <a:t> כמו שניתן לראות בתמונה. בנוסף נראה את ה</a:t>
+            </a:r>
+            <a:r>
+              <a:rPr lang="en-US" sz="1050" dirty="0"/>
+              <a:t>repositories</a:t>
+            </a:r>
+            <a:r>
+              <a:rPr lang="he-IL" sz="1050" dirty="0"/>
+              <a:t> בו </a:t>
+            </a:r>
+            <a:r>
+              <a:rPr lang="en-US" sz="1050" dirty="0" err="1"/>
+              <a:t>gradle</a:t>
+            </a:r>
+            <a:r>
+              <a:rPr lang="he-IL" sz="1050" dirty="0"/>
+              <a:t> יחפש את תלויות השונות (שלרוב בקובל של המודול). כברירת מחדל הקובץ מוגדר כך שיחפש ב</a:t>
+            </a:r>
+            <a:r>
+              <a:rPr lang="en-US" sz="1050" dirty="0"/>
+              <a:t>repositories</a:t>
+            </a:r>
+            <a:r>
+              <a:rPr lang="he-IL" sz="1050" dirty="0"/>
+              <a:t> של </a:t>
+            </a:r>
+            <a:r>
+              <a:rPr lang="en-US" sz="1050" dirty="0"/>
+              <a:t> google</a:t>
+            </a:r>
+            <a:r>
+              <a:rPr lang="he-IL" sz="1050" dirty="0"/>
+              <a:t> ו </a:t>
+            </a:r>
+            <a:r>
+              <a:rPr lang="en-US" sz="1050" dirty="0" err="1"/>
+              <a:t>jcenter</a:t>
+            </a:r>
+            <a:r>
+              <a:rPr lang="he-IL" sz="1050" dirty="0"/>
+              <a:t> – אוספים של הגדרות תוספים שניתן להגדית כתלות לפרוייקט ואז להשתמש בהם בפיתוח הפרוייקט. נבצע שינויים לקובץ זה רק לעיתים רחוקות.</a:t>
+            </a:r>
+          </a:p>
+          <a:p>
+            <a:pPr marL="0" indent="0" algn="r" rtl="1">
+              <a:buFont typeface="Arial" pitchFamily="34" charset="0"/>
+              <a:buNone/>
+            </a:pPr>
+            <a:endParaRPr lang="en-US" sz="1050" dirty="0"/>
           </a:p>
         </p:txBody>
       </p:sp>

</xml_diff>

<commit_message>
filled in res 1
</commit_message>
<xml_diff>
--- a/Android Presentation - Java Workshop.pptx
+++ b/Android Presentation - Java Workshop.pptx
@@ -8469,12 +8469,8 @@
               <a:t>glide</a:t>
             </a:r>
             <a:r>
-              <a:rPr lang="he-IL" smtClean="0"/>
-              <a:t> ועבודה </a:t>
-            </a:r>
-            <a:r>
               <a:rPr lang="he-IL" dirty="0" smtClean="0"/>
-              <a:t>עם תמונות. לבסוף בחלק העליון נראה קישור ל</a:t>
+              <a:t> ועבודה עם תמונות. לבסוף בחלק העליון נראה קישור ל</a:t>
             </a:r>
             <a:r>
               <a:rPr lang="en-US" dirty="0" smtClean="0"/>
@@ -8619,8 +8615,8 @@
         </p:nvSpPr>
         <p:spPr>
           <a:xfrm>
-            <a:off x="221674" y="2198254"/>
-            <a:ext cx="1431646" cy="260653"/>
+            <a:off x="197821" y="2309568"/>
+            <a:ext cx="1368586" cy="260653"/>
           </a:xfrm>
           <a:prstGeom prst="rect">
             <a:avLst/>
@@ -9462,7 +9458,7 @@
         </p:spPr>
         <p:txBody>
           <a:bodyPr vert="horz" lIns="91440" tIns="45720" rIns="91440" bIns="45720" rtlCol="0">
-            <a:normAutofit/>
+            <a:normAutofit fontScale="70000" lnSpcReduction="20000"/>
           </a:bodyPr>
           <a:lstStyle>
             <a:lvl1pPr marL="457189" indent="-457189" algn="l" defTabSz="1219170" rtl="0" eaLnBrk="1" latinLnBrk="0" hangingPunct="1">
@@ -9607,40 +9603,150 @@
               <a:buNone/>
             </a:pPr>
             <a:r>
+              <a:rPr lang="he-IL" dirty="0" smtClean="0"/>
+              <a:t>תיקיית </a:t>
+            </a:r>
+            <a:r>
               <a:rPr lang="en-US" dirty="0" smtClean="0"/>
-              <a:t>[some text about all the things that are in the res folder. Mention </a:t>
+              <a:t>res</a:t>
+            </a:r>
+            <a:r>
+              <a:rPr lang="he-IL" dirty="0" smtClean="0"/>
+              <a:t> היא התיקייה שמכיל את כלל המשאבים השונים שאינם קיבצי מקור של קוד </a:t>
+            </a:r>
+            <a:r>
+              <a:rPr lang="he-IL" dirty="0"/>
+              <a:t>(</a:t>
+            </a:r>
+            <a:r>
+              <a:rPr lang="en-US" dirty="0" smtClean="0"/>
+              <a:t>res</a:t>
+            </a:r>
+            <a:r>
+              <a:rPr lang="he-IL" dirty="0" smtClean="0"/>
+              <a:t> זה קיצור של </a:t>
+            </a:r>
+            <a:r>
+              <a:rPr lang="en-US" dirty="0" smtClean="0"/>
+              <a:t>resources</a:t>
+            </a:r>
+            <a:r>
+              <a:rPr lang="he-IL" dirty="0" smtClean="0"/>
+              <a:t>). </a:t>
+            </a:r>
+            <a:r>
+              <a:rPr lang="he-IL" dirty="0"/>
+              <a:t>ה</a:t>
+            </a:r>
+            <a:r>
+              <a:rPr lang="he-IL" dirty="0" smtClean="0"/>
+              <a:t>תיקיות הקיימות ב</a:t>
+            </a:r>
+            <a:r>
+              <a:rPr lang="en-US" dirty="0" smtClean="0"/>
+              <a:t>res</a:t>
+            </a:r>
+            <a:r>
+              <a:rPr lang="he-IL" dirty="0" smtClean="0"/>
+              <a:t> מכילים בעיקר קבצי </a:t>
+            </a:r>
+            <a:r>
+              <a:rPr lang="en-US" dirty="0" smtClean="0"/>
+              <a:t>XML</a:t>
+            </a:r>
+            <a:r>
+              <a:rPr lang="he-IL" dirty="0" smtClean="0"/>
+              <a:t> או מדיה.</a:t>
+            </a:r>
+            <a:r>
+              <a:rPr lang="he-IL" dirty="0" smtClean="0"/>
+              <a:t> בתיקיות אליו  קיימות תמונות המופיעות באפליקציה (</a:t>
+            </a:r>
+            <a:r>
+              <a:rPr lang="he-IL" dirty="0" smtClean="0"/>
+              <a:t>בתיקיית </a:t>
             </a:r>
             <a:r>
               <a:rPr lang="en-US" dirty="0" err="1" smtClean="0"/>
               <a:t>drawable</a:t>
             </a:r>
             <a:r>
-              <a:rPr lang="en-US" dirty="0" smtClean="0"/>
-              <a:t> and </a:t>
+              <a:rPr lang="he-IL" dirty="0" smtClean="0"/>
+              <a:t>). אייקונים (בתיקיית </a:t>
             </a:r>
             <a:r>
               <a:rPr lang="en-US" dirty="0" err="1" smtClean="0"/>
               <a:t>mipmap</a:t>
             </a:r>
             <a:r>
-              <a:rPr lang="en-US" dirty="0" smtClean="0"/>
-              <a:t> here along with things that may be added like </a:t>
+              <a:rPr lang="he-IL" dirty="0" smtClean="0"/>
+              <a:t>) ועוד הרבה שניתן גם להוסיף על התיקיות שנוצרו </a:t>
+            </a:r>
+            <a:r>
+              <a:rPr lang="he-IL" smtClean="0"/>
+              <a:t>כברירת מחדל, </a:t>
+            </a:r>
+            <a:r>
+              <a:rPr lang="he-IL" dirty="0" smtClean="0"/>
+              <a:t>למשל תיקיית </a:t>
             </a:r>
             <a:r>
               <a:rPr lang="en-US" dirty="0" err="1" smtClean="0"/>
               <a:t>anim</a:t>
             </a:r>
             <a:r>
+              <a:rPr lang="he-IL" dirty="0"/>
+              <a:t> </a:t>
+            </a:r>
+            <a:r>
+              <a:rPr lang="he-IL" dirty="0" smtClean="0"/>
+              <a:t>לקיבצי אנימציות (בצורת </a:t>
+            </a:r>
+            <a:r>
               <a:rPr lang="en-US" dirty="0" smtClean="0"/>
-              <a:t>, xml, raw,</a:t>
-            </a:r>
-            <a:r>
-              <a:rPr lang="mr-IN" dirty="0" smtClean="0"/>
-              <a:t>…</a:t>
+              <a:t>XML</a:t>
+            </a:r>
+            <a:r>
+              <a:rPr lang="he-IL" dirty="0" smtClean="0"/>
+              <a:t>) או תיקיית </a:t>
             </a:r>
             <a:r>
               <a:rPr lang="en-US" dirty="0" smtClean="0"/>
-              <a:t>]</a:t>
+              <a:t>raw</a:t>
+            </a:r>
+            <a:r>
+              <a:rPr lang="he-IL" dirty="0" smtClean="0"/>
+              <a:t> שמיועד לקיבצי אודיאו ווידאו.</a:t>
+            </a:r>
+          </a:p>
+          <a:p>
+            <a:pPr marL="0" indent="0" algn="r" rtl="1">
+              <a:buFont typeface="Arial" pitchFamily="34" charset="0"/>
+              <a:buNone/>
+            </a:pPr>
+            <a:r>
+              <a:rPr lang="he-IL" dirty="0" smtClean="0"/>
+              <a:t>שתי התיקיות הכי נפוצות בזמן הפיתוח הם תיקיות </a:t>
+            </a:r>
+            <a:r>
+              <a:rPr lang="en-US" dirty="0" smtClean="0"/>
+              <a:t>layout </a:t>
+            </a:r>
+            <a:r>
+              <a:rPr lang="he-IL" dirty="0"/>
+              <a:t> </a:t>
+            </a:r>
+            <a:r>
+              <a:rPr lang="he-IL" dirty="0" smtClean="0"/>
+              <a:t>ו </a:t>
+            </a:r>
+            <a:r>
+              <a:rPr lang="en-US" dirty="0" smtClean="0"/>
+              <a:t>values</a:t>
+            </a:r>
+            <a:r>
+              <a:rPr lang="he-IL" dirty="0" smtClean="0"/>
+              <a:t> אשר נגיע אליהם בשקפים הבאים. </a:t>
             </a:r>
             <a:endParaRPr lang="en-US" dirty="0"/>
           </a:p>

</xml_diff>

<commit_message>
filled in res 2
</commit_message>
<xml_diff>
--- a/Android Presentation - Java Workshop.pptx
+++ b/Android Presentation - Java Workshop.pptx
@@ -9007,6 +9007,197 @@
           </a:p>
         </p:txBody>
       </p:sp>
+      <p:sp>
+        <p:nvSpPr>
+          <p:cNvPr id="8" name="Content Placeholder 2"/>
+          <p:cNvSpPr txBox="1">
+            <a:spLocks/>
+          </p:cNvSpPr>
+          <p:nvPr/>
+        </p:nvSpPr>
+        <p:spPr>
+          <a:xfrm>
+            <a:off x="124271" y="6445128"/>
+            <a:ext cx="9409343" cy="556870"/>
+          </a:xfrm>
+          <a:prstGeom prst="rect">
+            <a:avLst/>
+          </a:prstGeom>
+        </p:spPr>
+        <p:txBody>
+          <a:bodyPr vert="horz" lIns="91440" tIns="45720" rIns="91440" bIns="45720" rtlCol="0">
+            <a:normAutofit fontScale="47500" lnSpcReduction="20000"/>
+          </a:bodyPr>
+          <a:lstStyle>
+            <a:lvl1pPr marL="457189" indent="-457189" algn="l" defTabSz="1219170" rtl="0" eaLnBrk="1" latinLnBrk="0" hangingPunct="1">
+              <a:spcBef>
+                <a:spcPct val="20000"/>
+              </a:spcBef>
+              <a:buFont typeface="Arial" pitchFamily="34" charset="0"/>
+              <a:buChar char="•"/>
+              <a:defRPr sz="3733" kern="1200">
+                <a:solidFill>
+                  <a:schemeClr val="bg1"/>
+                </a:solidFill>
+                <a:latin typeface="+mn-lt"/>
+                <a:ea typeface="+mn-ea"/>
+                <a:cs typeface="+mn-cs"/>
+              </a:defRPr>
+            </a:lvl1pPr>
+            <a:lvl2pPr marL="990575" indent="-380990" algn="l" defTabSz="1219170" rtl="0" eaLnBrk="1" latinLnBrk="0" hangingPunct="1">
+              <a:spcBef>
+                <a:spcPct val="20000"/>
+              </a:spcBef>
+              <a:buFont typeface="Arial" pitchFamily="34" charset="0"/>
+              <a:buChar char="–"/>
+              <a:defRPr sz="3733" kern="1200">
+                <a:solidFill>
+                  <a:schemeClr val="bg1"/>
+                </a:solidFill>
+                <a:latin typeface="+mn-lt"/>
+                <a:ea typeface="+mn-ea"/>
+                <a:cs typeface="+mn-cs"/>
+              </a:defRPr>
+            </a:lvl2pPr>
+            <a:lvl3pPr marL="1523962" indent="-304792" algn="l" defTabSz="1219170" rtl="0" eaLnBrk="1" latinLnBrk="0" hangingPunct="1">
+              <a:spcBef>
+                <a:spcPct val="20000"/>
+              </a:spcBef>
+              <a:buFont typeface="Arial" pitchFamily="34" charset="0"/>
+              <a:buChar char="•"/>
+              <a:defRPr sz="3200" kern="1200">
+                <a:solidFill>
+                  <a:schemeClr val="bg1"/>
+                </a:solidFill>
+                <a:latin typeface="+mn-lt"/>
+                <a:ea typeface="+mn-ea"/>
+                <a:cs typeface="+mn-cs"/>
+              </a:defRPr>
+            </a:lvl3pPr>
+            <a:lvl4pPr marL="2133547" indent="-304792" algn="l" defTabSz="1219170" rtl="0" eaLnBrk="1" latinLnBrk="0" hangingPunct="1">
+              <a:spcBef>
+                <a:spcPct val="20000"/>
+              </a:spcBef>
+              <a:buFont typeface="Arial" pitchFamily="34" charset="0"/>
+              <a:buChar char="–"/>
+              <a:defRPr sz="2667" kern="1200">
+                <a:solidFill>
+                  <a:schemeClr val="bg1"/>
+                </a:solidFill>
+                <a:latin typeface="+mn-lt"/>
+                <a:ea typeface="+mn-ea"/>
+                <a:cs typeface="+mn-cs"/>
+              </a:defRPr>
+            </a:lvl4pPr>
+            <a:lvl5pPr marL="2743131" indent="-304792" algn="l" defTabSz="1219170" rtl="0" eaLnBrk="1" latinLnBrk="0" hangingPunct="1">
+              <a:spcBef>
+                <a:spcPct val="20000"/>
+              </a:spcBef>
+              <a:buFont typeface="Arial" pitchFamily="34" charset="0"/>
+              <a:buChar char="»"/>
+              <a:defRPr sz="2667" kern="1200">
+                <a:solidFill>
+                  <a:schemeClr val="bg1"/>
+                </a:solidFill>
+                <a:latin typeface="+mn-lt"/>
+                <a:ea typeface="+mn-ea"/>
+                <a:cs typeface="+mn-cs"/>
+              </a:defRPr>
+            </a:lvl5pPr>
+            <a:lvl6pPr marL="3352716" indent="-304792" algn="l" defTabSz="1219170" rtl="0" eaLnBrk="1" latinLnBrk="0" hangingPunct="1">
+              <a:spcBef>
+                <a:spcPct val="20000"/>
+              </a:spcBef>
+              <a:buFont typeface="Arial" pitchFamily="34" charset="0"/>
+              <a:buChar char="•"/>
+              <a:defRPr sz="2667" kern="1200">
+                <a:solidFill>
+                  <a:schemeClr val="tx1"/>
+                </a:solidFill>
+                <a:latin typeface="+mn-lt"/>
+                <a:ea typeface="+mn-ea"/>
+                <a:cs typeface="+mn-cs"/>
+              </a:defRPr>
+            </a:lvl6pPr>
+            <a:lvl7pPr marL="3962301" indent="-304792" algn="l" defTabSz="1219170" rtl="0" eaLnBrk="1" latinLnBrk="0" hangingPunct="1">
+              <a:spcBef>
+                <a:spcPct val="20000"/>
+              </a:spcBef>
+              <a:buFont typeface="Arial" pitchFamily="34" charset="0"/>
+              <a:buChar char="•"/>
+              <a:defRPr sz="2667" kern="1200">
+                <a:solidFill>
+                  <a:schemeClr val="tx1"/>
+                </a:solidFill>
+                <a:latin typeface="+mn-lt"/>
+                <a:ea typeface="+mn-ea"/>
+                <a:cs typeface="+mn-cs"/>
+              </a:defRPr>
+            </a:lvl7pPr>
+            <a:lvl8pPr marL="4571886" indent="-304792" algn="l" defTabSz="1219170" rtl="0" eaLnBrk="1" latinLnBrk="0" hangingPunct="1">
+              <a:spcBef>
+                <a:spcPct val="20000"/>
+              </a:spcBef>
+              <a:buFont typeface="Arial" pitchFamily="34" charset="0"/>
+              <a:buChar char="•"/>
+              <a:defRPr sz="2667" kern="1200">
+                <a:solidFill>
+                  <a:schemeClr val="tx1"/>
+                </a:solidFill>
+                <a:latin typeface="+mn-lt"/>
+                <a:ea typeface="+mn-ea"/>
+                <a:cs typeface="+mn-cs"/>
+              </a:defRPr>
+            </a:lvl8pPr>
+            <a:lvl9pPr marL="5181470" indent="-304792" algn="l" defTabSz="1219170" rtl="0" eaLnBrk="1" latinLnBrk="0" hangingPunct="1">
+              <a:spcBef>
+                <a:spcPct val="20000"/>
+              </a:spcBef>
+              <a:buFont typeface="Arial" pitchFamily="34" charset="0"/>
+              <a:buChar char="•"/>
+              <a:defRPr sz="2667" kern="1200">
+                <a:solidFill>
+                  <a:schemeClr val="tx1"/>
+                </a:solidFill>
+                <a:latin typeface="+mn-lt"/>
+                <a:ea typeface="+mn-ea"/>
+                <a:cs typeface="+mn-cs"/>
+              </a:defRPr>
+            </a:lvl9pPr>
+          </a:lstStyle>
+          <a:p>
+            <a:pPr marL="0" indent="0" algn="r" rtl="1">
+              <a:buFont typeface="Arial" pitchFamily="34" charset="0"/>
+              <a:buNone/>
+            </a:pPr>
+            <a:r>
+              <a:rPr lang="he-IL" dirty="0" smtClean="0"/>
+              <a:t>הערה: לאחר שינוי באחד מקיבצי ה</a:t>
+            </a:r>
+            <a:r>
+              <a:rPr lang="en-US" dirty="0" err="1" smtClean="0"/>
+              <a:t>gradle</a:t>
+            </a:r>
+            <a:r>
+              <a:rPr lang="he-IL" dirty="0"/>
+              <a:t> </a:t>
+            </a:r>
+            <a:r>
+              <a:rPr lang="he-IL" dirty="0" smtClean="0"/>
+              <a:t>יש צורך ללחוץ על כפתור ה</a:t>
+            </a:r>
+            <a:r>
+              <a:rPr lang="en-US" dirty="0" smtClean="0"/>
+              <a:t>sync</a:t>
+            </a:r>
+            <a:r>
+              <a:rPr lang="he-IL" dirty="0" smtClean="0"/>
+              <a:t> שתופיע למעלה.</a:t>
+            </a:r>
+            <a:endParaRPr lang="en-US" dirty="0"/>
+          </a:p>
+        </p:txBody>
+      </p:sp>
     </p:spTree>
     <p:extLst>
       <p:ext uri="{BB962C8B-B14F-4D97-AF65-F5344CB8AC3E}">
@@ -9449,8 +9640,8 @@
         </p:nvSpPr>
         <p:spPr>
           <a:xfrm>
-            <a:off x="2586182" y="2156064"/>
-            <a:ext cx="6788727" cy="4244735"/>
+            <a:off x="2393344" y="2156064"/>
+            <a:ext cx="6981566" cy="4244735"/>
           </a:xfrm>
           <a:prstGeom prst="rect">
             <a:avLst/>
@@ -9458,7 +9649,7 @@
         </p:spPr>
         <p:txBody>
           <a:bodyPr vert="horz" lIns="91440" tIns="45720" rIns="91440" bIns="45720" rtlCol="0">
-            <a:normAutofit fontScale="70000" lnSpcReduction="20000"/>
+            <a:normAutofit fontScale="55000" lnSpcReduction="20000"/>
           </a:bodyPr>
           <a:lstStyle>
             <a:lvl1pPr marL="457189" indent="-457189" algn="l" defTabSz="1219170" rtl="0" eaLnBrk="1" latinLnBrk="0" hangingPunct="1">
@@ -9612,10 +9803,10 @@
             </a:r>
             <a:r>
               <a:rPr lang="he-IL" dirty="0" smtClean="0"/>
-              <a:t> היא התיקייה שמכיל את כלל המשאבים השונים שאינם קיבצי מקור של קוד </a:t>
-            </a:r>
-            <a:r>
-              <a:rPr lang="he-IL" dirty="0"/>
+              <a:t> היא התיקייה שמכיל את כלל המשאבים השונים שאינם קיבצי מקור לוגיים </a:t>
+            </a:r>
+            <a:r>
+              <a:rPr lang="he-IL" dirty="0" smtClean="0"/>
               <a:t>(</a:t>
             </a:r>
             <a:r>
@@ -9680,15 +9871,7 @@
             </a:r>
             <a:r>
               <a:rPr lang="he-IL" dirty="0" smtClean="0"/>
-              <a:t>) ועוד הרבה שניתן גם להוסיף על התיקיות שנוצרו </a:t>
-            </a:r>
-            <a:r>
-              <a:rPr lang="he-IL" smtClean="0"/>
-              <a:t>כברירת מחדל, </a:t>
-            </a:r>
-            <a:r>
-              <a:rPr lang="he-IL" dirty="0" smtClean="0"/>
-              <a:t>למשל תיקיית </a:t>
+              <a:t>) ועוד הרבה שניתן גם להוסיף על התיקיות שנוצרו כברירת מחדל, למשל תיקיית </a:t>
             </a:r>
             <a:r>
               <a:rPr lang="en-US" dirty="0" err="1" smtClean="0"/>
@@ -9747,6 +9930,105 @@
             <a:r>
               <a:rPr lang="he-IL" dirty="0" smtClean="0"/>
               <a:t> אשר נגיע אליהם בשקפים הבאים. </a:t>
+            </a:r>
+            <a:endParaRPr lang="en-US" dirty="0" smtClean="0"/>
+          </a:p>
+          <a:p>
+            <a:pPr marL="0" indent="0" algn="r" rtl="1">
+              <a:buFont typeface="Arial" pitchFamily="34" charset="0"/>
+              <a:buNone/>
+            </a:pPr>
+            <a:r>
+              <a:rPr lang="he-IL" dirty="0" smtClean="0"/>
+              <a:t>ניתן להפנות להגדרות השונות שבתיקיית </a:t>
+            </a:r>
+            <a:r>
+              <a:rPr lang="en-US" dirty="0" smtClean="0"/>
+              <a:t>res</a:t>
+            </a:r>
+            <a:r>
+              <a:rPr lang="he-IL" dirty="0" smtClean="0"/>
+              <a:t> ע"י</a:t>
+            </a:r>
+            <a:r>
+              <a:rPr lang="en-US" dirty="0" smtClean="0"/>
+              <a:t>  </a:t>
+            </a:r>
+            <a:r>
+              <a:rPr lang="he-IL" dirty="0" smtClean="0"/>
+              <a:t>@ בקבצי </a:t>
+            </a:r>
+            <a:r>
+              <a:rPr lang="en-US" dirty="0" smtClean="0"/>
+              <a:t>XML</a:t>
+            </a:r>
+            <a:r>
+              <a:rPr lang="he-IL" dirty="0" smtClean="0"/>
+              <a:t> (לדוגמה </a:t>
+            </a:r>
+            <a:r>
+              <a:rPr lang="en-US" dirty="0" smtClean="0"/>
+              <a:t>@</a:t>
+            </a:r>
+            <a:r>
+              <a:rPr lang="en-US" dirty="0" err="1" smtClean="0"/>
+              <a:t>mipmap</a:t>
+            </a:r>
+            <a:r>
+              <a:rPr lang="en-US" dirty="0" smtClean="0"/>
+              <a:t>/</a:t>
+            </a:r>
+            <a:r>
+              <a:rPr lang="en-US" dirty="0" err="1" smtClean="0"/>
+              <a:t>ic_launcher</a:t>
+            </a:r>
+            <a:r>
+              <a:rPr lang="he-IL" dirty="0" smtClean="0"/>
+              <a:t> הנמצא ה</a:t>
+            </a:r>
+            <a:r>
+              <a:rPr lang="en-US" dirty="0" smtClean="0"/>
+              <a:t>manifest</a:t>
+            </a:r>
+            <a:r>
+              <a:rPr lang="he-IL" dirty="0" smtClean="0"/>
+              <a:t> שמפנה לאייקון האפליקציה) או ע"י גישה סטטית למחלקת </a:t>
+            </a:r>
+            <a:r>
+              <a:rPr lang="en-US" dirty="0" smtClean="0"/>
+              <a:t>R</a:t>
+            </a:r>
+            <a:r>
+              <a:rPr lang="he-IL" dirty="0" smtClean="0"/>
+              <a:t> בקיבצי </a:t>
+            </a:r>
+            <a:r>
+              <a:rPr lang="en-US" dirty="0" smtClean="0"/>
+              <a:t>Java</a:t>
+            </a:r>
+            <a:r>
+              <a:rPr lang="he-IL" dirty="0" smtClean="0"/>
+              <a:t> או קיבצי קוד מקור לוגיים אחרים באפליקציה (לדוגמה </a:t>
+            </a:r>
+            <a:r>
+              <a:rPr lang="en-US" dirty="0" err="1" smtClean="0"/>
+              <a:t>R.layout.activity_main</a:t>
+            </a:r>
+            <a:r>
+              <a:rPr lang="he-IL" dirty="0" smtClean="0"/>
+              <a:t> הנמצא המחלקה </a:t>
+            </a:r>
+            <a:r>
+              <a:rPr lang="en-US" dirty="0" err="1" smtClean="0"/>
+              <a:t>MainActivity</a:t>
+            </a:r>
+            <a:r>
+              <a:rPr lang="he-IL" dirty="0"/>
+              <a:t> </a:t>
+            </a:r>
+            <a:r>
+              <a:rPr lang="he-IL" dirty="0" smtClean="0"/>
+              <a:t>בדוגמה שלנו).</a:t>
             </a:r>
             <a:endParaRPr lang="en-US" dirty="0"/>
           </a:p>
@@ -9976,7 +10258,7 @@
         <p:spPr>
           <a:xfrm>
             <a:off x="6862029" y="2156065"/>
-            <a:ext cx="2784762" cy="1144076"/>
+            <a:ext cx="2703390" cy="3226968"/>
           </a:xfrm>
           <a:prstGeom prst="rect">
             <a:avLst/>
@@ -9984,7 +10266,7 @@
         </p:spPr>
         <p:txBody>
           <a:bodyPr vert="horz" lIns="91440" tIns="45720" rIns="91440" bIns="45720" rtlCol="0">
-            <a:normAutofit fontScale="55000" lnSpcReduction="20000"/>
+            <a:normAutofit fontScale="47500" lnSpcReduction="20000"/>
           </a:bodyPr>
           <a:lstStyle>
             <a:lvl1pPr marL="457189" indent="-457189" algn="l" defTabSz="1219170" rtl="0" eaLnBrk="1" latinLnBrk="0" hangingPunct="1">
@@ -10129,8 +10411,78 @@
               <a:buNone/>
             </a:pPr>
             <a:r>
+              <a:rPr lang="he-IL" dirty="0" smtClean="0"/>
+              <a:t>בתיקיית </a:t>
+            </a:r>
+            <a:r>
               <a:rPr lang="en-US" dirty="0" smtClean="0"/>
-              <a:t>[some text about layout options (not in depth, just the different tabs)]</a:t>
+              <a:t>layout</a:t>
+            </a:r>
+            <a:r>
+              <a:rPr lang="he-IL" dirty="0" smtClean="0"/>
+              <a:t> הנמצא תחת תיקיית </a:t>
+            </a:r>
+            <a:r>
+              <a:rPr lang="en-US" dirty="0" smtClean="0"/>
+              <a:t>res</a:t>
+            </a:r>
+            <a:r>
+              <a:rPr lang="he-IL" dirty="0" smtClean="0"/>
+              <a:t> קיימות קיבצי </a:t>
+            </a:r>
+            <a:r>
+              <a:rPr lang="en-US" dirty="0" smtClean="0"/>
+              <a:t>XML</a:t>
+            </a:r>
+            <a:r>
+              <a:rPr lang="he-IL" dirty="0" smtClean="0"/>
+              <a:t> המגדירות את נראות המסכים ואלמנטים שונים באפליקצייה.</a:t>
+            </a:r>
+          </a:p>
+          <a:p>
+            <a:pPr marL="0" indent="0" algn="r" rtl="1">
+              <a:buFont typeface="Arial" pitchFamily="34" charset="0"/>
+              <a:buNone/>
+            </a:pPr>
+            <a:r>
+              <a:rPr lang="he-IL" dirty="0" smtClean="0"/>
+              <a:t>קבצים אלו יכולים להיות הגדרות של מסכים שלמים (</a:t>
+            </a:r>
+            <a:r>
+              <a:rPr lang="en-US" dirty="0" smtClean="0"/>
+              <a:t>activities</a:t>
+            </a:r>
+            <a:r>
+              <a:rPr lang="he-IL" dirty="0" smtClean="0"/>
+              <a:t>), </a:t>
+            </a:r>
+            <a:r>
+              <a:rPr lang="he-IL" dirty="0" smtClean="0"/>
+              <a:t>או אלמנטי </a:t>
+            </a:r>
+            <a:r>
+              <a:rPr lang="en-US" dirty="0" smtClean="0"/>
+              <a:t>UI</a:t>
+            </a:r>
+            <a:r>
+              <a:rPr lang="he-IL" dirty="0" smtClean="0"/>
+              <a:t> יותר קטנים כגון הגדרת בתנית של שורה שתופיע שוב ושוב ברשימה, חלק ממסך (</a:t>
+            </a:r>
+            <a:r>
+              <a:rPr lang="en-US" dirty="0" smtClean="0"/>
+              <a:t>fragment</a:t>
+            </a:r>
+            <a:r>
+              <a:rPr lang="he-IL" dirty="0" smtClean="0"/>
+              <a:t>), פופאפ (</a:t>
+            </a:r>
+            <a:r>
+              <a:rPr lang="en-US" dirty="0" smtClean="0"/>
+              <a:t>dialog/alert dialog</a:t>
+            </a:r>
+            <a:r>
+              <a:rPr lang="he-IL" dirty="0" smtClean="0"/>
+              <a:t>) ועוד.</a:t>
             </a:r>
             <a:endParaRPr lang="en-US" dirty="0"/>
           </a:p>
@@ -10179,6 +10531,217 @@
           <a:p>
             <a:pPr algn="ctr"/>
             <a:endParaRPr lang="en-US"/>
+          </a:p>
+        </p:txBody>
+      </p:sp>
+      <p:sp>
+        <p:nvSpPr>
+          <p:cNvPr id="8" name="Content Placeholder 2"/>
+          <p:cNvSpPr txBox="1">
+            <a:spLocks/>
+          </p:cNvSpPr>
+          <p:nvPr/>
+        </p:nvSpPr>
+        <p:spPr>
+          <a:xfrm>
+            <a:off x="123061" y="5383033"/>
+            <a:ext cx="9442358" cy="1058848"/>
+          </a:xfrm>
+          <a:prstGeom prst="rect">
+            <a:avLst/>
+          </a:prstGeom>
+        </p:spPr>
+        <p:txBody>
+          <a:bodyPr vert="horz" lIns="91440" tIns="45720" rIns="91440" bIns="45720" rtlCol="0">
+            <a:normAutofit fontScale="70000" lnSpcReduction="20000"/>
+          </a:bodyPr>
+          <a:lstStyle>
+            <a:lvl1pPr marL="457189" indent="-457189" algn="l" defTabSz="1219170" rtl="0" eaLnBrk="1" latinLnBrk="0" hangingPunct="1">
+              <a:spcBef>
+                <a:spcPct val="20000"/>
+              </a:spcBef>
+              <a:buFont typeface="Arial" pitchFamily="34" charset="0"/>
+              <a:buChar char="•"/>
+              <a:defRPr sz="3733" kern="1200">
+                <a:solidFill>
+                  <a:schemeClr val="bg1"/>
+                </a:solidFill>
+                <a:latin typeface="+mn-lt"/>
+                <a:ea typeface="+mn-ea"/>
+                <a:cs typeface="+mn-cs"/>
+              </a:defRPr>
+            </a:lvl1pPr>
+            <a:lvl2pPr marL="990575" indent="-380990" algn="l" defTabSz="1219170" rtl="0" eaLnBrk="1" latinLnBrk="0" hangingPunct="1">
+              <a:spcBef>
+                <a:spcPct val="20000"/>
+              </a:spcBef>
+              <a:buFont typeface="Arial" pitchFamily="34" charset="0"/>
+              <a:buChar char="–"/>
+              <a:defRPr sz="3733" kern="1200">
+                <a:solidFill>
+                  <a:schemeClr val="bg1"/>
+                </a:solidFill>
+                <a:latin typeface="+mn-lt"/>
+                <a:ea typeface="+mn-ea"/>
+                <a:cs typeface="+mn-cs"/>
+              </a:defRPr>
+            </a:lvl2pPr>
+            <a:lvl3pPr marL="1523962" indent="-304792" algn="l" defTabSz="1219170" rtl="0" eaLnBrk="1" latinLnBrk="0" hangingPunct="1">
+              <a:spcBef>
+                <a:spcPct val="20000"/>
+              </a:spcBef>
+              <a:buFont typeface="Arial" pitchFamily="34" charset="0"/>
+              <a:buChar char="•"/>
+              <a:defRPr sz="3200" kern="1200">
+                <a:solidFill>
+                  <a:schemeClr val="bg1"/>
+                </a:solidFill>
+                <a:latin typeface="+mn-lt"/>
+                <a:ea typeface="+mn-ea"/>
+                <a:cs typeface="+mn-cs"/>
+              </a:defRPr>
+            </a:lvl3pPr>
+            <a:lvl4pPr marL="2133547" indent="-304792" algn="l" defTabSz="1219170" rtl="0" eaLnBrk="1" latinLnBrk="0" hangingPunct="1">
+              <a:spcBef>
+                <a:spcPct val="20000"/>
+              </a:spcBef>
+              <a:buFont typeface="Arial" pitchFamily="34" charset="0"/>
+              <a:buChar char="–"/>
+              <a:defRPr sz="2667" kern="1200">
+                <a:solidFill>
+                  <a:schemeClr val="bg1"/>
+                </a:solidFill>
+                <a:latin typeface="+mn-lt"/>
+                <a:ea typeface="+mn-ea"/>
+                <a:cs typeface="+mn-cs"/>
+              </a:defRPr>
+            </a:lvl4pPr>
+            <a:lvl5pPr marL="2743131" indent="-304792" algn="l" defTabSz="1219170" rtl="0" eaLnBrk="1" latinLnBrk="0" hangingPunct="1">
+              <a:spcBef>
+                <a:spcPct val="20000"/>
+              </a:spcBef>
+              <a:buFont typeface="Arial" pitchFamily="34" charset="0"/>
+              <a:buChar char="»"/>
+              <a:defRPr sz="2667" kern="1200">
+                <a:solidFill>
+                  <a:schemeClr val="bg1"/>
+                </a:solidFill>
+                <a:latin typeface="+mn-lt"/>
+                <a:ea typeface="+mn-ea"/>
+                <a:cs typeface="+mn-cs"/>
+              </a:defRPr>
+            </a:lvl5pPr>
+            <a:lvl6pPr marL="3352716" indent="-304792" algn="l" defTabSz="1219170" rtl="0" eaLnBrk="1" latinLnBrk="0" hangingPunct="1">
+              <a:spcBef>
+                <a:spcPct val="20000"/>
+              </a:spcBef>
+              <a:buFont typeface="Arial" pitchFamily="34" charset="0"/>
+              <a:buChar char="•"/>
+              <a:defRPr sz="2667" kern="1200">
+                <a:solidFill>
+                  <a:schemeClr val="tx1"/>
+                </a:solidFill>
+                <a:latin typeface="+mn-lt"/>
+                <a:ea typeface="+mn-ea"/>
+                <a:cs typeface="+mn-cs"/>
+              </a:defRPr>
+            </a:lvl6pPr>
+            <a:lvl7pPr marL="3962301" indent="-304792" algn="l" defTabSz="1219170" rtl="0" eaLnBrk="1" latinLnBrk="0" hangingPunct="1">
+              <a:spcBef>
+                <a:spcPct val="20000"/>
+              </a:spcBef>
+              <a:buFont typeface="Arial" pitchFamily="34" charset="0"/>
+              <a:buChar char="•"/>
+              <a:defRPr sz="2667" kern="1200">
+                <a:solidFill>
+                  <a:schemeClr val="tx1"/>
+                </a:solidFill>
+                <a:latin typeface="+mn-lt"/>
+                <a:ea typeface="+mn-ea"/>
+                <a:cs typeface="+mn-cs"/>
+              </a:defRPr>
+            </a:lvl7pPr>
+            <a:lvl8pPr marL="4571886" indent="-304792" algn="l" defTabSz="1219170" rtl="0" eaLnBrk="1" latinLnBrk="0" hangingPunct="1">
+              <a:spcBef>
+                <a:spcPct val="20000"/>
+              </a:spcBef>
+              <a:buFont typeface="Arial" pitchFamily="34" charset="0"/>
+              <a:buChar char="•"/>
+              <a:defRPr sz="2667" kern="1200">
+                <a:solidFill>
+                  <a:schemeClr val="tx1"/>
+                </a:solidFill>
+                <a:latin typeface="+mn-lt"/>
+                <a:ea typeface="+mn-ea"/>
+                <a:cs typeface="+mn-cs"/>
+              </a:defRPr>
+            </a:lvl8pPr>
+            <a:lvl9pPr marL="5181470" indent="-304792" algn="l" defTabSz="1219170" rtl="0" eaLnBrk="1" latinLnBrk="0" hangingPunct="1">
+              <a:spcBef>
+                <a:spcPct val="20000"/>
+              </a:spcBef>
+              <a:buFont typeface="Arial" pitchFamily="34" charset="0"/>
+              <a:buChar char="•"/>
+              <a:defRPr sz="2667" kern="1200">
+                <a:solidFill>
+                  <a:schemeClr val="tx1"/>
+                </a:solidFill>
+                <a:latin typeface="+mn-lt"/>
+                <a:ea typeface="+mn-ea"/>
+                <a:cs typeface="+mn-cs"/>
+              </a:defRPr>
+            </a:lvl9pPr>
+          </a:lstStyle>
+          <a:p>
+            <a:pPr marL="0" indent="0" algn="r" rtl="1">
+              <a:buFont typeface="Arial" pitchFamily="34" charset="0"/>
+              <a:buNone/>
+            </a:pPr>
+            <a:r>
+              <a:rPr lang="he-IL" dirty="0" smtClean="0"/>
+              <a:t>ניתן לראות את הקבצים שבונים </a:t>
+            </a:r>
+            <a:r>
+              <a:rPr lang="en-US" dirty="0" smtClean="0"/>
+              <a:t>UI</a:t>
+            </a:r>
+            <a:r>
+              <a:rPr lang="he-IL" dirty="0" smtClean="0"/>
+              <a:t> באחד משולשה אופנים. קוד מקור (</a:t>
+            </a:r>
+            <a:r>
+              <a:rPr lang="en-US" dirty="0" smtClean="0"/>
+              <a:t>code</a:t>
+            </a:r>
+            <a:r>
+              <a:rPr lang="he-IL" dirty="0" smtClean="0"/>
+              <a:t>), עיצוב</a:t>
+            </a:r>
+            <a:r>
+              <a:rPr lang="en-US" dirty="0" smtClean="0"/>
+              <a:t> </a:t>
+            </a:r>
+            <a:r>
+              <a:rPr lang="he-IL" dirty="0" smtClean="0"/>
+              <a:t> </a:t>
+            </a:r>
+            <a:r>
+              <a:rPr lang="en-US" dirty="0" smtClean="0"/>
+              <a:t>(design)</a:t>
+            </a:r>
+            <a:r>
+              <a:rPr lang="he-IL" dirty="0" smtClean="0"/>
+              <a:t> או שנים/מחולק </a:t>
+            </a:r>
+            <a:r>
+              <a:rPr lang="en-US" dirty="0" smtClean="0"/>
+              <a:t>(split)</a:t>
+            </a:r>
+            <a:r>
+              <a:rPr lang="he-IL" dirty="0" smtClean="0"/>
+              <a:t>. ניתן לבחור בין האופציות לתצוגת ע"י לחיצת אחת מהאופציות בפינה בצד ימין למעלה. </a:t>
+            </a:r>
+            <a:endParaRPr lang="en-US" dirty="0"/>
           </a:p>
         </p:txBody>
       </p:sp>
@@ -10405,8 +10968,8 @@
         </p:nvSpPr>
         <p:spPr>
           <a:xfrm>
-            <a:off x="6862029" y="2156065"/>
-            <a:ext cx="2784762" cy="1144076"/>
+            <a:off x="6687047" y="1823901"/>
+            <a:ext cx="2934469" cy="3099747"/>
           </a:xfrm>
           <a:prstGeom prst="rect">
             <a:avLst/>
@@ -10414,7 +10977,7 @@
         </p:spPr>
         <p:txBody>
           <a:bodyPr vert="horz" lIns="91440" tIns="45720" rIns="91440" bIns="45720" rtlCol="0">
-            <a:normAutofit fontScale="77500" lnSpcReduction="20000"/>
+            <a:noAutofit/>
           </a:bodyPr>
           <a:lstStyle>
             <a:lvl1pPr marL="457189" indent="-457189" algn="l" defTabSz="1219170" rtl="0" eaLnBrk="1" latinLnBrk="0" hangingPunct="1">
@@ -10555,14 +11118,447 @@
           </a:lstStyle>
           <a:p>
             <a:pPr marL="0" indent="0" algn="r" rtl="1">
-              <a:buFont typeface="Arial" pitchFamily="34" charset="0"/>
               <a:buNone/>
             </a:pPr>
             <a:r>
-              <a:rPr lang="en-US" dirty="0" smtClean="0"/>
-              <a:t>[some text about values xml files)]</a:t>
-            </a:r>
-            <a:endParaRPr lang="en-US" dirty="0"/>
+              <a:rPr lang="he-IL" sz="1050" dirty="0"/>
+              <a:t>בתיקיית </a:t>
+            </a:r>
+            <a:r>
+              <a:rPr lang="en-US" sz="1050" dirty="0" smtClean="0"/>
+              <a:t>values</a:t>
+            </a:r>
+            <a:r>
+              <a:rPr lang="he-IL" sz="1050" dirty="0" smtClean="0"/>
+              <a:t> </a:t>
+            </a:r>
+            <a:r>
+              <a:rPr lang="he-IL" sz="1050" dirty="0"/>
+              <a:t>הנמצא תחת תיקיית </a:t>
+            </a:r>
+            <a:r>
+              <a:rPr lang="en-US" sz="1050" dirty="0"/>
+              <a:t>res</a:t>
+            </a:r>
+            <a:r>
+              <a:rPr lang="he-IL" sz="1050" dirty="0"/>
+              <a:t> קיימות קיבצי </a:t>
+            </a:r>
+            <a:r>
+              <a:rPr lang="en-US" sz="1050" dirty="0"/>
+              <a:t>XML</a:t>
+            </a:r>
+            <a:r>
+              <a:rPr lang="he-IL" sz="1050" dirty="0"/>
+              <a:t> המגדירות </a:t>
+            </a:r>
+            <a:r>
+              <a:rPr lang="he-IL" sz="1050" dirty="0" smtClean="0"/>
+              <a:t>ערכים נלווים לאפליקציה. 4 דוגמאות לקצבים אילו הינם הקבצים: </a:t>
+            </a:r>
+            <a:r>
+              <a:rPr lang="en-US" sz="1050" dirty="0" smtClean="0"/>
+              <a:t>strings, </a:t>
+            </a:r>
+            <a:r>
+              <a:rPr lang="en-US" sz="1050" dirty="0" err="1" smtClean="0"/>
+              <a:t>dimens</a:t>
+            </a:r>
+            <a:r>
+              <a:rPr lang="en-US" sz="1050" dirty="0" smtClean="0"/>
+              <a:t>, colors, themes.</a:t>
+            </a:r>
+            <a:endParaRPr lang="he-IL" sz="1050" dirty="0" smtClean="0"/>
+          </a:p>
+          <a:p>
+            <a:pPr marL="0" indent="0" algn="r" rtl="1">
+              <a:buNone/>
+            </a:pPr>
+            <a:r>
+              <a:rPr lang="he-IL" sz="1050" dirty="0" smtClean="0"/>
+              <a:t>בקבצים בתיקייה זאת יש אותו סגנון, שם ההגרה במאפיין </a:t>
+            </a:r>
+            <a:r>
+              <a:rPr lang="en-US" sz="1050" dirty="0" smtClean="0"/>
+              <a:t>name</a:t>
+            </a:r>
+            <a:r>
+              <a:rPr lang="he-IL" sz="1050" dirty="0" smtClean="0"/>
+              <a:t> של תגית של סוג ההגדרה, והערך בין התגית הפותחת לסוגרת.</a:t>
+            </a:r>
+            <a:endParaRPr lang="en-US" sz="1050" dirty="0" smtClean="0"/>
+          </a:p>
+          <a:p>
+            <a:pPr marL="0" indent="0" algn="r" rtl="1">
+              <a:buNone/>
+            </a:pPr>
+            <a:r>
+              <a:rPr lang="en-US" sz="1050" dirty="0" smtClean="0"/>
+              <a:t>strings</a:t>
+            </a:r>
+            <a:r>
+              <a:rPr lang="he-IL" sz="1050" dirty="0"/>
+              <a:t> </a:t>
+            </a:r>
+            <a:r>
+              <a:rPr lang="he-IL" sz="1050" dirty="0" smtClean="0"/>
+              <a:t>– קובץ </a:t>
+            </a:r>
+            <a:r>
+              <a:rPr lang="en-US" sz="1050" dirty="0" smtClean="0"/>
+              <a:t>XML</a:t>
+            </a:r>
+            <a:r>
+              <a:rPr lang="he-IL" sz="1050" dirty="0" smtClean="0"/>
+              <a:t> המכיל בתוכו את הטקסטים בשונים שנשים באפליקציה. טוב לשמור את הטסקטים בקובץ נפרד גם לצורך תרגום לשפות שונות וגם לצורך שימוש חוזר.</a:t>
+            </a:r>
+          </a:p>
+          <a:p>
+            <a:pPr marL="0" indent="0" algn="r" rtl="1">
+              <a:buNone/>
+            </a:pPr>
+            <a:r>
+              <a:rPr lang="he-IL" sz="1050" dirty="0" smtClean="0"/>
+              <a:t>התגית הרלוונטית - </a:t>
+            </a:r>
+            <a:r>
+              <a:rPr lang="en-US" sz="1050" dirty="0" smtClean="0"/>
+              <a:t>&lt;string&gt;</a:t>
+            </a:r>
+            <a:endParaRPr lang="he-IL" sz="1050" dirty="0" smtClean="0"/>
+          </a:p>
+          <a:p>
+            <a:pPr marL="0" indent="0" algn="r" rtl="1">
+              <a:buNone/>
+            </a:pPr>
+            <a:r>
+              <a:rPr lang="en-US" sz="1050" dirty="0" err="1" smtClean="0"/>
+              <a:t>dimens</a:t>
+            </a:r>
+            <a:r>
+              <a:rPr lang="en-US" sz="1050" dirty="0" smtClean="0"/>
+              <a:t> </a:t>
+            </a:r>
+            <a:r>
+              <a:rPr lang="he-IL" sz="1050" dirty="0" smtClean="0"/>
+              <a:t> - קובץ </a:t>
+            </a:r>
+            <a:r>
+              <a:rPr lang="en-US" sz="1050" dirty="0" smtClean="0"/>
+              <a:t>XML</a:t>
+            </a:r>
+            <a:r>
+              <a:rPr lang="he-IL" sz="1050" dirty="0" smtClean="0"/>
+              <a:t> המכיל גדלים של רכיבי </a:t>
+            </a:r>
+            <a:r>
+              <a:rPr lang="en-US" sz="1050" dirty="0" smtClean="0"/>
+              <a:t>UI</a:t>
+            </a:r>
+            <a:r>
+              <a:rPr lang="he-IL" sz="1050" dirty="0" smtClean="0"/>
+              <a:t> שונים כגון כפתורים ותיבות טקסט. בפיתוח אדרואיד. בעיקר בפיתוח אנדרואיד נשתמש ב2 יחידות מדידה שהינם </a:t>
+            </a:r>
+            <a:r>
+              <a:rPr lang="en-US" sz="1050" dirty="0" err="1" smtClean="0"/>
+              <a:t>dp</a:t>
+            </a:r>
+            <a:r>
+              <a:rPr lang="he-IL" sz="1050" dirty="0"/>
+              <a:t> </a:t>
+            </a:r>
+            <a:r>
+              <a:rPr lang="he-IL" sz="1050" dirty="0" smtClean="0"/>
+              <a:t>(</a:t>
+            </a:r>
+            <a:r>
+              <a:rPr lang="en-US" sz="1050" dirty="0" smtClean="0"/>
+              <a:t>density independent pixel</a:t>
+            </a:r>
+            <a:r>
+              <a:rPr lang="he-IL" sz="1050" dirty="0" smtClean="0"/>
+              <a:t> להגדרת גודל של אלמט כך שיתאים את עצמו למסכים עם רזולוציות שונות) ו</a:t>
+            </a:r>
+            <a:r>
+              <a:rPr lang="en-US" sz="1050" dirty="0" smtClean="0"/>
+              <a:t> </a:t>
+            </a:r>
+            <a:r>
+              <a:rPr lang="en-US" sz="1050" dirty="0" err="1" smtClean="0"/>
+              <a:t>sp</a:t>
+            </a:r>
+            <a:r>
+              <a:rPr lang="en-US" sz="1050" dirty="0" smtClean="0"/>
+              <a:t> </a:t>
+            </a:r>
+            <a:r>
+              <a:rPr lang="he-IL" sz="1050" dirty="0" smtClean="0"/>
+              <a:t> (</a:t>
+            </a:r>
+            <a:r>
+              <a:rPr lang="en-US" sz="1050" dirty="0" smtClean="0"/>
+              <a:t>scalable independent pixel</a:t>
+            </a:r>
+            <a:r>
+              <a:rPr lang="he-IL" sz="1050" dirty="0" smtClean="0"/>
+              <a:t> דומה ל</a:t>
+            </a:r>
+            <a:r>
+              <a:rPr lang="en-US" sz="1050" dirty="0" err="1" smtClean="0"/>
+              <a:t>dp</a:t>
+            </a:r>
+            <a:r>
+              <a:rPr lang="he-IL" sz="1050" dirty="0"/>
+              <a:t> </a:t>
+            </a:r>
+            <a:r>
+              <a:rPr lang="he-IL" sz="1050" dirty="0" smtClean="0"/>
+              <a:t>אך מתחשב להגדרות גולל גופן במכיר ולכן בשימוש להגדרות של גודל טקסטים). קיימות יחידות נוספות כמו </a:t>
+            </a:r>
+            <a:r>
+              <a:rPr lang="en-US" sz="1050" dirty="0" err="1" smtClean="0"/>
+              <a:t>px</a:t>
+            </a:r>
+            <a:r>
+              <a:rPr lang="en-US" sz="1050" dirty="0"/>
+              <a:t> </a:t>
+            </a:r>
+            <a:r>
+              <a:rPr lang="en-US" sz="1050" dirty="0" smtClean="0"/>
+              <a:t>– pixel</a:t>
+            </a:r>
+            <a:r>
+              <a:rPr lang="he-IL" sz="1050" dirty="0" smtClean="0"/>
+              <a:t> אבל מומלץ לא להשתמש בשהם כדי לשמור על ריספונסיביות לרזולוציות וגודלי מסך שונים.</a:t>
+            </a:r>
+            <a:endParaRPr lang="he-IL" sz="1050" dirty="0"/>
+          </a:p>
+        </p:txBody>
+      </p:sp>
+      <p:sp>
+        <p:nvSpPr>
+          <p:cNvPr id="9" name="Content Placeholder 2"/>
+          <p:cNvSpPr txBox="1">
+            <a:spLocks/>
+          </p:cNvSpPr>
+          <p:nvPr/>
+        </p:nvSpPr>
+        <p:spPr>
+          <a:xfrm>
+            <a:off x="123061" y="5565914"/>
+            <a:ext cx="9498455" cy="834886"/>
+          </a:xfrm>
+          <a:prstGeom prst="rect">
+            <a:avLst/>
+          </a:prstGeom>
+        </p:spPr>
+        <p:txBody>
+          <a:bodyPr vert="horz" lIns="91440" tIns="45720" rIns="91440" bIns="45720" rtlCol="0">
+            <a:noAutofit/>
+          </a:bodyPr>
+          <a:lstStyle>
+            <a:lvl1pPr marL="457189" indent="-457189" algn="l" defTabSz="1219170" rtl="0" eaLnBrk="1" latinLnBrk="0" hangingPunct="1">
+              <a:spcBef>
+                <a:spcPct val="20000"/>
+              </a:spcBef>
+              <a:buFont typeface="Arial" pitchFamily="34" charset="0"/>
+              <a:buChar char="•"/>
+              <a:defRPr sz="3733" kern="1200">
+                <a:solidFill>
+                  <a:schemeClr val="bg1"/>
+                </a:solidFill>
+                <a:latin typeface="+mn-lt"/>
+                <a:ea typeface="+mn-ea"/>
+                <a:cs typeface="+mn-cs"/>
+              </a:defRPr>
+            </a:lvl1pPr>
+            <a:lvl2pPr marL="990575" indent="-380990" algn="l" defTabSz="1219170" rtl="0" eaLnBrk="1" latinLnBrk="0" hangingPunct="1">
+              <a:spcBef>
+                <a:spcPct val="20000"/>
+              </a:spcBef>
+              <a:buFont typeface="Arial" pitchFamily="34" charset="0"/>
+              <a:buChar char="–"/>
+              <a:defRPr sz="3733" kern="1200">
+                <a:solidFill>
+                  <a:schemeClr val="bg1"/>
+                </a:solidFill>
+                <a:latin typeface="+mn-lt"/>
+                <a:ea typeface="+mn-ea"/>
+                <a:cs typeface="+mn-cs"/>
+              </a:defRPr>
+            </a:lvl2pPr>
+            <a:lvl3pPr marL="1523962" indent="-304792" algn="l" defTabSz="1219170" rtl="0" eaLnBrk="1" latinLnBrk="0" hangingPunct="1">
+              <a:spcBef>
+                <a:spcPct val="20000"/>
+              </a:spcBef>
+              <a:buFont typeface="Arial" pitchFamily="34" charset="0"/>
+              <a:buChar char="•"/>
+              <a:defRPr sz="3200" kern="1200">
+                <a:solidFill>
+                  <a:schemeClr val="bg1"/>
+                </a:solidFill>
+                <a:latin typeface="+mn-lt"/>
+                <a:ea typeface="+mn-ea"/>
+                <a:cs typeface="+mn-cs"/>
+              </a:defRPr>
+            </a:lvl3pPr>
+            <a:lvl4pPr marL="2133547" indent="-304792" algn="l" defTabSz="1219170" rtl="0" eaLnBrk="1" latinLnBrk="0" hangingPunct="1">
+              <a:spcBef>
+                <a:spcPct val="20000"/>
+              </a:spcBef>
+              <a:buFont typeface="Arial" pitchFamily="34" charset="0"/>
+              <a:buChar char="–"/>
+              <a:defRPr sz="2667" kern="1200">
+                <a:solidFill>
+                  <a:schemeClr val="bg1"/>
+                </a:solidFill>
+                <a:latin typeface="+mn-lt"/>
+                <a:ea typeface="+mn-ea"/>
+                <a:cs typeface="+mn-cs"/>
+              </a:defRPr>
+            </a:lvl4pPr>
+            <a:lvl5pPr marL="2743131" indent="-304792" algn="l" defTabSz="1219170" rtl="0" eaLnBrk="1" latinLnBrk="0" hangingPunct="1">
+              <a:spcBef>
+                <a:spcPct val="20000"/>
+              </a:spcBef>
+              <a:buFont typeface="Arial" pitchFamily="34" charset="0"/>
+              <a:buChar char="»"/>
+              <a:defRPr sz="2667" kern="1200">
+                <a:solidFill>
+                  <a:schemeClr val="bg1"/>
+                </a:solidFill>
+                <a:latin typeface="+mn-lt"/>
+                <a:ea typeface="+mn-ea"/>
+                <a:cs typeface="+mn-cs"/>
+              </a:defRPr>
+            </a:lvl5pPr>
+            <a:lvl6pPr marL="3352716" indent="-304792" algn="l" defTabSz="1219170" rtl="0" eaLnBrk="1" latinLnBrk="0" hangingPunct="1">
+              <a:spcBef>
+                <a:spcPct val="20000"/>
+              </a:spcBef>
+              <a:buFont typeface="Arial" pitchFamily="34" charset="0"/>
+              <a:buChar char="•"/>
+              <a:defRPr sz="2667" kern="1200">
+                <a:solidFill>
+                  <a:schemeClr val="tx1"/>
+                </a:solidFill>
+                <a:latin typeface="+mn-lt"/>
+                <a:ea typeface="+mn-ea"/>
+                <a:cs typeface="+mn-cs"/>
+              </a:defRPr>
+            </a:lvl6pPr>
+            <a:lvl7pPr marL="3962301" indent="-304792" algn="l" defTabSz="1219170" rtl="0" eaLnBrk="1" latinLnBrk="0" hangingPunct="1">
+              <a:spcBef>
+                <a:spcPct val="20000"/>
+              </a:spcBef>
+              <a:buFont typeface="Arial" pitchFamily="34" charset="0"/>
+              <a:buChar char="•"/>
+              <a:defRPr sz="2667" kern="1200">
+                <a:solidFill>
+                  <a:schemeClr val="tx1"/>
+                </a:solidFill>
+                <a:latin typeface="+mn-lt"/>
+                <a:ea typeface="+mn-ea"/>
+                <a:cs typeface="+mn-cs"/>
+              </a:defRPr>
+            </a:lvl7pPr>
+            <a:lvl8pPr marL="4571886" indent="-304792" algn="l" defTabSz="1219170" rtl="0" eaLnBrk="1" latinLnBrk="0" hangingPunct="1">
+              <a:spcBef>
+                <a:spcPct val="20000"/>
+              </a:spcBef>
+              <a:buFont typeface="Arial" pitchFamily="34" charset="0"/>
+              <a:buChar char="•"/>
+              <a:defRPr sz="2667" kern="1200">
+                <a:solidFill>
+                  <a:schemeClr val="tx1"/>
+                </a:solidFill>
+                <a:latin typeface="+mn-lt"/>
+                <a:ea typeface="+mn-ea"/>
+                <a:cs typeface="+mn-cs"/>
+              </a:defRPr>
+            </a:lvl8pPr>
+            <a:lvl9pPr marL="5181470" indent="-304792" algn="l" defTabSz="1219170" rtl="0" eaLnBrk="1" latinLnBrk="0" hangingPunct="1">
+              <a:spcBef>
+                <a:spcPct val="20000"/>
+              </a:spcBef>
+              <a:buFont typeface="Arial" pitchFamily="34" charset="0"/>
+              <a:buChar char="•"/>
+              <a:defRPr sz="2667" kern="1200">
+                <a:solidFill>
+                  <a:schemeClr val="tx1"/>
+                </a:solidFill>
+                <a:latin typeface="+mn-lt"/>
+                <a:ea typeface="+mn-ea"/>
+                <a:cs typeface="+mn-cs"/>
+              </a:defRPr>
+            </a:lvl9pPr>
+          </a:lstStyle>
+          <a:p>
+            <a:pPr marL="0" indent="0" algn="r" rtl="1">
+              <a:buFont typeface="Arial" pitchFamily="34" charset="0"/>
+              <a:buNone/>
+            </a:pPr>
+            <a:r>
+              <a:rPr lang="en-US" sz="1050" dirty="0" smtClean="0"/>
+              <a:t>colors</a:t>
+            </a:r>
+            <a:r>
+              <a:rPr lang="he-IL" sz="1050" dirty="0" smtClean="0"/>
+              <a:t> – צבעים שונים שנשתמש בהם שאפליקציה בסגנון </a:t>
+            </a:r>
+            <a:r>
+              <a:rPr lang="en-US" sz="1050" dirty="0" smtClean="0"/>
+              <a:t>hexadecimal code</a:t>
+            </a:r>
+            <a:r>
+              <a:rPr lang="he-IL" sz="1050" dirty="0" smtClean="0"/>
+              <a:t>.</a:t>
+            </a:r>
+          </a:p>
+          <a:p>
+            <a:pPr marL="0" indent="0" algn="r" rtl="1">
+              <a:buFont typeface="Arial" pitchFamily="34" charset="0"/>
+              <a:buNone/>
+            </a:pPr>
+            <a:r>
+              <a:rPr lang="en-US" sz="1050" dirty="0" smtClean="0"/>
+              <a:t>themes</a:t>
+            </a:r>
+            <a:r>
+              <a:rPr lang="he-IL" sz="1050" dirty="0" smtClean="0"/>
+              <a:t> – הגדרות סגנונות שלמים עבור אלמנטים מסויימים למשל ניתן להגדית במקום אחד שכל כפתור שיש לו את ה</a:t>
+            </a:r>
+            <a:r>
+              <a:rPr lang="en-US" sz="1050" dirty="0" smtClean="0"/>
+              <a:t>style</a:t>
+            </a:r>
+            <a:r>
+              <a:rPr lang="he-IL" sz="1050" dirty="0" smtClean="0"/>
+              <a:t> של </a:t>
+            </a:r>
+            <a:r>
+              <a:rPr lang="en-US" sz="1050" dirty="0" err="1" smtClean="0"/>
+              <a:t>blue_big</a:t>
+            </a:r>
+            <a:r>
+              <a:rPr lang="he-IL" sz="1050" dirty="0"/>
+              <a:t> </a:t>
+            </a:r>
+            <a:r>
+              <a:rPr lang="he-IL" sz="1050" dirty="0" smtClean="0"/>
+              <a:t>יהיה עם צבע רקע כחול, צבע טקסט לבן, גודל גופן מסויים וכן האלה.</a:t>
+            </a:r>
+          </a:p>
+          <a:p>
+            <a:pPr marL="0" indent="0" algn="r" rtl="1">
+              <a:buFont typeface="Arial" pitchFamily="34" charset="0"/>
+              <a:buNone/>
+            </a:pPr>
+            <a:r>
+              <a:rPr lang="he-IL" sz="1050" dirty="0" smtClean="0"/>
+              <a:t>נשים לב שימוש בקבצים אילו אינו הכרחי, ניתן לראות ישירות במקום הרלוונטי את הערך הרצוי, אבל מומלץ להשתמש בהם במיוחד עם ערכים שחוזרים על עצמם לעורך האפליקצייה ושאולי רצה לשנות את כולם במקום אחד במקום לעבור על כל המקומות שיש בהם שימוש ולשנות אחד אחד.</a:t>
+            </a:r>
+            <a:endParaRPr lang="en-US" sz="1050" dirty="0"/>
           </a:p>
         </p:txBody>
       </p:sp>
@@ -10944,11 +11940,7 @@
             </a:pPr>
             <a:r>
               <a:rPr lang="en-US" dirty="0" smtClean="0"/>
-              <a:t>[some text about the java folder, about how we are talking about the one that isn’t related to “test”. Like the root of a normal </a:t>
-            </a:r>
-            <a:r>
-              <a:rPr lang="en-US" smtClean="0"/>
-              <a:t>java project]</a:t>
+              <a:t>[some text about the java folder, about how we are talking about the one that isn’t related to “test”. Like the root of a normal java project]</a:t>
             </a:r>
             <a:endParaRPr lang="en-US" dirty="0"/>
           </a:p>

</xml_diff>

<commit_message>
finished parts of the project
</commit_message>
<xml_diff>
--- a/Android Presentation - Java Workshop.pptx
+++ b/Android Presentation - Java Workshop.pptx
@@ -11794,7 +11794,7 @@
         </p:spPr>
         <p:txBody>
           <a:bodyPr vert="horz" lIns="91440" tIns="45720" rIns="91440" bIns="45720" rtlCol="0">
-            <a:normAutofit/>
+            <a:normAutofit fontScale="62500" lnSpcReduction="20000"/>
           </a:bodyPr>
           <a:lstStyle>
             <a:lvl1pPr marL="457189" indent="-457189" algn="l" defTabSz="1219170" rtl="0" eaLnBrk="1" latinLnBrk="0" hangingPunct="1">
@@ -11939,8 +11939,156 @@
               <a:buNone/>
             </a:pPr>
             <a:r>
+              <a:rPr lang="he-IL" dirty="0" smtClean="0"/>
+              <a:t>תיקיית ה</a:t>
+            </a:r>
+            <a:r>
               <a:rPr lang="en-US" dirty="0" smtClean="0"/>
-              <a:t>[some text about the java folder, about how we are talking about the one that isn’t related to “test”. Like the root of a normal java project]</a:t>
+              <a:t>java</a:t>
+            </a:r>
+            <a:r>
+              <a:rPr lang="he-IL" dirty="0" smtClean="0"/>
+              <a:t> מכילה את קבצי המקור של </a:t>
+            </a:r>
+            <a:r>
+              <a:rPr lang="en-US" dirty="0" smtClean="0"/>
+              <a:t>Java</a:t>
+            </a:r>
+            <a:r>
+              <a:rPr lang="he-IL" dirty="0"/>
+              <a:t> </a:t>
+            </a:r>
+            <a:r>
+              <a:rPr lang="he-IL" dirty="0" smtClean="0"/>
+              <a:t>(או </a:t>
+            </a:r>
+            <a:r>
+              <a:rPr lang="en-US" dirty="0" err="1" smtClean="0"/>
+              <a:t>Kotlin</a:t>
+            </a:r>
+            <a:r>
+              <a:rPr lang="he-IL" dirty="0" smtClean="0"/>
+              <a:t>) ומתפקד שתיקיית השורש של פרוייקט </a:t>
+            </a:r>
+            <a:r>
+              <a:rPr lang="en-US" dirty="0" smtClean="0"/>
+              <a:t>Java</a:t>
+            </a:r>
+            <a:r>
+              <a:rPr lang="he-IL" dirty="0" smtClean="0"/>
+              <a:t> כמו שמכירים עד היום. ה</a:t>
+            </a:r>
+            <a:r>
+              <a:rPr lang="en-US" dirty="0" smtClean="0"/>
+              <a:t>package</a:t>
+            </a:r>
+            <a:r>
+              <a:rPr lang="he-IL" dirty="0" smtClean="0"/>
+              <a:t> של השורש הוא ה</a:t>
+            </a:r>
+            <a:r>
+              <a:rPr lang="en-US" dirty="0" smtClean="0"/>
+              <a:t>package</a:t>
+            </a:r>
+            <a:r>
+              <a:rPr lang="he-IL" dirty="0" smtClean="0"/>
+              <a:t> של הפרוייקט וניתן לפתוח תתי </a:t>
+            </a:r>
+            <a:r>
+              <a:rPr lang="en-US" dirty="0" smtClean="0"/>
+              <a:t>packages</a:t>
+            </a:r>
+            <a:r>
+              <a:rPr lang="he-IL" dirty="0" smtClean="0"/>
+              <a:t>.</a:t>
+            </a:r>
+          </a:p>
+          <a:p>
+            <a:pPr marL="0" indent="0" algn="r" rtl="1">
+              <a:buFont typeface="Arial" pitchFamily="34" charset="0"/>
+              <a:buNone/>
+            </a:pPr>
+            <a:r>
+              <a:rPr lang="he-IL" dirty="0" smtClean="0"/>
+              <a:t>התיקייה הרלוונטית היא התיקיית ללא שם המכיל </a:t>
+            </a:r>
+            <a:r>
+              <a:rPr lang="en-US" dirty="0" smtClean="0"/>
+              <a:t>test</a:t>
+            </a:r>
+            <a:r>
+              <a:rPr lang="he-IL" dirty="0"/>
+              <a:t> </a:t>
+            </a:r>
+            <a:r>
+              <a:rPr lang="he-IL" dirty="0" smtClean="0"/>
+              <a:t>אחריו (אילו מיועדים לבדיות יחידה/</a:t>
+            </a:r>
+            <a:r>
+              <a:rPr lang="en-US" dirty="0" smtClean="0"/>
+              <a:t>UI</a:t>
+            </a:r>
+            <a:r>
+              <a:rPr lang="he-IL" dirty="0" smtClean="0"/>
+              <a:t>).</a:t>
+            </a:r>
+          </a:p>
+          <a:p>
+            <a:pPr marL="0" indent="0" algn="r" rtl="1">
+              <a:buFont typeface="Arial" pitchFamily="34" charset="0"/>
+              <a:buNone/>
+            </a:pPr>
+            <a:r>
+              <a:rPr lang="he-IL" dirty="0" smtClean="0"/>
+              <a:t>הרבה מחלקות ב</a:t>
+            </a:r>
+            <a:r>
+              <a:rPr lang="en-US" dirty="0" smtClean="0"/>
+              <a:t>Java</a:t>
+            </a:r>
+            <a:r>
+              <a:rPr lang="he-IL" dirty="0" smtClean="0"/>
+              <a:t> שנגדיר הפרוייקט יהיו תתי מחלקות של מחלקות ב</a:t>
+            </a:r>
+            <a:r>
+              <a:rPr lang="en-US" dirty="0" smtClean="0"/>
+              <a:t>SDK</a:t>
+            </a:r>
+            <a:r>
+              <a:rPr lang="he-IL" dirty="0" smtClean="0"/>
+              <a:t> של אנדרואיד, כגון </a:t>
+            </a:r>
+            <a:r>
+              <a:rPr lang="en-US" dirty="0" err="1" smtClean="0"/>
+              <a:t>MainActivity</a:t>
+            </a:r>
+            <a:r>
+              <a:rPr lang="he-IL" dirty="0"/>
+              <a:t> </a:t>
+            </a:r>
+            <a:r>
+              <a:rPr lang="he-IL" dirty="0" smtClean="0"/>
+              <a:t>המגדירה את המסך הבודד שדוגמה פשוטה זו והיא תת ממחלקה של </a:t>
+            </a:r>
+            <a:r>
+              <a:rPr lang="en-US" dirty="0" err="1" smtClean="0"/>
+              <a:t>AppCompatActivity</a:t>
+            </a:r>
+            <a:r>
+              <a:rPr lang="he-IL" dirty="0"/>
+              <a:t> </a:t>
+            </a:r>
+            <a:r>
+              <a:rPr lang="he-IL" dirty="0" smtClean="0"/>
+              <a:t>(מחלקה להגדרת מסך בודד של אדרואיד – תת מחלקה בעצמה של </a:t>
+            </a:r>
+            <a:r>
+              <a:rPr lang="en-US" dirty="0" smtClean="0"/>
+              <a:t>Activity</a:t>
+            </a:r>
+            <a:r>
+              <a:rPr lang="he-IL" dirty="0" smtClean="0"/>
+              <a:t>).</a:t>
             </a:r>
             <a:endParaRPr lang="en-US" dirty="0"/>
           </a:p>

</xml_diff>

<commit_message>
removed some notes from table of contents
</commit_message>
<xml_diff>
--- a/Android Presentation - Java Workshop.pptx
+++ b/Android Presentation - Java Workshop.pptx
@@ -9303,48 +9303,20 @@
           <a:p>
             <a:pPr algn="r" rtl="1"/>
             <a:r>
-              <a:rPr lang="he-IL" sz="2800" dirty="0" smtClean="0"/>
-              <a:t>הרכב הפרוייק</a:t>
-            </a:r>
-            <a:r>
-              <a:rPr lang="he-IL" sz="2800" dirty="0">
+              <a:rPr lang="he-IL" sz="2800" smtClean="0"/>
+              <a:t>הרכב </a:t>
+            </a:r>
+            <a:r>
+              <a:rPr lang="he-IL" sz="2800" smtClean="0"/>
+              <a:t>הפרוייק</a:t>
+            </a:r>
+            <a:r>
+              <a:rPr lang="he-IL" sz="2800" smtClean="0">
                 <a:solidFill>
                   <a:prstClr val="white"/>
                 </a:solidFill>
               </a:rPr>
-              <a:t>ט </a:t>
-            </a:r>
-            <a:r>
-              <a:rPr lang="en-US" sz="1400" dirty="0">
-                <a:solidFill>
-                  <a:prstClr val="white"/>
-                </a:solidFill>
-              </a:rPr>
-              <a:t>[manifest, </a:t>
-            </a:r>
-            <a:r>
-              <a:rPr lang="en-US" sz="1400" dirty="0" err="1">
-                <a:solidFill>
-                  <a:prstClr val="white"/>
-                </a:solidFill>
-              </a:rPr>
-              <a:t>gradle</a:t>
-            </a:r>
-            <a:r>
-              <a:rPr lang="en-US" sz="1400" dirty="0">
-                <a:solidFill>
-                  <a:prstClr val="white"/>
-                </a:solidFill>
-              </a:rPr>
-              <a:t>, res, </a:t>
-            </a:r>
-            <a:r>
-              <a:rPr lang="en-US" sz="1400" dirty="0" smtClean="0">
-                <a:solidFill>
-                  <a:prstClr val="white"/>
-                </a:solidFill>
-              </a:rPr>
-              <a:t>java, and some windows like log cat]</a:t>
+              <a:t>ט</a:t>
             </a:r>
             <a:endParaRPr lang="en-US" sz="2800" dirty="0" smtClean="0"/>
           </a:p>

</xml_diff>

<commit_message>
add ui table of contents
</commit_message>
<xml_diff>
--- a/Android Presentation - Java Workshop.pptx
+++ b/Android Presentation - Java Workshop.pptx
@@ -28,6 +28,7 @@
     <p:sldId id="283" r:id="rId22"/>
     <p:sldId id="284" r:id="rId23"/>
     <p:sldId id="285" r:id="rId24"/>
+    <p:sldId id="286" r:id="rId25"/>
   </p:sldIdLst>
   <p:sldSz cx="12192000" cy="6858000"/>
   <p:notesSz cx="6858000" cy="9144000"/>
@@ -9303,15 +9304,15 @@
           <a:p>
             <a:pPr algn="r" rtl="1"/>
             <a:r>
-              <a:rPr lang="he-IL" sz="2800" smtClean="0"/>
+              <a:rPr lang="he-IL" sz="2800" dirty="0" smtClean="0"/>
               <a:t>הרכב </a:t>
             </a:r>
             <a:r>
-              <a:rPr lang="he-IL" sz="2800" smtClean="0"/>
+              <a:rPr lang="he-IL" sz="2800" dirty="0" smtClean="0"/>
               <a:t>הפרוייק</a:t>
             </a:r>
             <a:r>
-              <a:rPr lang="he-IL" sz="2800" smtClean="0">
+              <a:rPr lang="he-IL" sz="2800" dirty="0" smtClean="0">
                 <a:solidFill>
                   <a:prstClr val="white"/>
                 </a:solidFill>
@@ -12070,6 +12071,225 @@
     <p:extLst>
       <p:ext uri="{BB962C8B-B14F-4D97-AF65-F5344CB8AC3E}">
         <p14:creationId xmlns:p14="http://schemas.microsoft.com/office/powerpoint/2010/main" val="1868763568"/>
+      </p:ext>
+    </p:extLst>
+  </p:cSld>
+  <p:clrMapOvr>
+    <a:masterClrMapping/>
+  </p:clrMapOvr>
+  <p:timing>
+    <p:tnLst>
+      <p:par>
+        <p:cTn id="1" dur="indefinite" restart="never" nodeType="tmRoot"/>
+      </p:par>
+    </p:tnLst>
+  </p:timing>
+</p:sld>
+</file>
+
+<file path=ppt/slides/slide24.xml><?xml version="1.0" encoding="utf-8"?>
+<p:sld xmlns:a="http://schemas.openxmlformats.org/drawingml/2006/main" xmlns:r="http://schemas.openxmlformats.org/officeDocument/2006/relationships" xmlns:p="http://schemas.openxmlformats.org/presentationml/2006/main">
+  <p:cSld>
+    <p:spTree>
+      <p:nvGrpSpPr>
+        <p:cNvPr id="1" name=""/>
+        <p:cNvGrpSpPr/>
+        <p:nvPr/>
+      </p:nvGrpSpPr>
+      <p:grpSpPr>
+        <a:xfrm>
+          <a:off x="0" y="0"/>
+          <a:ext cx="0" cy="0"/>
+          <a:chOff x="0" y="0"/>
+          <a:chExt cx="0" cy="0"/>
+        </a:xfrm>
+      </p:grpSpPr>
+      <p:sp>
+        <p:nvSpPr>
+          <p:cNvPr id="2" name="Title 1"/>
+          <p:cNvSpPr>
+            <a:spLocks noGrp="1"/>
+          </p:cNvSpPr>
+          <p:nvPr>
+            <p:ph type="title"/>
+          </p:nvPr>
+        </p:nvSpPr>
+        <p:spPr/>
+        <p:txBody>
+          <a:bodyPr>
+            <a:normAutofit fontScale="90000"/>
+          </a:bodyPr>
+          <a:lstStyle/>
+          <a:p>
+            <a:pPr algn="r" rtl="1"/>
+            <a:r>
+              <a:rPr lang="he-IL" dirty="0"/>
+              <a:t>עיצוב </a:t>
+            </a:r>
+            <a:r>
+              <a:rPr lang="en-US" dirty="0"/>
+              <a:t>UI</a:t>
+            </a:r>
+            <a:r>
+              <a:rPr lang="he-IL" dirty="0"/>
+              <a:t> באנדרואיד</a:t>
+            </a:r>
+            <a:endParaRPr lang="en-US" dirty="0"/>
+          </a:p>
+        </p:txBody>
+      </p:sp>
+      <p:sp>
+        <p:nvSpPr>
+          <p:cNvPr id="3" name="Content Placeholder 2"/>
+          <p:cNvSpPr>
+            <a:spLocks noGrp="1"/>
+          </p:cNvSpPr>
+          <p:nvPr>
+            <p:ph idx="1"/>
+          </p:nvPr>
+        </p:nvSpPr>
+        <p:spPr>
+          <a:xfrm>
+            <a:off x="598621" y="1852654"/>
+            <a:ext cx="7940660" cy="4426840"/>
+          </a:xfrm>
+        </p:spPr>
+        <p:txBody>
+          <a:bodyPr>
+            <a:normAutofit/>
+          </a:bodyPr>
+          <a:lstStyle/>
+          <a:p>
+            <a:pPr algn="r" rtl="1"/>
+            <a:r>
+              <a:rPr lang="en-US" dirty="0" smtClean="0"/>
+              <a:t>Layouts</a:t>
+            </a:r>
+          </a:p>
+          <a:p>
+            <a:pPr algn="r" rtl="1"/>
+            <a:r>
+              <a:rPr lang="he-IL" dirty="0" smtClean="0"/>
+              <a:t>וויגטים בסיסיים</a:t>
+            </a:r>
+            <a:endParaRPr lang="en-US" dirty="0" smtClean="0"/>
+          </a:p>
+          <a:p>
+            <a:pPr algn="r" rtl="1"/>
+            <a:r>
+              <a:rPr lang="en-US" dirty="0" smtClean="0"/>
+              <a:t>t</a:t>
+            </a:r>
+            <a:r>
+              <a:rPr lang="en-US" dirty="0" smtClean="0"/>
+              <a:t>oasts </a:t>
+            </a:r>
+            <a:r>
+              <a:rPr lang="he-IL" dirty="0"/>
+              <a:t> </a:t>
+            </a:r>
+            <a:r>
+              <a:rPr lang="he-IL" dirty="0" smtClean="0"/>
+              <a:t>ולוגים</a:t>
+            </a:r>
+          </a:p>
+          <a:p>
+            <a:pPr algn="r" rtl="1"/>
+            <a:r>
+              <a:rPr lang="he-IL" dirty="0" smtClean="0"/>
+              <a:t>דיאלוגים</a:t>
+            </a:r>
+          </a:p>
+          <a:p>
+            <a:pPr algn="r" rtl="1"/>
+            <a:r>
+              <a:rPr lang="he-IL" dirty="0" smtClean="0"/>
+              <a:t>רשימות</a:t>
+            </a:r>
+            <a:r>
+              <a:rPr lang="he-IL" sz="2000" dirty="0" smtClean="0"/>
+              <a:t> </a:t>
+            </a:r>
+            <a:r>
+              <a:rPr lang="en-US" sz="2000" dirty="0" smtClean="0"/>
+              <a:t>[maybe]</a:t>
+            </a:r>
+            <a:endParaRPr lang="he-IL" sz="2000" dirty="0" smtClean="0"/>
+          </a:p>
+          <a:p>
+            <a:pPr marL="0" indent="0" algn="r" rtl="1">
+              <a:buNone/>
+            </a:pPr>
+            <a:endParaRPr lang="en-US" dirty="0" smtClean="0"/>
+          </a:p>
+        </p:txBody>
+      </p:sp>
+      <p:sp>
+        <p:nvSpPr>
+          <p:cNvPr id="4" name="Title 1"/>
+          <p:cNvSpPr txBox="1">
+            <a:spLocks/>
+          </p:cNvSpPr>
+          <p:nvPr/>
+        </p:nvSpPr>
+        <p:spPr>
+          <a:xfrm>
+            <a:off x="598621" y="1089129"/>
+            <a:ext cx="7376537" cy="763525"/>
+          </a:xfrm>
+          <a:prstGeom prst="rect">
+            <a:avLst/>
+          </a:prstGeom>
+        </p:spPr>
+        <p:txBody>
+          <a:bodyPr vert="horz" lIns="91440" tIns="45720" rIns="91440" bIns="45720" rtlCol="0" anchor="ctr">
+            <a:normAutofit fontScale="97500"/>
+          </a:bodyPr>
+          <a:lstStyle>
+            <a:lvl1pPr algn="l" defTabSz="1219170" rtl="0" eaLnBrk="1" latinLnBrk="0" hangingPunct="1">
+              <a:spcBef>
+                <a:spcPct val="0"/>
+              </a:spcBef>
+              <a:buNone/>
+              <a:defRPr sz="4800" kern="1200">
+                <a:solidFill>
+                  <a:srgbClr val="FFC000"/>
+                </a:solidFill>
+                <a:effectLst>
+                  <a:outerShdw blurRad="50800" dist="38100" dir="2700000" algn="tl" rotWithShape="0">
+                    <a:prstClr val="black">
+                      <a:alpha val="40000"/>
+                    </a:prstClr>
+                  </a:outerShdw>
+                </a:effectLst>
+                <a:latin typeface="+mj-lt"/>
+                <a:ea typeface="+mj-ea"/>
+                <a:cs typeface="+mj-cs"/>
+              </a:defRPr>
+            </a:lvl1pPr>
+          </a:lstStyle>
+          <a:p>
+            <a:pPr algn="r" rtl="1"/>
+            <a:r>
+              <a:rPr lang="he-IL" sz="4000" dirty="0" smtClean="0">
+                <a:solidFill>
+                  <a:srgbClr val="FFE701"/>
+                </a:solidFill>
+              </a:rPr>
+              <a:t>תוכן עניינים</a:t>
+            </a:r>
+            <a:endParaRPr lang="en-US" sz="4000" dirty="0">
+              <a:solidFill>
+                <a:srgbClr val="FFE701"/>
+              </a:solidFill>
+            </a:endParaRPr>
+          </a:p>
+        </p:txBody>
+      </p:sp>
+    </p:spTree>
+    <p:extLst>
+      <p:ext uri="{BB962C8B-B14F-4D97-AF65-F5344CB8AC3E}">
+        <p14:creationId xmlns:p14="http://schemas.microsoft.com/office/powerpoint/2010/main" val="3861225713"/>
       </p:ext>
     </p:extLst>
   </p:cSld>

</xml_diff>